<commit_message>
Added slides on structures
</commit_message>
<xml_diff>
--- a/CPlusPlus/02_essential_cpp_udt.pptx
+++ b/CPlusPlus/02_essential_cpp_udt.pptx
@@ -9,6 +9,8 @@
     <p:sldId id="258" r:id="rId3"/>
     <p:sldId id="259" r:id="rId4"/>
     <p:sldId id="260" r:id="rId5"/>
+    <p:sldId id="261" r:id="rId6"/>
+    <p:sldId id="262" r:id="rId7"/>
   </p:sldIdLst>
   <p:sldSz cx="9144000" cy="6858000" type="screen4x3"/>
   <p:notesSz cx="6858000" cy="9144000"/>
@@ -107,6 +109,11 @@
       </a:defRPr>
     </a:lvl9pPr>
   </p:defaultTextStyle>
+  <p:extLst>
+    <p:ext uri="{EFAFB233-063F-42B5-8137-9DF3F51BA10A}">
+      <p15:sldGuideLst xmlns:p15="http://schemas.microsoft.com/office/powerpoint/2012/main"/>
+    </p:ext>
+  </p:extLst>
 </p:presentation>
 </file>
 
@@ -241,7 +248,7 @@
           <a:p>
             <a:fld id="{A8801574-87B3-4792-B4E8-6055B541C335}" type="datetimeFigureOut">
               <a:rPr lang="en-US" smtClean="0"/>
-              <a:t>2017-02-14</a:t>
+              <a:t>2017-02-15</a:t>
             </a:fld>
             <a:endParaRPr lang="en-US"/>
           </a:p>
@@ -411,7 +418,7 @@
           <a:p>
             <a:fld id="{A8801574-87B3-4792-B4E8-6055B541C335}" type="datetimeFigureOut">
               <a:rPr lang="en-US" smtClean="0"/>
-              <a:t>2017-02-14</a:t>
+              <a:t>2017-02-15</a:t>
             </a:fld>
             <a:endParaRPr lang="en-US"/>
           </a:p>
@@ -591,7 +598,7 @@
           <a:p>
             <a:fld id="{A8801574-87B3-4792-B4E8-6055B541C335}" type="datetimeFigureOut">
               <a:rPr lang="en-US" smtClean="0"/>
-              <a:t>2017-02-14</a:t>
+              <a:t>2017-02-15</a:t>
             </a:fld>
             <a:endParaRPr lang="en-US"/>
           </a:p>
@@ -761,7 +768,7 @@
           <a:p>
             <a:fld id="{A8801574-87B3-4792-B4E8-6055B541C335}" type="datetimeFigureOut">
               <a:rPr lang="en-US" smtClean="0"/>
-              <a:t>2017-02-14</a:t>
+              <a:t>2017-02-15</a:t>
             </a:fld>
             <a:endParaRPr lang="en-US"/>
           </a:p>
@@ -1005,7 +1012,7 @@
           <a:p>
             <a:fld id="{A8801574-87B3-4792-B4E8-6055B541C335}" type="datetimeFigureOut">
               <a:rPr lang="en-US" smtClean="0"/>
-              <a:t>2017-02-14</a:t>
+              <a:t>2017-02-15</a:t>
             </a:fld>
             <a:endParaRPr lang="en-US"/>
           </a:p>
@@ -1237,7 +1244,7 @@
           <a:p>
             <a:fld id="{A8801574-87B3-4792-B4E8-6055B541C335}" type="datetimeFigureOut">
               <a:rPr lang="en-US" smtClean="0"/>
-              <a:t>2017-02-14</a:t>
+              <a:t>2017-02-15</a:t>
             </a:fld>
             <a:endParaRPr lang="en-US"/>
           </a:p>
@@ -1604,7 +1611,7 @@
           <a:p>
             <a:fld id="{A8801574-87B3-4792-B4E8-6055B541C335}" type="datetimeFigureOut">
               <a:rPr lang="en-US" smtClean="0"/>
-              <a:t>2017-02-14</a:t>
+              <a:t>2017-02-15</a:t>
             </a:fld>
             <a:endParaRPr lang="en-US"/>
           </a:p>
@@ -1722,7 +1729,7 @@
           <a:p>
             <a:fld id="{A8801574-87B3-4792-B4E8-6055B541C335}" type="datetimeFigureOut">
               <a:rPr lang="en-US" smtClean="0"/>
-              <a:t>2017-02-14</a:t>
+              <a:t>2017-02-15</a:t>
             </a:fld>
             <a:endParaRPr lang="en-US"/>
           </a:p>
@@ -1817,7 +1824,7 @@
           <a:p>
             <a:fld id="{A8801574-87B3-4792-B4E8-6055B541C335}" type="datetimeFigureOut">
               <a:rPr lang="en-US" smtClean="0"/>
-              <a:t>2017-02-14</a:t>
+              <a:t>2017-02-15</a:t>
             </a:fld>
             <a:endParaRPr lang="en-US"/>
           </a:p>
@@ -2094,7 +2101,7 @@
           <a:p>
             <a:fld id="{A8801574-87B3-4792-B4E8-6055B541C335}" type="datetimeFigureOut">
               <a:rPr lang="en-US" smtClean="0"/>
-              <a:t>2017-02-14</a:t>
+              <a:t>2017-02-15</a:t>
             </a:fld>
             <a:endParaRPr lang="en-US"/>
           </a:p>
@@ -2351,7 +2358,7 @@
           <a:p>
             <a:fld id="{A8801574-87B3-4792-B4E8-6055B541C335}" type="datetimeFigureOut">
               <a:rPr lang="en-US" smtClean="0"/>
-              <a:t>2017-02-14</a:t>
+              <a:t>2017-02-15</a:t>
             </a:fld>
             <a:endParaRPr lang="en-US"/>
           </a:p>
@@ -2564,7 +2571,7 @@
           <a:p>
             <a:fld id="{A8801574-87B3-4792-B4E8-6055B541C335}" type="datetimeFigureOut">
               <a:rPr lang="en-US" smtClean="0"/>
-              <a:t>2017-02-14</a:t>
+              <a:t>2017-02-15</a:t>
             </a:fld>
             <a:endParaRPr lang="en-US"/>
           </a:p>
@@ -3516,6 +3523,13 @@
   <p:clrMapOvr>
     <a:masterClrMapping/>
   </p:clrMapOvr>
+  <p:timing>
+    <p:tnLst>
+      <p:par>
+        <p:cTn id="1" dur="indefinite" restart="never" nodeType="tmRoot"/>
+      </p:par>
+    </p:tnLst>
+  </p:timing>
 </p:sld>
 </file>
 
@@ -3553,7 +3567,11 @@
           <a:p>
             <a:r>
               <a:rPr lang="en-US" dirty="0" smtClean="0"/>
-              <a:t>Structures</a:t>
+              <a:t>Defining s</a:t>
+            </a:r>
+            <a:r>
+              <a:rPr lang="en-US" dirty="0" smtClean="0"/>
+              <a:t>tructures</a:t>
             </a:r>
             <a:endParaRPr lang="en-US" dirty="0"/>
           </a:p>
@@ -3576,7 +3594,36 @@
           <a:p>
             <a:r>
               <a:rPr lang="en-US" dirty="0" smtClean="0"/>
-              <a:t>Representing tuples</a:t>
+              <a:t>Representing </a:t>
+            </a:r>
+            <a:r>
+              <a:rPr lang="en-US" dirty="0" smtClean="0"/>
+              <a:t>tuples</a:t>
+            </a:r>
+          </a:p>
+          <a:p>
+            <a:r>
+              <a:rPr lang="en-US" dirty="0" smtClean="0"/>
+              <a:t>Define new type, specify name, members</a:t>
+            </a:r>
+            <a:endParaRPr lang="en-US" dirty="0" smtClean="0"/>
+          </a:p>
+          <a:p>
+            <a:endParaRPr lang="en-US" dirty="0"/>
+          </a:p>
+          <a:p>
+            <a:endParaRPr lang="en-US" dirty="0" smtClean="0"/>
+          </a:p>
+          <a:p>
+            <a:endParaRPr lang="en-US" dirty="0"/>
+          </a:p>
+          <a:p>
+            <a:endParaRPr lang="en-US" dirty="0" smtClean="0"/>
+          </a:p>
+          <a:p>
+            <a:r>
+              <a:rPr lang="en-US" dirty="0" smtClean="0"/>
+              <a:t>Members can have distinct types</a:t>
             </a:r>
             <a:endParaRPr lang="en-US" dirty="0"/>
           </a:p>
@@ -3590,8 +3637,8 @@
         </p:nvSpPr>
         <p:spPr>
           <a:xfrm>
-            <a:off x="701777" y="2508666"/>
-            <a:ext cx="4646971" cy="1323439"/>
+            <a:off x="750938" y="3108433"/>
+            <a:ext cx="2955823" cy="1323439"/>
           </a:xfrm>
           <a:prstGeom prst="rect">
             <a:avLst/>
@@ -3613,7 +3660,21 @@
                 <a:latin typeface="Courier New" pitchFamily="49" charset="0"/>
                 <a:cs typeface="Courier New" pitchFamily="49" charset="0"/>
               </a:rPr>
-              <a:t>struct particle {</a:t>
+              <a:t>struct </a:t>
+            </a:r>
+            <a:r>
+              <a:rPr lang="nn-NO" sz="1600" dirty="0" smtClean="0">
+                <a:latin typeface="Courier New" pitchFamily="49" charset="0"/>
+                <a:cs typeface="Courier New" pitchFamily="49" charset="0"/>
+              </a:rPr>
+              <a:t>Particle </a:t>
+            </a:r>
+            <a:r>
+              <a:rPr lang="nn-NO" sz="1600" dirty="0" smtClean="0">
+                <a:latin typeface="Courier New" pitchFamily="49" charset="0"/>
+                <a:cs typeface="Courier New" pitchFamily="49" charset="0"/>
+              </a:rPr>
+              <a:t>{</a:t>
             </a:r>
           </a:p>
           <a:p>
@@ -3666,11 +3727,11 @@
           </a:p>
           <a:p>
             <a:r>
-              <a:rPr lang="nn-NO" sz="1600" dirty="0">
+              <a:rPr lang="nn-NO" sz="1600" dirty="0" smtClean="0">
                 <a:latin typeface="Courier New" pitchFamily="49" charset="0"/>
                 <a:cs typeface="Courier New" pitchFamily="49" charset="0"/>
               </a:rPr>
-              <a:t>}</a:t>
+              <a:t>};</a:t>
             </a:r>
             <a:endParaRPr lang="nn-NO" sz="1600" dirty="0">
               <a:latin typeface="Courier New" pitchFamily="49" charset="0"/>
@@ -3679,6 +3740,300 @@
           </a:p>
         </p:txBody>
       </p:sp>
+      <p:grpSp>
+        <p:nvGrpSpPr>
+          <p:cNvPr id="5" name="Group 4"/>
+          <p:cNvGrpSpPr/>
+          <p:nvPr/>
+        </p:nvGrpSpPr>
+        <p:grpSpPr>
+          <a:xfrm>
+            <a:off x="1798111" y="3373693"/>
+            <a:ext cx="3245838" cy="805198"/>
+            <a:chOff x="241550" y="2790404"/>
+            <a:chExt cx="3245838" cy="805198"/>
+          </a:xfrm>
+        </p:grpSpPr>
+        <p:sp>
+          <p:nvSpPr>
+            <p:cNvPr id="6" name="TextBox 5"/>
+            <p:cNvSpPr txBox="1"/>
+            <p:nvPr/>
+          </p:nvSpPr>
+          <p:spPr>
+            <a:xfrm>
+              <a:off x="1748722" y="2790404"/>
+              <a:ext cx="1738666" cy="400110"/>
+            </a:xfrm>
+            <a:prstGeom prst="rect">
+              <a:avLst/>
+            </a:prstGeom>
+            <a:solidFill>
+              <a:schemeClr val="bg1"/>
+            </a:solidFill>
+            <a:ln w="19050">
+              <a:solidFill>
+                <a:srgbClr val="C00000"/>
+              </a:solidFill>
+            </a:ln>
+          </p:spPr>
+          <p:txBody>
+            <a:bodyPr wrap="square" rtlCol="0">
+              <a:spAutoFit/>
+            </a:bodyPr>
+            <a:lstStyle/>
+            <a:p>
+              <a:r>
+                <a:rPr lang="en-US" sz="2000" dirty="0" smtClean="0">
+                  <a:solidFill>
+                    <a:srgbClr val="C00000"/>
+                  </a:solidFill>
+                </a:rPr>
+                <a:t>member name</a:t>
+              </a:r>
+              <a:endParaRPr lang="en-US" sz="2000" dirty="0">
+                <a:solidFill>
+                  <a:srgbClr val="C00000"/>
+                </a:solidFill>
+                <a:latin typeface="Courier New" panose="02070309020205020404" pitchFamily="49" charset="0"/>
+                <a:cs typeface="Courier New" panose="02070309020205020404" pitchFamily="49" charset="0"/>
+              </a:endParaRPr>
+            </a:p>
+          </p:txBody>
+        </p:sp>
+        <p:sp>
+          <p:nvSpPr>
+            <p:cNvPr id="7" name="Rectangle 6"/>
+            <p:cNvSpPr/>
+            <p:nvPr/>
+          </p:nvSpPr>
+          <p:spPr>
+            <a:xfrm>
+              <a:off x="241550" y="3314758"/>
+              <a:ext cx="768807" cy="280844"/>
+            </a:xfrm>
+            <a:prstGeom prst="rect">
+              <a:avLst/>
+            </a:prstGeom>
+            <a:noFill/>
+            <a:ln w="19050">
+              <a:solidFill>
+                <a:srgbClr val="C00000"/>
+              </a:solidFill>
+            </a:ln>
+          </p:spPr>
+          <p:style>
+            <a:lnRef idx="2">
+              <a:schemeClr val="accent1">
+                <a:shade val="50000"/>
+              </a:schemeClr>
+            </a:lnRef>
+            <a:fillRef idx="1">
+              <a:schemeClr val="accent1"/>
+            </a:fillRef>
+            <a:effectRef idx="0">
+              <a:schemeClr val="accent1"/>
+            </a:effectRef>
+            <a:fontRef idx="minor">
+              <a:schemeClr val="lt1"/>
+            </a:fontRef>
+          </p:style>
+          <p:txBody>
+            <a:bodyPr rtlCol="0" anchor="ctr"/>
+            <a:lstStyle/>
+            <a:p>
+              <a:pPr algn="ctr"/>
+              <a:endParaRPr lang="en-US"/>
+            </a:p>
+          </p:txBody>
+        </p:sp>
+        <p:cxnSp>
+          <p:nvCxnSpPr>
+            <p:cNvPr id="8" name="Straight Arrow Connector 7"/>
+            <p:cNvCxnSpPr>
+              <a:stCxn id="6" idx="1"/>
+              <a:endCxn id="7" idx="3"/>
+            </p:cNvCxnSpPr>
+            <p:nvPr/>
+          </p:nvCxnSpPr>
+          <p:spPr>
+            <a:xfrm flipH="1">
+              <a:off x="1010357" y="2990459"/>
+              <a:ext cx="738365" cy="464721"/>
+            </a:xfrm>
+            <a:prstGeom prst="straightConnector1">
+              <a:avLst/>
+            </a:prstGeom>
+            <a:ln w="19050">
+              <a:solidFill>
+                <a:srgbClr val="C00000"/>
+              </a:solidFill>
+              <a:tailEnd type="stealth" w="lg" len="lg"/>
+            </a:ln>
+          </p:spPr>
+          <p:style>
+            <a:lnRef idx="1">
+              <a:schemeClr val="accent1"/>
+            </a:lnRef>
+            <a:fillRef idx="0">
+              <a:schemeClr val="accent1"/>
+            </a:fillRef>
+            <a:effectRef idx="0">
+              <a:schemeClr val="accent1"/>
+            </a:effectRef>
+            <a:fontRef idx="minor">
+              <a:schemeClr val="tx1"/>
+            </a:fontRef>
+          </p:style>
+        </p:cxnSp>
+      </p:grpSp>
+      <p:grpSp>
+        <p:nvGrpSpPr>
+          <p:cNvPr id="10" name="Group 9"/>
+          <p:cNvGrpSpPr/>
+          <p:nvPr/>
+        </p:nvGrpSpPr>
+        <p:grpSpPr>
+          <a:xfrm>
+            <a:off x="1314659" y="3892091"/>
+            <a:ext cx="2392102" cy="868816"/>
+            <a:chOff x="592922" y="3314758"/>
+            <a:chExt cx="2392102" cy="868816"/>
+          </a:xfrm>
+        </p:grpSpPr>
+        <p:sp>
+          <p:nvSpPr>
+            <p:cNvPr id="11" name="TextBox 10"/>
+            <p:cNvSpPr txBox="1"/>
+            <p:nvPr/>
+          </p:nvSpPr>
+          <p:spPr>
+            <a:xfrm>
+              <a:off x="1394760" y="3783464"/>
+              <a:ext cx="1590264" cy="400110"/>
+            </a:xfrm>
+            <a:prstGeom prst="rect">
+              <a:avLst/>
+            </a:prstGeom>
+            <a:solidFill>
+              <a:schemeClr val="bg1"/>
+            </a:solidFill>
+            <a:ln w="19050">
+              <a:solidFill>
+                <a:srgbClr val="C00000"/>
+              </a:solidFill>
+            </a:ln>
+          </p:spPr>
+          <p:txBody>
+            <a:bodyPr wrap="square" rtlCol="0">
+              <a:spAutoFit/>
+            </a:bodyPr>
+            <a:lstStyle/>
+            <a:p>
+              <a:r>
+                <a:rPr lang="en-US" sz="2000" dirty="0" smtClean="0">
+                  <a:solidFill>
+                    <a:srgbClr val="C00000"/>
+                  </a:solidFill>
+                </a:rPr>
+                <a:t>member type</a:t>
+              </a:r>
+              <a:endParaRPr lang="en-US" sz="2000" dirty="0">
+                <a:solidFill>
+                  <a:srgbClr val="C00000"/>
+                </a:solidFill>
+                <a:latin typeface="Courier New" panose="02070309020205020404" pitchFamily="49" charset="0"/>
+                <a:cs typeface="Courier New" panose="02070309020205020404" pitchFamily="49" charset="0"/>
+              </a:endParaRPr>
+            </a:p>
+          </p:txBody>
+        </p:sp>
+        <p:sp>
+          <p:nvSpPr>
+            <p:cNvPr id="12" name="Rectangle 11"/>
+            <p:cNvSpPr/>
+            <p:nvPr/>
+          </p:nvSpPr>
+          <p:spPr>
+            <a:xfrm>
+              <a:off x="592922" y="3314758"/>
+              <a:ext cx="417435" cy="280844"/>
+            </a:xfrm>
+            <a:prstGeom prst="rect">
+              <a:avLst/>
+            </a:prstGeom>
+            <a:noFill/>
+            <a:ln w="19050">
+              <a:solidFill>
+                <a:srgbClr val="C00000"/>
+              </a:solidFill>
+            </a:ln>
+          </p:spPr>
+          <p:style>
+            <a:lnRef idx="2">
+              <a:schemeClr val="accent1">
+                <a:shade val="50000"/>
+              </a:schemeClr>
+            </a:lnRef>
+            <a:fillRef idx="1">
+              <a:schemeClr val="accent1"/>
+            </a:fillRef>
+            <a:effectRef idx="0">
+              <a:schemeClr val="accent1"/>
+            </a:effectRef>
+            <a:fontRef idx="minor">
+              <a:schemeClr val="lt1"/>
+            </a:fontRef>
+          </p:style>
+          <p:txBody>
+            <a:bodyPr rtlCol="0" anchor="ctr"/>
+            <a:lstStyle/>
+            <a:p>
+              <a:pPr algn="ctr"/>
+              <a:endParaRPr lang="en-US"/>
+            </a:p>
+          </p:txBody>
+        </p:sp>
+        <p:cxnSp>
+          <p:nvCxnSpPr>
+            <p:cNvPr id="13" name="Straight Arrow Connector 12"/>
+            <p:cNvCxnSpPr>
+              <a:stCxn id="11" idx="1"/>
+              <a:endCxn id="12" idx="2"/>
+            </p:cNvCxnSpPr>
+            <p:nvPr/>
+          </p:nvCxnSpPr>
+          <p:spPr>
+            <a:xfrm flipH="1" flipV="1">
+              <a:off x="801640" y="3595602"/>
+              <a:ext cx="593120" cy="387917"/>
+            </a:xfrm>
+            <a:prstGeom prst="straightConnector1">
+              <a:avLst/>
+            </a:prstGeom>
+            <a:ln w="19050">
+              <a:solidFill>
+                <a:srgbClr val="C00000"/>
+              </a:solidFill>
+              <a:tailEnd type="stealth" w="lg" len="lg"/>
+            </a:ln>
+          </p:spPr>
+          <p:style>
+            <a:lnRef idx="1">
+              <a:schemeClr val="accent1"/>
+            </a:lnRef>
+            <a:fillRef idx="0">
+              <a:schemeClr val="accent1"/>
+            </a:fillRef>
+            <a:effectRef idx="0">
+              <a:schemeClr val="accent1"/>
+            </a:effectRef>
+            <a:fontRef idx="minor">
+              <a:schemeClr val="tx1"/>
+            </a:fontRef>
+          </p:style>
+        </p:cxnSp>
+      </p:grpSp>
     </p:spTree>
     <p:extLst>
       <p:ext uri="{BB962C8B-B14F-4D97-AF65-F5344CB8AC3E}">
@@ -3689,6 +4044,1697 @@
   <p:clrMapOvr>
     <a:masterClrMapping/>
   </p:clrMapOvr>
+  <p:timing>
+    <p:tnLst>
+      <p:par>
+        <p:cTn id="1" dur="indefinite" restart="never" nodeType="tmRoot">
+          <p:childTnLst>
+            <p:seq concurrent="1" nextAc="seek">
+              <p:cTn id="2" dur="indefinite" nodeType="mainSeq">
+                <p:childTnLst>
+                  <p:par>
+                    <p:cTn id="3" fill="hold">
+                      <p:stCondLst>
+                        <p:cond delay="indefinite"/>
+                        <p:cond evt="onBegin" delay="0">
+                          <p:tn val="2"/>
+                        </p:cond>
+                      </p:stCondLst>
+                      <p:childTnLst>
+                        <p:par>
+                          <p:cTn id="4" fill="hold">
+                            <p:stCondLst>
+                              <p:cond delay="0"/>
+                            </p:stCondLst>
+                            <p:childTnLst>
+                              <p:par>
+                                <p:cTn id="5" presetID="1" presetClass="entr" presetSubtype="0" fill="hold" grpId="0" nodeType="withEffect">
+                                  <p:stCondLst>
+                                    <p:cond delay="0"/>
+                                  </p:stCondLst>
+                                  <p:childTnLst>
+                                    <p:set>
+                                      <p:cBhvr>
+                                        <p:cTn id="6" dur="1" fill="hold">
+                                          <p:stCondLst>
+                                            <p:cond delay="0"/>
+                                          </p:stCondLst>
+                                        </p:cTn>
+                                        <p:tgtEl>
+                                          <p:spTgt spid="3">
+                                            <p:txEl>
+                                              <p:pRg st="0" end="0"/>
+                                            </p:txEl>
+                                          </p:spTgt>
+                                        </p:tgtEl>
+                                        <p:attrNameLst>
+                                          <p:attrName>style.visibility</p:attrName>
+                                        </p:attrNameLst>
+                                      </p:cBhvr>
+                                      <p:to>
+                                        <p:strVal val="visible"/>
+                                      </p:to>
+                                    </p:set>
+                                  </p:childTnLst>
+                                </p:cTn>
+                              </p:par>
+                            </p:childTnLst>
+                          </p:cTn>
+                        </p:par>
+                      </p:childTnLst>
+                    </p:cTn>
+                  </p:par>
+                  <p:par>
+                    <p:cTn id="7" fill="hold">
+                      <p:stCondLst>
+                        <p:cond delay="indefinite"/>
+                      </p:stCondLst>
+                      <p:childTnLst>
+                        <p:par>
+                          <p:cTn id="8" fill="hold">
+                            <p:stCondLst>
+                              <p:cond delay="0"/>
+                            </p:stCondLst>
+                            <p:childTnLst>
+                              <p:par>
+                                <p:cTn id="9" presetID="1" presetClass="entr" presetSubtype="0" fill="hold" grpId="0" nodeType="clickEffect">
+                                  <p:stCondLst>
+                                    <p:cond delay="0"/>
+                                  </p:stCondLst>
+                                  <p:childTnLst>
+                                    <p:set>
+                                      <p:cBhvr>
+                                        <p:cTn id="10" dur="1" fill="hold">
+                                          <p:stCondLst>
+                                            <p:cond delay="0"/>
+                                          </p:stCondLst>
+                                        </p:cTn>
+                                        <p:tgtEl>
+                                          <p:spTgt spid="3">
+                                            <p:txEl>
+                                              <p:pRg st="1" end="1"/>
+                                            </p:txEl>
+                                          </p:spTgt>
+                                        </p:tgtEl>
+                                        <p:attrNameLst>
+                                          <p:attrName>style.visibility</p:attrName>
+                                        </p:attrNameLst>
+                                      </p:cBhvr>
+                                      <p:to>
+                                        <p:strVal val="visible"/>
+                                      </p:to>
+                                    </p:set>
+                                  </p:childTnLst>
+                                </p:cTn>
+                              </p:par>
+                              <p:par>
+                                <p:cTn id="11" presetID="1" presetClass="entr" presetSubtype="0" fill="hold" grpId="0" nodeType="withEffect">
+                                  <p:stCondLst>
+                                    <p:cond delay="0"/>
+                                  </p:stCondLst>
+                                  <p:childTnLst>
+                                    <p:set>
+                                      <p:cBhvr>
+                                        <p:cTn id="12" dur="1" fill="hold">
+                                          <p:stCondLst>
+                                            <p:cond delay="0"/>
+                                          </p:stCondLst>
+                                        </p:cTn>
+                                        <p:tgtEl>
+                                          <p:spTgt spid="4"/>
+                                        </p:tgtEl>
+                                        <p:attrNameLst>
+                                          <p:attrName>style.visibility</p:attrName>
+                                        </p:attrNameLst>
+                                      </p:cBhvr>
+                                      <p:to>
+                                        <p:strVal val="visible"/>
+                                      </p:to>
+                                    </p:set>
+                                  </p:childTnLst>
+                                </p:cTn>
+                              </p:par>
+                            </p:childTnLst>
+                          </p:cTn>
+                        </p:par>
+                      </p:childTnLst>
+                    </p:cTn>
+                  </p:par>
+                  <p:par>
+                    <p:cTn id="13" fill="hold">
+                      <p:stCondLst>
+                        <p:cond delay="indefinite"/>
+                      </p:stCondLst>
+                      <p:childTnLst>
+                        <p:par>
+                          <p:cTn id="14" fill="hold">
+                            <p:stCondLst>
+                              <p:cond delay="0"/>
+                            </p:stCondLst>
+                            <p:childTnLst>
+                              <p:par>
+                                <p:cTn id="15" presetID="1" presetClass="entr" presetSubtype="0" fill="hold" nodeType="clickEffect">
+                                  <p:stCondLst>
+                                    <p:cond delay="0"/>
+                                  </p:stCondLst>
+                                  <p:childTnLst>
+                                    <p:set>
+                                      <p:cBhvr>
+                                        <p:cTn id="16" dur="1" fill="hold">
+                                          <p:stCondLst>
+                                            <p:cond delay="0"/>
+                                          </p:stCondLst>
+                                        </p:cTn>
+                                        <p:tgtEl>
+                                          <p:spTgt spid="5"/>
+                                        </p:tgtEl>
+                                        <p:attrNameLst>
+                                          <p:attrName>style.visibility</p:attrName>
+                                        </p:attrNameLst>
+                                      </p:cBhvr>
+                                      <p:to>
+                                        <p:strVal val="visible"/>
+                                      </p:to>
+                                    </p:set>
+                                  </p:childTnLst>
+                                </p:cTn>
+                              </p:par>
+                            </p:childTnLst>
+                          </p:cTn>
+                        </p:par>
+                      </p:childTnLst>
+                    </p:cTn>
+                  </p:par>
+                  <p:par>
+                    <p:cTn id="17" fill="hold">
+                      <p:stCondLst>
+                        <p:cond delay="indefinite"/>
+                      </p:stCondLst>
+                      <p:childTnLst>
+                        <p:par>
+                          <p:cTn id="18" fill="hold">
+                            <p:stCondLst>
+                              <p:cond delay="0"/>
+                            </p:stCondLst>
+                            <p:childTnLst>
+                              <p:par>
+                                <p:cTn id="19" presetID="1" presetClass="entr" presetSubtype="0" fill="hold" nodeType="clickEffect">
+                                  <p:stCondLst>
+                                    <p:cond delay="0"/>
+                                  </p:stCondLst>
+                                  <p:childTnLst>
+                                    <p:set>
+                                      <p:cBhvr>
+                                        <p:cTn id="20" dur="1" fill="hold">
+                                          <p:stCondLst>
+                                            <p:cond delay="0"/>
+                                          </p:stCondLst>
+                                        </p:cTn>
+                                        <p:tgtEl>
+                                          <p:spTgt spid="10"/>
+                                        </p:tgtEl>
+                                        <p:attrNameLst>
+                                          <p:attrName>style.visibility</p:attrName>
+                                        </p:attrNameLst>
+                                      </p:cBhvr>
+                                      <p:to>
+                                        <p:strVal val="visible"/>
+                                      </p:to>
+                                    </p:set>
+                                  </p:childTnLst>
+                                </p:cTn>
+                              </p:par>
+                            </p:childTnLst>
+                          </p:cTn>
+                        </p:par>
+                      </p:childTnLst>
+                    </p:cTn>
+                  </p:par>
+                  <p:par>
+                    <p:cTn id="21" fill="hold">
+                      <p:stCondLst>
+                        <p:cond delay="indefinite"/>
+                      </p:stCondLst>
+                      <p:childTnLst>
+                        <p:par>
+                          <p:cTn id="22" fill="hold">
+                            <p:stCondLst>
+                              <p:cond delay="0"/>
+                            </p:stCondLst>
+                            <p:childTnLst>
+                              <p:par>
+                                <p:cTn id="23" presetID="1" presetClass="entr" presetSubtype="0" fill="hold" grpId="0" nodeType="clickEffect">
+                                  <p:stCondLst>
+                                    <p:cond delay="0"/>
+                                  </p:stCondLst>
+                                  <p:childTnLst>
+                                    <p:set>
+                                      <p:cBhvr>
+                                        <p:cTn id="24" dur="1" fill="hold">
+                                          <p:stCondLst>
+                                            <p:cond delay="0"/>
+                                          </p:stCondLst>
+                                        </p:cTn>
+                                        <p:tgtEl>
+                                          <p:spTgt spid="3">
+                                            <p:txEl>
+                                              <p:pRg st="6" end="6"/>
+                                            </p:txEl>
+                                          </p:spTgt>
+                                        </p:tgtEl>
+                                        <p:attrNameLst>
+                                          <p:attrName>style.visibility</p:attrName>
+                                        </p:attrNameLst>
+                                      </p:cBhvr>
+                                      <p:to>
+                                        <p:strVal val="visible"/>
+                                      </p:to>
+                                    </p:set>
+                                  </p:childTnLst>
+                                </p:cTn>
+                              </p:par>
+                            </p:childTnLst>
+                          </p:cTn>
+                        </p:par>
+                      </p:childTnLst>
+                    </p:cTn>
+                  </p:par>
+                </p:childTnLst>
+              </p:cTn>
+              <p:prevCondLst>
+                <p:cond evt="onPrev" delay="0">
+                  <p:tgtEl>
+                    <p:sldTgt/>
+                  </p:tgtEl>
+                </p:cond>
+              </p:prevCondLst>
+              <p:nextCondLst>
+                <p:cond evt="onNext" delay="0">
+                  <p:tgtEl>
+                    <p:sldTgt/>
+                  </p:tgtEl>
+                </p:cond>
+              </p:nextCondLst>
+            </p:seq>
+          </p:childTnLst>
+        </p:cTn>
+      </p:par>
+    </p:tnLst>
+    <p:bldLst>
+      <p:bldP spid="3" grpId="0" uiExpand="1" build="p"/>
+      <p:bldP spid="4" grpId="0" animBg="1"/>
+    </p:bldLst>
+  </p:timing>
+</p:sld>
+</file>
+
+<file path=ppt/slides/slide5.xml><?xml version="1.0" encoding="utf-8"?>
+<p:sld xmlns:a="http://schemas.openxmlformats.org/drawingml/2006/main" xmlns:r="http://schemas.openxmlformats.org/officeDocument/2006/relationships" xmlns:p="http://schemas.openxmlformats.org/presentationml/2006/main">
+  <p:cSld>
+    <p:spTree>
+      <p:nvGrpSpPr>
+        <p:cNvPr id="1" name=""/>
+        <p:cNvGrpSpPr/>
+        <p:nvPr/>
+      </p:nvGrpSpPr>
+      <p:grpSpPr>
+        <a:xfrm>
+          <a:off x="0" y="0"/>
+          <a:ext cx="0" cy="0"/>
+          <a:chOff x="0" y="0"/>
+          <a:chExt cx="0" cy="0"/>
+        </a:xfrm>
+      </p:grpSpPr>
+      <p:sp>
+        <p:nvSpPr>
+          <p:cNvPr id="2" name="Title 1"/>
+          <p:cNvSpPr>
+            <a:spLocks noGrp="1"/>
+          </p:cNvSpPr>
+          <p:nvPr>
+            <p:ph type="title"/>
+          </p:nvPr>
+        </p:nvSpPr>
+        <p:spPr/>
+        <p:txBody>
+          <a:bodyPr/>
+          <a:lstStyle/>
+          <a:p>
+            <a:r>
+              <a:rPr lang="en-US" dirty="0" smtClean="0"/>
+              <a:t>Using structures</a:t>
+            </a:r>
+            <a:endParaRPr lang="en-US" dirty="0"/>
+          </a:p>
+        </p:txBody>
+      </p:sp>
+      <p:sp>
+        <p:nvSpPr>
+          <p:cNvPr id="3" name="Content Placeholder 2"/>
+          <p:cNvSpPr>
+            <a:spLocks noGrp="1"/>
+          </p:cNvSpPr>
+          <p:nvPr>
+            <p:ph idx="1"/>
+          </p:nvPr>
+        </p:nvSpPr>
+        <p:spPr/>
+        <p:txBody>
+          <a:bodyPr/>
+          <a:lstStyle/>
+          <a:p>
+            <a:r>
+              <a:rPr lang="en-US" dirty="0" smtClean="0"/>
+              <a:t>Variable declaration</a:t>
+            </a:r>
+          </a:p>
+          <a:p>
+            <a:endParaRPr lang="en-US" dirty="0"/>
+          </a:p>
+          <a:p>
+            <a:endParaRPr lang="en-US" dirty="0" smtClean="0"/>
+          </a:p>
+          <a:p>
+            <a:endParaRPr lang="en-US" dirty="0"/>
+          </a:p>
+          <a:p>
+            <a:endParaRPr lang="en-US" dirty="0" smtClean="0"/>
+          </a:p>
+          <a:p>
+            <a:r>
+              <a:rPr lang="en-US" dirty="0" smtClean="0"/>
+              <a:t>Using variables</a:t>
+            </a:r>
+            <a:endParaRPr lang="en-US" dirty="0"/>
+          </a:p>
+        </p:txBody>
+      </p:sp>
+      <p:sp>
+        <p:nvSpPr>
+          <p:cNvPr id="4" name="TextBox 3"/>
+          <p:cNvSpPr txBox="1"/>
+          <p:nvPr/>
+        </p:nvSpPr>
+        <p:spPr>
+          <a:xfrm>
+            <a:off x="750938" y="2459510"/>
+            <a:ext cx="2955823" cy="1815882"/>
+          </a:xfrm>
+          <a:prstGeom prst="rect">
+            <a:avLst/>
+          </a:prstGeom>
+          <a:solidFill>
+            <a:schemeClr val="bg1">
+              <a:lumMod val="75000"/>
+            </a:schemeClr>
+          </a:solidFill>
+        </p:spPr>
+        <p:txBody>
+          <a:bodyPr wrap="square" rtlCol="0">
+            <a:spAutoFit/>
+          </a:bodyPr>
+          <a:lstStyle/>
+          <a:p>
+            <a:r>
+              <a:rPr lang="nn-NO" sz="1600" dirty="0" smtClean="0">
+                <a:latin typeface="Courier New" pitchFamily="49" charset="0"/>
+                <a:cs typeface="Courier New" pitchFamily="49" charset="0"/>
+              </a:rPr>
+              <a:t>Particle </a:t>
+            </a:r>
+            <a:r>
+              <a:rPr lang="nn-NO" sz="1600" dirty="0" smtClean="0">
+                <a:latin typeface="Courier New" pitchFamily="49" charset="0"/>
+                <a:cs typeface="Courier New" pitchFamily="49" charset="0"/>
+              </a:rPr>
+              <a:t>p1;</a:t>
+            </a:r>
+          </a:p>
+          <a:p>
+            <a:r>
+              <a:rPr lang="nn-NO" sz="1600" dirty="0" smtClean="0">
+                <a:latin typeface="Courier New" pitchFamily="49" charset="0"/>
+                <a:cs typeface="Courier New" pitchFamily="49" charset="0"/>
+              </a:rPr>
+              <a:t>Particle p2 = {</a:t>
+            </a:r>
+          </a:p>
+          <a:p>
+            <a:r>
+              <a:rPr lang="nn-NO" sz="1600" dirty="0">
+                <a:latin typeface="Courier New" pitchFamily="49" charset="0"/>
+                <a:cs typeface="Courier New" pitchFamily="49" charset="0"/>
+              </a:rPr>
+              <a:t> </a:t>
+            </a:r>
+            <a:r>
+              <a:rPr lang="nn-NO" sz="1600" dirty="0" smtClean="0">
+                <a:latin typeface="Courier New" pitchFamily="49" charset="0"/>
+                <a:cs typeface="Courier New" pitchFamily="49" charset="0"/>
+              </a:rPr>
+              <a:t>   .x = 3.0,</a:t>
+            </a:r>
+          </a:p>
+          <a:p>
+            <a:r>
+              <a:rPr lang="nn-NO" sz="1600" dirty="0">
+                <a:latin typeface="Courier New" pitchFamily="49" charset="0"/>
+                <a:cs typeface="Courier New" pitchFamily="49" charset="0"/>
+              </a:rPr>
+              <a:t> </a:t>
+            </a:r>
+            <a:r>
+              <a:rPr lang="nn-NO" sz="1600" dirty="0" smtClean="0">
+                <a:latin typeface="Courier New" pitchFamily="49" charset="0"/>
+                <a:cs typeface="Courier New" pitchFamily="49" charset="0"/>
+              </a:rPr>
+              <a:t>   </a:t>
+            </a:r>
+            <a:r>
+              <a:rPr lang="en-US" sz="1600" dirty="0" smtClean="0">
+                <a:latin typeface="Courier New" pitchFamily="49" charset="0"/>
+                <a:cs typeface="Courier New" pitchFamily="49" charset="0"/>
+              </a:rPr>
+              <a:t>…</a:t>
+            </a:r>
+            <a:endParaRPr lang="en-US" sz="1600" dirty="0">
+              <a:latin typeface="Courier New" pitchFamily="49" charset="0"/>
+              <a:cs typeface="Courier New" pitchFamily="49" charset="0"/>
+            </a:endParaRPr>
+          </a:p>
+          <a:p>
+            <a:r>
+              <a:rPr lang="nn-NO" sz="1600" dirty="0" smtClean="0">
+                <a:latin typeface="Courier New" pitchFamily="49" charset="0"/>
+                <a:cs typeface="Courier New" pitchFamily="49" charset="0"/>
+              </a:rPr>
+              <a:t>    .mass = 1.0,</a:t>
+            </a:r>
+          </a:p>
+          <a:p>
+            <a:r>
+              <a:rPr lang="nn-NO" sz="1600" dirty="0">
+                <a:latin typeface="Courier New" pitchFamily="49" charset="0"/>
+                <a:cs typeface="Courier New" pitchFamily="49" charset="0"/>
+              </a:rPr>
+              <a:t> </a:t>
+            </a:r>
+            <a:r>
+              <a:rPr lang="nn-NO" sz="1600" dirty="0" smtClean="0">
+                <a:latin typeface="Courier New" pitchFamily="49" charset="0"/>
+                <a:cs typeface="Courier New" pitchFamily="49" charset="0"/>
+              </a:rPr>
+              <a:t>   .charge = 1</a:t>
+            </a:r>
+          </a:p>
+          <a:p>
+            <a:r>
+              <a:rPr lang="nn-NO" sz="1600" dirty="0" smtClean="0">
+                <a:latin typeface="Courier New" pitchFamily="49" charset="0"/>
+                <a:cs typeface="Courier New" pitchFamily="49" charset="0"/>
+              </a:rPr>
+              <a:t>};</a:t>
+            </a:r>
+            <a:endParaRPr lang="nn-NO" sz="1600" dirty="0" smtClean="0">
+              <a:latin typeface="Courier New" pitchFamily="49" charset="0"/>
+              <a:cs typeface="Courier New" pitchFamily="49" charset="0"/>
+            </a:endParaRPr>
+          </a:p>
+        </p:txBody>
+      </p:sp>
+      <p:grpSp>
+        <p:nvGrpSpPr>
+          <p:cNvPr id="5" name="Group 4"/>
+          <p:cNvGrpSpPr/>
+          <p:nvPr/>
+        </p:nvGrpSpPr>
+        <p:grpSpPr>
+          <a:xfrm>
+            <a:off x="2310581" y="2182976"/>
+            <a:ext cx="4553535" cy="400110"/>
+            <a:chOff x="-1477423" y="3441725"/>
+            <a:chExt cx="4553535" cy="400110"/>
+          </a:xfrm>
+        </p:grpSpPr>
+        <p:sp>
+          <p:nvSpPr>
+            <p:cNvPr id="6" name="TextBox 5"/>
+            <p:cNvSpPr txBox="1"/>
+            <p:nvPr/>
+          </p:nvSpPr>
+          <p:spPr>
+            <a:xfrm>
+              <a:off x="199578" y="3441725"/>
+              <a:ext cx="2876534" cy="400110"/>
+            </a:xfrm>
+            <a:prstGeom prst="rect">
+              <a:avLst/>
+            </a:prstGeom>
+            <a:solidFill>
+              <a:schemeClr val="bg1"/>
+            </a:solidFill>
+            <a:ln w="19050">
+              <a:solidFill>
+                <a:schemeClr val="tx1"/>
+              </a:solidFill>
+            </a:ln>
+          </p:spPr>
+          <p:txBody>
+            <a:bodyPr wrap="square" rtlCol="0">
+              <a:spAutoFit/>
+            </a:bodyPr>
+            <a:lstStyle/>
+            <a:p>
+              <a:r>
+                <a:rPr lang="en-US" sz="2000" dirty="0" smtClean="0"/>
+                <a:t>members not initialized!</a:t>
+              </a:r>
+              <a:endParaRPr lang="en-US" sz="2000" dirty="0">
+                <a:latin typeface="Courier New" panose="02070309020205020404" pitchFamily="49" charset="0"/>
+                <a:cs typeface="Courier New" panose="02070309020205020404" pitchFamily="49" charset="0"/>
+              </a:endParaRPr>
+            </a:p>
+          </p:txBody>
+        </p:sp>
+        <p:cxnSp>
+          <p:nvCxnSpPr>
+            <p:cNvPr id="7" name="Straight Arrow Connector 6"/>
+            <p:cNvCxnSpPr>
+              <a:stCxn id="6" idx="1"/>
+            </p:cNvCxnSpPr>
+            <p:nvPr/>
+          </p:nvCxnSpPr>
+          <p:spPr>
+            <a:xfrm flipH="1">
+              <a:off x="-1477423" y="3641780"/>
+              <a:ext cx="1677001" cy="200055"/>
+            </a:xfrm>
+            <a:prstGeom prst="straightConnector1">
+              <a:avLst/>
+            </a:prstGeom>
+            <a:ln w="19050">
+              <a:solidFill>
+                <a:schemeClr val="tx1"/>
+              </a:solidFill>
+              <a:tailEnd type="stealth" w="lg" len="lg"/>
+            </a:ln>
+          </p:spPr>
+          <p:style>
+            <a:lnRef idx="1">
+              <a:schemeClr val="accent1"/>
+            </a:lnRef>
+            <a:fillRef idx="0">
+              <a:schemeClr val="accent1"/>
+            </a:fillRef>
+            <a:effectRef idx="0">
+              <a:schemeClr val="accent1"/>
+            </a:effectRef>
+            <a:fontRef idx="minor">
+              <a:schemeClr val="tx1"/>
+            </a:fontRef>
+          </p:style>
+        </p:cxnSp>
+      </p:grpSp>
+      <p:grpSp>
+        <p:nvGrpSpPr>
+          <p:cNvPr id="14" name="Group 13"/>
+          <p:cNvGrpSpPr/>
+          <p:nvPr/>
+        </p:nvGrpSpPr>
+        <p:grpSpPr>
+          <a:xfrm>
+            <a:off x="2949677" y="3167396"/>
+            <a:ext cx="3955599" cy="775341"/>
+            <a:chOff x="2949677" y="3236220"/>
+            <a:chExt cx="3955599" cy="775341"/>
+          </a:xfrm>
+        </p:grpSpPr>
+        <p:grpSp>
+          <p:nvGrpSpPr>
+            <p:cNvPr id="9" name="Group 8"/>
+            <p:cNvGrpSpPr/>
+            <p:nvPr/>
+          </p:nvGrpSpPr>
+          <p:grpSpPr>
+            <a:xfrm>
+              <a:off x="3224981" y="3236220"/>
+              <a:ext cx="3680295" cy="400110"/>
+              <a:chOff x="-604183" y="3441725"/>
+              <a:chExt cx="3680295" cy="400110"/>
+            </a:xfrm>
+          </p:grpSpPr>
+          <p:sp>
+            <p:nvSpPr>
+              <p:cNvPr id="10" name="TextBox 9"/>
+              <p:cNvSpPr txBox="1"/>
+              <p:nvPr/>
+            </p:nvSpPr>
+            <p:spPr>
+              <a:xfrm>
+                <a:off x="199578" y="3441725"/>
+                <a:ext cx="2876534" cy="400110"/>
+              </a:xfrm>
+              <a:prstGeom prst="rect">
+                <a:avLst/>
+              </a:prstGeom>
+              <a:solidFill>
+                <a:schemeClr val="bg1"/>
+              </a:solidFill>
+              <a:ln w="19050">
+                <a:solidFill>
+                  <a:schemeClr val="tx1"/>
+                </a:solidFill>
+              </a:ln>
+            </p:spPr>
+            <p:txBody>
+              <a:bodyPr wrap="square" rtlCol="0">
+                <a:spAutoFit/>
+              </a:bodyPr>
+              <a:lstStyle/>
+              <a:p>
+                <a:r>
+                  <a:rPr lang="en-US" sz="2000" dirty="0" smtClean="0"/>
+                  <a:t>members initialization</a:t>
+                </a:r>
+                <a:endParaRPr lang="en-US" sz="2000" dirty="0">
+                  <a:latin typeface="Courier New" panose="02070309020205020404" pitchFamily="49" charset="0"/>
+                  <a:cs typeface="Courier New" panose="02070309020205020404" pitchFamily="49" charset="0"/>
+                </a:endParaRPr>
+              </a:p>
+            </p:txBody>
+          </p:sp>
+          <p:cxnSp>
+            <p:nvCxnSpPr>
+              <p:cNvPr id="11" name="Straight Arrow Connector 10"/>
+              <p:cNvCxnSpPr>
+                <a:stCxn id="10" idx="1"/>
+              </p:cNvCxnSpPr>
+              <p:nvPr/>
+            </p:nvCxnSpPr>
+            <p:spPr>
+              <a:xfrm flipH="1">
+                <a:off x="-604183" y="3641780"/>
+                <a:ext cx="803761" cy="200055"/>
+              </a:xfrm>
+              <a:prstGeom prst="straightConnector1">
+                <a:avLst/>
+              </a:prstGeom>
+              <a:ln w="19050">
+                <a:solidFill>
+                  <a:schemeClr val="tx1"/>
+                </a:solidFill>
+                <a:tailEnd type="stealth" w="lg" len="lg"/>
+              </a:ln>
+            </p:spPr>
+            <p:style>
+              <a:lnRef idx="1">
+                <a:schemeClr val="accent1"/>
+              </a:lnRef>
+              <a:fillRef idx="0">
+                <a:schemeClr val="accent1"/>
+              </a:fillRef>
+              <a:effectRef idx="0">
+                <a:schemeClr val="accent1"/>
+              </a:effectRef>
+              <a:fontRef idx="minor">
+                <a:schemeClr val="tx1"/>
+              </a:fontRef>
+            </p:style>
+          </p:cxnSp>
+        </p:grpSp>
+        <p:sp>
+          <p:nvSpPr>
+            <p:cNvPr id="13" name="Right Brace 12"/>
+            <p:cNvSpPr/>
+            <p:nvPr/>
+          </p:nvSpPr>
+          <p:spPr>
+            <a:xfrm>
+              <a:off x="2949677" y="3236220"/>
+              <a:ext cx="78658" cy="775341"/>
+            </a:xfrm>
+            <a:prstGeom prst="rightBrace">
+              <a:avLst/>
+            </a:prstGeom>
+            <a:ln w="19050">
+              <a:solidFill>
+                <a:schemeClr val="tx1"/>
+              </a:solidFill>
+            </a:ln>
+          </p:spPr>
+          <p:style>
+            <a:lnRef idx="1">
+              <a:schemeClr val="accent1"/>
+            </a:lnRef>
+            <a:fillRef idx="0">
+              <a:schemeClr val="accent1"/>
+            </a:fillRef>
+            <a:effectRef idx="0">
+              <a:schemeClr val="accent1"/>
+            </a:effectRef>
+            <a:fontRef idx="minor">
+              <a:schemeClr val="tx1"/>
+            </a:fontRef>
+          </p:style>
+          <p:txBody>
+            <a:bodyPr rtlCol="0" anchor="ctr"/>
+            <a:lstStyle/>
+            <a:p>
+              <a:pPr algn="ctr"/>
+              <a:endParaRPr lang="en-US"/>
+            </a:p>
+          </p:txBody>
+        </p:sp>
+      </p:grpSp>
+      <p:sp>
+        <p:nvSpPr>
+          <p:cNvPr id="24" name="TextBox 23"/>
+          <p:cNvSpPr txBox="1"/>
+          <p:nvPr/>
+        </p:nvSpPr>
+        <p:spPr>
+          <a:xfrm>
+            <a:off x="750938" y="4909277"/>
+            <a:ext cx="2955823" cy="1077218"/>
+          </a:xfrm>
+          <a:prstGeom prst="rect">
+            <a:avLst/>
+          </a:prstGeom>
+          <a:solidFill>
+            <a:schemeClr val="bg1">
+              <a:lumMod val="75000"/>
+            </a:schemeClr>
+          </a:solidFill>
+        </p:spPr>
+        <p:txBody>
+          <a:bodyPr wrap="square" rtlCol="0">
+            <a:spAutoFit/>
+          </a:bodyPr>
+          <a:lstStyle/>
+          <a:p>
+            <a:r>
+              <a:rPr lang="en-US" sz="1600" dirty="0" smtClean="0">
+                <a:latin typeface="Courier New" pitchFamily="49" charset="0"/>
+                <a:cs typeface="Courier New" pitchFamily="49" charset="0"/>
+              </a:rPr>
+              <a:t>…</a:t>
+            </a:r>
+            <a:br>
+              <a:rPr lang="en-US" sz="1600" dirty="0" smtClean="0">
+                <a:latin typeface="Courier New" pitchFamily="49" charset="0"/>
+                <a:cs typeface="Courier New" pitchFamily="49" charset="0"/>
+              </a:rPr>
+            </a:br>
+            <a:r>
+              <a:rPr lang="nn-NO" sz="1600" dirty="0" smtClean="0">
+                <a:latin typeface="Courier New" pitchFamily="49" charset="0"/>
+                <a:cs typeface="Courier New" pitchFamily="49" charset="0"/>
+              </a:rPr>
+              <a:t>p1.x = -2.0;</a:t>
+            </a:r>
+          </a:p>
+          <a:p>
+            <a:r>
+              <a:rPr lang="nn-NO" sz="1600" dirty="0" smtClean="0">
+                <a:latin typeface="Courier New" pitchFamily="49" charset="0"/>
+                <a:cs typeface="Courier New" pitchFamily="49" charset="0"/>
+              </a:rPr>
+              <a:t>cout &lt;&lt; p2.mass;</a:t>
+            </a:r>
+          </a:p>
+          <a:p>
+            <a:r>
+              <a:rPr lang="en-US" sz="1600" dirty="0">
+                <a:latin typeface="Courier New" pitchFamily="49" charset="0"/>
+                <a:cs typeface="Courier New" pitchFamily="49" charset="0"/>
+              </a:rPr>
+              <a:t>…</a:t>
+            </a:r>
+            <a:endParaRPr lang="nn-NO" sz="1600" dirty="0" smtClean="0">
+              <a:latin typeface="Courier New" pitchFamily="49" charset="0"/>
+              <a:cs typeface="Courier New" pitchFamily="49" charset="0"/>
+            </a:endParaRPr>
+          </a:p>
+        </p:txBody>
+      </p:sp>
+    </p:spTree>
+    <p:extLst>
+      <p:ext uri="{BB962C8B-B14F-4D97-AF65-F5344CB8AC3E}">
+        <p14:creationId xmlns:p14="http://schemas.microsoft.com/office/powerpoint/2010/main" val="3949843793"/>
+      </p:ext>
+    </p:extLst>
+  </p:cSld>
+  <p:clrMapOvr>
+    <a:masterClrMapping/>
+  </p:clrMapOvr>
+  <p:timing>
+    <p:tnLst>
+      <p:par>
+        <p:cTn id="1" dur="indefinite" restart="never" nodeType="tmRoot">
+          <p:childTnLst>
+            <p:seq concurrent="1" nextAc="seek">
+              <p:cTn id="2" dur="indefinite" nodeType="mainSeq">
+                <p:childTnLst>
+                  <p:par>
+                    <p:cTn id="3" fill="hold">
+                      <p:stCondLst>
+                        <p:cond delay="indefinite"/>
+                        <p:cond evt="onBegin" delay="0">
+                          <p:tn val="2"/>
+                        </p:cond>
+                      </p:stCondLst>
+                      <p:childTnLst>
+                        <p:par>
+                          <p:cTn id="4" fill="hold">
+                            <p:stCondLst>
+                              <p:cond delay="0"/>
+                            </p:stCondLst>
+                            <p:childTnLst>
+                              <p:par>
+                                <p:cTn id="5" presetID="1" presetClass="entr" presetSubtype="0" fill="hold" grpId="0" nodeType="withEffect">
+                                  <p:stCondLst>
+                                    <p:cond delay="0"/>
+                                  </p:stCondLst>
+                                  <p:childTnLst>
+                                    <p:set>
+                                      <p:cBhvr>
+                                        <p:cTn id="6" dur="1" fill="hold">
+                                          <p:stCondLst>
+                                            <p:cond delay="0"/>
+                                          </p:stCondLst>
+                                        </p:cTn>
+                                        <p:tgtEl>
+                                          <p:spTgt spid="3">
+                                            <p:txEl>
+                                              <p:pRg st="0" end="0"/>
+                                            </p:txEl>
+                                          </p:spTgt>
+                                        </p:tgtEl>
+                                        <p:attrNameLst>
+                                          <p:attrName>style.visibility</p:attrName>
+                                        </p:attrNameLst>
+                                      </p:cBhvr>
+                                      <p:to>
+                                        <p:strVal val="visible"/>
+                                      </p:to>
+                                    </p:set>
+                                  </p:childTnLst>
+                                </p:cTn>
+                              </p:par>
+                              <p:par>
+                                <p:cTn id="7" presetID="1" presetClass="entr" presetSubtype="0" fill="hold" grpId="0" nodeType="withEffect">
+                                  <p:stCondLst>
+                                    <p:cond delay="0"/>
+                                  </p:stCondLst>
+                                  <p:childTnLst>
+                                    <p:set>
+                                      <p:cBhvr>
+                                        <p:cTn id="8" dur="1" fill="hold">
+                                          <p:stCondLst>
+                                            <p:cond delay="0"/>
+                                          </p:stCondLst>
+                                        </p:cTn>
+                                        <p:tgtEl>
+                                          <p:spTgt spid="4"/>
+                                        </p:tgtEl>
+                                        <p:attrNameLst>
+                                          <p:attrName>style.visibility</p:attrName>
+                                        </p:attrNameLst>
+                                      </p:cBhvr>
+                                      <p:to>
+                                        <p:strVal val="visible"/>
+                                      </p:to>
+                                    </p:set>
+                                  </p:childTnLst>
+                                </p:cTn>
+                              </p:par>
+                            </p:childTnLst>
+                          </p:cTn>
+                        </p:par>
+                      </p:childTnLst>
+                    </p:cTn>
+                  </p:par>
+                  <p:par>
+                    <p:cTn id="9" fill="hold">
+                      <p:stCondLst>
+                        <p:cond delay="indefinite"/>
+                      </p:stCondLst>
+                      <p:childTnLst>
+                        <p:par>
+                          <p:cTn id="10" fill="hold">
+                            <p:stCondLst>
+                              <p:cond delay="0"/>
+                            </p:stCondLst>
+                            <p:childTnLst>
+                              <p:par>
+                                <p:cTn id="11" presetID="1" presetClass="entr" presetSubtype="0" fill="hold" nodeType="clickEffect">
+                                  <p:stCondLst>
+                                    <p:cond delay="0"/>
+                                  </p:stCondLst>
+                                  <p:childTnLst>
+                                    <p:set>
+                                      <p:cBhvr>
+                                        <p:cTn id="12" dur="1" fill="hold">
+                                          <p:stCondLst>
+                                            <p:cond delay="0"/>
+                                          </p:stCondLst>
+                                        </p:cTn>
+                                        <p:tgtEl>
+                                          <p:spTgt spid="5"/>
+                                        </p:tgtEl>
+                                        <p:attrNameLst>
+                                          <p:attrName>style.visibility</p:attrName>
+                                        </p:attrNameLst>
+                                      </p:cBhvr>
+                                      <p:to>
+                                        <p:strVal val="visible"/>
+                                      </p:to>
+                                    </p:set>
+                                  </p:childTnLst>
+                                </p:cTn>
+                              </p:par>
+                            </p:childTnLst>
+                          </p:cTn>
+                        </p:par>
+                      </p:childTnLst>
+                    </p:cTn>
+                  </p:par>
+                  <p:par>
+                    <p:cTn id="13" fill="hold">
+                      <p:stCondLst>
+                        <p:cond delay="indefinite"/>
+                      </p:stCondLst>
+                      <p:childTnLst>
+                        <p:par>
+                          <p:cTn id="14" fill="hold">
+                            <p:stCondLst>
+                              <p:cond delay="0"/>
+                            </p:stCondLst>
+                            <p:childTnLst>
+                              <p:par>
+                                <p:cTn id="15" presetID="1" presetClass="entr" presetSubtype="0" fill="hold" nodeType="clickEffect">
+                                  <p:stCondLst>
+                                    <p:cond delay="0"/>
+                                  </p:stCondLst>
+                                  <p:childTnLst>
+                                    <p:set>
+                                      <p:cBhvr>
+                                        <p:cTn id="16" dur="1" fill="hold">
+                                          <p:stCondLst>
+                                            <p:cond delay="0"/>
+                                          </p:stCondLst>
+                                        </p:cTn>
+                                        <p:tgtEl>
+                                          <p:spTgt spid="14"/>
+                                        </p:tgtEl>
+                                        <p:attrNameLst>
+                                          <p:attrName>style.visibility</p:attrName>
+                                        </p:attrNameLst>
+                                      </p:cBhvr>
+                                      <p:to>
+                                        <p:strVal val="visible"/>
+                                      </p:to>
+                                    </p:set>
+                                  </p:childTnLst>
+                                </p:cTn>
+                              </p:par>
+                            </p:childTnLst>
+                          </p:cTn>
+                        </p:par>
+                      </p:childTnLst>
+                    </p:cTn>
+                  </p:par>
+                  <p:par>
+                    <p:cTn id="17" fill="hold">
+                      <p:stCondLst>
+                        <p:cond delay="indefinite"/>
+                      </p:stCondLst>
+                      <p:childTnLst>
+                        <p:par>
+                          <p:cTn id="18" fill="hold">
+                            <p:stCondLst>
+                              <p:cond delay="0"/>
+                            </p:stCondLst>
+                            <p:childTnLst>
+                              <p:par>
+                                <p:cTn id="19" presetID="1" presetClass="entr" presetSubtype="0" fill="hold" grpId="0" nodeType="clickEffect">
+                                  <p:stCondLst>
+                                    <p:cond delay="0"/>
+                                  </p:stCondLst>
+                                  <p:childTnLst>
+                                    <p:set>
+                                      <p:cBhvr>
+                                        <p:cTn id="20" dur="1" fill="hold">
+                                          <p:stCondLst>
+                                            <p:cond delay="0"/>
+                                          </p:stCondLst>
+                                        </p:cTn>
+                                        <p:tgtEl>
+                                          <p:spTgt spid="3">
+                                            <p:txEl>
+                                              <p:pRg st="5" end="5"/>
+                                            </p:txEl>
+                                          </p:spTgt>
+                                        </p:tgtEl>
+                                        <p:attrNameLst>
+                                          <p:attrName>style.visibility</p:attrName>
+                                        </p:attrNameLst>
+                                      </p:cBhvr>
+                                      <p:to>
+                                        <p:strVal val="visible"/>
+                                      </p:to>
+                                    </p:set>
+                                  </p:childTnLst>
+                                </p:cTn>
+                              </p:par>
+                              <p:par>
+                                <p:cTn id="21" presetID="1" presetClass="entr" presetSubtype="0" fill="hold" grpId="0" nodeType="withEffect">
+                                  <p:stCondLst>
+                                    <p:cond delay="0"/>
+                                  </p:stCondLst>
+                                  <p:childTnLst>
+                                    <p:set>
+                                      <p:cBhvr>
+                                        <p:cTn id="22" dur="1" fill="hold">
+                                          <p:stCondLst>
+                                            <p:cond delay="0"/>
+                                          </p:stCondLst>
+                                        </p:cTn>
+                                        <p:tgtEl>
+                                          <p:spTgt spid="24"/>
+                                        </p:tgtEl>
+                                        <p:attrNameLst>
+                                          <p:attrName>style.visibility</p:attrName>
+                                        </p:attrNameLst>
+                                      </p:cBhvr>
+                                      <p:to>
+                                        <p:strVal val="visible"/>
+                                      </p:to>
+                                    </p:set>
+                                  </p:childTnLst>
+                                </p:cTn>
+                              </p:par>
+                            </p:childTnLst>
+                          </p:cTn>
+                        </p:par>
+                      </p:childTnLst>
+                    </p:cTn>
+                  </p:par>
+                </p:childTnLst>
+              </p:cTn>
+              <p:prevCondLst>
+                <p:cond evt="onPrev" delay="0">
+                  <p:tgtEl>
+                    <p:sldTgt/>
+                  </p:tgtEl>
+                </p:cond>
+              </p:prevCondLst>
+              <p:nextCondLst>
+                <p:cond evt="onNext" delay="0">
+                  <p:tgtEl>
+                    <p:sldTgt/>
+                  </p:tgtEl>
+                </p:cond>
+              </p:nextCondLst>
+            </p:seq>
+          </p:childTnLst>
+        </p:cTn>
+      </p:par>
+    </p:tnLst>
+    <p:bldLst>
+      <p:bldP spid="3" grpId="0" uiExpand="1" build="p"/>
+      <p:bldP spid="4" grpId="0" animBg="1"/>
+      <p:bldP spid="24" grpId="0" animBg="1"/>
+    </p:bldLst>
+  </p:timing>
+</p:sld>
+</file>
+
+<file path=ppt/slides/slide6.xml><?xml version="1.0" encoding="utf-8"?>
+<p:sld xmlns:a="http://schemas.openxmlformats.org/drawingml/2006/main" xmlns:r="http://schemas.openxmlformats.org/officeDocument/2006/relationships" xmlns:p="http://schemas.openxmlformats.org/presentationml/2006/main">
+  <p:cSld>
+    <p:spTree>
+      <p:nvGrpSpPr>
+        <p:cNvPr id="1" name=""/>
+        <p:cNvGrpSpPr/>
+        <p:nvPr/>
+      </p:nvGrpSpPr>
+      <p:grpSpPr>
+        <a:xfrm>
+          <a:off x="0" y="0"/>
+          <a:ext cx="0" cy="0"/>
+          <a:chOff x="0" y="0"/>
+          <a:chExt cx="0" cy="0"/>
+        </a:xfrm>
+      </p:grpSpPr>
+      <p:sp>
+        <p:nvSpPr>
+          <p:cNvPr id="2" name="Title 1"/>
+          <p:cNvSpPr>
+            <a:spLocks noGrp="1"/>
+          </p:cNvSpPr>
+          <p:nvPr>
+            <p:ph type="title"/>
+          </p:nvPr>
+        </p:nvSpPr>
+        <p:spPr/>
+        <p:txBody>
+          <a:bodyPr/>
+          <a:lstStyle/>
+          <a:p>
+            <a:r>
+              <a:rPr lang="en-US" dirty="0" smtClean="0"/>
+              <a:t>Passing structures to functions</a:t>
+            </a:r>
+            <a:endParaRPr lang="en-US" dirty="0"/>
+          </a:p>
+        </p:txBody>
+      </p:sp>
+      <p:sp>
+        <p:nvSpPr>
+          <p:cNvPr id="3" name="Content Placeholder 2"/>
+          <p:cNvSpPr>
+            <a:spLocks noGrp="1"/>
+          </p:cNvSpPr>
+          <p:nvPr>
+            <p:ph idx="1"/>
+          </p:nvPr>
+        </p:nvSpPr>
+        <p:spPr/>
+        <p:txBody>
+          <a:bodyPr/>
+          <a:lstStyle/>
+          <a:p>
+            <a:r>
+              <a:rPr lang="en-US" dirty="0" smtClean="0"/>
+              <a:t>Pass by value copies, not what you want</a:t>
+            </a:r>
+            <a:endParaRPr lang="en-US" dirty="0"/>
+          </a:p>
+        </p:txBody>
+      </p:sp>
+      <p:sp>
+        <p:nvSpPr>
+          <p:cNvPr id="4" name="TextBox 3"/>
+          <p:cNvSpPr txBox="1"/>
+          <p:nvPr/>
+        </p:nvSpPr>
+        <p:spPr>
+          <a:xfrm>
+            <a:off x="628650" y="2459510"/>
+            <a:ext cx="7886700" cy="1323439"/>
+          </a:xfrm>
+          <a:prstGeom prst="rect">
+            <a:avLst/>
+          </a:prstGeom>
+          <a:solidFill>
+            <a:schemeClr val="bg1">
+              <a:lumMod val="75000"/>
+            </a:schemeClr>
+          </a:solidFill>
+        </p:spPr>
+        <p:txBody>
+          <a:bodyPr wrap="square" rtlCol="0">
+            <a:spAutoFit/>
+          </a:bodyPr>
+          <a:lstStyle/>
+          <a:p>
+            <a:r>
+              <a:rPr lang="en-US" sz="1600" dirty="0">
+                <a:latin typeface="Courier New" pitchFamily="49" charset="0"/>
+                <a:cs typeface="Courier New" pitchFamily="49" charset="0"/>
+              </a:rPr>
+              <a:t>…</a:t>
+            </a:r>
+            <a:endParaRPr lang="nn-NO" sz="1600" dirty="0" smtClean="0">
+              <a:latin typeface="Courier New" pitchFamily="49" charset="0"/>
+              <a:cs typeface="Courier New" pitchFamily="49" charset="0"/>
+            </a:endParaRPr>
+          </a:p>
+          <a:p>
+            <a:r>
+              <a:rPr lang="nn-NO" sz="1600" dirty="0" smtClean="0">
+                <a:latin typeface="Courier New" pitchFamily="49" charset="0"/>
+                <a:cs typeface="Courier New" pitchFamily="49" charset="0"/>
+              </a:rPr>
+              <a:t>double </a:t>
+            </a:r>
+            <a:r>
+              <a:rPr lang="nn-NO" sz="1600" dirty="0">
+                <a:latin typeface="Courier New" pitchFamily="49" charset="0"/>
+                <a:cs typeface="Courier New" pitchFamily="49" charset="0"/>
+              </a:rPr>
+              <a:t>dist(const Particle</a:t>
+            </a:r>
+            <a:r>
+              <a:rPr lang="nn-NO" sz="1600" b="1" dirty="0">
+                <a:solidFill>
+                  <a:srgbClr val="C00000"/>
+                </a:solidFill>
+                <a:latin typeface="Courier New" pitchFamily="49" charset="0"/>
+                <a:cs typeface="Courier New" pitchFamily="49" charset="0"/>
+              </a:rPr>
+              <a:t>&amp;</a:t>
+            </a:r>
+            <a:r>
+              <a:rPr lang="nn-NO" sz="1600" dirty="0">
+                <a:latin typeface="Courier New" pitchFamily="49" charset="0"/>
+                <a:cs typeface="Courier New" pitchFamily="49" charset="0"/>
+              </a:rPr>
+              <a:t> p1, const Particle</a:t>
+            </a:r>
+            <a:r>
+              <a:rPr lang="nn-NO" sz="1600" b="1" dirty="0">
+                <a:solidFill>
+                  <a:srgbClr val="C00000"/>
+                </a:solidFill>
+                <a:latin typeface="Courier New" pitchFamily="49" charset="0"/>
+                <a:cs typeface="Courier New" pitchFamily="49" charset="0"/>
+              </a:rPr>
+              <a:t>&amp;</a:t>
+            </a:r>
+            <a:r>
+              <a:rPr lang="nn-NO" sz="1600" dirty="0">
+                <a:latin typeface="Courier New" pitchFamily="49" charset="0"/>
+                <a:cs typeface="Courier New" pitchFamily="49" charset="0"/>
+              </a:rPr>
+              <a:t> p2) {</a:t>
+            </a:r>
+          </a:p>
+          <a:p>
+            <a:r>
+              <a:rPr lang="nn-NO" sz="1600" dirty="0">
+                <a:latin typeface="Courier New" pitchFamily="49" charset="0"/>
+                <a:cs typeface="Courier New" pitchFamily="49" charset="0"/>
+              </a:rPr>
+              <a:t>    return sqrt(sqr(p1.x - p2.x) + sqr(p1.y - p2.y) </a:t>
+            </a:r>
+            <a:r>
+              <a:rPr lang="nn-NO" sz="1600" dirty="0" smtClean="0">
+                <a:latin typeface="Courier New" pitchFamily="49" charset="0"/>
+                <a:cs typeface="Courier New" pitchFamily="49" charset="0"/>
+              </a:rPr>
+              <a:t>+</a:t>
+            </a:r>
+            <a:br>
+              <a:rPr lang="nn-NO" sz="1600" dirty="0" smtClean="0">
+                <a:latin typeface="Courier New" pitchFamily="49" charset="0"/>
+                <a:cs typeface="Courier New" pitchFamily="49" charset="0"/>
+              </a:rPr>
+            </a:br>
+            <a:r>
+              <a:rPr lang="nn-NO" sz="1600" dirty="0" smtClean="0">
+                <a:latin typeface="Courier New" pitchFamily="49" charset="0"/>
+                <a:cs typeface="Courier New" pitchFamily="49" charset="0"/>
+              </a:rPr>
+              <a:t>                </a:t>
+            </a:r>
+            <a:r>
+              <a:rPr lang="nn-NO" sz="1600" dirty="0">
+                <a:latin typeface="Courier New" pitchFamily="49" charset="0"/>
+                <a:cs typeface="Courier New" pitchFamily="49" charset="0"/>
+              </a:rPr>
+              <a:t>sqr(p1.z - p2.z));</a:t>
+            </a:r>
+          </a:p>
+          <a:p>
+            <a:r>
+              <a:rPr lang="nn-NO" sz="1600" dirty="0">
+                <a:latin typeface="Courier New" pitchFamily="49" charset="0"/>
+                <a:cs typeface="Courier New" pitchFamily="49" charset="0"/>
+              </a:rPr>
+              <a:t>}</a:t>
+            </a:r>
+          </a:p>
+        </p:txBody>
+      </p:sp>
+      <p:sp>
+        <p:nvSpPr>
+          <p:cNvPr id="5" name="TextBox 4"/>
+          <p:cNvSpPr txBox="1"/>
+          <p:nvPr/>
+        </p:nvSpPr>
+        <p:spPr>
+          <a:xfrm>
+            <a:off x="628650" y="4001294"/>
+            <a:ext cx="7950610" cy="1569660"/>
+          </a:xfrm>
+          <a:prstGeom prst="rect">
+            <a:avLst/>
+          </a:prstGeom>
+          <a:solidFill>
+            <a:schemeClr val="bg1">
+              <a:lumMod val="75000"/>
+            </a:schemeClr>
+          </a:solidFill>
+        </p:spPr>
+        <p:txBody>
+          <a:bodyPr wrap="square" rtlCol="0">
+            <a:spAutoFit/>
+          </a:bodyPr>
+          <a:lstStyle/>
+          <a:p>
+            <a:r>
+              <a:rPr lang="en-US" sz="1600" dirty="0">
+                <a:latin typeface="Courier New" pitchFamily="49" charset="0"/>
+                <a:cs typeface="Courier New" pitchFamily="49" charset="0"/>
+              </a:rPr>
+              <a:t>…</a:t>
+            </a:r>
+            <a:endParaRPr lang="nn-NO" sz="1600" dirty="0" smtClean="0">
+              <a:latin typeface="Courier New" pitchFamily="49" charset="0"/>
+              <a:cs typeface="Courier New" pitchFamily="49" charset="0"/>
+            </a:endParaRPr>
+          </a:p>
+          <a:p>
+            <a:r>
+              <a:rPr lang="nn-NO" sz="1600" dirty="0" smtClean="0">
+                <a:latin typeface="Courier New" pitchFamily="49" charset="0"/>
+                <a:cs typeface="Courier New" pitchFamily="49" charset="0"/>
+              </a:rPr>
+              <a:t>void move(Particle</a:t>
+            </a:r>
+            <a:r>
+              <a:rPr lang="nn-NO" sz="1600" b="1" dirty="0">
+                <a:solidFill>
+                  <a:srgbClr val="C00000"/>
+                </a:solidFill>
+                <a:latin typeface="Courier New" pitchFamily="49" charset="0"/>
+                <a:cs typeface="Courier New" pitchFamily="49" charset="0"/>
+              </a:rPr>
+              <a:t>&amp;</a:t>
+            </a:r>
+            <a:r>
+              <a:rPr lang="nn-NO" sz="1600" dirty="0">
+                <a:latin typeface="Courier New" pitchFamily="49" charset="0"/>
+                <a:cs typeface="Courier New" pitchFamily="49" charset="0"/>
+              </a:rPr>
+              <a:t> </a:t>
+            </a:r>
+            <a:r>
+              <a:rPr lang="nn-NO" sz="1600" dirty="0" smtClean="0">
+                <a:latin typeface="Courier New" pitchFamily="49" charset="0"/>
+                <a:cs typeface="Courier New" pitchFamily="49" charset="0"/>
+              </a:rPr>
+              <a:t>p, double dx, double dy, double dz) </a:t>
+            </a:r>
+            <a:r>
+              <a:rPr lang="nn-NO" sz="1600" dirty="0">
+                <a:latin typeface="Courier New" pitchFamily="49" charset="0"/>
+                <a:cs typeface="Courier New" pitchFamily="49" charset="0"/>
+              </a:rPr>
+              <a:t>{</a:t>
+            </a:r>
+          </a:p>
+          <a:p>
+            <a:r>
+              <a:rPr lang="nn-NO" sz="1600" dirty="0">
+                <a:latin typeface="Courier New" pitchFamily="49" charset="0"/>
+                <a:cs typeface="Courier New" pitchFamily="49" charset="0"/>
+              </a:rPr>
+              <a:t>    </a:t>
+            </a:r>
+            <a:r>
+              <a:rPr lang="nn-NO" sz="1600" dirty="0" smtClean="0">
+                <a:latin typeface="Courier New" pitchFamily="49" charset="0"/>
+                <a:cs typeface="Courier New" pitchFamily="49" charset="0"/>
+              </a:rPr>
+              <a:t>p.x += dx;</a:t>
+            </a:r>
+          </a:p>
+          <a:p>
+            <a:r>
+              <a:rPr lang="nn-NO" sz="1600" dirty="0">
+                <a:latin typeface="Courier New" pitchFamily="49" charset="0"/>
+                <a:cs typeface="Courier New" pitchFamily="49" charset="0"/>
+              </a:rPr>
+              <a:t> </a:t>
+            </a:r>
+            <a:r>
+              <a:rPr lang="nn-NO" sz="1600" dirty="0" smtClean="0">
+                <a:latin typeface="Courier New" pitchFamily="49" charset="0"/>
+                <a:cs typeface="Courier New" pitchFamily="49" charset="0"/>
+              </a:rPr>
+              <a:t>   p.y += dy;</a:t>
+            </a:r>
+          </a:p>
+          <a:p>
+            <a:r>
+              <a:rPr lang="nn-NO" sz="1600" dirty="0">
+                <a:latin typeface="Courier New" pitchFamily="49" charset="0"/>
+                <a:cs typeface="Courier New" pitchFamily="49" charset="0"/>
+              </a:rPr>
+              <a:t> </a:t>
+            </a:r>
+            <a:r>
+              <a:rPr lang="nn-NO" sz="1600" dirty="0" smtClean="0">
+                <a:latin typeface="Courier New" pitchFamily="49" charset="0"/>
+                <a:cs typeface="Courier New" pitchFamily="49" charset="0"/>
+              </a:rPr>
+              <a:t>   p.z += dz;</a:t>
+            </a:r>
+            <a:endParaRPr lang="nn-NO" sz="1600" dirty="0">
+              <a:latin typeface="Courier New" pitchFamily="49" charset="0"/>
+              <a:cs typeface="Courier New" pitchFamily="49" charset="0"/>
+            </a:endParaRPr>
+          </a:p>
+          <a:p>
+            <a:r>
+              <a:rPr lang="nn-NO" sz="1600" dirty="0">
+                <a:latin typeface="Courier New" pitchFamily="49" charset="0"/>
+                <a:cs typeface="Courier New" pitchFamily="49" charset="0"/>
+              </a:rPr>
+              <a:t>}</a:t>
+            </a:r>
+          </a:p>
+        </p:txBody>
+      </p:sp>
+      <p:grpSp>
+        <p:nvGrpSpPr>
+          <p:cNvPr id="6" name="Group 5"/>
+          <p:cNvGrpSpPr/>
+          <p:nvPr/>
+        </p:nvGrpSpPr>
+        <p:grpSpPr>
+          <a:xfrm>
+            <a:off x="904568" y="4650132"/>
+            <a:ext cx="4522838" cy="1489589"/>
+            <a:chOff x="-572855" y="2302558"/>
+            <a:chExt cx="4522838" cy="1489589"/>
+          </a:xfrm>
+        </p:grpSpPr>
+        <p:sp>
+          <p:nvSpPr>
+            <p:cNvPr id="7" name="TextBox 6"/>
+            <p:cNvSpPr txBox="1"/>
+            <p:nvPr/>
+          </p:nvSpPr>
+          <p:spPr>
+            <a:xfrm>
+              <a:off x="-12431" y="3392037"/>
+              <a:ext cx="3962414" cy="400110"/>
+            </a:xfrm>
+            <a:prstGeom prst="rect">
+              <a:avLst/>
+            </a:prstGeom>
+            <a:solidFill>
+              <a:schemeClr val="bg1"/>
+            </a:solidFill>
+            <a:ln w="19050">
+              <a:solidFill>
+                <a:schemeClr val="tx1"/>
+              </a:solidFill>
+            </a:ln>
+          </p:spPr>
+          <p:txBody>
+            <a:bodyPr wrap="square" rtlCol="0">
+              <a:spAutoFit/>
+            </a:bodyPr>
+            <a:lstStyle/>
+            <a:p>
+              <a:r>
+                <a:rPr lang="en-US" sz="2000" dirty="0" smtClean="0"/>
+                <a:t>Note: function doesn't return value</a:t>
+              </a:r>
+              <a:endParaRPr lang="en-US" sz="2000" dirty="0">
+                <a:latin typeface="Courier New" panose="02070309020205020404" pitchFamily="49" charset="0"/>
+                <a:cs typeface="Courier New" panose="02070309020205020404" pitchFamily="49" charset="0"/>
+              </a:endParaRPr>
+            </a:p>
+          </p:txBody>
+        </p:sp>
+        <p:cxnSp>
+          <p:nvCxnSpPr>
+            <p:cNvPr id="8" name="Straight Arrow Connector 7"/>
+            <p:cNvCxnSpPr>
+              <a:stCxn id="7" idx="1"/>
+            </p:cNvCxnSpPr>
+            <p:nvPr/>
+          </p:nvCxnSpPr>
+          <p:spPr>
+            <a:xfrm flipH="1" flipV="1">
+              <a:off x="-572855" y="2302558"/>
+              <a:ext cx="560424" cy="1289534"/>
+            </a:xfrm>
+            <a:prstGeom prst="straightConnector1">
+              <a:avLst/>
+            </a:prstGeom>
+            <a:ln w="19050">
+              <a:solidFill>
+                <a:schemeClr val="tx1"/>
+              </a:solidFill>
+              <a:tailEnd type="stealth" w="lg" len="lg"/>
+            </a:ln>
+          </p:spPr>
+          <p:style>
+            <a:lnRef idx="1">
+              <a:schemeClr val="accent1"/>
+            </a:lnRef>
+            <a:fillRef idx="0">
+              <a:schemeClr val="accent1"/>
+            </a:fillRef>
+            <a:effectRef idx="0">
+              <a:schemeClr val="accent1"/>
+            </a:effectRef>
+            <a:fontRef idx="minor">
+              <a:schemeClr val="tx1"/>
+            </a:fontRef>
+          </p:style>
+        </p:cxnSp>
+      </p:grpSp>
+    </p:spTree>
+    <p:extLst>
+      <p:ext uri="{BB962C8B-B14F-4D97-AF65-F5344CB8AC3E}">
+        <p14:creationId xmlns:p14="http://schemas.microsoft.com/office/powerpoint/2010/main" val="2262145082"/>
+      </p:ext>
+    </p:extLst>
+  </p:cSld>
+  <p:clrMapOvr>
+    <a:masterClrMapping/>
+  </p:clrMapOvr>
+  <p:timing>
+    <p:tnLst>
+      <p:par>
+        <p:cTn id="1" dur="indefinite" restart="never" nodeType="tmRoot">
+          <p:childTnLst>
+            <p:seq concurrent="1" nextAc="seek">
+              <p:cTn id="2" dur="indefinite" nodeType="mainSeq">
+                <p:childTnLst>
+                  <p:par>
+                    <p:cTn id="3" fill="hold">
+                      <p:stCondLst>
+                        <p:cond delay="indefinite"/>
+                      </p:stCondLst>
+                      <p:childTnLst>
+                        <p:par>
+                          <p:cTn id="4" fill="hold">
+                            <p:stCondLst>
+                              <p:cond delay="0"/>
+                            </p:stCondLst>
+                            <p:childTnLst>
+                              <p:par>
+                                <p:cTn id="5" presetID="1" presetClass="entr" presetSubtype="0" fill="hold" grpId="0" nodeType="clickEffect">
+                                  <p:stCondLst>
+                                    <p:cond delay="0"/>
+                                  </p:stCondLst>
+                                  <p:childTnLst>
+                                    <p:set>
+                                      <p:cBhvr>
+                                        <p:cTn id="6" dur="1" fill="hold">
+                                          <p:stCondLst>
+                                            <p:cond delay="0"/>
+                                          </p:stCondLst>
+                                        </p:cTn>
+                                        <p:tgtEl>
+                                          <p:spTgt spid="5"/>
+                                        </p:tgtEl>
+                                        <p:attrNameLst>
+                                          <p:attrName>style.visibility</p:attrName>
+                                        </p:attrNameLst>
+                                      </p:cBhvr>
+                                      <p:to>
+                                        <p:strVal val="visible"/>
+                                      </p:to>
+                                    </p:set>
+                                  </p:childTnLst>
+                                </p:cTn>
+                              </p:par>
+                            </p:childTnLst>
+                          </p:cTn>
+                        </p:par>
+                      </p:childTnLst>
+                    </p:cTn>
+                  </p:par>
+                  <p:par>
+                    <p:cTn id="7" fill="hold">
+                      <p:stCondLst>
+                        <p:cond delay="indefinite"/>
+                      </p:stCondLst>
+                      <p:childTnLst>
+                        <p:par>
+                          <p:cTn id="8" fill="hold">
+                            <p:stCondLst>
+                              <p:cond delay="0"/>
+                            </p:stCondLst>
+                            <p:childTnLst>
+                              <p:par>
+                                <p:cTn id="9" presetID="1" presetClass="entr" presetSubtype="0" fill="hold" nodeType="clickEffect">
+                                  <p:stCondLst>
+                                    <p:cond delay="0"/>
+                                  </p:stCondLst>
+                                  <p:childTnLst>
+                                    <p:set>
+                                      <p:cBhvr>
+                                        <p:cTn id="10" dur="1" fill="hold">
+                                          <p:stCondLst>
+                                            <p:cond delay="0"/>
+                                          </p:stCondLst>
+                                        </p:cTn>
+                                        <p:tgtEl>
+                                          <p:spTgt spid="6"/>
+                                        </p:tgtEl>
+                                        <p:attrNameLst>
+                                          <p:attrName>style.visibility</p:attrName>
+                                        </p:attrNameLst>
+                                      </p:cBhvr>
+                                      <p:to>
+                                        <p:strVal val="visible"/>
+                                      </p:to>
+                                    </p:set>
+                                  </p:childTnLst>
+                                </p:cTn>
+                              </p:par>
+                            </p:childTnLst>
+                          </p:cTn>
+                        </p:par>
+                      </p:childTnLst>
+                    </p:cTn>
+                  </p:par>
+                </p:childTnLst>
+              </p:cTn>
+              <p:prevCondLst>
+                <p:cond evt="onPrev" delay="0">
+                  <p:tgtEl>
+                    <p:sldTgt/>
+                  </p:tgtEl>
+                </p:cond>
+              </p:prevCondLst>
+              <p:nextCondLst>
+                <p:cond evt="onNext" delay="0">
+                  <p:tgtEl>
+                    <p:sldTgt/>
+                  </p:tgtEl>
+                </p:cond>
+              </p:nextCondLst>
+            </p:seq>
+          </p:childTnLst>
+        </p:cTn>
+      </p:par>
+    </p:tnLst>
+    <p:bldLst>
+      <p:bldP spid="5" grpId="0" animBg="1"/>
+    </p:bldLst>
+  </p:timing>
 </p:sld>
 </file>
 

</xml_diff>

<commit_message>
Added slides on class definition
</commit_message>
<xml_diff>
--- a/CPlusPlus/02_essential_cpp_udt.pptx
+++ b/CPlusPlus/02_essential_cpp_udt.pptx
@@ -11,6 +11,11 @@
     <p:sldId id="260" r:id="rId5"/>
     <p:sldId id="261" r:id="rId6"/>
     <p:sldId id="262" r:id="rId7"/>
+    <p:sldId id="263" r:id="rId8"/>
+    <p:sldId id="264" r:id="rId9"/>
+    <p:sldId id="265" r:id="rId10"/>
+    <p:sldId id="266" r:id="rId11"/>
+    <p:sldId id="267" r:id="rId12"/>
   </p:sldIdLst>
   <p:sldSz cx="9144000" cy="6858000" type="screen4x3"/>
   <p:notesSz cx="6858000" cy="9144000"/>
@@ -248,7 +253,7 @@
           <a:p>
             <a:fld id="{A8801574-87B3-4792-B4E8-6055B541C335}" type="datetimeFigureOut">
               <a:rPr lang="en-US" smtClean="0"/>
-              <a:t>2017-02-15</a:t>
+              <a:t>2017-02-17</a:t>
             </a:fld>
             <a:endParaRPr lang="en-US"/>
           </a:p>
@@ -418,7 +423,7 @@
           <a:p>
             <a:fld id="{A8801574-87B3-4792-B4E8-6055B541C335}" type="datetimeFigureOut">
               <a:rPr lang="en-US" smtClean="0"/>
-              <a:t>2017-02-15</a:t>
+              <a:t>2017-02-17</a:t>
             </a:fld>
             <a:endParaRPr lang="en-US"/>
           </a:p>
@@ -598,7 +603,7 @@
           <a:p>
             <a:fld id="{A8801574-87B3-4792-B4E8-6055B541C335}" type="datetimeFigureOut">
               <a:rPr lang="en-US" smtClean="0"/>
-              <a:t>2017-02-15</a:t>
+              <a:t>2017-02-17</a:t>
             </a:fld>
             <a:endParaRPr lang="en-US"/>
           </a:p>
@@ -768,7 +773,7 @@
           <a:p>
             <a:fld id="{A8801574-87B3-4792-B4E8-6055B541C335}" type="datetimeFigureOut">
               <a:rPr lang="en-US" smtClean="0"/>
-              <a:t>2017-02-15</a:t>
+              <a:t>2017-02-17</a:t>
             </a:fld>
             <a:endParaRPr lang="en-US"/>
           </a:p>
@@ -1012,7 +1017,7 @@
           <a:p>
             <a:fld id="{A8801574-87B3-4792-B4E8-6055B541C335}" type="datetimeFigureOut">
               <a:rPr lang="en-US" smtClean="0"/>
-              <a:t>2017-02-15</a:t>
+              <a:t>2017-02-17</a:t>
             </a:fld>
             <a:endParaRPr lang="en-US"/>
           </a:p>
@@ -1244,7 +1249,7 @@
           <a:p>
             <a:fld id="{A8801574-87B3-4792-B4E8-6055B541C335}" type="datetimeFigureOut">
               <a:rPr lang="en-US" smtClean="0"/>
-              <a:t>2017-02-15</a:t>
+              <a:t>2017-02-17</a:t>
             </a:fld>
             <a:endParaRPr lang="en-US"/>
           </a:p>
@@ -1611,7 +1616,7 @@
           <a:p>
             <a:fld id="{A8801574-87B3-4792-B4E8-6055B541C335}" type="datetimeFigureOut">
               <a:rPr lang="en-US" smtClean="0"/>
-              <a:t>2017-02-15</a:t>
+              <a:t>2017-02-17</a:t>
             </a:fld>
             <a:endParaRPr lang="en-US"/>
           </a:p>
@@ -1729,7 +1734,7 @@
           <a:p>
             <a:fld id="{A8801574-87B3-4792-B4E8-6055B541C335}" type="datetimeFigureOut">
               <a:rPr lang="en-US" smtClean="0"/>
-              <a:t>2017-02-15</a:t>
+              <a:t>2017-02-17</a:t>
             </a:fld>
             <a:endParaRPr lang="en-US"/>
           </a:p>
@@ -1824,7 +1829,7 @@
           <a:p>
             <a:fld id="{A8801574-87B3-4792-B4E8-6055B541C335}" type="datetimeFigureOut">
               <a:rPr lang="en-US" smtClean="0"/>
-              <a:t>2017-02-15</a:t>
+              <a:t>2017-02-17</a:t>
             </a:fld>
             <a:endParaRPr lang="en-US"/>
           </a:p>
@@ -2101,7 +2106,7 @@
           <a:p>
             <a:fld id="{A8801574-87B3-4792-B4E8-6055B541C335}" type="datetimeFigureOut">
               <a:rPr lang="en-US" smtClean="0"/>
-              <a:t>2017-02-15</a:t>
+              <a:t>2017-02-17</a:t>
             </a:fld>
             <a:endParaRPr lang="en-US"/>
           </a:p>
@@ -2358,7 +2363,7 @@
           <a:p>
             <a:fld id="{A8801574-87B3-4792-B4E8-6055B541C335}" type="datetimeFigureOut">
               <a:rPr lang="en-US" smtClean="0"/>
-              <a:t>2017-02-15</a:t>
+              <a:t>2017-02-17</a:t>
             </a:fld>
             <a:endParaRPr lang="en-US"/>
           </a:p>
@@ -2571,7 +2576,7 @@
           <a:p>
             <a:fld id="{A8801574-87B3-4792-B4E8-6055B541C335}" type="datetimeFigureOut">
               <a:rPr lang="en-US" smtClean="0"/>
-              <a:t>2017-02-15</a:t>
+              <a:t>2017-02-17</a:t>
             </a:fld>
             <a:endParaRPr lang="en-US"/>
           </a:p>
@@ -3138,6 +3143,939 @@
 </p:sld>
 </file>
 
+<file path=ppt/slides/slide10.xml><?xml version="1.0" encoding="utf-8"?>
+<p:sld xmlns:a="http://schemas.openxmlformats.org/drawingml/2006/main" xmlns:r="http://schemas.openxmlformats.org/officeDocument/2006/relationships" xmlns:p="http://schemas.openxmlformats.org/presentationml/2006/main">
+  <p:cSld>
+    <p:spTree>
+      <p:nvGrpSpPr>
+        <p:cNvPr id="1" name=""/>
+        <p:cNvGrpSpPr/>
+        <p:nvPr/>
+      </p:nvGrpSpPr>
+      <p:grpSpPr>
+        <a:xfrm>
+          <a:off x="0" y="0"/>
+          <a:ext cx="0" cy="0"/>
+          <a:chOff x="0" y="0"/>
+          <a:chExt cx="0" cy="0"/>
+        </a:xfrm>
+      </p:grpSpPr>
+      <p:sp>
+        <p:nvSpPr>
+          <p:cNvPr id="2" name="Title 1"/>
+          <p:cNvSpPr>
+            <a:spLocks noGrp="1"/>
+          </p:cNvSpPr>
+          <p:nvPr>
+            <p:ph type="title"/>
+          </p:nvPr>
+        </p:nvSpPr>
+        <p:spPr/>
+        <p:txBody>
+          <a:bodyPr/>
+          <a:lstStyle/>
+          <a:p>
+            <a:r>
+              <a:rPr lang="en-US" dirty="0" smtClean="0"/>
+              <a:t>Class constructor</a:t>
+            </a:r>
+            <a:endParaRPr lang="en-US" dirty="0"/>
+          </a:p>
+        </p:txBody>
+      </p:sp>
+      <p:sp>
+        <p:nvSpPr>
+          <p:cNvPr id="3" name="Content Placeholder 2"/>
+          <p:cNvSpPr>
+            <a:spLocks noGrp="1"/>
+          </p:cNvSpPr>
+          <p:nvPr>
+            <p:ph idx="1"/>
+          </p:nvPr>
+        </p:nvSpPr>
+        <p:spPr/>
+        <p:txBody>
+          <a:bodyPr/>
+          <a:lstStyle/>
+          <a:p>
+            <a:r>
+              <a:rPr lang="en-US" dirty="0" smtClean="0"/>
+              <a:t>Can be public</a:t>
+            </a:r>
+          </a:p>
+          <a:p>
+            <a:endParaRPr lang="en-US" dirty="0"/>
+          </a:p>
+          <a:p>
+            <a:endParaRPr lang="en-US" dirty="0" smtClean="0"/>
+          </a:p>
+          <a:p>
+            <a:endParaRPr lang="en-US" dirty="0"/>
+          </a:p>
+          <a:p>
+            <a:endParaRPr lang="en-US" dirty="0" smtClean="0"/>
+          </a:p>
+          <a:p>
+            <a:endParaRPr lang="en-US" dirty="0"/>
+          </a:p>
+          <a:p>
+            <a:r>
+              <a:rPr lang="en-US" dirty="0" smtClean="0"/>
+              <a:t>Creates new instance</a:t>
+            </a:r>
+          </a:p>
+          <a:p>
+            <a:r>
+              <a:rPr lang="en-US" dirty="0" smtClean="0"/>
+              <a:t>Can also be private (factories, …)</a:t>
+            </a:r>
+            <a:endParaRPr lang="en-US" dirty="0"/>
+          </a:p>
+        </p:txBody>
+      </p:sp>
+      <p:sp>
+        <p:nvSpPr>
+          <p:cNvPr id="4" name="TextBox 3"/>
+          <p:cNvSpPr txBox="1"/>
+          <p:nvPr/>
+        </p:nvSpPr>
+        <p:spPr>
+          <a:xfrm>
+            <a:off x="628650" y="2272706"/>
+            <a:ext cx="7886700" cy="2554545"/>
+          </a:xfrm>
+          <a:prstGeom prst="rect">
+            <a:avLst/>
+          </a:prstGeom>
+          <a:solidFill>
+            <a:schemeClr val="bg1">
+              <a:lumMod val="75000"/>
+            </a:schemeClr>
+          </a:solidFill>
+        </p:spPr>
+        <p:txBody>
+          <a:bodyPr wrap="square" rtlCol="0">
+            <a:spAutoFit/>
+          </a:bodyPr>
+          <a:lstStyle/>
+          <a:p>
+            <a:r>
+              <a:rPr lang="en-US" sz="1600" dirty="0" smtClean="0">
+                <a:latin typeface="Courier New" pitchFamily="49" charset="0"/>
+                <a:cs typeface="Courier New" pitchFamily="49" charset="0"/>
+              </a:rPr>
+              <a:t>class Particle {</a:t>
+            </a:r>
+          </a:p>
+          <a:p>
+            <a:r>
+              <a:rPr lang="en-US" sz="1600" dirty="0">
+                <a:latin typeface="Courier New" pitchFamily="49" charset="0"/>
+                <a:cs typeface="Courier New" pitchFamily="49" charset="0"/>
+              </a:rPr>
+              <a:t> </a:t>
+            </a:r>
+            <a:r>
+              <a:rPr lang="en-US" sz="1600" dirty="0" smtClean="0">
+                <a:latin typeface="Courier New" pitchFamily="49" charset="0"/>
+                <a:cs typeface="Courier New" pitchFamily="49" charset="0"/>
+              </a:rPr>
+              <a:t>   …</a:t>
+            </a:r>
+          </a:p>
+          <a:p>
+            <a:r>
+              <a:rPr lang="en-US" sz="1600" dirty="0" smtClean="0">
+                <a:latin typeface="Courier New" pitchFamily="49" charset="0"/>
+                <a:cs typeface="Courier New" pitchFamily="49" charset="0"/>
+              </a:rPr>
+              <a:t>    </a:t>
+            </a:r>
+            <a:r>
+              <a:rPr lang="en-US" sz="1600" dirty="0">
+                <a:latin typeface="Courier New" pitchFamily="49" charset="0"/>
+                <a:cs typeface="Courier New" pitchFamily="49" charset="0"/>
+              </a:rPr>
+              <a:t>public</a:t>
+            </a:r>
+            <a:r>
+              <a:rPr lang="en-US" sz="1600" dirty="0" smtClean="0">
+                <a:latin typeface="Courier New" pitchFamily="49" charset="0"/>
+                <a:cs typeface="Courier New" pitchFamily="49" charset="0"/>
+              </a:rPr>
+              <a:t>:</a:t>
+            </a:r>
+          </a:p>
+          <a:p>
+            <a:r>
+              <a:rPr lang="en-US" sz="1600" dirty="0">
+                <a:latin typeface="Courier New" pitchFamily="49" charset="0"/>
+                <a:cs typeface="Courier New" pitchFamily="49" charset="0"/>
+              </a:rPr>
+              <a:t> </a:t>
+            </a:r>
+            <a:r>
+              <a:rPr lang="en-US" sz="1600" dirty="0" smtClean="0">
+                <a:latin typeface="Courier New" pitchFamily="49" charset="0"/>
+                <a:cs typeface="Courier New" pitchFamily="49" charset="0"/>
+              </a:rPr>
+              <a:t>       …</a:t>
+            </a:r>
+            <a:endParaRPr lang="en-US" sz="1600" dirty="0">
+              <a:latin typeface="Courier New" pitchFamily="49" charset="0"/>
+              <a:cs typeface="Courier New" pitchFamily="49" charset="0"/>
+            </a:endParaRPr>
+          </a:p>
+          <a:p>
+            <a:r>
+              <a:rPr lang="en-US" sz="1600" dirty="0" smtClean="0">
+                <a:latin typeface="Courier New" pitchFamily="49" charset="0"/>
+                <a:cs typeface="Courier New" pitchFamily="49" charset="0"/>
+              </a:rPr>
+              <a:t>        Particle(double x, double y, double z,</a:t>
+            </a:r>
+          </a:p>
+          <a:p>
+            <a:r>
+              <a:rPr lang="en-US" sz="1600" dirty="0">
+                <a:latin typeface="Courier New" pitchFamily="49" charset="0"/>
+                <a:cs typeface="Courier New" pitchFamily="49" charset="0"/>
+              </a:rPr>
+              <a:t> </a:t>
+            </a:r>
+            <a:r>
+              <a:rPr lang="en-US" sz="1600" dirty="0" smtClean="0">
+                <a:latin typeface="Courier New" pitchFamily="49" charset="0"/>
+                <a:cs typeface="Courier New" pitchFamily="49" charset="0"/>
+              </a:rPr>
+              <a:t>                double mass, </a:t>
+            </a:r>
+            <a:r>
+              <a:rPr lang="en-US" sz="1600" dirty="0" err="1" smtClean="0">
+                <a:latin typeface="Courier New" pitchFamily="49" charset="0"/>
+                <a:cs typeface="Courier New" pitchFamily="49" charset="0"/>
+              </a:rPr>
+              <a:t>int</a:t>
+            </a:r>
+            <a:r>
+              <a:rPr lang="en-US" sz="1600" dirty="0" smtClean="0">
+                <a:latin typeface="Courier New" pitchFamily="49" charset="0"/>
+                <a:cs typeface="Courier New" pitchFamily="49" charset="0"/>
+              </a:rPr>
+              <a:t> charge) </a:t>
+            </a:r>
+            <a:r>
+              <a:rPr lang="en-US" sz="1600" dirty="0">
+                <a:latin typeface="Courier New" pitchFamily="49" charset="0"/>
+                <a:cs typeface="Courier New" pitchFamily="49" charset="0"/>
+              </a:rPr>
+              <a:t>:</a:t>
+            </a:r>
+          </a:p>
+          <a:p>
+            <a:r>
+              <a:rPr lang="en-US" sz="1600" dirty="0">
+                <a:latin typeface="Courier New" pitchFamily="49" charset="0"/>
+                <a:cs typeface="Courier New" pitchFamily="49" charset="0"/>
+              </a:rPr>
+              <a:t>            _x </a:t>
+            </a:r>
+            <a:r>
+              <a:rPr lang="en-US" sz="1600" dirty="0" smtClean="0">
+                <a:latin typeface="Courier New" pitchFamily="49" charset="0"/>
+                <a:cs typeface="Courier New" pitchFamily="49" charset="0"/>
+              </a:rPr>
+              <a:t>{x}, </a:t>
+            </a:r>
+            <a:r>
+              <a:rPr lang="en-US" sz="1600" dirty="0">
+                <a:latin typeface="Courier New" pitchFamily="49" charset="0"/>
+                <a:cs typeface="Courier New" pitchFamily="49" charset="0"/>
+              </a:rPr>
+              <a:t>_y </a:t>
+            </a:r>
+            <a:r>
+              <a:rPr lang="en-US" sz="1600" dirty="0" smtClean="0">
+                <a:latin typeface="Courier New" pitchFamily="49" charset="0"/>
+                <a:cs typeface="Courier New" pitchFamily="49" charset="0"/>
+              </a:rPr>
+              <a:t>{y}, </a:t>
+            </a:r>
+            <a:r>
+              <a:rPr lang="en-US" sz="1600" dirty="0">
+                <a:latin typeface="Courier New" pitchFamily="49" charset="0"/>
+                <a:cs typeface="Courier New" pitchFamily="49" charset="0"/>
+              </a:rPr>
+              <a:t>_z </a:t>
+            </a:r>
+            <a:r>
+              <a:rPr lang="en-US" sz="1600" dirty="0" smtClean="0">
+                <a:latin typeface="Courier New" pitchFamily="49" charset="0"/>
+                <a:cs typeface="Courier New" pitchFamily="49" charset="0"/>
+              </a:rPr>
+              <a:t>{z},</a:t>
+            </a:r>
+            <a:endParaRPr lang="en-US" sz="1600" dirty="0">
+              <a:latin typeface="Courier New" pitchFamily="49" charset="0"/>
+              <a:cs typeface="Courier New" pitchFamily="49" charset="0"/>
+            </a:endParaRPr>
+          </a:p>
+          <a:p>
+            <a:r>
+              <a:rPr lang="en-US" sz="1600" dirty="0">
+                <a:latin typeface="Courier New" pitchFamily="49" charset="0"/>
+                <a:cs typeface="Courier New" pitchFamily="49" charset="0"/>
+              </a:rPr>
+              <a:t>            _mass {</a:t>
+            </a:r>
+            <a:r>
+              <a:rPr lang="en-US" sz="1600" dirty="0" smtClean="0">
+                <a:latin typeface="Courier New" pitchFamily="49" charset="0"/>
+                <a:cs typeface="Courier New" pitchFamily="49" charset="0"/>
+              </a:rPr>
+              <a:t>mass}, </a:t>
+            </a:r>
+            <a:r>
+              <a:rPr lang="en-US" sz="1600" dirty="0">
+                <a:latin typeface="Courier New" pitchFamily="49" charset="0"/>
+                <a:cs typeface="Courier New" pitchFamily="49" charset="0"/>
+              </a:rPr>
+              <a:t>_charge {</a:t>
+            </a:r>
+            <a:r>
+              <a:rPr lang="en-US" sz="1600" dirty="0" smtClean="0">
+                <a:latin typeface="Courier New" pitchFamily="49" charset="0"/>
+                <a:cs typeface="Courier New" pitchFamily="49" charset="0"/>
+              </a:rPr>
+              <a:t>charge} {};</a:t>
+            </a:r>
+          </a:p>
+          <a:p>
+            <a:r>
+              <a:rPr lang="en-US" sz="1600" dirty="0" smtClean="0">
+                <a:latin typeface="Courier New" pitchFamily="49" charset="0"/>
+                <a:cs typeface="Courier New" pitchFamily="49" charset="0"/>
+              </a:rPr>
+              <a:t>        …</a:t>
+            </a:r>
+          </a:p>
+          <a:p>
+            <a:r>
+              <a:rPr lang="en-US" sz="1600" dirty="0" smtClean="0">
+                <a:latin typeface="Courier New" pitchFamily="49" charset="0"/>
+                <a:cs typeface="Courier New" pitchFamily="49" charset="0"/>
+              </a:rPr>
+              <a:t>};</a:t>
+            </a:r>
+            <a:endParaRPr lang="en-US" sz="1600" dirty="0">
+              <a:latin typeface="Courier New" pitchFamily="49" charset="0"/>
+              <a:cs typeface="Courier New" pitchFamily="49" charset="0"/>
+            </a:endParaRPr>
+          </a:p>
+        </p:txBody>
+      </p:sp>
+      <p:grpSp>
+        <p:nvGrpSpPr>
+          <p:cNvPr id="5" name="Group 4"/>
+          <p:cNvGrpSpPr/>
+          <p:nvPr/>
+        </p:nvGrpSpPr>
+        <p:grpSpPr>
+          <a:xfrm>
+            <a:off x="3706761" y="4385187"/>
+            <a:ext cx="3991897" cy="691334"/>
+            <a:chOff x="-661347" y="3150501"/>
+            <a:chExt cx="3991897" cy="691334"/>
+          </a:xfrm>
+        </p:grpSpPr>
+        <p:sp>
+          <p:nvSpPr>
+            <p:cNvPr id="6" name="TextBox 5"/>
+            <p:cNvSpPr txBox="1"/>
+            <p:nvPr/>
+          </p:nvSpPr>
+          <p:spPr>
+            <a:xfrm>
+              <a:off x="199578" y="3441725"/>
+              <a:ext cx="3130972" cy="400110"/>
+            </a:xfrm>
+            <a:prstGeom prst="rect">
+              <a:avLst/>
+            </a:prstGeom>
+            <a:solidFill>
+              <a:schemeClr val="bg1"/>
+            </a:solidFill>
+            <a:ln w="19050">
+              <a:solidFill>
+                <a:schemeClr val="tx1"/>
+              </a:solidFill>
+            </a:ln>
+          </p:spPr>
+          <p:txBody>
+            <a:bodyPr wrap="square" rtlCol="0">
+              <a:spAutoFit/>
+            </a:bodyPr>
+            <a:lstStyle/>
+            <a:p>
+              <a:r>
+                <a:rPr lang="en-US" sz="2000" dirty="0" smtClean="0"/>
+                <a:t>trivial attribute initialization</a:t>
+              </a:r>
+              <a:endParaRPr lang="en-US" sz="2000" dirty="0">
+                <a:latin typeface="Courier New" panose="02070309020205020404" pitchFamily="49" charset="0"/>
+                <a:cs typeface="Courier New" panose="02070309020205020404" pitchFamily="49" charset="0"/>
+              </a:endParaRPr>
+            </a:p>
+          </p:txBody>
+        </p:sp>
+        <p:cxnSp>
+          <p:nvCxnSpPr>
+            <p:cNvPr id="7" name="Straight Arrow Connector 6"/>
+            <p:cNvCxnSpPr>
+              <a:stCxn id="6" idx="1"/>
+            </p:cNvCxnSpPr>
+            <p:nvPr/>
+          </p:nvCxnSpPr>
+          <p:spPr>
+            <a:xfrm flipH="1" flipV="1">
+              <a:off x="-661347" y="3150501"/>
+              <a:ext cx="860925" cy="491279"/>
+            </a:xfrm>
+            <a:prstGeom prst="straightConnector1">
+              <a:avLst/>
+            </a:prstGeom>
+            <a:ln w="19050">
+              <a:solidFill>
+                <a:schemeClr val="tx1"/>
+              </a:solidFill>
+              <a:tailEnd type="stealth" w="lg" len="lg"/>
+            </a:ln>
+          </p:spPr>
+          <p:style>
+            <a:lnRef idx="1">
+              <a:schemeClr val="accent1"/>
+            </a:lnRef>
+            <a:fillRef idx="0">
+              <a:schemeClr val="accent1"/>
+            </a:fillRef>
+            <a:effectRef idx="0">
+              <a:schemeClr val="accent1"/>
+            </a:effectRef>
+            <a:fontRef idx="minor">
+              <a:schemeClr val="tx1"/>
+            </a:fontRef>
+          </p:style>
+        </p:cxnSp>
+      </p:grpSp>
+      <p:grpSp>
+        <p:nvGrpSpPr>
+          <p:cNvPr id="10" name="Group 9"/>
+          <p:cNvGrpSpPr/>
+          <p:nvPr/>
+        </p:nvGrpSpPr>
+        <p:grpSpPr>
+          <a:xfrm>
+            <a:off x="6194323" y="2926589"/>
+            <a:ext cx="2831690" cy="1045643"/>
+            <a:chOff x="-272972" y="3441725"/>
+            <a:chExt cx="2831690" cy="1045643"/>
+          </a:xfrm>
+        </p:grpSpPr>
+        <p:sp>
+          <p:nvSpPr>
+            <p:cNvPr id="11" name="TextBox 10"/>
+            <p:cNvSpPr txBox="1"/>
+            <p:nvPr/>
+          </p:nvSpPr>
+          <p:spPr>
+            <a:xfrm>
+              <a:off x="199578" y="3441725"/>
+              <a:ext cx="2359140" cy="400110"/>
+            </a:xfrm>
+            <a:prstGeom prst="rect">
+              <a:avLst/>
+            </a:prstGeom>
+            <a:solidFill>
+              <a:schemeClr val="bg1"/>
+            </a:solidFill>
+            <a:ln w="19050">
+              <a:solidFill>
+                <a:schemeClr val="tx1"/>
+              </a:solidFill>
+            </a:ln>
+          </p:spPr>
+          <p:txBody>
+            <a:bodyPr wrap="square" rtlCol="0">
+              <a:spAutoFit/>
+            </a:bodyPr>
+            <a:lstStyle/>
+            <a:p>
+              <a:r>
+                <a:rPr lang="en-US" sz="2000" dirty="0" smtClean="0"/>
+                <a:t>empty  method body</a:t>
+              </a:r>
+              <a:endParaRPr lang="en-US" sz="2000" dirty="0">
+                <a:latin typeface="Courier New" panose="02070309020205020404" pitchFamily="49" charset="0"/>
+                <a:cs typeface="Courier New" panose="02070309020205020404" pitchFamily="49" charset="0"/>
+              </a:endParaRPr>
+            </a:p>
+          </p:txBody>
+        </p:sp>
+        <p:cxnSp>
+          <p:nvCxnSpPr>
+            <p:cNvPr id="12" name="Straight Arrow Connector 11"/>
+            <p:cNvCxnSpPr>
+              <a:stCxn id="11" idx="1"/>
+            </p:cNvCxnSpPr>
+            <p:nvPr/>
+          </p:nvCxnSpPr>
+          <p:spPr>
+            <a:xfrm flipH="1">
+              <a:off x="-272972" y="3641780"/>
+              <a:ext cx="472550" cy="845588"/>
+            </a:xfrm>
+            <a:prstGeom prst="straightConnector1">
+              <a:avLst/>
+            </a:prstGeom>
+            <a:ln w="19050">
+              <a:solidFill>
+                <a:schemeClr val="tx1"/>
+              </a:solidFill>
+              <a:tailEnd type="stealth" w="lg" len="lg"/>
+            </a:ln>
+          </p:spPr>
+          <p:style>
+            <a:lnRef idx="1">
+              <a:schemeClr val="accent1"/>
+            </a:lnRef>
+            <a:fillRef idx="0">
+              <a:schemeClr val="accent1"/>
+            </a:fillRef>
+            <a:effectRef idx="0">
+              <a:schemeClr val="accent1"/>
+            </a:effectRef>
+            <a:fontRef idx="minor">
+              <a:schemeClr val="tx1"/>
+            </a:fontRef>
+          </p:style>
+        </p:cxnSp>
+      </p:grpSp>
+    </p:spTree>
+    <p:extLst>
+      <p:ext uri="{BB962C8B-B14F-4D97-AF65-F5344CB8AC3E}">
+        <p14:creationId xmlns:p14="http://schemas.microsoft.com/office/powerpoint/2010/main" val="3275919169"/>
+      </p:ext>
+    </p:extLst>
+  </p:cSld>
+  <p:clrMapOvr>
+    <a:masterClrMapping/>
+  </p:clrMapOvr>
+  <p:timing>
+    <p:tnLst>
+      <p:par>
+        <p:cTn id="1" dur="indefinite" restart="never" nodeType="tmRoot">
+          <p:childTnLst>
+            <p:seq concurrent="1" nextAc="seek">
+              <p:cTn id="2" dur="indefinite" nodeType="mainSeq">
+                <p:childTnLst>
+                  <p:par>
+                    <p:cTn id="3" fill="hold">
+                      <p:stCondLst>
+                        <p:cond delay="indefinite"/>
+                        <p:cond evt="onBegin" delay="0">
+                          <p:tn val="2"/>
+                        </p:cond>
+                      </p:stCondLst>
+                      <p:childTnLst>
+                        <p:par>
+                          <p:cTn id="4" fill="hold">
+                            <p:stCondLst>
+                              <p:cond delay="0"/>
+                            </p:stCondLst>
+                            <p:childTnLst>
+                              <p:par>
+                                <p:cTn id="5" presetID="1" presetClass="entr" presetSubtype="0" fill="hold" grpId="0" nodeType="withEffect">
+                                  <p:stCondLst>
+                                    <p:cond delay="0"/>
+                                  </p:stCondLst>
+                                  <p:childTnLst>
+                                    <p:set>
+                                      <p:cBhvr>
+                                        <p:cTn id="6" dur="1" fill="hold">
+                                          <p:stCondLst>
+                                            <p:cond delay="0"/>
+                                          </p:stCondLst>
+                                        </p:cTn>
+                                        <p:tgtEl>
+                                          <p:spTgt spid="3">
+                                            <p:txEl>
+                                              <p:pRg st="0" end="0"/>
+                                            </p:txEl>
+                                          </p:spTgt>
+                                        </p:tgtEl>
+                                        <p:attrNameLst>
+                                          <p:attrName>style.visibility</p:attrName>
+                                        </p:attrNameLst>
+                                      </p:cBhvr>
+                                      <p:to>
+                                        <p:strVal val="visible"/>
+                                      </p:to>
+                                    </p:set>
+                                  </p:childTnLst>
+                                </p:cTn>
+                              </p:par>
+                              <p:par>
+                                <p:cTn id="7" presetID="1" presetClass="entr" presetSubtype="0" fill="hold" grpId="0" nodeType="withEffect">
+                                  <p:stCondLst>
+                                    <p:cond delay="0"/>
+                                  </p:stCondLst>
+                                  <p:childTnLst>
+                                    <p:set>
+                                      <p:cBhvr>
+                                        <p:cTn id="8" dur="1" fill="hold">
+                                          <p:stCondLst>
+                                            <p:cond delay="0"/>
+                                          </p:stCondLst>
+                                        </p:cTn>
+                                        <p:tgtEl>
+                                          <p:spTgt spid="4"/>
+                                        </p:tgtEl>
+                                        <p:attrNameLst>
+                                          <p:attrName>style.visibility</p:attrName>
+                                        </p:attrNameLst>
+                                      </p:cBhvr>
+                                      <p:to>
+                                        <p:strVal val="visible"/>
+                                      </p:to>
+                                    </p:set>
+                                  </p:childTnLst>
+                                </p:cTn>
+                              </p:par>
+                            </p:childTnLst>
+                          </p:cTn>
+                        </p:par>
+                      </p:childTnLst>
+                    </p:cTn>
+                  </p:par>
+                  <p:par>
+                    <p:cTn id="9" fill="hold">
+                      <p:stCondLst>
+                        <p:cond delay="indefinite"/>
+                      </p:stCondLst>
+                      <p:childTnLst>
+                        <p:par>
+                          <p:cTn id="10" fill="hold">
+                            <p:stCondLst>
+                              <p:cond delay="0"/>
+                            </p:stCondLst>
+                            <p:childTnLst>
+                              <p:par>
+                                <p:cTn id="11" presetID="1" presetClass="entr" presetSubtype="0" fill="hold" nodeType="clickEffect">
+                                  <p:stCondLst>
+                                    <p:cond delay="0"/>
+                                  </p:stCondLst>
+                                  <p:childTnLst>
+                                    <p:set>
+                                      <p:cBhvr>
+                                        <p:cTn id="12" dur="1" fill="hold">
+                                          <p:stCondLst>
+                                            <p:cond delay="0"/>
+                                          </p:stCondLst>
+                                        </p:cTn>
+                                        <p:tgtEl>
+                                          <p:spTgt spid="5"/>
+                                        </p:tgtEl>
+                                        <p:attrNameLst>
+                                          <p:attrName>style.visibility</p:attrName>
+                                        </p:attrNameLst>
+                                      </p:cBhvr>
+                                      <p:to>
+                                        <p:strVal val="visible"/>
+                                      </p:to>
+                                    </p:set>
+                                  </p:childTnLst>
+                                </p:cTn>
+                              </p:par>
+                            </p:childTnLst>
+                          </p:cTn>
+                        </p:par>
+                      </p:childTnLst>
+                    </p:cTn>
+                  </p:par>
+                  <p:par>
+                    <p:cTn id="13" fill="hold">
+                      <p:stCondLst>
+                        <p:cond delay="indefinite"/>
+                      </p:stCondLst>
+                      <p:childTnLst>
+                        <p:par>
+                          <p:cTn id="14" fill="hold">
+                            <p:stCondLst>
+                              <p:cond delay="0"/>
+                            </p:stCondLst>
+                            <p:childTnLst>
+                              <p:par>
+                                <p:cTn id="15" presetID="1" presetClass="entr" presetSubtype="0" fill="hold" nodeType="clickEffect">
+                                  <p:stCondLst>
+                                    <p:cond delay="0"/>
+                                  </p:stCondLst>
+                                  <p:childTnLst>
+                                    <p:set>
+                                      <p:cBhvr>
+                                        <p:cTn id="16" dur="1" fill="hold">
+                                          <p:stCondLst>
+                                            <p:cond delay="0"/>
+                                          </p:stCondLst>
+                                        </p:cTn>
+                                        <p:tgtEl>
+                                          <p:spTgt spid="10"/>
+                                        </p:tgtEl>
+                                        <p:attrNameLst>
+                                          <p:attrName>style.visibility</p:attrName>
+                                        </p:attrNameLst>
+                                      </p:cBhvr>
+                                      <p:to>
+                                        <p:strVal val="visible"/>
+                                      </p:to>
+                                    </p:set>
+                                  </p:childTnLst>
+                                </p:cTn>
+                              </p:par>
+                            </p:childTnLst>
+                          </p:cTn>
+                        </p:par>
+                      </p:childTnLst>
+                    </p:cTn>
+                  </p:par>
+                  <p:par>
+                    <p:cTn id="17" fill="hold">
+                      <p:stCondLst>
+                        <p:cond delay="indefinite"/>
+                      </p:stCondLst>
+                      <p:childTnLst>
+                        <p:par>
+                          <p:cTn id="18" fill="hold">
+                            <p:stCondLst>
+                              <p:cond delay="0"/>
+                            </p:stCondLst>
+                            <p:childTnLst>
+                              <p:par>
+                                <p:cTn id="19" presetID="1" presetClass="entr" presetSubtype="0" fill="hold" grpId="0" nodeType="clickEffect">
+                                  <p:stCondLst>
+                                    <p:cond delay="0"/>
+                                  </p:stCondLst>
+                                  <p:childTnLst>
+                                    <p:set>
+                                      <p:cBhvr>
+                                        <p:cTn id="20" dur="1" fill="hold">
+                                          <p:stCondLst>
+                                            <p:cond delay="0"/>
+                                          </p:stCondLst>
+                                        </p:cTn>
+                                        <p:tgtEl>
+                                          <p:spTgt spid="3">
+                                            <p:txEl>
+                                              <p:pRg st="6" end="6"/>
+                                            </p:txEl>
+                                          </p:spTgt>
+                                        </p:tgtEl>
+                                        <p:attrNameLst>
+                                          <p:attrName>style.visibility</p:attrName>
+                                        </p:attrNameLst>
+                                      </p:cBhvr>
+                                      <p:to>
+                                        <p:strVal val="visible"/>
+                                      </p:to>
+                                    </p:set>
+                                  </p:childTnLst>
+                                </p:cTn>
+                              </p:par>
+                            </p:childTnLst>
+                          </p:cTn>
+                        </p:par>
+                      </p:childTnLst>
+                    </p:cTn>
+                  </p:par>
+                  <p:par>
+                    <p:cTn id="21" fill="hold">
+                      <p:stCondLst>
+                        <p:cond delay="indefinite"/>
+                      </p:stCondLst>
+                      <p:childTnLst>
+                        <p:par>
+                          <p:cTn id="22" fill="hold">
+                            <p:stCondLst>
+                              <p:cond delay="0"/>
+                            </p:stCondLst>
+                            <p:childTnLst>
+                              <p:par>
+                                <p:cTn id="23" presetID="1" presetClass="entr" presetSubtype="0" fill="hold" grpId="0" nodeType="clickEffect">
+                                  <p:stCondLst>
+                                    <p:cond delay="0"/>
+                                  </p:stCondLst>
+                                  <p:childTnLst>
+                                    <p:set>
+                                      <p:cBhvr>
+                                        <p:cTn id="24" dur="1" fill="hold">
+                                          <p:stCondLst>
+                                            <p:cond delay="0"/>
+                                          </p:stCondLst>
+                                        </p:cTn>
+                                        <p:tgtEl>
+                                          <p:spTgt spid="3">
+                                            <p:txEl>
+                                              <p:pRg st="7" end="7"/>
+                                            </p:txEl>
+                                          </p:spTgt>
+                                        </p:tgtEl>
+                                        <p:attrNameLst>
+                                          <p:attrName>style.visibility</p:attrName>
+                                        </p:attrNameLst>
+                                      </p:cBhvr>
+                                      <p:to>
+                                        <p:strVal val="visible"/>
+                                      </p:to>
+                                    </p:set>
+                                  </p:childTnLst>
+                                </p:cTn>
+                              </p:par>
+                            </p:childTnLst>
+                          </p:cTn>
+                        </p:par>
+                      </p:childTnLst>
+                    </p:cTn>
+                  </p:par>
+                </p:childTnLst>
+              </p:cTn>
+              <p:prevCondLst>
+                <p:cond evt="onPrev" delay="0">
+                  <p:tgtEl>
+                    <p:sldTgt/>
+                  </p:tgtEl>
+                </p:cond>
+              </p:prevCondLst>
+              <p:nextCondLst>
+                <p:cond evt="onNext" delay="0">
+                  <p:tgtEl>
+                    <p:sldTgt/>
+                  </p:tgtEl>
+                </p:cond>
+              </p:nextCondLst>
+            </p:seq>
+          </p:childTnLst>
+        </p:cTn>
+      </p:par>
+    </p:tnLst>
+    <p:bldLst>
+      <p:bldP spid="3" grpId="0" uiExpand="1" build="p"/>
+      <p:bldP spid="4" grpId="0" animBg="1"/>
+    </p:bldLst>
+  </p:timing>
+</p:sld>
+</file>
+
+<file path=ppt/slides/slide11.xml><?xml version="1.0" encoding="utf-8"?>
+<p:sld xmlns:a="http://schemas.openxmlformats.org/drawingml/2006/main" xmlns:r="http://schemas.openxmlformats.org/officeDocument/2006/relationships" xmlns:p="http://schemas.openxmlformats.org/presentationml/2006/main">
+  <p:cSld>
+    <p:spTree>
+      <p:nvGrpSpPr>
+        <p:cNvPr id="1" name=""/>
+        <p:cNvGrpSpPr/>
+        <p:nvPr/>
+      </p:nvGrpSpPr>
+      <p:grpSpPr>
+        <a:xfrm>
+          <a:off x="0" y="0"/>
+          <a:ext cx="0" cy="0"/>
+          <a:chOff x="0" y="0"/>
+          <a:chExt cx="0" cy="0"/>
+        </a:xfrm>
+      </p:grpSpPr>
+      <p:sp>
+        <p:nvSpPr>
+          <p:cNvPr id="2" name="Title 1"/>
+          <p:cNvSpPr>
+            <a:spLocks noGrp="1"/>
+          </p:cNvSpPr>
+          <p:nvPr>
+            <p:ph type="title"/>
+          </p:nvPr>
+        </p:nvSpPr>
+        <p:spPr/>
+        <p:txBody>
+          <a:bodyPr/>
+          <a:lstStyle/>
+          <a:p>
+            <a:r>
+              <a:rPr lang="en-US" dirty="0" smtClean="0"/>
+              <a:t>Method types</a:t>
+            </a:r>
+            <a:endParaRPr lang="en-US" dirty="0"/>
+          </a:p>
+        </p:txBody>
+      </p:sp>
+      <p:sp>
+        <p:nvSpPr>
+          <p:cNvPr id="3" name="Content Placeholder 2"/>
+          <p:cNvSpPr>
+            <a:spLocks noGrp="1"/>
+          </p:cNvSpPr>
+          <p:nvPr>
+            <p:ph idx="1"/>
+          </p:nvPr>
+        </p:nvSpPr>
+        <p:spPr/>
+        <p:txBody>
+          <a:bodyPr/>
+          <a:lstStyle/>
+          <a:p>
+            <a:r>
+              <a:rPr lang="en-US" dirty="0" smtClean="0"/>
+              <a:t>Constructor(s)</a:t>
+            </a:r>
+          </a:p>
+          <a:p>
+            <a:r>
+              <a:rPr lang="en-US" dirty="0" smtClean="0"/>
+              <a:t>Inspectors</a:t>
+            </a:r>
+          </a:p>
+          <a:p>
+            <a:r>
+              <a:rPr lang="en-US" dirty="0" err="1" smtClean="0"/>
+              <a:t>Mutators</a:t>
+            </a:r>
+            <a:endParaRPr lang="en-US" dirty="0" smtClean="0"/>
+          </a:p>
+          <a:p>
+            <a:r>
+              <a:rPr lang="en-US" dirty="0" smtClean="0"/>
+              <a:t>Destructor</a:t>
+            </a:r>
+            <a:endParaRPr lang="en-US" dirty="0"/>
+          </a:p>
+        </p:txBody>
+      </p:sp>
+    </p:spTree>
+    <p:extLst>
+      <p:ext uri="{BB962C8B-B14F-4D97-AF65-F5344CB8AC3E}">
+        <p14:creationId xmlns:p14="http://schemas.microsoft.com/office/powerpoint/2010/main" val="375352401"/>
+      </p:ext>
+    </p:extLst>
+  </p:cSld>
+  <p:clrMapOvr>
+    <a:masterClrMapping/>
+  </p:clrMapOvr>
+  <p:timing>
+    <p:tnLst>
+      <p:par>
+        <p:cTn id="1" dur="indefinite" restart="never" nodeType="tmRoot"/>
+      </p:par>
+    </p:tnLst>
+  </p:timing>
+</p:sld>
+</file>
+
 <file path=ppt/slides/slide2.xml><?xml version="1.0" encoding="utf-8"?>
 <p:sld xmlns:a="http://schemas.openxmlformats.org/drawingml/2006/main" xmlns:r="http://schemas.openxmlformats.org/officeDocument/2006/relationships" xmlns:p="http://schemas.openxmlformats.org/presentationml/2006/main">
   <p:cSld>
@@ -3567,11 +4505,7 @@
           <a:p>
             <a:r>
               <a:rPr lang="en-US" dirty="0" smtClean="0"/>
-              <a:t>Defining s</a:t>
-            </a:r>
-            <a:r>
-              <a:rPr lang="en-US" dirty="0" smtClean="0"/>
-              <a:t>tructures</a:t>
+              <a:t>Defining structures</a:t>
             </a:r>
             <a:endParaRPr lang="en-US" dirty="0"/>
           </a:p>
@@ -3594,11 +4528,7 @@
           <a:p>
             <a:r>
               <a:rPr lang="en-US" dirty="0" smtClean="0"/>
-              <a:t>Representing </a:t>
-            </a:r>
-            <a:r>
-              <a:rPr lang="en-US" dirty="0" smtClean="0"/>
-              <a:t>tuples</a:t>
+              <a:t>Representing tuples</a:t>
             </a:r>
           </a:p>
           <a:p>
@@ -3606,7 +4536,6 @@
               <a:rPr lang="en-US" dirty="0" smtClean="0"/>
               <a:t>Define new type, specify name, members</a:t>
             </a:r>
-            <a:endParaRPr lang="en-US" dirty="0" smtClean="0"/>
           </a:p>
           <a:p>
             <a:endParaRPr lang="en-US" dirty="0"/>
@@ -3660,21 +4589,7 @@
                 <a:latin typeface="Courier New" pitchFamily="49" charset="0"/>
                 <a:cs typeface="Courier New" pitchFamily="49" charset="0"/>
               </a:rPr>
-              <a:t>struct </a:t>
-            </a:r>
-            <a:r>
-              <a:rPr lang="nn-NO" sz="1600" dirty="0" smtClean="0">
-                <a:latin typeface="Courier New" pitchFamily="49" charset="0"/>
-                <a:cs typeface="Courier New" pitchFamily="49" charset="0"/>
-              </a:rPr>
-              <a:t>Particle </a:t>
-            </a:r>
-            <a:r>
-              <a:rPr lang="nn-NO" sz="1600" dirty="0" smtClean="0">
-                <a:latin typeface="Courier New" pitchFamily="49" charset="0"/>
-                <a:cs typeface="Courier New" pitchFamily="49" charset="0"/>
-              </a:rPr>
-              <a:t>{</a:t>
+              <a:t>struct Particle {</a:t>
             </a:r>
           </a:p>
           <a:p>
@@ -4460,14 +5375,7 @@
                 <a:latin typeface="Courier New" pitchFamily="49" charset="0"/>
                 <a:cs typeface="Courier New" pitchFamily="49" charset="0"/>
               </a:rPr>
-              <a:t>Particle </a:t>
-            </a:r>
-            <a:r>
-              <a:rPr lang="nn-NO" sz="1600" dirty="0" smtClean="0">
-                <a:latin typeface="Courier New" pitchFamily="49" charset="0"/>
-                <a:cs typeface="Courier New" pitchFamily="49" charset="0"/>
-              </a:rPr>
-              <a:t>p1;</a:t>
+              <a:t>Particle p1;</a:t>
             </a:r>
           </a:p>
           <a:p>
@@ -4555,10 +5463,6 @@
               </a:rPr>
               <a:t>};</a:t>
             </a:r>
-            <a:endParaRPr lang="nn-NO" sz="1600" dirty="0" smtClean="0">
-              <a:latin typeface="Courier New" pitchFamily="49" charset="0"/>
-              <a:cs typeface="Courier New" pitchFamily="49" charset="0"/>
-            </a:endParaRPr>
           </a:p>
         </p:txBody>
       </p:sp>
@@ -5227,7 +6131,27 @@
           <a:p>
             <a:r>
               <a:rPr lang="en-US" dirty="0" smtClean="0"/>
-              <a:t>Pass by value copies, not what you want</a:t>
+              <a:t>Pass by value copies, </a:t>
+            </a:r>
+            <a:r>
+              <a:rPr lang="en-US" i="1" dirty="0" smtClean="0">
+                <a:solidFill>
+                  <a:srgbClr val="C00000"/>
+                </a:solidFill>
+              </a:rPr>
+              <a:t>not</a:t>
+            </a:r>
+            <a:r>
+              <a:rPr lang="en-US" dirty="0" smtClean="0">
+                <a:solidFill>
+                  <a:srgbClr val="C00000"/>
+                </a:solidFill>
+              </a:rPr>
+              <a:t> </a:t>
+            </a:r>
+            <a:r>
+              <a:rPr lang="en-US" dirty="0" smtClean="0"/>
+              <a:t>what you want</a:t>
             </a:r>
             <a:endParaRPr lang="en-US" dirty="0"/>
           </a:p>
@@ -5733,6 +6657,1847 @@
     </p:tnLst>
     <p:bldLst>
       <p:bldP spid="5" grpId="0" animBg="1"/>
+    </p:bldLst>
+  </p:timing>
+</p:sld>
+</file>
+
+<file path=ppt/slides/slide7.xml><?xml version="1.0" encoding="utf-8"?>
+<p:sld xmlns:a="http://schemas.openxmlformats.org/drawingml/2006/main" xmlns:r="http://schemas.openxmlformats.org/officeDocument/2006/relationships" xmlns:p="http://schemas.openxmlformats.org/presentationml/2006/main">
+  <p:cSld>
+    <p:spTree>
+      <p:nvGrpSpPr>
+        <p:cNvPr id="1" name=""/>
+        <p:cNvGrpSpPr/>
+        <p:nvPr/>
+      </p:nvGrpSpPr>
+      <p:grpSpPr>
+        <a:xfrm>
+          <a:off x="0" y="0"/>
+          <a:ext cx="0" cy="0"/>
+          <a:chOff x="0" y="0"/>
+          <a:chExt cx="0" cy="0"/>
+        </a:xfrm>
+      </p:grpSpPr>
+      <p:sp>
+        <p:nvSpPr>
+          <p:cNvPr id="2" name="Title 1"/>
+          <p:cNvSpPr>
+            <a:spLocks noGrp="1"/>
+          </p:cNvSpPr>
+          <p:nvPr>
+            <p:ph type="title"/>
+          </p:nvPr>
+        </p:nvSpPr>
+        <p:spPr/>
+        <p:txBody>
+          <a:bodyPr/>
+          <a:lstStyle/>
+          <a:p>
+            <a:r>
+              <a:rPr lang="en-US" dirty="0" smtClean="0"/>
+              <a:t>Discussion of structures</a:t>
+            </a:r>
+            <a:endParaRPr lang="en-US" dirty="0"/>
+          </a:p>
+        </p:txBody>
+      </p:sp>
+      <p:sp>
+        <p:nvSpPr>
+          <p:cNvPr id="3" name="Content Placeholder 2"/>
+          <p:cNvSpPr>
+            <a:spLocks noGrp="1"/>
+          </p:cNvSpPr>
+          <p:nvPr>
+            <p:ph idx="1"/>
+          </p:nvPr>
+        </p:nvSpPr>
+        <p:spPr/>
+        <p:txBody>
+          <a:bodyPr/>
+          <a:lstStyle/>
+          <a:p>
+            <a:r>
+              <a:rPr lang="en-US" dirty="0" smtClean="0"/>
+              <a:t>Advantages</a:t>
+            </a:r>
+          </a:p>
+          <a:p>
+            <a:pPr lvl="1"/>
+            <a:r>
+              <a:rPr lang="en-US" dirty="0" smtClean="0"/>
+              <a:t>easy to use</a:t>
+            </a:r>
+          </a:p>
+          <a:p>
+            <a:pPr lvl="1"/>
+            <a:r>
+              <a:rPr lang="en-US" dirty="0" smtClean="0"/>
+              <a:t>good fit for modelling</a:t>
+            </a:r>
+          </a:p>
+          <a:p>
+            <a:r>
+              <a:rPr lang="en-US" dirty="0" smtClean="0"/>
+              <a:t>Drawbacks</a:t>
+            </a:r>
+          </a:p>
+          <a:p>
+            <a:pPr lvl="1"/>
+            <a:r>
+              <a:rPr lang="en-US" dirty="0" smtClean="0"/>
+              <a:t>Members are public</a:t>
+            </a:r>
+          </a:p>
+          <a:p>
+            <a:pPr lvl="2"/>
+            <a:r>
+              <a:rPr lang="en-US" dirty="0" smtClean="0"/>
+              <a:t>can be modified </a:t>
+            </a:r>
+            <a:r>
+              <a:rPr lang="en-US" dirty="0" err="1" smtClean="0"/>
+              <a:t>inadvertedly</a:t>
+            </a:r>
+            <a:endParaRPr lang="en-US" dirty="0" smtClean="0"/>
+          </a:p>
+          <a:p>
+            <a:pPr lvl="1"/>
+            <a:r>
+              <a:rPr lang="en-US" dirty="0" smtClean="0"/>
+              <a:t>Data and operations on data are separately defined</a:t>
+            </a:r>
+          </a:p>
+          <a:p>
+            <a:r>
+              <a:rPr lang="en-US" dirty="0" smtClean="0"/>
+              <a:t>Alternative: classes</a:t>
+            </a:r>
+            <a:endParaRPr lang="en-US" dirty="0"/>
+          </a:p>
+        </p:txBody>
+      </p:sp>
+    </p:spTree>
+    <p:extLst>
+      <p:ext uri="{BB962C8B-B14F-4D97-AF65-F5344CB8AC3E}">
+        <p14:creationId xmlns:p14="http://schemas.microsoft.com/office/powerpoint/2010/main" val="1262489674"/>
+      </p:ext>
+    </p:extLst>
+  </p:cSld>
+  <p:clrMapOvr>
+    <a:masterClrMapping/>
+  </p:clrMapOvr>
+  <p:timing>
+    <p:tnLst>
+      <p:par>
+        <p:cTn id="1" dur="indefinite" restart="never" nodeType="tmRoot">
+          <p:childTnLst>
+            <p:seq concurrent="1" nextAc="seek">
+              <p:cTn id="2" dur="indefinite" nodeType="mainSeq">
+                <p:childTnLst>
+                  <p:par>
+                    <p:cTn id="3" fill="hold">
+                      <p:stCondLst>
+                        <p:cond delay="indefinite"/>
+                        <p:cond evt="onBegin" delay="0">
+                          <p:tn val="2"/>
+                        </p:cond>
+                      </p:stCondLst>
+                      <p:childTnLst>
+                        <p:par>
+                          <p:cTn id="4" fill="hold">
+                            <p:stCondLst>
+                              <p:cond delay="0"/>
+                            </p:stCondLst>
+                            <p:childTnLst>
+                              <p:par>
+                                <p:cTn id="5" presetID="1" presetClass="entr" presetSubtype="0" fill="hold" grpId="0" nodeType="withEffect">
+                                  <p:stCondLst>
+                                    <p:cond delay="0"/>
+                                  </p:stCondLst>
+                                  <p:childTnLst>
+                                    <p:set>
+                                      <p:cBhvr>
+                                        <p:cTn id="6" dur="1" fill="hold">
+                                          <p:stCondLst>
+                                            <p:cond delay="0"/>
+                                          </p:stCondLst>
+                                        </p:cTn>
+                                        <p:tgtEl>
+                                          <p:spTgt spid="3">
+                                            <p:txEl>
+                                              <p:pRg st="0" end="0"/>
+                                            </p:txEl>
+                                          </p:spTgt>
+                                        </p:tgtEl>
+                                        <p:attrNameLst>
+                                          <p:attrName>style.visibility</p:attrName>
+                                        </p:attrNameLst>
+                                      </p:cBhvr>
+                                      <p:to>
+                                        <p:strVal val="visible"/>
+                                      </p:to>
+                                    </p:set>
+                                  </p:childTnLst>
+                                </p:cTn>
+                              </p:par>
+                            </p:childTnLst>
+                          </p:cTn>
+                        </p:par>
+                      </p:childTnLst>
+                    </p:cTn>
+                  </p:par>
+                  <p:par>
+                    <p:cTn id="7" fill="hold">
+                      <p:stCondLst>
+                        <p:cond delay="indefinite"/>
+                      </p:stCondLst>
+                      <p:childTnLst>
+                        <p:par>
+                          <p:cTn id="8" fill="hold">
+                            <p:stCondLst>
+                              <p:cond delay="0"/>
+                            </p:stCondLst>
+                            <p:childTnLst>
+                              <p:par>
+                                <p:cTn id="9" presetID="1" presetClass="entr" presetSubtype="0" fill="hold" grpId="0" nodeType="clickEffect">
+                                  <p:stCondLst>
+                                    <p:cond delay="0"/>
+                                  </p:stCondLst>
+                                  <p:childTnLst>
+                                    <p:set>
+                                      <p:cBhvr>
+                                        <p:cTn id="10" dur="1" fill="hold">
+                                          <p:stCondLst>
+                                            <p:cond delay="0"/>
+                                          </p:stCondLst>
+                                        </p:cTn>
+                                        <p:tgtEl>
+                                          <p:spTgt spid="3">
+                                            <p:txEl>
+                                              <p:pRg st="1" end="1"/>
+                                            </p:txEl>
+                                          </p:spTgt>
+                                        </p:tgtEl>
+                                        <p:attrNameLst>
+                                          <p:attrName>style.visibility</p:attrName>
+                                        </p:attrNameLst>
+                                      </p:cBhvr>
+                                      <p:to>
+                                        <p:strVal val="visible"/>
+                                      </p:to>
+                                    </p:set>
+                                  </p:childTnLst>
+                                </p:cTn>
+                              </p:par>
+                            </p:childTnLst>
+                          </p:cTn>
+                        </p:par>
+                      </p:childTnLst>
+                    </p:cTn>
+                  </p:par>
+                  <p:par>
+                    <p:cTn id="11" fill="hold">
+                      <p:stCondLst>
+                        <p:cond delay="indefinite"/>
+                      </p:stCondLst>
+                      <p:childTnLst>
+                        <p:par>
+                          <p:cTn id="12" fill="hold">
+                            <p:stCondLst>
+                              <p:cond delay="0"/>
+                            </p:stCondLst>
+                            <p:childTnLst>
+                              <p:par>
+                                <p:cTn id="13" presetID="1" presetClass="entr" presetSubtype="0" fill="hold" grpId="0" nodeType="clickEffect">
+                                  <p:stCondLst>
+                                    <p:cond delay="0"/>
+                                  </p:stCondLst>
+                                  <p:childTnLst>
+                                    <p:set>
+                                      <p:cBhvr>
+                                        <p:cTn id="14" dur="1" fill="hold">
+                                          <p:stCondLst>
+                                            <p:cond delay="0"/>
+                                          </p:stCondLst>
+                                        </p:cTn>
+                                        <p:tgtEl>
+                                          <p:spTgt spid="3">
+                                            <p:txEl>
+                                              <p:pRg st="2" end="2"/>
+                                            </p:txEl>
+                                          </p:spTgt>
+                                        </p:tgtEl>
+                                        <p:attrNameLst>
+                                          <p:attrName>style.visibility</p:attrName>
+                                        </p:attrNameLst>
+                                      </p:cBhvr>
+                                      <p:to>
+                                        <p:strVal val="visible"/>
+                                      </p:to>
+                                    </p:set>
+                                  </p:childTnLst>
+                                </p:cTn>
+                              </p:par>
+                            </p:childTnLst>
+                          </p:cTn>
+                        </p:par>
+                      </p:childTnLst>
+                    </p:cTn>
+                  </p:par>
+                  <p:par>
+                    <p:cTn id="15" fill="hold">
+                      <p:stCondLst>
+                        <p:cond delay="indefinite"/>
+                      </p:stCondLst>
+                      <p:childTnLst>
+                        <p:par>
+                          <p:cTn id="16" fill="hold">
+                            <p:stCondLst>
+                              <p:cond delay="0"/>
+                            </p:stCondLst>
+                            <p:childTnLst>
+                              <p:par>
+                                <p:cTn id="17" presetID="1" presetClass="entr" presetSubtype="0" fill="hold" grpId="0" nodeType="clickEffect">
+                                  <p:stCondLst>
+                                    <p:cond delay="0"/>
+                                  </p:stCondLst>
+                                  <p:childTnLst>
+                                    <p:set>
+                                      <p:cBhvr>
+                                        <p:cTn id="18" dur="1" fill="hold">
+                                          <p:stCondLst>
+                                            <p:cond delay="0"/>
+                                          </p:stCondLst>
+                                        </p:cTn>
+                                        <p:tgtEl>
+                                          <p:spTgt spid="3">
+                                            <p:txEl>
+                                              <p:pRg st="3" end="3"/>
+                                            </p:txEl>
+                                          </p:spTgt>
+                                        </p:tgtEl>
+                                        <p:attrNameLst>
+                                          <p:attrName>style.visibility</p:attrName>
+                                        </p:attrNameLst>
+                                      </p:cBhvr>
+                                      <p:to>
+                                        <p:strVal val="visible"/>
+                                      </p:to>
+                                    </p:set>
+                                  </p:childTnLst>
+                                </p:cTn>
+                              </p:par>
+                            </p:childTnLst>
+                          </p:cTn>
+                        </p:par>
+                      </p:childTnLst>
+                    </p:cTn>
+                  </p:par>
+                  <p:par>
+                    <p:cTn id="19" fill="hold">
+                      <p:stCondLst>
+                        <p:cond delay="indefinite"/>
+                      </p:stCondLst>
+                      <p:childTnLst>
+                        <p:par>
+                          <p:cTn id="20" fill="hold">
+                            <p:stCondLst>
+                              <p:cond delay="0"/>
+                            </p:stCondLst>
+                            <p:childTnLst>
+                              <p:par>
+                                <p:cTn id="21" presetID="1" presetClass="entr" presetSubtype="0" fill="hold" grpId="0" nodeType="clickEffect">
+                                  <p:stCondLst>
+                                    <p:cond delay="0"/>
+                                  </p:stCondLst>
+                                  <p:childTnLst>
+                                    <p:set>
+                                      <p:cBhvr>
+                                        <p:cTn id="22" dur="1" fill="hold">
+                                          <p:stCondLst>
+                                            <p:cond delay="0"/>
+                                          </p:stCondLst>
+                                        </p:cTn>
+                                        <p:tgtEl>
+                                          <p:spTgt spid="3">
+                                            <p:txEl>
+                                              <p:pRg st="4" end="4"/>
+                                            </p:txEl>
+                                          </p:spTgt>
+                                        </p:tgtEl>
+                                        <p:attrNameLst>
+                                          <p:attrName>style.visibility</p:attrName>
+                                        </p:attrNameLst>
+                                      </p:cBhvr>
+                                      <p:to>
+                                        <p:strVal val="visible"/>
+                                      </p:to>
+                                    </p:set>
+                                  </p:childTnLst>
+                                </p:cTn>
+                              </p:par>
+                              <p:par>
+                                <p:cTn id="23" presetID="1" presetClass="entr" presetSubtype="0" fill="hold" grpId="0" nodeType="withEffect">
+                                  <p:stCondLst>
+                                    <p:cond delay="0"/>
+                                  </p:stCondLst>
+                                  <p:childTnLst>
+                                    <p:set>
+                                      <p:cBhvr>
+                                        <p:cTn id="24" dur="1" fill="hold">
+                                          <p:stCondLst>
+                                            <p:cond delay="0"/>
+                                          </p:stCondLst>
+                                        </p:cTn>
+                                        <p:tgtEl>
+                                          <p:spTgt spid="3">
+                                            <p:txEl>
+                                              <p:pRg st="5" end="5"/>
+                                            </p:txEl>
+                                          </p:spTgt>
+                                        </p:tgtEl>
+                                        <p:attrNameLst>
+                                          <p:attrName>style.visibility</p:attrName>
+                                        </p:attrNameLst>
+                                      </p:cBhvr>
+                                      <p:to>
+                                        <p:strVal val="visible"/>
+                                      </p:to>
+                                    </p:set>
+                                  </p:childTnLst>
+                                </p:cTn>
+                              </p:par>
+                            </p:childTnLst>
+                          </p:cTn>
+                        </p:par>
+                      </p:childTnLst>
+                    </p:cTn>
+                  </p:par>
+                  <p:par>
+                    <p:cTn id="25" fill="hold">
+                      <p:stCondLst>
+                        <p:cond delay="indefinite"/>
+                      </p:stCondLst>
+                      <p:childTnLst>
+                        <p:par>
+                          <p:cTn id="26" fill="hold">
+                            <p:stCondLst>
+                              <p:cond delay="0"/>
+                            </p:stCondLst>
+                            <p:childTnLst>
+                              <p:par>
+                                <p:cTn id="27" presetID="1" presetClass="entr" presetSubtype="0" fill="hold" grpId="0" nodeType="clickEffect">
+                                  <p:stCondLst>
+                                    <p:cond delay="0"/>
+                                  </p:stCondLst>
+                                  <p:childTnLst>
+                                    <p:set>
+                                      <p:cBhvr>
+                                        <p:cTn id="28" dur="1" fill="hold">
+                                          <p:stCondLst>
+                                            <p:cond delay="0"/>
+                                          </p:stCondLst>
+                                        </p:cTn>
+                                        <p:tgtEl>
+                                          <p:spTgt spid="3">
+                                            <p:txEl>
+                                              <p:pRg st="6" end="6"/>
+                                            </p:txEl>
+                                          </p:spTgt>
+                                        </p:tgtEl>
+                                        <p:attrNameLst>
+                                          <p:attrName>style.visibility</p:attrName>
+                                        </p:attrNameLst>
+                                      </p:cBhvr>
+                                      <p:to>
+                                        <p:strVal val="visible"/>
+                                      </p:to>
+                                    </p:set>
+                                  </p:childTnLst>
+                                </p:cTn>
+                              </p:par>
+                            </p:childTnLst>
+                          </p:cTn>
+                        </p:par>
+                      </p:childTnLst>
+                    </p:cTn>
+                  </p:par>
+                  <p:par>
+                    <p:cTn id="29" fill="hold">
+                      <p:stCondLst>
+                        <p:cond delay="indefinite"/>
+                      </p:stCondLst>
+                      <p:childTnLst>
+                        <p:par>
+                          <p:cTn id="30" fill="hold">
+                            <p:stCondLst>
+                              <p:cond delay="0"/>
+                            </p:stCondLst>
+                            <p:childTnLst>
+                              <p:par>
+                                <p:cTn id="31" presetID="1" presetClass="entr" presetSubtype="0" fill="hold" grpId="0" nodeType="clickEffect">
+                                  <p:stCondLst>
+                                    <p:cond delay="0"/>
+                                  </p:stCondLst>
+                                  <p:childTnLst>
+                                    <p:set>
+                                      <p:cBhvr>
+                                        <p:cTn id="32" dur="1" fill="hold">
+                                          <p:stCondLst>
+                                            <p:cond delay="0"/>
+                                          </p:stCondLst>
+                                        </p:cTn>
+                                        <p:tgtEl>
+                                          <p:spTgt spid="3">
+                                            <p:txEl>
+                                              <p:pRg st="7" end="7"/>
+                                            </p:txEl>
+                                          </p:spTgt>
+                                        </p:tgtEl>
+                                        <p:attrNameLst>
+                                          <p:attrName>style.visibility</p:attrName>
+                                        </p:attrNameLst>
+                                      </p:cBhvr>
+                                      <p:to>
+                                        <p:strVal val="visible"/>
+                                      </p:to>
+                                    </p:set>
+                                  </p:childTnLst>
+                                </p:cTn>
+                              </p:par>
+                            </p:childTnLst>
+                          </p:cTn>
+                        </p:par>
+                      </p:childTnLst>
+                    </p:cTn>
+                  </p:par>
+                </p:childTnLst>
+              </p:cTn>
+              <p:prevCondLst>
+                <p:cond evt="onPrev" delay="0">
+                  <p:tgtEl>
+                    <p:sldTgt/>
+                  </p:tgtEl>
+                </p:cond>
+              </p:prevCondLst>
+              <p:nextCondLst>
+                <p:cond evt="onNext" delay="0">
+                  <p:tgtEl>
+                    <p:sldTgt/>
+                  </p:tgtEl>
+                </p:cond>
+              </p:nextCondLst>
+            </p:seq>
+          </p:childTnLst>
+        </p:cTn>
+      </p:par>
+    </p:tnLst>
+    <p:bldLst>
+      <p:bldP spid="3" grpId="0" uiExpand="1" build="p" bldLvl="2"/>
+    </p:bldLst>
+  </p:timing>
+</p:sld>
+</file>
+
+<file path=ppt/slides/slide8.xml><?xml version="1.0" encoding="utf-8"?>
+<p:sld xmlns:a="http://schemas.openxmlformats.org/drawingml/2006/main" xmlns:r="http://schemas.openxmlformats.org/officeDocument/2006/relationships" xmlns:p="http://schemas.openxmlformats.org/presentationml/2006/main">
+  <p:cSld>
+    <p:spTree>
+      <p:nvGrpSpPr>
+        <p:cNvPr id="1" name=""/>
+        <p:cNvGrpSpPr/>
+        <p:nvPr/>
+      </p:nvGrpSpPr>
+      <p:grpSpPr>
+        <a:xfrm>
+          <a:off x="0" y="0"/>
+          <a:ext cx="0" cy="0"/>
+          <a:chOff x="0" y="0"/>
+          <a:chExt cx="0" cy="0"/>
+        </a:xfrm>
+      </p:grpSpPr>
+      <p:sp>
+        <p:nvSpPr>
+          <p:cNvPr id="2" name="Title 1"/>
+          <p:cNvSpPr>
+            <a:spLocks noGrp="1"/>
+          </p:cNvSpPr>
+          <p:nvPr>
+            <p:ph type="title"/>
+          </p:nvPr>
+        </p:nvSpPr>
+        <p:spPr/>
+        <p:txBody>
+          <a:bodyPr/>
+          <a:lstStyle/>
+          <a:p>
+            <a:r>
+              <a:rPr lang="en-US" dirty="0" smtClean="0"/>
+              <a:t>Class attributes</a:t>
+            </a:r>
+            <a:endParaRPr lang="en-US" dirty="0"/>
+          </a:p>
+        </p:txBody>
+      </p:sp>
+      <p:sp>
+        <p:nvSpPr>
+          <p:cNvPr id="3" name="Content Placeholder 2"/>
+          <p:cNvSpPr>
+            <a:spLocks noGrp="1"/>
+          </p:cNvSpPr>
+          <p:nvPr>
+            <p:ph idx="1"/>
+          </p:nvPr>
+        </p:nvSpPr>
+        <p:spPr/>
+        <p:txBody>
+          <a:bodyPr/>
+          <a:lstStyle/>
+          <a:p>
+            <a:r>
+              <a:rPr lang="en-US" dirty="0" smtClean="0"/>
+              <a:t>Can be private</a:t>
+            </a:r>
+          </a:p>
+          <a:p>
+            <a:endParaRPr lang="en-US" dirty="0"/>
+          </a:p>
+          <a:p>
+            <a:endParaRPr lang="en-US" dirty="0" smtClean="0"/>
+          </a:p>
+          <a:p>
+            <a:endParaRPr lang="en-US" dirty="0"/>
+          </a:p>
+          <a:p>
+            <a:endParaRPr lang="en-US" dirty="0" smtClean="0"/>
+          </a:p>
+          <a:p>
+            <a:r>
+              <a:rPr lang="en-US" dirty="0" smtClean="0"/>
+              <a:t>Can only be accessed (read/write) from within class</a:t>
+            </a:r>
+          </a:p>
+          <a:p>
+            <a:r>
+              <a:rPr lang="en-US" dirty="0" smtClean="0"/>
+              <a:t>Can also be public</a:t>
+            </a:r>
+          </a:p>
+        </p:txBody>
+      </p:sp>
+      <p:sp>
+        <p:nvSpPr>
+          <p:cNvPr id="4" name="TextBox 3"/>
+          <p:cNvSpPr txBox="1"/>
+          <p:nvPr/>
+        </p:nvSpPr>
+        <p:spPr>
+          <a:xfrm>
+            <a:off x="628650" y="2410354"/>
+            <a:ext cx="7886700" cy="1815882"/>
+          </a:xfrm>
+          <a:prstGeom prst="rect">
+            <a:avLst/>
+          </a:prstGeom>
+          <a:solidFill>
+            <a:schemeClr val="bg1">
+              <a:lumMod val="75000"/>
+            </a:schemeClr>
+          </a:solidFill>
+        </p:spPr>
+        <p:txBody>
+          <a:bodyPr wrap="square" rtlCol="0">
+            <a:spAutoFit/>
+          </a:bodyPr>
+          <a:lstStyle/>
+          <a:p>
+            <a:r>
+              <a:rPr lang="en-US" sz="1600" dirty="0">
+                <a:latin typeface="Courier New" pitchFamily="49" charset="0"/>
+                <a:cs typeface="Courier New" pitchFamily="49" charset="0"/>
+              </a:rPr>
+              <a:t>class Particle {</a:t>
+            </a:r>
+          </a:p>
+          <a:p>
+            <a:r>
+              <a:rPr lang="en-US" sz="1600" dirty="0">
+                <a:latin typeface="Courier New" pitchFamily="49" charset="0"/>
+                <a:cs typeface="Courier New" pitchFamily="49" charset="0"/>
+              </a:rPr>
+              <a:t>    private:</a:t>
+            </a:r>
+          </a:p>
+          <a:p>
+            <a:r>
+              <a:rPr lang="en-US" sz="1600" dirty="0">
+                <a:latin typeface="Courier New" pitchFamily="49" charset="0"/>
+                <a:cs typeface="Courier New" pitchFamily="49" charset="0"/>
+              </a:rPr>
+              <a:t>        double _x, _y, _z;</a:t>
+            </a:r>
+          </a:p>
+          <a:p>
+            <a:r>
+              <a:rPr lang="en-US" sz="1600" dirty="0">
+                <a:latin typeface="Courier New" pitchFamily="49" charset="0"/>
+                <a:cs typeface="Courier New" pitchFamily="49" charset="0"/>
+              </a:rPr>
+              <a:t>        double _mass;</a:t>
+            </a:r>
+          </a:p>
+          <a:p>
+            <a:r>
+              <a:rPr lang="en-US" sz="1600" dirty="0">
+                <a:latin typeface="Courier New" pitchFamily="49" charset="0"/>
+                <a:cs typeface="Courier New" pitchFamily="49" charset="0"/>
+              </a:rPr>
+              <a:t>        </a:t>
+            </a:r>
+            <a:r>
+              <a:rPr lang="en-US" sz="1600" dirty="0" err="1">
+                <a:latin typeface="Courier New" pitchFamily="49" charset="0"/>
+                <a:cs typeface="Courier New" pitchFamily="49" charset="0"/>
+              </a:rPr>
+              <a:t>int</a:t>
+            </a:r>
+            <a:r>
+              <a:rPr lang="en-US" sz="1600" dirty="0">
+                <a:latin typeface="Courier New" pitchFamily="49" charset="0"/>
+                <a:cs typeface="Courier New" pitchFamily="49" charset="0"/>
+              </a:rPr>
+              <a:t> _charge</a:t>
+            </a:r>
+            <a:r>
+              <a:rPr lang="en-US" sz="1600" dirty="0" smtClean="0">
+                <a:latin typeface="Courier New" pitchFamily="49" charset="0"/>
+                <a:cs typeface="Courier New" pitchFamily="49" charset="0"/>
+              </a:rPr>
+              <a:t>;</a:t>
+            </a:r>
+          </a:p>
+          <a:p>
+            <a:r>
+              <a:rPr lang="en-US" sz="1600" dirty="0">
+                <a:latin typeface="Courier New" pitchFamily="49" charset="0"/>
+                <a:cs typeface="Courier New" pitchFamily="49" charset="0"/>
+              </a:rPr>
+              <a:t> </a:t>
+            </a:r>
+            <a:r>
+              <a:rPr lang="en-US" sz="1600" dirty="0" smtClean="0">
+                <a:latin typeface="Courier New" pitchFamily="49" charset="0"/>
+                <a:cs typeface="Courier New" pitchFamily="49" charset="0"/>
+              </a:rPr>
+              <a:t>   …</a:t>
+            </a:r>
+          </a:p>
+          <a:p>
+            <a:r>
+              <a:rPr lang="en-US" sz="1600" dirty="0" smtClean="0">
+                <a:latin typeface="Courier New" pitchFamily="49" charset="0"/>
+                <a:cs typeface="Courier New" pitchFamily="49" charset="0"/>
+              </a:rPr>
+              <a:t>};</a:t>
+            </a:r>
+            <a:endParaRPr lang="en-US" sz="1600" dirty="0">
+              <a:latin typeface="Courier New" pitchFamily="49" charset="0"/>
+              <a:cs typeface="Courier New" pitchFamily="49" charset="0"/>
+            </a:endParaRPr>
+          </a:p>
+        </p:txBody>
+      </p:sp>
+    </p:spTree>
+    <p:extLst>
+      <p:ext uri="{BB962C8B-B14F-4D97-AF65-F5344CB8AC3E}">
+        <p14:creationId xmlns:p14="http://schemas.microsoft.com/office/powerpoint/2010/main" val="2134546374"/>
+      </p:ext>
+    </p:extLst>
+  </p:cSld>
+  <p:clrMapOvr>
+    <a:masterClrMapping/>
+  </p:clrMapOvr>
+  <p:timing>
+    <p:tnLst>
+      <p:par>
+        <p:cTn id="1" dur="indefinite" restart="never" nodeType="tmRoot">
+          <p:childTnLst>
+            <p:seq concurrent="1" nextAc="seek">
+              <p:cTn id="2" dur="indefinite" nodeType="mainSeq">
+                <p:childTnLst>
+                  <p:par>
+                    <p:cTn id="3" fill="hold">
+                      <p:stCondLst>
+                        <p:cond delay="indefinite"/>
+                        <p:cond evt="onBegin" delay="0">
+                          <p:tn val="2"/>
+                        </p:cond>
+                      </p:stCondLst>
+                      <p:childTnLst>
+                        <p:par>
+                          <p:cTn id="4" fill="hold">
+                            <p:stCondLst>
+                              <p:cond delay="0"/>
+                            </p:stCondLst>
+                            <p:childTnLst>
+                              <p:par>
+                                <p:cTn id="5" presetID="1" presetClass="entr" presetSubtype="0" fill="hold" grpId="0" nodeType="withEffect">
+                                  <p:stCondLst>
+                                    <p:cond delay="0"/>
+                                  </p:stCondLst>
+                                  <p:childTnLst>
+                                    <p:set>
+                                      <p:cBhvr>
+                                        <p:cTn id="6" dur="1" fill="hold">
+                                          <p:stCondLst>
+                                            <p:cond delay="0"/>
+                                          </p:stCondLst>
+                                        </p:cTn>
+                                        <p:tgtEl>
+                                          <p:spTgt spid="3">
+                                            <p:txEl>
+                                              <p:pRg st="0" end="0"/>
+                                            </p:txEl>
+                                          </p:spTgt>
+                                        </p:tgtEl>
+                                        <p:attrNameLst>
+                                          <p:attrName>style.visibility</p:attrName>
+                                        </p:attrNameLst>
+                                      </p:cBhvr>
+                                      <p:to>
+                                        <p:strVal val="visible"/>
+                                      </p:to>
+                                    </p:set>
+                                  </p:childTnLst>
+                                </p:cTn>
+                              </p:par>
+                              <p:par>
+                                <p:cTn id="7" presetID="1" presetClass="entr" presetSubtype="0" fill="hold" grpId="0" nodeType="withEffect">
+                                  <p:stCondLst>
+                                    <p:cond delay="0"/>
+                                  </p:stCondLst>
+                                  <p:childTnLst>
+                                    <p:set>
+                                      <p:cBhvr>
+                                        <p:cTn id="8" dur="1" fill="hold">
+                                          <p:stCondLst>
+                                            <p:cond delay="0"/>
+                                          </p:stCondLst>
+                                        </p:cTn>
+                                        <p:tgtEl>
+                                          <p:spTgt spid="4"/>
+                                        </p:tgtEl>
+                                        <p:attrNameLst>
+                                          <p:attrName>style.visibility</p:attrName>
+                                        </p:attrNameLst>
+                                      </p:cBhvr>
+                                      <p:to>
+                                        <p:strVal val="visible"/>
+                                      </p:to>
+                                    </p:set>
+                                  </p:childTnLst>
+                                </p:cTn>
+                              </p:par>
+                            </p:childTnLst>
+                          </p:cTn>
+                        </p:par>
+                      </p:childTnLst>
+                    </p:cTn>
+                  </p:par>
+                  <p:par>
+                    <p:cTn id="9" fill="hold">
+                      <p:stCondLst>
+                        <p:cond delay="indefinite"/>
+                      </p:stCondLst>
+                      <p:childTnLst>
+                        <p:par>
+                          <p:cTn id="10" fill="hold">
+                            <p:stCondLst>
+                              <p:cond delay="0"/>
+                            </p:stCondLst>
+                            <p:childTnLst>
+                              <p:par>
+                                <p:cTn id="11" presetID="1" presetClass="entr" presetSubtype="0" fill="hold" grpId="0" nodeType="clickEffect">
+                                  <p:stCondLst>
+                                    <p:cond delay="0"/>
+                                  </p:stCondLst>
+                                  <p:childTnLst>
+                                    <p:set>
+                                      <p:cBhvr>
+                                        <p:cTn id="12" dur="1" fill="hold">
+                                          <p:stCondLst>
+                                            <p:cond delay="0"/>
+                                          </p:stCondLst>
+                                        </p:cTn>
+                                        <p:tgtEl>
+                                          <p:spTgt spid="3">
+                                            <p:txEl>
+                                              <p:pRg st="5" end="5"/>
+                                            </p:txEl>
+                                          </p:spTgt>
+                                        </p:tgtEl>
+                                        <p:attrNameLst>
+                                          <p:attrName>style.visibility</p:attrName>
+                                        </p:attrNameLst>
+                                      </p:cBhvr>
+                                      <p:to>
+                                        <p:strVal val="visible"/>
+                                      </p:to>
+                                    </p:set>
+                                  </p:childTnLst>
+                                </p:cTn>
+                              </p:par>
+                            </p:childTnLst>
+                          </p:cTn>
+                        </p:par>
+                      </p:childTnLst>
+                    </p:cTn>
+                  </p:par>
+                  <p:par>
+                    <p:cTn id="13" fill="hold">
+                      <p:stCondLst>
+                        <p:cond delay="indefinite"/>
+                      </p:stCondLst>
+                      <p:childTnLst>
+                        <p:par>
+                          <p:cTn id="14" fill="hold">
+                            <p:stCondLst>
+                              <p:cond delay="0"/>
+                            </p:stCondLst>
+                            <p:childTnLst>
+                              <p:par>
+                                <p:cTn id="15" presetID="1" presetClass="entr" presetSubtype="0" fill="hold" grpId="0" nodeType="clickEffect">
+                                  <p:stCondLst>
+                                    <p:cond delay="0"/>
+                                  </p:stCondLst>
+                                  <p:childTnLst>
+                                    <p:set>
+                                      <p:cBhvr>
+                                        <p:cTn id="16" dur="1" fill="hold">
+                                          <p:stCondLst>
+                                            <p:cond delay="0"/>
+                                          </p:stCondLst>
+                                        </p:cTn>
+                                        <p:tgtEl>
+                                          <p:spTgt spid="3">
+                                            <p:txEl>
+                                              <p:pRg st="6" end="6"/>
+                                            </p:txEl>
+                                          </p:spTgt>
+                                        </p:tgtEl>
+                                        <p:attrNameLst>
+                                          <p:attrName>style.visibility</p:attrName>
+                                        </p:attrNameLst>
+                                      </p:cBhvr>
+                                      <p:to>
+                                        <p:strVal val="visible"/>
+                                      </p:to>
+                                    </p:set>
+                                  </p:childTnLst>
+                                </p:cTn>
+                              </p:par>
+                            </p:childTnLst>
+                          </p:cTn>
+                        </p:par>
+                      </p:childTnLst>
+                    </p:cTn>
+                  </p:par>
+                </p:childTnLst>
+              </p:cTn>
+              <p:prevCondLst>
+                <p:cond evt="onPrev" delay="0">
+                  <p:tgtEl>
+                    <p:sldTgt/>
+                  </p:tgtEl>
+                </p:cond>
+              </p:prevCondLst>
+              <p:nextCondLst>
+                <p:cond evt="onNext" delay="0">
+                  <p:tgtEl>
+                    <p:sldTgt/>
+                  </p:tgtEl>
+                </p:cond>
+              </p:nextCondLst>
+            </p:seq>
+          </p:childTnLst>
+        </p:cTn>
+      </p:par>
+    </p:tnLst>
+    <p:bldLst>
+      <p:bldP spid="3" grpId="0" uiExpand="1" build="p"/>
+      <p:bldP spid="4" grpId="0" animBg="1"/>
+    </p:bldLst>
+  </p:timing>
+</p:sld>
+</file>
+
+<file path=ppt/slides/slide9.xml><?xml version="1.0" encoding="utf-8"?>
+<p:sld xmlns:a="http://schemas.openxmlformats.org/drawingml/2006/main" xmlns:r="http://schemas.openxmlformats.org/officeDocument/2006/relationships" xmlns:p="http://schemas.openxmlformats.org/presentationml/2006/main">
+  <p:cSld>
+    <p:spTree>
+      <p:nvGrpSpPr>
+        <p:cNvPr id="1" name=""/>
+        <p:cNvGrpSpPr/>
+        <p:nvPr/>
+      </p:nvGrpSpPr>
+      <p:grpSpPr>
+        <a:xfrm>
+          <a:off x="0" y="0"/>
+          <a:ext cx="0" cy="0"/>
+          <a:chOff x="0" y="0"/>
+          <a:chExt cx="0" cy="0"/>
+        </a:xfrm>
+      </p:grpSpPr>
+      <p:sp>
+        <p:nvSpPr>
+          <p:cNvPr id="2" name="Title 1"/>
+          <p:cNvSpPr>
+            <a:spLocks noGrp="1"/>
+          </p:cNvSpPr>
+          <p:nvPr>
+            <p:ph type="title"/>
+          </p:nvPr>
+        </p:nvSpPr>
+        <p:spPr/>
+        <p:txBody>
+          <a:bodyPr/>
+          <a:lstStyle/>
+          <a:p>
+            <a:r>
+              <a:rPr lang="en-US" dirty="0" smtClean="0"/>
+              <a:t>Class methods</a:t>
+            </a:r>
+            <a:endParaRPr lang="en-US" dirty="0"/>
+          </a:p>
+        </p:txBody>
+      </p:sp>
+      <p:sp>
+        <p:nvSpPr>
+          <p:cNvPr id="3" name="Content Placeholder 2"/>
+          <p:cNvSpPr>
+            <a:spLocks noGrp="1"/>
+          </p:cNvSpPr>
+          <p:nvPr>
+            <p:ph idx="1"/>
+          </p:nvPr>
+        </p:nvSpPr>
+        <p:spPr/>
+        <p:txBody>
+          <a:bodyPr/>
+          <a:lstStyle/>
+          <a:p>
+            <a:r>
+              <a:rPr lang="en-US" dirty="0" smtClean="0"/>
+              <a:t>Can be public</a:t>
+            </a:r>
+          </a:p>
+          <a:p>
+            <a:endParaRPr lang="en-US" dirty="0"/>
+          </a:p>
+          <a:p>
+            <a:endParaRPr lang="en-US" dirty="0" smtClean="0"/>
+          </a:p>
+          <a:p>
+            <a:endParaRPr lang="en-US" dirty="0"/>
+          </a:p>
+          <a:p>
+            <a:endParaRPr lang="en-US" dirty="0" smtClean="0"/>
+          </a:p>
+          <a:p>
+            <a:endParaRPr lang="en-US" dirty="0"/>
+          </a:p>
+          <a:p>
+            <a:r>
+              <a:rPr lang="en-US" dirty="0" smtClean="0"/>
+              <a:t>Is called on instance</a:t>
+            </a:r>
+          </a:p>
+          <a:p>
+            <a:r>
+              <a:rPr lang="en-US" dirty="0" smtClean="0"/>
+              <a:t>Can also be private</a:t>
+            </a:r>
+            <a:endParaRPr lang="en-US" dirty="0"/>
+          </a:p>
+        </p:txBody>
+      </p:sp>
+      <p:sp>
+        <p:nvSpPr>
+          <p:cNvPr id="4" name="TextBox 3"/>
+          <p:cNvSpPr txBox="1"/>
+          <p:nvPr/>
+        </p:nvSpPr>
+        <p:spPr>
+          <a:xfrm>
+            <a:off x="628650" y="2272706"/>
+            <a:ext cx="7886700" cy="2554545"/>
+          </a:xfrm>
+          <a:prstGeom prst="rect">
+            <a:avLst/>
+          </a:prstGeom>
+          <a:solidFill>
+            <a:schemeClr val="bg1">
+              <a:lumMod val="75000"/>
+            </a:schemeClr>
+          </a:solidFill>
+        </p:spPr>
+        <p:txBody>
+          <a:bodyPr wrap="square" rtlCol="0">
+            <a:spAutoFit/>
+          </a:bodyPr>
+          <a:lstStyle/>
+          <a:p>
+            <a:r>
+              <a:rPr lang="en-US" sz="1600" dirty="0" smtClean="0">
+                <a:latin typeface="Courier New" pitchFamily="49" charset="0"/>
+                <a:cs typeface="Courier New" pitchFamily="49" charset="0"/>
+              </a:rPr>
+              <a:t>class Particle {</a:t>
+            </a:r>
+          </a:p>
+          <a:p>
+            <a:r>
+              <a:rPr lang="en-US" sz="1600" dirty="0">
+                <a:latin typeface="Courier New" pitchFamily="49" charset="0"/>
+                <a:cs typeface="Courier New" pitchFamily="49" charset="0"/>
+              </a:rPr>
+              <a:t> </a:t>
+            </a:r>
+            <a:r>
+              <a:rPr lang="en-US" sz="1600" dirty="0" smtClean="0">
+                <a:latin typeface="Courier New" pitchFamily="49" charset="0"/>
+                <a:cs typeface="Courier New" pitchFamily="49" charset="0"/>
+              </a:rPr>
+              <a:t>   …</a:t>
+            </a:r>
+          </a:p>
+          <a:p>
+            <a:r>
+              <a:rPr lang="en-US" sz="1600" dirty="0" smtClean="0">
+                <a:latin typeface="Courier New" pitchFamily="49" charset="0"/>
+                <a:cs typeface="Courier New" pitchFamily="49" charset="0"/>
+              </a:rPr>
+              <a:t>    </a:t>
+            </a:r>
+            <a:r>
+              <a:rPr lang="en-US" sz="1600" dirty="0">
+                <a:latin typeface="Courier New" pitchFamily="49" charset="0"/>
+                <a:cs typeface="Courier New" pitchFamily="49" charset="0"/>
+              </a:rPr>
+              <a:t>public</a:t>
+            </a:r>
+            <a:r>
+              <a:rPr lang="en-US" sz="1600" dirty="0" smtClean="0">
+                <a:latin typeface="Courier New" pitchFamily="49" charset="0"/>
+                <a:cs typeface="Courier New" pitchFamily="49" charset="0"/>
+              </a:rPr>
+              <a:t>:</a:t>
+            </a:r>
+          </a:p>
+          <a:p>
+            <a:r>
+              <a:rPr lang="en-US" sz="1600" dirty="0">
+                <a:latin typeface="Courier New" pitchFamily="49" charset="0"/>
+                <a:cs typeface="Courier New" pitchFamily="49" charset="0"/>
+              </a:rPr>
+              <a:t> </a:t>
+            </a:r>
+            <a:r>
+              <a:rPr lang="en-US" sz="1600" dirty="0" smtClean="0">
+                <a:latin typeface="Courier New" pitchFamily="49" charset="0"/>
+                <a:cs typeface="Courier New" pitchFamily="49" charset="0"/>
+              </a:rPr>
+              <a:t>       …</a:t>
+            </a:r>
+            <a:endParaRPr lang="en-US" sz="1600" dirty="0">
+              <a:latin typeface="Courier New" pitchFamily="49" charset="0"/>
+              <a:cs typeface="Courier New" pitchFamily="49" charset="0"/>
+            </a:endParaRPr>
+          </a:p>
+          <a:p>
+            <a:r>
+              <a:rPr lang="en-US" sz="1600" dirty="0" smtClean="0">
+                <a:latin typeface="Courier New" pitchFamily="49" charset="0"/>
+                <a:cs typeface="Courier New" pitchFamily="49" charset="0"/>
+              </a:rPr>
+              <a:t>        double </a:t>
+            </a:r>
+            <a:r>
+              <a:rPr lang="en-US" sz="1600" dirty="0">
+                <a:latin typeface="Courier New" pitchFamily="49" charset="0"/>
+                <a:cs typeface="Courier New" pitchFamily="49" charset="0"/>
+              </a:rPr>
+              <a:t>x() </a:t>
+            </a:r>
+            <a:r>
+              <a:rPr lang="en-US" sz="1600" b="1" dirty="0" err="1">
+                <a:solidFill>
+                  <a:srgbClr val="C00000"/>
+                </a:solidFill>
+                <a:latin typeface="Courier New" pitchFamily="49" charset="0"/>
+                <a:cs typeface="Courier New" pitchFamily="49" charset="0"/>
+              </a:rPr>
+              <a:t>const</a:t>
+            </a:r>
+            <a:r>
+              <a:rPr lang="en-US" sz="1600" dirty="0">
+                <a:latin typeface="Courier New" pitchFamily="49" charset="0"/>
+                <a:cs typeface="Courier New" pitchFamily="49" charset="0"/>
+              </a:rPr>
+              <a:t> { return _x; }</a:t>
+            </a:r>
+          </a:p>
+          <a:p>
+            <a:r>
+              <a:rPr lang="en-US" sz="1600" dirty="0" smtClean="0">
+                <a:latin typeface="Courier New" pitchFamily="49" charset="0"/>
+                <a:cs typeface="Courier New" pitchFamily="49" charset="0"/>
+              </a:rPr>
+              <a:t>        …</a:t>
+            </a:r>
+          </a:p>
+          <a:p>
+            <a:r>
+              <a:rPr lang="en-US" sz="1600" dirty="0" smtClean="0">
+                <a:latin typeface="Courier New" pitchFamily="49" charset="0"/>
+                <a:cs typeface="Courier New" pitchFamily="49" charset="0"/>
+              </a:rPr>
+              <a:t>        </a:t>
+            </a:r>
+            <a:r>
+              <a:rPr lang="en-US" sz="1600" dirty="0">
+                <a:latin typeface="Courier New" pitchFamily="49" charset="0"/>
+                <a:cs typeface="Courier New" pitchFamily="49" charset="0"/>
+              </a:rPr>
+              <a:t>double charge() </a:t>
+            </a:r>
+            <a:r>
+              <a:rPr lang="en-US" sz="1600" dirty="0" err="1">
+                <a:latin typeface="Courier New" pitchFamily="49" charset="0"/>
+                <a:cs typeface="Courier New" pitchFamily="49" charset="0"/>
+              </a:rPr>
+              <a:t>const</a:t>
+            </a:r>
+            <a:r>
+              <a:rPr lang="en-US" sz="1600" dirty="0">
+                <a:latin typeface="Courier New" pitchFamily="49" charset="0"/>
+                <a:cs typeface="Courier New" pitchFamily="49" charset="0"/>
+              </a:rPr>
+              <a:t> {return _charge; }</a:t>
+            </a:r>
+          </a:p>
+          <a:p>
+            <a:r>
+              <a:rPr lang="en-US" sz="1600" dirty="0">
+                <a:latin typeface="Courier New" pitchFamily="49" charset="0"/>
+                <a:cs typeface="Courier New" pitchFamily="49" charset="0"/>
+              </a:rPr>
+              <a:t>        void move(double dx, double </a:t>
+            </a:r>
+            <a:r>
+              <a:rPr lang="en-US" sz="1600" dirty="0" err="1">
+                <a:latin typeface="Courier New" pitchFamily="49" charset="0"/>
+                <a:cs typeface="Courier New" pitchFamily="49" charset="0"/>
+              </a:rPr>
+              <a:t>dy</a:t>
+            </a:r>
+            <a:r>
+              <a:rPr lang="en-US" sz="1600" dirty="0">
+                <a:latin typeface="Courier New" pitchFamily="49" charset="0"/>
+                <a:cs typeface="Courier New" pitchFamily="49" charset="0"/>
+              </a:rPr>
+              <a:t>, double </a:t>
+            </a:r>
+            <a:r>
+              <a:rPr lang="en-US" sz="1600" dirty="0" err="1">
+                <a:latin typeface="Courier New" pitchFamily="49" charset="0"/>
+                <a:cs typeface="Courier New" pitchFamily="49" charset="0"/>
+              </a:rPr>
+              <a:t>dz</a:t>
+            </a:r>
+            <a:r>
+              <a:rPr lang="en-US" sz="1600" dirty="0" smtClean="0">
+                <a:latin typeface="Courier New" pitchFamily="49" charset="0"/>
+                <a:cs typeface="Courier New" pitchFamily="49" charset="0"/>
+              </a:rPr>
+              <a:t>);</a:t>
+            </a:r>
+          </a:p>
+          <a:p>
+            <a:r>
+              <a:rPr lang="en-US" sz="1600" dirty="0">
+                <a:latin typeface="Courier New" pitchFamily="49" charset="0"/>
+                <a:cs typeface="Courier New" pitchFamily="49" charset="0"/>
+              </a:rPr>
+              <a:t> </a:t>
+            </a:r>
+            <a:r>
+              <a:rPr lang="en-US" sz="1600" dirty="0" smtClean="0">
+                <a:latin typeface="Courier New" pitchFamily="49" charset="0"/>
+                <a:cs typeface="Courier New" pitchFamily="49" charset="0"/>
+              </a:rPr>
+              <a:t>       …</a:t>
+            </a:r>
+          </a:p>
+          <a:p>
+            <a:r>
+              <a:rPr lang="en-US" sz="1600" dirty="0" smtClean="0">
+                <a:latin typeface="Courier New" pitchFamily="49" charset="0"/>
+                <a:cs typeface="Courier New" pitchFamily="49" charset="0"/>
+              </a:rPr>
+              <a:t>};</a:t>
+            </a:r>
+            <a:endParaRPr lang="en-US" sz="1600" dirty="0">
+              <a:latin typeface="Courier New" pitchFamily="49" charset="0"/>
+              <a:cs typeface="Courier New" pitchFamily="49" charset="0"/>
+            </a:endParaRPr>
+          </a:p>
+        </p:txBody>
+      </p:sp>
+      <p:grpSp>
+        <p:nvGrpSpPr>
+          <p:cNvPr id="5" name="Group 4"/>
+          <p:cNvGrpSpPr/>
+          <p:nvPr/>
+        </p:nvGrpSpPr>
+        <p:grpSpPr>
+          <a:xfrm>
+            <a:off x="2772697" y="2389454"/>
+            <a:ext cx="5605002" cy="825695"/>
+            <a:chOff x="-1182456" y="3441725"/>
+            <a:chExt cx="5605002" cy="825695"/>
+          </a:xfrm>
+        </p:grpSpPr>
+        <p:sp>
+          <p:nvSpPr>
+            <p:cNvPr id="6" name="TextBox 5"/>
+            <p:cNvSpPr txBox="1"/>
+            <p:nvPr/>
+          </p:nvSpPr>
+          <p:spPr>
+            <a:xfrm>
+              <a:off x="199578" y="3441725"/>
+              <a:ext cx="4222968" cy="400110"/>
+            </a:xfrm>
+            <a:prstGeom prst="rect">
+              <a:avLst/>
+            </a:prstGeom>
+            <a:solidFill>
+              <a:schemeClr val="bg1"/>
+            </a:solidFill>
+            <a:ln w="19050">
+              <a:solidFill>
+                <a:schemeClr val="tx1"/>
+              </a:solidFill>
+            </a:ln>
+          </p:spPr>
+          <p:txBody>
+            <a:bodyPr wrap="square" rtlCol="0">
+              <a:spAutoFit/>
+            </a:bodyPr>
+            <a:lstStyle/>
+            <a:p>
+              <a:r>
+                <a:rPr lang="en-US" sz="2000" dirty="0" smtClean="0"/>
+                <a:t>definition for inspector of </a:t>
+              </a:r>
+              <a:r>
+                <a:rPr lang="en-US" sz="2000" dirty="0" smtClean="0">
+                  <a:latin typeface="Courier New" panose="02070309020205020404" pitchFamily="49" charset="0"/>
+                  <a:cs typeface="Courier New" panose="02070309020205020404" pitchFamily="49" charset="0"/>
+                </a:rPr>
+                <a:t>_x</a:t>
+              </a:r>
+              <a:r>
+                <a:rPr lang="en-US" sz="2000" dirty="0" smtClean="0"/>
+                <a:t> attribute</a:t>
+              </a:r>
+              <a:endParaRPr lang="en-US" sz="2000" dirty="0">
+                <a:latin typeface="Courier New" panose="02070309020205020404" pitchFamily="49" charset="0"/>
+                <a:cs typeface="Courier New" panose="02070309020205020404" pitchFamily="49" charset="0"/>
+              </a:endParaRPr>
+            </a:p>
+          </p:txBody>
+        </p:sp>
+        <p:cxnSp>
+          <p:nvCxnSpPr>
+            <p:cNvPr id="7" name="Straight Arrow Connector 6"/>
+            <p:cNvCxnSpPr>
+              <a:stCxn id="6" idx="1"/>
+            </p:cNvCxnSpPr>
+            <p:nvPr/>
+          </p:nvCxnSpPr>
+          <p:spPr>
+            <a:xfrm flipH="1">
+              <a:off x="-1182456" y="3641780"/>
+              <a:ext cx="1382034" cy="625640"/>
+            </a:xfrm>
+            <a:prstGeom prst="straightConnector1">
+              <a:avLst/>
+            </a:prstGeom>
+            <a:ln w="19050">
+              <a:solidFill>
+                <a:schemeClr val="tx1"/>
+              </a:solidFill>
+              <a:tailEnd type="stealth" w="lg" len="lg"/>
+            </a:ln>
+          </p:spPr>
+          <p:style>
+            <a:lnRef idx="1">
+              <a:schemeClr val="accent1"/>
+            </a:lnRef>
+            <a:fillRef idx="0">
+              <a:schemeClr val="accent1"/>
+            </a:fillRef>
+            <a:effectRef idx="0">
+              <a:schemeClr val="accent1"/>
+            </a:effectRef>
+            <a:fontRef idx="minor">
+              <a:schemeClr val="tx1"/>
+            </a:fontRef>
+          </p:style>
+        </p:cxnSp>
+      </p:grpSp>
+      <p:grpSp>
+        <p:nvGrpSpPr>
+          <p:cNvPr id="10" name="Group 9"/>
+          <p:cNvGrpSpPr/>
+          <p:nvPr/>
+        </p:nvGrpSpPr>
+        <p:grpSpPr>
+          <a:xfrm>
+            <a:off x="2772697" y="4306531"/>
+            <a:ext cx="5605002" cy="1006878"/>
+            <a:chOff x="-1182456" y="2834957"/>
+            <a:chExt cx="5605002" cy="1006878"/>
+          </a:xfrm>
+        </p:grpSpPr>
+        <p:sp>
+          <p:nvSpPr>
+            <p:cNvPr id="11" name="TextBox 10"/>
+            <p:cNvSpPr txBox="1"/>
+            <p:nvPr/>
+          </p:nvSpPr>
+          <p:spPr>
+            <a:xfrm>
+              <a:off x="199578" y="3441725"/>
+              <a:ext cx="4222968" cy="400110"/>
+            </a:xfrm>
+            <a:prstGeom prst="rect">
+              <a:avLst/>
+            </a:prstGeom>
+            <a:solidFill>
+              <a:schemeClr val="bg1"/>
+            </a:solidFill>
+            <a:ln w="19050">
+              <a:solidFill>
+                <a:schemeClr val="tx1"/>
+              </a:solidFill>
+            </a:ln>
+          </p:spPr>
+          <p:txBody>
+            <a:bodyPr wrap="square" rtlCol="0">
+              <a:spAutoFit/>
+            </a:bodyPr>
+            <a:lstStyle/>
+            <a:p>
+              <a:r>
+                <a:rPr lang="en-US" sz="2000" dirty="0" smtClean="0"/>
+                <a:t>declaration of  </a:t>
+              </a:r>
+              <a:r>
+                <a:rPr lang="en-US" sz="2000" dirty="0" err="1" smtClean="0"/>
+                <a:t>mutator</a:t>
+              </a:r>
+              <a:r>
+                <a:rPr lang="en-US" sz="2000" dirty="0" smtClean="0"/>
+                <a:t> for </a:t>
+              </a:r>
+              <a:r>
+                <a:rPr lang="en-US" sz="2000" dirty="0" smtClean="0">
+                  <a:latin typeface="Courier New" panose="02070309020205020404" pitchFamily="49" charset="0"/>
+                  <a:cs typeface="Courier New" panose="02070309020205020404" pitchFamily="49" charset="0"/>
+                </a:rPr>
+                <a:t>_x</a:t>
+              </a:r>
+              <a:r>
+                <a:rPr lang="en-US" sz="2000" dirty="0" smtClean="0"/>
+                <a:t>, </a:t>
+              </a:r>
+              <a:r>
+                <a:rPr lang="en-US" sz="2000" dirty="0" smtClean="0">
+                  <a:latin typeface="Courier New" panose="02070309020205020404" pitchFamily="49" charset="0"/>
+                  <a:cs typeface="Courier New" panose="02070309020205020404" pitchFamily="49" charset="0"/>
+                </a:rPr>
+                <a:t>_y</a:t>
+              </a:r>
+              <a:r>
+                <a:rPr lang="en-US" sz="2000" dirty="0" smtClean="0"/>
+                <a:t>, </a:t>
+              </a:r>
+              <a:r>
+                <a:rPr lang="en-US" sz="2000" dirty="0" smtClean="0">
+                  <a:latin typeface="Courier New" panose="02070309020205020404" pitchFamily="49" charset="0"/>
+                  <a:cs typeface="Courier New" panose="02070309020205020404" pitchFamily="49" charset="0"/>
+                </a:rPr>
+                <a:t>_z</a:t>
+              </a:r>
+              <a:endParaRPr lang="en-US" sz="2000" dirty="0">
+                <a:latin typeface="Courier New" panose="02070309020205020404" pitchFamily="49" charset="0"/>
+                <a:cs typeface="Courier New" panose="02070309020205020404" pitchFamily="49" charset="0"/>
+              </a:endParaRPr>
+            </a:p>
+          </p:txBody>
+        </p:sp>
+        <p:cxnSp>
+          <p:nvCxnSpPr>
+            <p:cNvPr id="12" name="Straight Arrow Connector 11"/>
+            <p:cNvCxnSpPr>
+              <a:stCxn id="11" idx="1"/>
+            </p:cNvCxnSpPr>
+            <p:nvPr/>
+          </p:nvCxnSpPr>
+          <p:spPr>
+            <a:xfrm flipH="1" flipV="1">
+              <a:off x="-1182456" y="2834957"/>
+              <a:ext cx="1382034" cy="806823"/>
+            </a:xfrm>
+            <a:prstGeom prst="straightConnector1">
+              <a:avLst/>
+            </a:prstGeom>
+            <a:ln w="19050">
+              <a:solidFill>
+                <a:schemeClr val="tx1"/>
+              </a:solidFill>
+              <a:tailEnd type="stealth" w="lg" len="lg"/>
+            </a:ln>
+          </p:spPr>
+          <p:style>
+            <a:lnRef idx="1">
+              <a:schemeClr val="accent1"/>
+            </a:lnRef>
+            <a:fillRef idx="0">
+              <a:schemeClr val="accent1"/>
+            </a:fillRef>
+            <a:effectRef idx="0">
+              <a:schemeClr val="accent1"/>
+            </a:effectRef>
+            <a:fontRef idx="minor">
+              <a:schemeClr val="tx1"/>
+            </a:fontRef>
+          </p:style>
+        </p:cxnSp>
+      </p:grpSp>
+    </p:spTree>
+    <p:extLst>
+      <p:ext uri="{BB962C8B-B14F-4D97-AF65-F5344CB8AC3E}">
+        <p14:creationId xmlns:p14="http://schemas.microsoft.com/office/powerpoint/2010/main" val="190955657"/>
+      </p:ext>
+    </p:extLst>
+  </p:cSld>
+  <p:clrMapOvr>
+    <a:masterClrMapping/>
+  </p:clrMapOvr>
+  <p:timing>
+    <p:tnLst>
+      <p:par>
+        <p:cTn id="1" dur="indefinite" restart="never" nodeType="tmRoot">
+          <p:childTnLst>
+            <p:seq concurrent="1" nextAc="seek">
+              <p:cTn id="2" dur="indefinite" nodeType="mainSeq">
+                <p:childTnLst>
+                  <p:par>
+                    <p:cTn id="3" fill="hold">
+                      <p:stCondLst>
+                        <p:cond delay="indefinite"/>
+                        <p:cond evt="onBegin" delay="0">
+                          <p:tn val="2"/>
+                        </p:cond>
+                      </p:stCondLst>
+                      <p:childTnLst>
+                        <p:par>
+                          <p:cTn id="4" fill="hold">
+                            <p:stCondLst>
+                              <p:cond delay="0"/>
+                            </p:stCondLst>
+                            <p:childTnLst>
+                              <p:par>
+                                <p:cTn id="5" presetID="1" presetClass="entr" presetSubtype="0" fill="hold" grpId="0" nodeType="withEffect">
+                                  <p:stCondLst>
+                                    <p:cond delay="0"/>
+                                  </p:stCondLst>
+                                  <p:childTnLst>
+                                    <p:set>
+                                      <p:cBhvr>
+                                        <p:cTn id="6" dur="1" fill="hold">
+                                          <p:stCondLst>
+                                            <p:cond delay="0"/>
+                                          </p:stCondLst>
+                                        </p:cTn>
+                                        <p:tgtEl>
+                                          <p:spTgt spid="3">
+                                            <p:txEl>
+                                              <p:pRg st="0" end="0"/>
+                                            </p:txEl>
+                                          </p:spTgt>
+                                        </p:tgtEl>
+                                        <p:attrNameLst>
+                                          <p:attrName>style.visibility</p:attrName>
+                                        </p:attrNameLst>
+                                      </p:cBhvr>
+                                      <p:to>
+                                        <p:strVal val="visible"/>
+                                      </p:to>
+                                    </p:set>
+                                  </p:childTnLst>
+                                </p:cTn>
+                              </p:par>
+                              <p:par>
+                                <p:cTn id="7" presetID="1" presetClass="entr" presetSubtype="0" fill="hold" grpId="0" nodeType="withEffect">
+                                  <p:stCondLst>
+                                    <p:cond delay="0"/>
+                                  </p:stCondLst>
+                                  <p:childTnLst>
+                                    <p:set>
+                                      <p:cBhvr>
+                                        <p:cTn id="8" dur="1" fill="hold">
+                                          <p:stCondLst>
+                                            <p:cond delay="0"/>
+                                          </p:stCondLst>
+                                        </p:cTn>
+                                        <p:tgtEl>
+                                          <p:spTgt spid="4"/>
+                                        </p:tgtEl>
+                                        <p:attrNameLst>
+                                          <p:attrName>style.visibility</p:attrName>
+                                        </p:attrNameLst>
+                                      </p:cBhvr>
+                                      <p:to>
+                                        <p:strVal val="visible"/>
+                                      </p:to>
+                                    </p:set>
+                                  </p:childTnLst>
+                                </p:cTn>
+                              </p:par>
+                            </p:childTnLst>
+                          </p:cTn>
+                        </p:par>
+                      </p:childTnLst>
+                    </p:cTn>
+                  </p:par>
+                  <p:par>
+                    <p:cTn id="9" fill="hold">
+                      <p:stCondLst>
+                        <p:cond delay="indefinite"/>
+                      </p:stCondLst>
+                      <p:childTnLst>
+                        <p:par>
+                          <p:cTn id="10" fill="hold">
+                            <p:stCondLst>
+                              <p:cond delay="0"/>
+                            </p:stCondLst>
+                            <p:childTnLst>
+                              <p:par>
+                                <p:cTn id="11" presetID="1" presetClass="entr" presetSubtype="0" fill="hold" nodeType="clickEffect">
+                                  <p:stCondLst>
+                                    <p:cond delay="0"/>
+                                  </p:stCondLst>
+                                  <p:childTnLst>
+                                    <p:set>
+                                      <p:cBhvr>
+                                        <p:cTn id="12" dur="1" fill="hold">
+                                          <p:stCondLst>
+                                            <p:cond delay="0"/>
+                                          </p:stCondLst>
+                                        </p:cTn>
+                                        <p:tgtEl>
+                                          <p:spTgt spid="5"/>
+                                        </p:tgtEl>
+                                        <p:attrNameLst>
+                                          <p:attrName>style.visibility</p:attrName>
+                                        </p:attrNameLst>
+                                      </p:cBhvr>
+                                      <p:to>
+                                        <p:strVal val="visible"/>
+                                      </p:to>
+                                    </p:set>
+                                  </p:childTnLst>
+                                </p:cTn>
+                              </p:par>
+                            </p:childTnLst>
+                          </p:cTn>
+                        </p:par>
+                      </p:childTnLst>
+                    </p:cTn>
+                  </p:par>
+                  <p:par>
+                    <p:cTn id="13" fill="hold">
+                      <p:stCondLst>
+                        <p:cond delay="indefinite"/>
+                      </p:stCondLst>
+                      <p:childTnLst>
+                        <p:par>
+                          <p:cTn id="14" fill="hold">
+                            <p:stCondLst>
+                              <p:cond delay="0"/>
+                            </p:stCondLst>
+                            <p:childTnLst>
+                              <p:par>
+                                <p:cTn id="15" presetID="1" presetClass="entr" presetSubtype="0" fill="hold" nodeType="clickEffect">
+                                  <p:stCondLst>
+                                    <p:cond delay="0"/>
+                                  </p:stCondLst>
+                                  <p:childTnLst>
+                                    <p:set>
+                                      <p:cBhvr>
+                                        <p:cTn id="16" dur="1" fill="hold">
+                                          <p:stCondLst>
+                                            <p:cond delay="0"/>
+                                          </p:stCondLst>
+                                        </p:cTn>
+                                        <p:tgtEl>
+                                          <p:spTgt spid="10"/>
+                                        </p:tgtEl>
+                                        <p:attrNameLst>
+                                          <p:attrName>style.visibility</p:attrName>
+                                        </p:attrNameLst>
+                                      </p:cBhvr>
+                                      <p:to>
+                                        <p:strVal val="visible"/>
+                                      </p:to>
+                                    </p:set>
+                                  </p:childTnLst>
+                                </p:cTn>
+                              </p:par>
+                            </p:childTnLst>
+                          </p:cTn>
+                        </p:par>
+                      </p:childTnLst>
+                    </p:cTn>
+                  </p:par>
+                  <p:par>
+                    <p:cTn id="17" fill="hold">
+                      <p:stCondLst>
+                        <p:cond delay="indefinite"/>
+                      </p:stCondLst>
+                      <p:childTnLst>
+                        <p:par>
+                          <p:cTn id="18" fill="hold">
+                            <p:stCondLst>
+                              <p:cond delay="0"/>
+                            </p:stCondLst>
+                            <p:childTnLst>
+                              <p:par>
+                                <p:cTn id="19" presetID="1" presetClass="entr" presetSubtype="0" fill="hold" grpId="0" nodeType="clickEffect">
+                                  <p:stCondLst>
+                                    <p:cond delay="0"/>
+                                  </p:stCondLst>
+                                  <p:childTnLst>
+                                    <p:set>
+                                      <p:cBhvr>
+                                        <p:cTn id="20" dur="1" fill="hold">
+                                          <p:stCondLst>
+                                            <p:cond delay="0"/>
+                                          </p:stCondLst>
+                                        </p:cTn>
+                                        <p:tgtEl>
+                                          <p:spTgt spid="3">
+                                            <p:txEl>
+                                              <p:pRg st="6" end="6"/>
+                                            </p:txEl>
+                                          </p:spTgt>
+                                        </p:tgtEl>
+                                        <p:attrNameLst>
+                                          <p:attrName>style.visibility</p:attrName>
+                                        </p:attrNameLst>
+                                      </p:cBhvr>
+                                      <p:to>
+                                        <p:strVal val="visible"/>
+                                      </p:to>
+                                    </p:set>
+                                  </p:childTnLst>
+                                </p:cTn>
+                              </p:par>
+                            </p:childTnLst>
+                          </p:cTn>
+                        </p:par>
+                      </p:childTnLst>
+                    </p:cTn>
+                  </p:par>
+                  <p:par>
+                    <p:cTn id="21" fill="hold">
+                      <p:stCondLst>
+                        <p:cond delay="indefinite"/>
+                      </p:stCondLst>
+                      <p:childTnLst>
+                        <p:par>
+                          <p:cTn id="22" fill="hold">
+                            <p:stCondLst>
+                              <p:cond delay="0"/>
+                            </p:stCondLst>
+                            <p:childTnLst>
+                              <p:par>
+                                <p:cTn id="23" presetID="1" presetClass="entr" presetSubtype="0" fill="hold" grpId="0" nodeType="clickEffect">
+                                  <p:stCondLst>
+                                    <p:cond delay="0"/>
+                                  </p:stCondLst>
+                                  <p:childTnLst>
+                                    <p:set>
+                                      <p:cBhvr>
+                                        <p:cTn id="24" dur="1" fill="hold">
+                                          <p:stCondLst>
+                                            <p:cond delay="0"/>
+                                          </p:stCondLst>
+                                        </p:cTn>
+                                        <p:tgtEl>
+                                          <p:spTgt spid="3">
+                                            <p:txEl>
+                                              <p:pRg st="7" end="7"/>
+                                            </p:txEl>
+                                          </p:spTgt>
+                                        </p:tgtEl>
+                                        <p:attrNameLst>
+                                          <p:attrName>style.visibility</p:attrName>
+                                        </p:attrNameLst>
+                                      </p:cBhvr>
+                                      <p:to>
+                                        <p:strVal val="visible"/>
+                                      </p:to>
+                                    </p:set>
+                                  </p:childTnLst>
+                                </p:cTn>
+                              </p:par>
+                            </p:childTnLst>
+                          </p:cTn>
+                        </p:par>
+                      </p:childTnLst>
+                    </p:cTn>
+                  </p:par>
+                </p:childTnLst>
+              </p:cTn>
+              <p:prevCondLst>
+                <p:cond evt="onPrev" delay="0">
+                  <p:tgtEl>
+                    <p:sldTgt/>
+                  </p:tgtEl>
+                </p:cond>
+              </p:prevCondLst>
+              <p:nextCondLst>
+                <p:cond evt="onNext" delay="0">
+                  <p:tgtEl>
+                    <p:sldTgt/>
+                  </p:tgtEl>
+                </p:cond>
+              </p:nextCondLst>
+            </p:seq>
+          </p:childTnLst>
+        </p:cTn>
+      </p:par>
+    </p:tnLst>
+    <p:bldLst>
+      <p:bldP spid="3" grpId="0" uiExpand="1" build="p"/>
+      <p:bldP spid="4" grpId="0" animBg="1"/>
     </p:bldLst>
   </p:timing>
 </p:sld>

</xml_diff>

<commit_message>
Added slides on instance methods
</commit_message>
<xml_diff>
--- a/CPlusPlus/02_essential_cpp_udt.pptx
+++ b/CPlusPlus/02_essential_cpp_udt.pptx
@@ -4,6 +4,9 @@
   <p:sldMasterIdLst>
     <p:sldMasterId id="2147483660" r:id="rId1"/>
   </p:sldMasterIdLst>
+  <p:notesMasterIdLst>
+    <p:notesMasterId r:id="rId16"/>
+  </p:notesMasterIdLst>
   <p:sldIdLst>
     <p:sldId id="257" r:id="rId2"/>
     <p:sldId id="258" r:id="rId3"/>
@@ -16,6 +19,9 @@
     <p:sldId id="265" r:id="rId10"/>
     <p:sldId id="266" r:id="rId11"/>
     <p:sldId id="267" r:id="rId12"/>
+    <p:sldId id="269" r:id="rId13"/>
+    <p:sldId id="268" r:id="rId14"/>
+    <p:sldId id="270" r:id="rId15"/>
   </p:sldIdLst>
   <p:sldSz cx="9144000" cy="6858000" type="screen4x3"/>
   <p:notesSz cx="6858000" cy="9144000"/>
@@ -122,6 +128,440 @@
 </p:presentation>
 </file>
 
+<file path=ppt/notesMasters/notesMaster1.xml><?xml version="1.0" encoding="utf-8"?>
+<p:notesMaster xmlns:a="http://schemas.openxmlformats.org/drawingml/2006/main" xmlns:r="http://schemas.openxmlformats.org/officeDocument/2006/relationships" xmlns:p="http://schemas.openxmlformats.org/presentationml/2006/main">
+  <p:cSld>
+    <p:bg>
+      <p:bgRef idx="1001">
+        <a:schemeClr val="bg1"/>
+      </p:bgRef>
+    </p:bg>
+    <p:spTree>
+      <p:nvGrpSpPr>
+        <p:cNvPr id="1" name=""/>
+        <p:cNvGrpSpPr/>
+        <p:nvPr/>
+      </p:nvGrpSpPr>
+      <p:grpSpPr>
+        <a:xfrm>
+          <a:off x="0" y="0"/>
+          <a:ext cx="0" cy="0"/>
+          <a:chOff x="0" y="0"/>
+          <a:chExt cx="0" cy="0"/>
+        </a:xfrm>
+      </p:grpSpPr>
+      <p:sp>
+        <p:nvSpPr>
+          <p:cNvPr id="2" name="Header Placeholder 1"/>
+          <p:cNvSpPr>
+            <a:spLocks noGrp="1"/>
+          </p:cNvSpPr>
+          <p:nvPr>
+            <p:ph type="hdr" sz="quarter"/>
+          </p:nvPr>
+        </p:nvSpPr>
+        <p:spPr>
+          <a:xfrm>
+            <a:off x="0" y="0"/>
+            <a:ext cx="2971800" cy="458788"/>
+          </a:xfrm>
+          <a:prstGeom prst="rect">
+            <a:avLst/>
+          </a:prstGeom>
+        </p:spPr>
+        <p:txBody>
+          <a:bodyPr vert="horz" lIns="91440" tIns="45720" rIns="91440" bIns="45720" rtlCol="0"/>
+          <a:lstStyle>
+            <a:lvl1pPr algn="l">
+              <a:defRPr sz="1200"/>
+            </a:lvl1pPr>
+          </a:lstStyle>
+          <a:p>
+            <a:endParaRPr lang="en-US"/>
+          </a:p>
+        </p:txBody>
+      </p:sp>
+      <p:sp>
+        <p:nvSpPr>
+          <p:cNvPr id="3" name="Date Placeholder 2"/>
+          <p:cNvSpPr>
+            <a:spLocks noGrp="1"/>
+          </p:cNvSpPr>
+          <p:nvPr>
+            <p:ph type="dt" idx="1"/>
+          </p:nvPr>
+        </p:nvSpPr>
+        <p:spPr>
+          <a:xfrm>
+            <a:off x="3884613" y="0"/>
+            <a:ext cx="2971800" cy="458788"/>
+          </a:xfrm>
+          <a:prstGeom prst="rect">
+            <a:avLst/>
+          </a:prstGeom>
+        </p:spPr>
+        <p:txBody>
+          <a:bodyPr vert="horz" lIns="91440" tIns="45720" rIns="91440" bIns="45720" rtlCol="0"/>
+          <a:lstStyle>
+            <a:lvl1pPr algn="r">
+              <a:defRPr sz="1200"/>
+            </a:lvl1pPr>
+          </a:lstStyle>
+          <a:p>
+            <a:fld id="{65F1378B-C2AB-4698-A639-9C0E3F833333}" type="datetimeFigureOut">
+              <a:rPr lang="en-US" smtClean="0"/>
+              <a:t>2017-02-17</a:t>
+            </a:fld>
+            <a:endParaRPr lang="en-US"/>
+          </a:p>
+        </p:txBody>
+      </p:sp>
+      <p:sp>
+        <p:nvSpPr>
+          <p:cNvPr id="4" name="Slide Image Placeholder 3"/>
+          <p:cNvSpPr>
+            <a:spLocks noGrp="1" noRot="1" noChangeAspect="1"/>
+          </p:cNvSpPr>
+          <p:nvPr>
+            <p:ph type="sldImg" idx="2"/>
+          </p:nvPr>
+        </p:nvSpPr>
+        <p:spPr>
+          <a:xfrm>
+            <a:off x="1371600" y="1143000"/>
+            <a:ext cx="4114800" cy="3086100"/>
+          </a:xfrm>
+          <a:prstGeom prst="rect">
+            <a:avLst/>
+          </a:prstGeom>
+          <a:noFill/>
+          <a:ln w="12700">
+            <a:solidFill>
+              <a:prstClr val="black"/>
+            </a:solidFill>
+          </a:ln>
+        </p:spPr>
+        <p:txBody>
+          <a:bodyPr vert="horz" lIns="91440" tIns="45720" rIns="91440" bIns="45720" rtlCol="0" anchor="ctr"/>
+          <a:lstStyle/>
+          <a:p>
+            <a:endParaRPr lang="en-US"/>
+          </a:p>
+        </p:txBody>
+      </p:sp>
+      <p:sp>
+        <p:nvSpPr>
+          <p:cNvPr id="5" name="Notes Placeholder 4"/>
+          <p:cNvSpPr>
+            <a:spLocks noGrp="1"/>
+          </p:cNvSpPr>
+          <p:nvPr>
+            <p:ph type="body" sz="quarter" idx="3"/>
+          </p:nvPr>
+        </p:nvSpPr>
+        <p:spPr>
+          <a:xfrm>
+            <a:off x="685800" y="4400550"/>
+            <a:ext cx="5486400" cy="3600450"/>
+          </a:xfrm>
+          <a:prstGeom prst="rect">
+            <a:avLst/>
+          </a:prstGeom>
+        </p:spPr>
+        <p:txBody>
+          <a:bodyPr vert="horz" lIns="91440" tIns="45720" rIns="91440" bIns="45720" rtlCol="0"/>
+          <a:lstStyle/>
+          <a:p>
+            <a:pPr lvl="0"/>
+            <a:r>
+              <a:rPr lang="en-US" smtClean="0"/>
+              <a:t>Click to edit Master text styles</a:t>
+            </a:r>
+          </a:p>
+          <a:p>
+            <a:pPr lvl="1"/>
+            <a:r>
+              <a:rPr lang="en-US" smtClean="0"/>
+              <a:t>Second level</a:t>
+            </a:r>
+          </a:p>
+          <a:p>
+            <a:pPr lvl="2"/>
+            <a:r>
+              <a:rPr lang="en-US" smtClean="0"/>
+              <a:t>Third level</a:t>
+            </a:r>
+          </a:p>
+          <a:p>
+            <a:pPr lvl="3"/>
+            <a:r>
+              <a:rPr lang="en-US" smtClean="0"/>
+              <a:t>Fourth level</a:t>
+            </a:r>
+          </a:p>
+          <a:p>
+            <a:pPr lvl="4"/>
+            <a:r>
+              <a:rPr lang="en-US" smtClean="0"/>
+              <a:t>Fifth level</a:t>
+            </a:r>
+            <a:endParaRPr lang="en-US"/>
+          </a:p>
+        </p:txBody>
+      </p:sp>
+      <p:sp>
+        <p:nvSpPr>
+          <p:cNvPr id="6" name="Footer Placeholder 5"/>
+          <p:cNvSpPr>
+            <a:spLocks noGrp="1"/>
+          </p:cNvSpPr>
+          <p:nvPr>
+            <p:ph type="ftr" sz="quarter" idx="4"/>
+          </p:nvPr>
+        </p:nvSpPr>
+        <p:spPr>
+          <a:xfrm>
+            <a:off x="0" y="8685213"/>
+            <a:ext cx="2971800" cy="458787"/>
+          </a:xfrm>
+          <a:prstGeom prst="rect">
+            <a:avLst/>
+          </a:prstGeom>
+        </p:spPr>
+        <p:txBody>
+          <a:bodyPr vert="horz" lIns="91440" tIns="45720" rIns="91440" bIns="45720" rtlCol="0" anchor="b"/>
+          <a:lstStyle>
+            <a:lvl1pPr algn="l">
+              <a:defRPr sz="1200"/>
+            </a:lvl1pPr>
+          </a:lstStyle>
+          <a:p>
+            <a:endParaRPr lang="en-US"/>
+          </a:p>
+        </p:txBody>
+      </p:sp>
+      <p:sp>
+        <p:nvSpPr>
+          <p:cNvPr id="7" name="Slide Number Placeholder 6"/>
+          <p:cNvSpPr>
+            <a:spLocks noGrp="1"/>
+          </p:cNvSpPr>
+          <p:nvPr>
+            <p:ph type="sldNum" sz="quarter" idx="5"/>
+          </p:nvPr>
+        </p:nvSpPr>
+        <p:spPr>
+          <a:xfrm>
+            <a:off x="3884613" y="8685213"/>
+            <a:ext cx="2971800" cy="458787"/>
+          </a:xfrm>
+          <a:prstGeom prst="rect">
+            <a:avLst/>
+          </a:prstGeom>
+        </p:spPr>
+        <p:txBody>
+          <a:bodyPr vert="horz" lIns="91440" tIns="45720" rIns="91440" bIns="45720" rtlCol="0" anchor="b"/>
+          <a:lstStyle>
+            <a:lvl1pPr algn="r">
+              <a:defRPr sz="1200"/>
+            </a:lvl1pPr>
+          </a:lstStyle>
+          <a:p>
+            <a:fld id="{AA58AC32-B3E1-43F6-A93B-BFEE32E87511}" type="slidenum">
+              <a:rPr lang="en-US" smtClean="0"/>
+              <a:t>‹#›</a:t>
+            </a:fld>
+            <a:endParaRPr lang="en-US"/>
+          </a:p>
+        </p:txBody>
+      </p:sp>
+    </p:spTree>
+    <p:extLst>
+      <p:ext uri="{BB962C8B-B14F-4D97-AF65-F5344CB8AC3E}">
+        <p14:creationId xmlns:p14="http://schemas.microsoft.com/office/powerpoint/2010/main" val="1730149805"/>
+      </p:ext>
+    </p:extLst>
+  </p:cSld>
+  <p:clrMap bg1="lt1" tx1="dk1" bg2="lt2" tx2="dk2" accent1="accent1" accent2="accent2" accent3="accent3" accent4="accent4" accent5="accent5" accent6="accent6" hlink="hlink" folHlink="folHlink"/>
+  <p:notesStyle>
+    <a:lvl1pPr marL="0" algn="l" defTabSz="914400" rtl="0" eaLnBrk="1" latinLnBrk="0" hangingPunct="1">
+      <a:defRPr sz="1200" kern="1200">
+        <a:solidFill>
+          <a:schemeClr val="tx1"/>
+        </a:solidFill>
+        <a:latin typeface="+mn-lt"/>
+        <a:ea typeface="+mn-ea"/>
+        <a:cs typeface="+mn-cs"/>
+      </a:defRPr>
+    </a:lvl1pPr>
+    <a:lvl2pPr marL="457200" algn="l" defTabSz="914400" rtl="0" eaLnBrk="1" latinLnBrk="0" hangingPunct="1">
+      <a:defRPr sz="1200" kern="1200">
+        <a:solidFill>
+          <a:schemeClr val="tx1"/>
+        </a:solidFill>
+        <a:latin typeface="+mn-lt"/>
+        <a:ea typeface="+mn-ea"/>
+        <a:cs typeface="+mn-cs"/>
+      </a:defRPr>
+    </a:lvl2pPr>
+    <a:lvl3pPr marL="914400" algn="l" defTabSz="914400" rtl="0" eaLnBrk="1" latinLnBrk="0" hangingPunct="1">
+      <a:defRPr sz="1200" kern="1200">
+        <a:solidFill>
+          <a:schemeClr val="tx1"/>
+        </a:solidFill>
+        <a:latin typeface="+mn-lt"/>
+        <a:ea typeface="+mn-ea"/>
+        <a:cs typeface="+mn-cs"/>
+      </a:defRPr>
+    </a:lvl3pPr>
+    <a:lvl4pPr marL="1371600" algn="l" defTabSz="914400" rtl="0" eaLnBrk="1" latinLnBrk="0" hangingPunct="1">
+      <a:defRPr sz="1200" kern="1200">
+        <a:solidFill>
+          <a:schemeClr val="tx1"/>
+        </a:solidFill>
+        <a:latin typeface="+mn-lt"/>
+        <a:ea typeface="+mn-ea"/>
+        <a:cs typeface="+mn-cs"/>
+      </a:defRPr>
+    </a:lvl4pPr>
+    <a:lvl5pPr marL="1828800" algn="l" defTabSz="914400" rtl="0" eaLnBrk="1" latinLnBrk="0" hangingPunct="1">
+      <a:defRPr sz="1200" kern="1200">
+        <a:solidFill>
+          <a:schemeClr val="tx1"/>
+        </a:solidFill>
+        <a:latin typeface="+mn-lt"/>
+        <a:ea typeface="+mn-ea"/>
+        <a:cs typeface="+mn-cs"/>
+      </a:defRPr>
+    </a:lvl5pPr>
+    <a:lvl6pPr marL="2286000" algn="l" defTabSz="914400" rtl="0" eaLnBrk="1" latinLnBrk="0" hangingPunct="1">
+      <a:defRPr sz="1200" kern="1200">
+        <a:solidFill>
+          <a:schemeClr val="tx1"/>
+        </a:solidFill>
+        <a:latin typeface="+mn-lt"/>
+        <a:ea typeface="+mn-ea"/>
+        <a:cs typeface="+mn-cs"/>
+      </a:defRPr>
+    </a:lvl6pPr>
+    <a:lvl7pPr marL="2743200" algn="l" defTabSz="914400" rtl="0" eaLnBrk="1" latinLnBrk="0" hangingPunct="1">
+      <a:defRPr sz="1200" kern="1200">
+        <a:solidFill>
+          <a:schemeClr val="tx1"/>
+        </a:solidFill>
+        <a:latin typeface="+mn-lt"/>
+        <a:ea typeface="+mn-ea"/>
+        <a:cs typeface="+mn-cs"/>
+      </a:defRPr>
+    </a:lvl7pPr>
+    <a:lvl8pPr marL="3200400" algn="l" defTabSz="914400" rtl="0" eaLnBrk="1" latinLnBrk="0" hangingPunct="1">
+      <a:defRPr sz="1200" kern="1200">
+        <a:solidFill>
+          <a:schemeClr val="tx1"/>
+        </a:solidFill>
+        <a:latin typeface="+mn-lt"/>
+        <a:ea typeface="+mn-ea"/>
+        <a:cs typeface="+mn-cs"/>
+      </a:defRPr>
+    </a:lvl8pPr>
+    <a:lvl9pPr marL="3657600" algn="l" defTabSz="914400" rtl="0" eaLnBrk="1" latinLnBrk="0" hangingPunct="1">
+      <a:defRPr sz="1200" kern="1200">
+        <a:solidFill>
+          <a:schemeClr val="tx1"/>
+        </a:solidFill>
+        <a:latin typeface="+mn-lt"/>
+        <a:ea typeface="+mn-ea"/>
+        <a:cs typeface="+mn-cs"/>
+      </a:defRPr>
+    </a:lvl9pPr>
+  </p:notesStyle>
+</p:notesMaster>
+</file>
+
+<file path=ppt/notesSlides/notesSlide1.xml><?xml version="1.0" encoding="utf-8"?>
+<p:notes xmlns:a="http://schemas.openxmlformats.org/drawingml/2006/main" xmlns:r="http://schemas.openxmlformats.org/officeDocument/2006/relationships" xmlns:p="http://schemas.openxmlformats.org/presentationml/2006/main">
+  <p:cSld>
+    <p:spTree>
+      <p:nvGrpSpPr>
+        <p:cNvPr id="1" name=""/>
+        <p:cNvGrpSpPr/>
+        <p:nvPr/>
+      </p:nvGrpSpPr>
+      <p:grpSpPr>
+        <a:xfrm>
+          <a:off x="0" y="0"/>
+          <a:ext cx="0" cy="0"/>
+          <a:chOff x="0" y="0"/>
+          <a:chExt cx="0" cy="0"/>
+        </a:xfrm>
+      </p:grpSpPr>
+      <p:sp>
+        <p:nvSpPr>
+          <p:cNvPr id="2" name="Slide Image Placeholder 1"/>
+          <p:cNvSpPr>
+            <a:spLocks noGrp="1" noRot="1" noChangeAspect="1"/>
+          </p:cNvSpPr>
+          <p:nvPr>
+            <p:ph type="sldImg"/>
+          </p:nvPr>
+        </p:nvSpPr>
+        <p:spPr/>
+      </p:sp>
+      <p:sp>
+        <p:nvSpPr>
+          <p:cNvPr id="3" name="Notes Placeholder 2"/>
+          <p:cNvSpPr>
+            <a:spLocks noGrp="1"/>
+          </p:cNvSpPr>
+          <p:nvPr>
+            <p:ph type="body" idx="1"/>
+          </p:nvPr>
+        </p:nvSpPr>
+        <p:spPr/>
+        <p:txBody>
+          <a:bodyPr/>
+          <a:lstStyle/>
+          <a:p>
+            <a:endParaRPr lang="en-US"/>
+          </a:p>
+        </p:txBody>
+      </p:sp>
+      <p:sp>
+        <p:nvSpPr>
+          <p:cNvPr id="4" name="Slide Number Placeholder 3"/>
+          <p:cNvSpPr>
+            <a:spLocks noGrp="1"/>
+          </p:cNvSpPr>
+          <p:nvPr>
+            <p:ph type="sldNum" sz="quarter" idx="10"/>
+          </p:nvPr>
+        </p:nvSpPr>
+        <p:spPr/>
+        <p:txBody>
+          <a:bodyPr/>
+          <a:lstStyle/>
+          <a:p>
+            <a:fld id="{AA58AC32-B3E1-43F6-A93B-BFEE32E87511}" type="slidenum">
+              <a:rPr lang="en-US" smtClean="0"/>
+              <a:t>14</a:t>
+            </a:fld>
+            <a:endParaRPr lang="en-US"/>
+          </a:p>
+        </p:txBody>
+      </p:sp>
+    </p:spTree>
+    <p:extLst>
+      <p:ext uri="{BB962C8B-B14F-4D97-AF65-F5344CB8AC3E}">
+        <p14:creationId xmlns:p14="http://schemas.microsoft.com/office/powerpoint/2010/main" val="1539694008"/>
+      </p:ext>
+    </p:extLst>
+  </p:cSld>
+  <p:clrMapOvr>
+    <a:masterClrMapping/>
+  </p:clrMapOvr>
+</p:notes>
+</file>
+
 <file path=ppt/slideLayouts/slideLayout1.xml><?xml version="1.0" encoding="utf-8"?>
 <p:sldLayout xmlns:a="http://schemas.openxmlformats.org/drawingml/2006/main" xmlns:r="http://schemas.openxmlformats.org/officeDocument/2006/relationships" xmlns:p="http://schemas.openxmlformats.org/presentationml/2006/main" type="title" preserve="1">
   <p:cSld name="Title Slide">
@@ -251,7 +691,7 @@
           <a:bodyPr/>
           <a:lstStyle/>
           <a:p>
-            <a:fld id="{A8801574-87B3-4792-B4E8-6055B541C335}" type="datetimeFigureOut">
+            <a:fld id="{5786021F-A61E-4517-8760-BC87D1A92FA2}" type="datetime1">
               <a:rPr lang="en-US" smtClean="0"/>
               <a:t>2017-02-17</a:t>
             </a:fld>
@@ -421,7 +861,7 @@
           <a:bodyPr/>
           <a:lstStyle/>
           <a:p>
-            <a:fld id="{A8801574-87B3-4792-B4E8-6055B541C335}" type="datetimeFigureOut">
+            <a:fld id="{1319E2CA-33D9-482F-BBF4-3C2EF9A11FD9}" type="datetime1">
               <a:rPr lang="en-US" smtClean="0"/>
               <a:t>2017-02-17</a:t>
             </a:fld>
@@ -601,7 +1041,7 @@
           <a:bodyPr/>
           <a:lstStyle/>
           <a:p>
-            <a:fld id="{A8801574-87B3-4792-B4E8-6055B541C335}" type="datetimeFigureOut">
+            <a:fld id="{E0855842-D24D-4D96-893F-FC8253D498B3}" type="datetime1">
               <a:rPr lang="en-US" smtClean="0"/>
               <a:t>2017-02-17</a:t>
             </a:fld>
@@ -771,7 +1211,7 @@
           <a:bodyPr/>
           <a:lstStyle/>
           <a:p>
-            <a:fld id="{A8801574-87B3-4792-B4E8-6055B541C335}" type="datetimeFigureOut">
+            <a:fld id="{4F17A02C-CCD5-4EAA-AD62-6AF1BBBA5098}" type="datetime1">
               <a:rPr lang="en-US" smtClean="0"/>
               <a:t>2017-02-17</a:t>
             </a:fld>
@@ -1015,7 +1455,7 @@
           <a:bodyPr/>
           <a:lstStyle/>
           <a:p>
-            <a:fld id="{A8801574-87B3-4792-B4E8-6055B541C335}" type="datetimeFigureOut">
+            <a:fld id="{3C16106F-9685-4E44-9262-E438E92F03CD}" type="datetime1">
               <a:rPr lang="en-US" smtClean="0"/>
               <a:t>2017-02-17</a:t>
             </a:fld>
@@ -1247,7 +1687,7 @@
           <a:bodyPr/>
           <a:lstStyle/>
           <a:p>
-            <a:fld id="{A8801574-87B3-4792-B4E8-6055B541C335}" type="datetimeFigureOut">
+            <a:fld id="{BA74F6A0-DDD4-49C4-A22A-B3084067F398}" type="datetime1">
               <a:rPr lang="en-US" smtClean="0"/>
               <a:t>2017-02-17</a:t>
             </a:fld>
@@ -1614,7 +2054,7 @@
           <a:bodyPr/>
           <a:lstStyle/>
           <a:p>
-            <a:fld id="{A8801574-87B3-4792-B4E8-6055B541C335}" type="datetimeFigureOut">
+            <a:fld id="{EFA42ADE-A4E3-4963-8866-B76841D074B7}" type="datetime1">
               <a:rPr lang="en-US" smtClean="0"/>
               <a:t>2017-02-17</a:t>
             </a:fld>
@@ -1732,7 +2172,7 @@
           <a:bodyPr/>
           <a:lstStyle/>
           <a:p>
-            <a:fld id="{A8801574-87B3-4792-B4E8-6055B541C335}" type="datetimeFigureOut">
+            <a:fld id="{9BF63FB9-06BC-40F3-9571-396BEEB1EB3D}" type="datetime1">
               <a:rPr lang="en-US" smtClean="0"/>
               <a:t>2017-02-17</a:t>
             </a:fld>
@@ -1827,7 +2267,7 @@
           <a:bodyPr/>
           <a:lstStyle/>
           <a:p>
-            <a:fld id="{A8801574-87B3-4792-B4E8-6055B541C335}" type="datetimeFigureOut">
+            <a:fld id="{A2766F7D-06DD-44B0-8ACC-315F25A1E086}" type="datetime1">
               <a:rPr lang="en-US" smtClean="0"/>
               <a:t>2017-02-17</a:t>
             </a:fld>
@@ -2104,7 +2544,7 @@
           <a:bodyPr/>
           <a:lstStyle/>
           <a:p>
-            <a:fld id="{A8801574-87B3-4792-B4E8-6055B541C335}" type="datetimeFigureOut">
+            <a:fld id="{19AB181A-4E09-4B9D-B55E-138F3038D59A}" type="datetime1">
               <a:rPr lang="en-US" smtClean="0"/>
               <a:t>2017-02-17</a:t>
             </a:fld>
@@ -2361,7 +2801,7 @@
           <a:bodyPr/>
           <a:lstStyle/>
           <a:p>
-            <a:fld id="{A8801574-87B3-4792-B4E8-6055B541C335}" type="datetimeFigureOut">
+            <a:fld id="{DABD2A41-686D-44E1-829D-0CDE584BAA73}" type="datetime1">
               <a:rPr lang="en-US" smtClean="0"/>
               <a:t>2017-02-17</a:t>
             </a:fld>
@@ -2574,7 +3014,7 @@
             </a:lvl1pPr>
           </a:lstStyle>
           <a:p>
-            <a:fld id="{A8801574-87B3-4792-B4E8-6055B541C335}" type="datetimeFigureOut">
+            <a:fld id="{6FCAA38F-FF33-40B5-8182-D4E420F5D6EB}" type="datetime1">
               <a:rPr lang="en-US" smtClean="0"/>
               <a:t>2017-02-17</a:t>
             </a:fld>
@@ -2681,6 +3121,7 @@
     <p:sldLayoutId id="2147483670" r:id="rId10"/>
     <p:sldLayoutId id="2147483671" r:id="rId11"/>
   </p:sldLayoutIdLst>
+  <p:hf hdr="0" ftr="0" dt="0"/>
   <p:txStyles>
     <p:titleStyle>
       <a:lvl1pPr algn="l" defTabSz="914400" rtl="0" eaLnBrk="1" latinLnBrk="0" hangingPunct="1">
@@ -3660,6 +4101,29 @@
           </p:style>
         </p:cxnSp>
       </p:grpSp>
+      <p:sp>
+        <p:nvSpPr>
+          <p:cNvPr id="15" name="Slide Number Placeholder 14"/>
+          <p:cNvSpPr>
+            <a:spLocks noGrp="1"/>
+          </p:cNvSpPr>
+          <p:nvPr>
+            <p:ph type="sldNum" sz="quarter" idx="12"/>
+          </p:nvPr>
+        </p:nvSpPr>
+        <p:spPr/>
+        <p:txBody>
+          <a:bodyPr/>
+          <a:lstStyle/>
+          <a:p>
+            <a:fld id="{2F8BA72C-5DC7-4014-AC42-C5F5AAAF9B79}" type="slidenum">
+              <a:rPr lang="en-US" smtClean="0"/>
+              <a:t>10</a:t>
+            </a:fld>
+            <a:endParaRPr lang="en-US"/>
+          </a:p>
+        </p:txBody>
+      </p:sp>
     </p:spTree>
     <p:extLst>
       <p:ext uri="{BB962C8B-B14F-4D97-AF65-F5344CB8AC3E}">
@@ -4035,12 +4499,33 @@
             </a:r>
           </a:p>
           <a:p>
+            <a:pPr lvl="1"/>
+            <a:r>
+              <a:rPr lang="en-US" dirty="0" smtClean="0"/>
+              <a:t>creates new object (instance) of class</a:t>
+            </a:r>
+          </a:p>
+          <a:p>
             <a:r>
               <a:rPr lang="en-US" dirty="0" smtClean="0"/>
               <a:t>Inspectors</a:t>
             </a:r>
           </a:p>
           <a:p>
+            <a:pPr lvl="1"/>
+            <a:r>
+              <a:rPr lang="en-US" dirty="0" smtClean="0"/>
+              <a:t>retrieve state information of object</a:t>
+            </a:r>
+          </a:p>
+          <a:p>
+            <a:pPr lvl="1"/>
+            <a:r>
+              <a:rPr lang="en-US" dirty="0" smtClean="0"/>
+              <a:t>doesn't change state of object</a:t>
+            </a:r>
+          </a:p>
+          <a:p>
             <a:r>
               <a:rPr lang="en-US" dirty="0" err="1" smtClean="0"/>
               <a:t>Mutators</a:t>
@@ -4048,11 +4533,48 @@
             <a:endParaRPr lang="en-US" dirty="0" smtClean="0"/>
           </a:p>
           <a:p>
+            <a:pPr lvl="1"/>
+            <a:r>
+              <a:rPr lang="en-US" dirty="0" smtClean="0"/>
+              <a:t>changes state of object</a:t>
+            </a:r>
+          </a:p>
+          <a:p>
             <a:r>
               <a:rPr lang="en-US" dirty="0" smtClean="0"/>
               <a:t>Destructor</a:t>
             </a:r>
+          </a:p>
+          <a:p>
+            <a:pPr lvl="1"/>
+            <a:r>
+              <a:rPr lang="en-US" dirty="0" smtClean="0"/>
+              <a:t>releases resources acquired by object</a:t>
+            </a:r>
             <a:endParaRPr lang="en-US" dirty="0"/>
+          </a:p>
+        </p:txBody>
+      </p:sp>
+      <p:sp>
+        <p:nvSpPr>
+          <p:cNvPr id="4" name="Slide Number Placeholder 3"/>
+          <p:cNvSpPr>
+            <a:spLocks noGrp="1"/>
+          </p:cNvSpPr>
+          <p:nvPr>
+            <p:ph type="sldNum" sz="quarter" idx="12"/>
+          </p:nvPr>
+        </p:nvSpPr>
+        <p:spPr/>
+        <p:txBody>
+          <a:bodyPr/>
+          <a:lstStyle/>
+          <a:p>
+            <a:fld id="{2F8BA72C-5DC7-4014-AC42-C5F5AAAF9B79}" type="slidenum">
+              <a:rPr lang="en-US" smtClean="0"/>
+              <a:t>11</a:t>
+            </a:fld>
+            <a:endParaRPr lang="en-US"/>
           </a:p>
         </p:txBody>
       </p:sp>
@@ -4069,9 +4591,2782 @@
   <p:timing>
     <p:tnLst>
       <p:par>
-        <p:cTn id="1" dur="indefinite" restart="never" nodeType="tmRoot"/>
+        <p:cTn id="1" dur="indefinite" restart="never" nodeType="tmRoot">
+          <p:childTnLst>
+            <p:seq concurrent="1" nextAc="seek">
+              <p:cTn id="2" dur="indefinite" nodeType="mainSeq">
+                <p:childTnLst>
+                  <p:par>
+                    <p:cTn id="3" fill="hold">
+                      <p:stCondLst>
+                        <p:cond delay="indefinite"/>
+                        <p:cond evt="onBegin" delay="0">
+                          <p:tn val="2"/>
+                        </p:cond>
+                      </p:stCondLst>
+                      <p:childTnLst>
+                        <p:par>
+                          <p:cTn id="4" fill="hold">
+                            <p:stCondLst>
+                              <p:cond delay="0"/>
+                            </p:stCondLst>
+                            <p:childTnLst>
+                              <p:par>
+                                <p:cTn id="5" presetID="1" presetClass="entr" presetSubtype="0" fill="hold" grpId="0" nodeType="withEffect">
+                                  <p:stCondLst>
+                                    <p:cond delay="0"/>
+                                  </p:stCondLst>
+                                  <p:childTnLst>
+                                    <p:set>
+                                      <p:cBhvr>
+                                        <p:cTn id="6" dur="1" fill="hold">
+                                          <p:stCondLst>
+                                            <p:cond delay="0"/>
+                                          </p:stCondLst>
+                                        </p:cTn>
+                                        <p:tgtEl>
+                                          <p:spTgt spid="3">
+                                            <p:txEl>
+                                              <p:pRg st="0" end="0"/>
+                                            </p:txEl>
+                                          </p:spTgt>
+                                        </p:tgtEl>
+                                        <p:attrNameLst>
+                                          <p:attrName>style.visibility</p:attrName>
+                                        </p:attrNameLst>
+                                      </p:cBhvr>
+                                      <p:to>
+                                        <p:strVal val="visible"/>
+                                      </p:to>
+                                    </p:set>
+                                  </p:childTnLst>
+                                </p:cTn>
+                              </p:par>
+                              <p:par>
+                                <p:cTn id="7" presetID="1" presetClass="entr" presetSubtype="0" fill="hold" grpId="0" nodeType="withEffect">
+                                  <p:stCondLst>
+                                    <p:cond delay="0"/>
+                                  </p:stCondLst>
+                                  <p:childTnLst>
+                                    <p:set>
+                                      <p:cBhvr>
+                                        <p:cTn id="8" dur="1" fill="hold">
+                                          <p:stCondLst>
+                                            <p:cond delay="0"/>
+                                          </p:stCondLst>
+                                        </p:cTn>
+                                        <p:tgtEl>
+                                          <p:spTgt spid="3">
+                                            <p:txEl>
+                                              <p:pRg st="1" end="1"/>
+                                            </p:txEl>
+                                          </p:spTgt>
+                                        </p:tgtEl>
+                                        <p:attrNameLst>
+                                          <p:attrName>style.visibility</p:attrName>
+                                        </p:attrNameLst>
+                                      </p:cBhvr>
+                                      <p:to>
+                                        <p:strVal val="visible"/>
+                                      </p:to>
+                                    </p:set>
+                                  </p:childTnLst>
+                                </p:cTn>
+                              </p:par>
+                            </p:childTnLst>
+                          </p:cTn>
+                        </p:par>
+                      </p:childTnLst>
+                    </p:cTn>
+                  </p:par>
+                  <p:par>
+                    <p:cTn id="9" fill="hold">
+                      <p:stCondLst>
+                        <p:cond delay="indefinite"/>
+                      </p:stCondLst>
+                      <p:childTnLst>
+                        <p:par>
+                          <p:cTn id="10" fill="hold">
+                            <p:stCondLst>
+                              <p:cond delay="0"/>
+                            </p:stCondLst>
+                            <p:childTnLst>
+                              <p:par>
+                                <p:cTn id="11" presetID="1" presetClass="entr" presetSubtype="0" fill="hold" grpId="0" nodeType="clickEffect">
+                                  <p:stCondLst>
+                                    <p:cond delay="0"/>
+                                  </p:stCondLst>
+                                  <p:childTnLst>
+                                    <p:set>
+                                      <p:cBhvr>
+                                        <p:cTn id="12" dur="1" fill="hold">
+                                          <p:stCondLst>
+                                            <p:cond delay="0"/>
+                                          </p:stCondLst>
+                                        </p:cTn>
+                                        <p:tgtEl>
+                                          <p:spTgt spid="3">
+                                            <p:txEl>
+                                              <p:pRg st="2" end="2"/>
+                                            </p:txEl>
+                                          </p:spTgt>
+                                        </p:tgtEl>
+                                        <p:attrNameLst>
+                                          <p:attrName>style.visibility</p:attrName>
+                                        </p:attrNameLst>
+                                      </p:cBhvr>
+                                      <p:to>
+                                        <p:strVal val="visible"/>
+                                      </p:to>
+                                    </p:set>
+                                  </p:childTnLst>
+                                </p:cTn>
+                              </p:par>
+                              <p:par>
+                                <p:cTn id="13" presetID="1" presetClass="entr" presetSubtype="0" fill="hold" grpId="0" nodeType="withEffect">
+                                  <p:stCondLst>
+                                    <p:cond delay="0"/>
+                                  </p:stCondLst>
+                                  <p:childTnLst>
+                                    <p:set>
+                                      <p:cBhvr>
+                                        <p:cTn id="14" dur="1" fill="hold">
+                                          <p:stCondLst>
+                                            <p:cond delay="0"/>
+                                          </p:stCondLst>
+                                        </p:cTn>
+                                        <p:tgtEl>
+                                          <p:spTgt spid="3">
+                                            <p:txEl>
+                                              <p:pRg st="3" end="3"/>
+                                            </p:txEl>
+                                          </p:spTgt>
+                                        </p:tgtEl>
+                                        <p:attrNameLst>
+                                          <p:attrName>style.visibility</p:attrName>
+                                        </p:attrNameLst>
+                                      </p:cBhvr>
+                                      <p:to>
+                                        <p:strVal val="visible"/>
+                                      </p:to>
+                                    </p:set>
+                                  </p:childTnLst>
+                                </p:cTn>
+                              </p:par>
+                              <p:par>
+                                <p:cTn id="15" presetID="1" presetClass="entr" presetSubtype="0" fill="hold" grpId="0" nodeType="withEffect">
+                                  <p:stCondLst>
+                                    <p:cond delay="0"/>
+                                  </p:stCondLst>
+                                  <p:childTnLst>
+                                    <p:set>
+                                      <p:cBhvr>
+                                        <p:cTn id="16" dur="1" fill="hold">
+                                          <p:stCondLst>
+                                            <p:cond delay="0"/>
+                                          </p:stCondLst>
+                                        </p:cTn>
+                                        <p:tgtEl>
+                                          <p:spTgt spid="3">
+                                            <p:txEl>
+                                              <p:pRg st="4" end="4"/>
+                                            </p:txEl>
+                                          </p:spTgt>
+                                        </p:tgtEl>
+                                        <p:attrNameLst>
+                                          <p:attrName>style.visibility</p:attrName>
+                                        </p:attrNameLst>
+                                      </p:cBhvr>
+                                      <p:to>
+                                        <p:strVal val="visible"/>
+                                      </p:to>
+                                    </p:set>
+                                  </p:childTnLst>
+                                </p:cTn>
+                              </p:par>
+                            </p:childTnLst>
+                          </p:cTn>
+                        </p:par>
+                      </p:childTnLst>
+                    </p:cTn>
+                  </p:par>
+                  <p:par>
+                    <p:cTn id="17" fill="hold">
+                      <p:stCondLst>
+                        <p:cond delay="indefinite"/>
+                      </p:stCondLst>
+                      <p:childTnLst>
+                        <p:par>
+                          <p:cTn id="18" fill="hold">
+                            <p:stCondLst>
+                              <p:cond delay="0"/>
+                            </p:stCondLst>
+                            <p:childTnLst>
+                              <p:par>
+                                <p:cTn id="19" presetID="1" presetClass="entr" presetSubtype="0" fill="hold" grpId="0" nodeType="clickEffect">
+                                  <p:stCondLst>
+                                    <p:cond delay="0"/>
+                                  </p:stCondLst>
+                                  <p:childTnLst>
+                                    <p:set>
+                                      <p:cBhvr>
+                                        <p:cTn id="20" dur="1" fill="hold">
+                                          <p:stCondLst>
+                                            <p:cond delay="0"/>
+                                          </p:stCondLst>
+                                        </p:cTn>
+                                        <p:tgtEl>
+                                          <p:spTgt spid="3">
+                                            <p:txEl>
+                                              <p:pRg st="5" end="5"/>
+                                            </p:txEl>
+                                          </p:spTgt>
+                                        </p:tgtEl>
+                                        <p:attrNameLst>
+                                          <p:attrName>style.visibility</p:attrName>
+                                        </p:attrNameLst>
+                                      </p:cBhvr>
+                                      <p:to>
+                                        <p:strVal val="visible"/>
+                                      </p:to>
+                                    </p:set>
+                                  </p:childTnLst>
+                                </p:cTn>
+                              </p:par>
+                              <p:par>
+                                <p:cTn id="21" presetID="1" presetClass="entr" presetSubtype="0" fill="hold" grpId="0" nodeType="withEffect">
+                                  <p:stCondLst>
+                                    <p:cond delay="0"/>
+                                  </p:stCondLst>
+                                  <p:childTnLst>
+                                    <p:set>
+                                      <p:cBhvr>
+                                        <p:cTn id="22" dur="1" fill="hold">
+                                          <p:stCondLst>
+                                            <p:cond delay="0"/>
+                                          </p:stCondLst>
+                                        </p:cTn>
+                                        <p:tgtEl>
+                                          <p:spTgt spid="3">
+                                            <p:txEl>
+                                              <p:pRg st="6" end="6"/>
+                                            </p:txEl>
+                                          </p:spTgt>
+                                        </p:tgtEl>
+                                        <p:attrNameLst>
+                                          <p:attrName>style.visibility</p:attrName>
+                                        </p:attrNameLst>
+                                      </p:cBhvr>
+                                      <p:to>
+                                        <p:strVal val="visible"/>
+                                      </p:to>
+                                    </p:set>
+                                  </p:childTnLst>
+                                </p:cTn>
+                              </p:par>
+                            </p:childTnLst>
+                          </p:cTn>
+                        </p:par>
+                      </p:childTnLst>
+                    </p:cTn>
+                  </p:par>
+                  <p:par>
+                    <p:cTn id="23" fill="hold">
+                      <p:stCondLst>
+                        <p:cond delay="indefinite"/>
+                      </p:stCondLst>
+                      <p:childTnLst>
+                        <p:par>
+                          <p:cTn id="24" fill="hold">
+                            <p:stCondLst>
+                              <p:cond delay="0"/>
+                            </p:stCondLst>
+                            <p:childTnLst>
+                              <p:par>
+                                <p:cTn id="25" presetID="1" presetClass="entr" presetSubtype="0" fill="hold" grpId="0" nodeType="clickEffect">
+                                  <p:stCondLst>
+                                    <p:cond delay="0"/>
+                                  </p:stCondLst>
+                                  <p:childTnLst>
+                                    <p:set>
+                                      <p:cBhvr>
+                                        <p:cTn id="26" dur="1" fill="hold">
+                                          <p:stCondLst>
+                                            <p:cond delay="0"/>
+                                          </p:stCondLst>
+                                        </p:cTn>
+                                        <p:tgtEl>
+                                          <p:spTgt spid="3">
+                                            <p:txEl>
+                                              <p:pRg st="7" end="7"/>
+                                            </p:txEl>
+                                          </p:spTgt>
+                                        </p:tgtEl>
+                                        <p:attrNameLst>
+                                          <p:attrName>style.visibility</p:attrName>
+                                        </p:attrNameLst>
+                                      </p:cBhvr>
+                                      <p:to>
+                                        <p:strVal val="visible"/>
+                                      </p:to>
+                                    </p:set>
+                                  </p:childTnLst>
+                                </p:cTn>
+                              </p:par>
+                              <p:par>
+                                <p:cTn id="27" presetID="1" presetClass="entr" presetSubtype="0" fill="hold" grpId="0" nodeType="withEffect">
+                                  <p:stCondLst>
+                                    <p:cond delay="0"/>
+                                  </p:stCondLst>
+                                  <p:childTnLst>
+                                    <p:set>
+                                      <p:cBhvr>
+                                        <p:cTn id="28" dur="1" fill="hold">
+                                          <p:stCondLst>
+                                            <p:cond delay="0"/>
+                                          </p:stCondLst>
+                                        </p:cTn>
+                                        <p:tgtEl>
+                                          <p:spTgt spid="3">
+                                            <p:txEl>
+                                              <p:pRg st="8" end="8"/>
+                                            </p:txEl>
+                                          </p:spTgt>
+                                        </p:tgtEl>
+                                        <p:attrNameLst>
+                                          <p:attrName>style.visibility</p:attrName>
+                                        </p:attrNameLst>
+                                      </p:cBhvr>
+                                      <p:to>
+                                        <p:strVal val="visible"/>
+                                      </p:to>
+                                    </p:set>
+                                  </p:childTnLst>
+                                </p:cTn>
+                              </p:par>
+                            </p:childTnLst>
+                          </p:cTn>
+                        </p:par>
+                      </p:childTnLst>
+                    </p:cTn>
+                  </p:par>
+                </p:childTnLst>
+              </p:cTn>
+              <p:prevCondLst>
+                <p:cond evt="onPrev" delay="0">
+                  <p:tgtEl>
+                    <p:sldTgt/>
+                  </p:tgtEl>
+                </p:cond>
+              </p:prevCondLst>
+              <p:nextCondLst>
+                <p:cond evt="onNext" delay="0">
+                  <p:tgtEl>
+                    <p:sldTgt/>
+                  </p:tgtEl>
+                </p:cond>
+              </p:nextCondLst>
+            </p:seq>
+          </p:childTnLst>
+        </p:cTn>
       </p:par>
     </p:tnLst>
+    <p:bldLst>
+      <p:bldP spid="3" grpId="0" uiExpand="1" build="p"/>
+    </p:bldLst>
+  </p:timing>
+</p:sld>
+</file>
+
+<file path=ppt/slides/slide12.xml><?xml version="1.0" encoding="utf-8"?>
+<p:sld xmlns:a="http://schemas.openxmlformats.org/drawingml/2006/main" xmlns:r="http://schemas.openxmlformats.org/officeDocument/2006/relationships" xmlns:p="http://schemas.openxmlformats.org/presentationml/2006/main">
+  <p:cSld>
+    <p:spTree>
+      <p:nvGrpSpPr>
+        <p:cNvPr id="1" name=""/>
+        <p:cNvGrpSpPr/>
+        <p:nvPr/>
+      </p:nvGrpSpPr>
+      <p:grpSpPr>
+        <a:xfrm>
+          <a:off x="0" y="0"/>
+          <a:ext cx="0" cy="0"/>
+          <a:chOff x="0" y="0"/>
+          <a:chExt cx="0" cy="0"/>
+        </a:xfrm>
+      </p:grpSpPr>
+      <p:sp>
+        <p:nvSpPr>
+          <p:cNvPr id="2" name="Title 1"/>
+          <p:cNvSpPr>
+            <a:spLocks noGrp="1"/>
+          </p:cNvSpPr>
+          <p:nvPr>
+            <p:ph type="title"/>
+          </p:nvPr>
+        </p:nvSpPr>
+        <p:spPr/>
+        <p:txBody>
+          <a:bodyPr/>
+          <a:lstStyle/>
+          <a:p>
+            <a:r>
+              <a:rPr lang="en-US" dirty="0" smtClean="0"/>
+              <a:t>Method implementation</a:t>
+            </a:r>
+            <a:endParaRPr lang="en-US" dirty="0"/>
+          </a:p>
+        </p:txBody>
+      </p:sp>
+      <p:sp>
+        <p:nvSpPr>
+          <p:cNvPr id="3" name="Content Placeholder 2"/>
+          <p:cNvSpPr>
+            <a:spLocks noGrp="1"/>
+          </p:cNvSpPr>
+          <p:nvPr>
+            <p:ph idx="1"/>
+          </p:nvPr>
+        </p:nvSpPr>
+        <p:spPr/>
+        <p:txBody>
+          <a:bodyPr/>
+          <a:lstStyle/>
+          <a:p>
+            <a:r>
+              <a:rPr lang="en-US" dirty="0" smtClean="0"/>
+              <a:t>When trivial, in class definition</a:t>
+            </a:r>
+          </a:p>
+          <a:p>
+            <a:pPr lvl="1"/>
+            <a:r>
+              <a:rPr lang="en-US" dirty="0" smtClean="0"/>
+              <a:t>e.g., </a:t>
+            </a:r>
+            <a:r>
+              <a:rPr lang="en-US" dirty="0" smtClean="0">
+                <a:latin typeface="Courier New" panose="02070309020205020404" pitchFamily="49" charset="0"/>
+                <a:cs typeface="Courier New" panose="02070309020205020404" pitchFamily="49" charset="0"/>
+              </a:rPr>
+              <a:t>x</a:t>
+            </a:r>
+            <a:r>
+              <a:rPr lang="en-US" dirty="0" smtClean="0"/>
+              <a:t> inspector, …, </a:t>
+            </a:r>
+            <a:r>
+              <a:rPr lang="en-US" dirty="0" smtClean="0">
+                <a:latin typeface="Courier New" panose="02070309020205020404" pitchFamily="49" charset="0"/>
+                <a:cs typeface="Courier New" panose="02070309020205020404" pitchFamily="49" charset="0"/>
+              </a:rPr>
+              <a:t>Particle</a:t>
+            </a:r>
+            <a:r>
+              <a:rPr lang="en-US" dirty="0" smtClean="0"/>
+              <a:t> constructor</a:t>
+            </a:r>
+          </a:p>
+          <a:p>
+            <a:r>
+              <a:rPr lang="en-US" dirty="0" smtClean="0"/>
+              <a:t>Otherwise, outside class definition</a:t>
+            </a:r>
+          </a:p>
+          <a:p>
+            <a:pPr lvl="1"/>
+            <a:r>
+              <a:rPr lang="en-US" dirty="0" smtClean="0"/>
+              <a:t>e.g., </a:t>
+            </a:r>
+            <a:r>
+              <a:rPr lang="en-US" dirty="0" smtClean="0">
+                <a:latin typeface="Courier New" panose="02070309020205020404" pitchFamily="49" charset="0"/>
+                <a:cs typeface="Courier New" panose="02070309020205020404" pitchFamily="49" charset="0"/>
+              </a:rPr>
+              <a:t>move</a:t>
+            </a:r>
+            <a:r>
+              <a:rPr lang="en-US" dirty="0" smtClean="0"/>
+              <a:t> </a:t>
+            </a:r>
+            <a:r>
+              <a:rPr lang="en-US" dirty="0" err="1" smtClean="0"/>
+              <a:t>mutator</a:t>
+            </a:r>
+            <a:endParaRPr lang="en-US" dirty="0"/>
+          </a:p>
+        </p:txBody>
+      </p:sp>
+      <p:sp>
+        <p:nvSpPr>
+          <p:cNvPr id="4" name="TextBox 3"/>
+          <p:cNvSpPr txBox="1"/>
+          <p:nvPr/>
+        </p:nvSpPr>
+        <p:spPr>
+          <a:xfrm>
+            <a:off x="628650" y="4239166"/>
+            <a:ext cx="7886700" cy="1323439"/>
+          </a:xfrm>
+          <a:prstGeom prst="rect">
+            <a:avLst/>
+          </a:prstGeom>
+          <a:solidFill>
+            <a:schemeClr val="bg1">
+              <a:lumMod val="75000"/>
+            </a:schemeClr>
+          </a:solidFill>
+        </p:spPr>
+        <p:txBody>
+          <a:bodyPr wrap="square" rtlCol="0">
+            <a:spAutoFit/>
+          </a:bodyPr>
+          <a:lstStyle/>
+          <a:p>
+            <a:r>
+              <a:rPr lang="fr-FR" sz="1600" dirty="0" err="1">
+                <a:latin typeface="Courier New" pitchFamily="49" charset="0"/>
+                <a:cs typeface="Courier New" pitchFamily="49" charset="0"/>
+              </a:rPr>
+              <a:t>void</a:t>
+            </a:r>
+            <a:r>
+              <a:rPr lang="fr-FR" sz="1600" dirty="0">
+                <a:latin typeface="Courier New" pitchFamily="49" charset="0"/>
+                <a:cs typeface="Courier New" pitchFamily="49" charset="0"/>
+              </a:rPr>
+              <a:t> </a:t>
+            </a:r>
+            <a:r>
+              <a:rPr lang="fr-FR" sz="1600" b="1" dirty="0" err="1">
+                <a:solidFill>
+                  <a:srgbClr val="C00000"/>
+                </a:solidFill>
+                <a:latin typeface="Courier New" pitchFamily="49" charset="0"/>
+                <a:cs typeface="Courier New" pitchFamily="49" charset="0"/>
+              </a:rPr>
+              <a:t>Particle</a:t>
+            </a:r>
+            <a:r>
+              <a:rPr lang="fr-FR" sz="1600" b="1" dirty="0">
+                <a:solidFill>
+                  <a:srgbClr val="C00000"/>
+                </a:solidFill>
+                <a:latin typeface="Courier New" pitchFamily="49" charset="0"/>
+                <a:cs typeface="Courier New" pitchFamily="49" charset="0"/>
+              </a:rPr>
+              <a:t>::</a:t>
+            </a:r>
+            <a:r>
+              <a:rPr lang="fr-FR" sz="1600" dirty="0">
+                <a:latin typeface="Courier New" pitchFamily="49" charset="0"/>
+                <a:cs typeface="Courier New" pitchFamily="49" charset="0"/>
+              </a:rPr>
+              <a:t>move(double dx, double </a:t>
+            </a:r>
+            <a:r>
+              <a:rPr lang="fr-FR" sz="1600" dirty="0" err="1">
+                <a:latin typeface="Courier New" pitchFamily="49" charset="0"/>
+                <a:cs typeface="Courier New" pitchFamily="49" charset="0"/>
+              </a:rPr>
+              <a:t>dy</a:t>
+            </a:r>
+            <a:r>
+              <a:rPr lang="fr-FR" sz="1600" dirty="0">
+                <a:latin typeface="Courier New" pitchFamily="49" charset="0"/>
+                <a:cs typeface="Courier New" pitchFamily="49" charset="0"/>
+              </a:rPr>
+              <a:t>, double dz) {</a:t>
+            </a:r>
+          </a:p>
+          <a:p>
+            <a:r>
+              <a:rPr lang="fr-FR" sz="1600" dirty="0">
+                <a:latin typeface="Courier New" pitchFamily="49" charset="0"/>
+                <a:cs typeface="Courier New" pitchFamily="49" charset="0"/>
+              </a:rPr>
+              <a:t>    _x += dx;</a:t>
+            </a:r>
+          </a:p>
+          <a:p>
+            <a:r>
+              <a:rPr lang="fr-FR" sz="1600" dirty="0">
+                <a:latin typeface="Courier New" pitchFamily="49" charset="0"/>
+                <a:cs typeface="Courier New" pitchFamily="49" charset="0"/>
+              </a:rPr>
+              <a:t>    _y += </a:t>
+            </a:r>
+            <a:r>
+              <a:rPr lang="fr-FR" sz="1600" dirty="0" err="1">
+                <a:latin typeface="Courier New" pitchFamily="49" charset="0"/>
+                <a:cs typeface="Courier New" pitchFamily="49" charset="0"/>
+              </a:rPr>
+              <a:t>dy</a:t>
+            </a:r>
+            <a:r>
+              <a:rPr lang="fr-FR" sz="1600" dirty="0">
+                <a:latin typeface="Courier New" pitchFamily="49" charset="0"/>
+                <a:cs typeface="Courier New" pitchFamily="49" charset="0"/>
+              </a:rPr>
+              <a:t>;</a:t>
+            </a:r>
+          </a:p>
+          <a:p>
+            <a:r>
+              <a:rPr lang="fr-FR" sz="1600" dirty="0">
+                <a:latin typeface="Courier New" pitchFamily="49" charset="0"/>
+                <a:cs typeface="Courier New" pitchFamily="49" charset="0"/>
+              </a:rPr>
+              <a:t>    _z += dz;</a:t>
+            </a:r>
+          </a:p>
+          <a:p>
+            <a:r>
+              <a:rPr lang="fr-FR" sz="1600" dirty="0">
+                <a:latin typeface="Courier New" pitchFamily="49" charset="0"/>
+                <a:cs typeface="Courier New" pitchFamily="49" charset="0"/>
+              </a:rPr>
+              <a:t>}</a:t>
+            </a:r>
+          </a:p>
+        </p:txBody>
+      </p:sp>
+      <p:grpSp>
+        <p:nvGrpSpPr>
+          <p:cNvPr id="5" name="Group 4"/>
+          <p:cNvGrpSpPr/>
+          <p:nvPr/>
+        </p:nvGrpSpPr>
+        <p:grpSpPr>
+          <a:xfrm>
+            <a:off x="2212256" y="3507814"/>
+            <a:ext cx="2959510" cy="790344"/>
+            <a:chOff x="-1511838" y="3501842"/>
+            <a:chExt cx="2959510" cy="790344"/>
+          </a:xfrm>
+        </p:grpSpPr>
+        <p:sp>
+          <p:nvSpPr>
+            <p:cNvPr id="6" name="TextBox 5"/>
+            <p:cNvSpPr txBox="1"/>
+            <p:nvPr/>
+          </p:nvSpPr>
+          <p:spPr>
+            <a:xfrm>
+              <a:off x="91423" y="3501842"/>
+              <a:ext cx="1356249" cy="400110"/>
+            </a:xfrm>
+            <a:prstGeom prst="rect">
+              <a:avLst/>
+            </a:prstGeom>
+            <a:solidFill>
+              <a:schemeClr val="bg1"/>
+            </a:solidFill>
+            <a:ln w="19050">
+              <a:solidFill>
+                <a:schemeClr val="tx1"/>
+              </a:solidFill>
+            </a:ln>
+          </p:spPr>
+          <p:txBody>
+            <a:bodyPr wrap="square" rtlCol="0">
+              <a:spAutoFit/>
+            </a:bodyPr>
+            <a:lstStyle/>
+            <a:p>
+              <a:r>
+                <a:rPr lang="en-US" sz="2000" dirty="0" smtClean="0"/>
+                <a:t>class name</a:t>
+              </a:r>
+              <a:endParaRPr lang="en-US" sz="2000" dirty="0">
+                <a:latin typeface="Courier New" panose="02070309020205020404" pitchFamily="49" charset="0"/>
+                <a:cs typeface="Courier New" panose="02070309020205020404" pitchFamily="49" charset="0"/>
+              </a:endParaRPr>
+            </a:p>
+          </p:txBody>
+        </p:sp>
+        <p:cxnSp>
+          <p:nvCxnSpPr>
+            <p:cNvPr id="7" name="Straight Arrow Connector 6"/>
+            <p:cNvCxnSpPr>
+              <a:stCxn id="6" idx="1"/>
+            </p:cNvCxnSpPr>
+            <p:nvPr/>
+          </p:nvCxnSpPr>
+          <p:spPr>
+            <a:xfrm flipH="1">
+              <a:off x="-1511838" y="3701897"/>
+              <a:ext cx="1603261" cy="590289"/>
+            </a:xfrm>
+            <a:prstGeom prst="straightConnector1">
+              <a:avLst/>
+            </a:prstGeom>
+            <a:ln w="19050">
+              <a:solidFill>
+                <a:schemeClr val="tx1"/>
+              </a:solidFill>
+              <a:tailEnd type="stealth" w="lg" len="lg"/>
+            </a:ln>
+          </p:spPr>
+          <p:style>
+            <a:lnRef idx="1">
+              <a:schemeClr val="accent1"/>
+            </a:lnRef>
+            <a:fillRef idx="0">
+              <a:schemeClr val="accent1"/>
+            </a:fillRef>
+            <a:effectRef idx="0">
+              <a:schemeClr val="accent1"/>
+            </a:effectRef>
+            <a:fontRef idx="minor">
+              <a:schemeClr val="tx1"/>
+            </a:fontRef>
+          </p:style>
+        </p:cxnSp>
+      </p:grpSp>
+      <p:grpSp>
+        <p:nvGrpSpPr>
+          <p:cNvPr id="11" name="Group 10"/>
+          <p:cNvGrpSpPr/>
+          <p:nvPr/>
+        </p:nvGrpSpPr>
+        <p:grpSpPr>
+          <a:xfrm>
+            <a:off x="1474840" y="5326194"/>
+            <a:ext cx="3392128" cy="625439"/>
+            <a:chOff x="-1280779" y="3276513"/>
+            <a:chExt cx="3392128" cy="625439"/>
+          </a:xfrm>
+        </p:grpSpPr>
+        <p:sp>
+          <p:nvSpPr>
+            <p:cNvPr id="12" name="TextBox 11"/>
+            <p:cNvSpPr txBox="1"/>
+            <p:nvPr/>
+          </p:nvSpPr>
+          <p:spPr>
+            <a:xfrm>
+              <a:off x="91423" y="3501842"/>
+              <a:ext cx="2019926" cy="400110"/>
+            </a:xfrm>
+            <a:prstGeom prst="rect">
+              <a:avLst/>
+            </a:prstGeom>
+            <a:solidFill>
+              <a:schemeClr val="bg1"/>
+            </a:solidFill>
+            <a:ln w="19050">
+              <a:solidFill>
+                <a:schemeClr val="tx1"/>
+              </a:solidFill>
+            </a:ln>
+          </p:spPr>
+          <p:txBody>
+            <a:bodyPr wrap="square" rtlCol="0">
+              <a:spAutoFit/>
+            </a:bodyPr>
+            <a:lstStyle/>
+            <a:p>
+              <a:r>
+                <a:rPr lang="en-US" sz="2000" dirty="0" smtClean="0"/>
+                <a:t>object attributes</a:t>
+              </a:r>
+              <a:endParaRPr lang="en-US" sz="2000" dirty="0">
+                <a:latin typeface="Courier New" panose="02070309020205020404" pitchFamily="49" charset="0"/>
+                <a:cs typeface="Courier New" panose="02070309020205020404" pitchFamily="49" charset="0"/>
+              </a:endParaRPr>
+            </a:p>
+          </p:txBody>
+        </p:sp>
+        <p:cxnSp>
+          <p:nvCxnSpPr>
+            <p:cNvPr id="13" name="Straight Arrow Connector 12"/>
+            <p:cNvCxnSpPr>
+              <a:stCxn id="12" idx="1"/>
+            </p:cNvCxnSpPr>
+            <p:nvPr/>
+          </p:nvCxnSpPr>
+          <p:spPr>
+            <a:xfrm flipH="1" flipV="1">
+              <a:off x="-1280779" y="3276513"/>
+              <a:ext cx="1372202" cy="425384"/>
+            </a:xfrm>
+            <a:prstGeom prst="straightConnector1">
+              <a:avLst/>
+            </a:prstGeom>
+            <a:ln w="19050">
+              <a:solidFill>
+                <a:schemeClr val="tx1"/>
+              </a:solidFill>
+              <a:tailEnd type="stealth" w="lg" len="lg"/>
+            </a:ln>
+          </p:spPr>
+          <p:style>
+            <a:lnRef idx="1">
+              <a:schemeClr val="accent1"/>
+            </a:lnRef>
+            <a:fillRef idx="0">
+              <a:schemeClr val="accent1"/>
+            </a:fillRef>
+            <a:effectRef idx="0">
+              <a:schemeClr val="accent1"/>
+            </a:effectRef>
+            <a:fontRef idx="minor">
+              <a:schemeClr val="tx1"/>
+            </a:fontRef>
+          </p:style>
+        </p:cxnSp>
+      </p:grpSp>
+      <p:sp>
+        <p:nvSpPr>
+          <p:cNvPr id="16" name="Slide Number Placeholder 15"/>
+          <p:cNvSpPr>
+            <a:spLocks noGrp="1"/>
+          </p:cNvSpPr>
+          <p:nvPr>
+            <p:ph type="sldNum" sz="quarter" idx="12"/>
+          </p:nvPr>
+        </p:nvSpPr>
+        <p:spPr/>
+        <p:txBody>
+          <a:bodyPr/>
+          <a:lstStyle/>
+          <a:p>
+            <a:fld id="{2F8BA72C-5DC7-4014-AC42-C5F5AAAF9B79}" type="slidenum">
+              <a:rPr lang="en-US" smtClean="0"/>
+              <a:t>12</a:t>
+            </a:fld>
+            <a:endParaRPr lang="en-US"/>
+          </a:p>
+        </p:txBody>
+      </p:sp>
+    </p:spTree>
+    <p:extLst>
+      <p:ext uri="{BB962C8B-B14F-4D97-AF65-F5344CB8AC3E}">
+        <p14:creationId xmlns:p14="http://schemas.microsoft.com/office/powerpoint/2010/main" val="3034569808"/>
+      </p:ext>
+    </p:extLst>
+  </p:cSld>
+  <p:clrMapOvr>
+    <a:masterClrMapping/>
+  </p:clrMapOvr>
+  <p:timing>
+    <p:tnLst>
+      <p:par>
+        <p:cTn id="1" dur="indefinite" restart="never" nodeType="tmRoot">
+          <p:childTnLst>
+            <p:seq concurrent="1" nextAc="seek">
+              <p:cTn id="2" dur="indefinite" nodeType="mainSeq">
+                <p:childTnLst>
+                  <p:par>
+                    <p:cTn id="3" fill="hold">
+                      <p:stCondLst>
+                        <p:cond delay="indefinite"/>
+                        <p:cond evt="onBegin" delay="0">
+                          <p:tn val="2"/>
+                        </p:cond>
+                      </p:stCondLst>
+                      <p:childTnLst>
+                        <p:par>
+                          <p:cTn id="4" fill="hold">
+                            <p:stCondLst>
+                              <p:cond delay="0"/>
+                            </p:stCondLst>
+                            <p:childTnLst>
+                              <p:par>
+                                <p:cTn id="5" presetID="1" presetClass="entr" presetSubtype="0" fill="hold" grpId="0" nodeType="withEffect">
+                                  <p:stCondLst>
+                                    <p:cond delay="0"/>
+                                  </p:stCondLst>
+                                  <p:childTnLst>
+                                    <p:set>
+                                      <p:cBhvr>
+                                        <p:cTn id="6" dur="1" fill="hold">
+                                          <p:stCondLst>
+                                            <p:cond delay="0"/>
+                                          </p:stCondLst>
+                                        </p:cTn>
+                                        <p:tgtEl>
+                                          <p:spTgt spid="3">
+                                            <p:txEl>
+                                              <p:pRg st="0" end="0"/>
+                                            </p:txEl>
+                                          </p:spTgt>
+                                        </p:tgtEl>
+                                        <p:attrNameLst>
+                                          <p:attrName>style.visibility</p:attrName>
+                                        </p:attrNameLst>
+                                      </p:cBhvr>
+                                      <p:to>
+                                        <p:strVal val="visible"/>
+                                      </p:to>
+                                    </p:set>
+                                  </p:childTnLst>
+                                </p:cTn>
+                              </p:par>
+                              <p:par>
+                                <p:cTn id="7" presetID="1" presetClass="entr" presetSubtype="0" fill="hold" grpId="0" nodeType="withEffect">
+                                  <p:stCondLst>
+                                    <p:cond delay="0"/>
+                                  </p:stCondLst>
+                                  <p:childTnLst>
+                                    <p:set>
+                                      <p:cBhvr>
+                                        <p:cTn id="8" dur="1" fill="hold">
+                                          <p:stCondLst>
+                                            <p:cond delay="0"/>
+                                          </p:stCondLst>
+                                        </p:cTn>
+                                        <p:tgtEl>
+                                          <p:spTgt spid="3">
+                                            <p:txEl>
+                                              <p:pRg st="1" end="1"/>
+                                            </p:txEl>
+                                          </p:spTgt>
+                                        </p:tgtEl>
+                                        <p:attrNameLst>
+                                          <p:attrName>style.visibility</p:attrName>
+                                        </p:attrNameLst>
+                                      </p:cBhvr>
+                                      <p:to>
+                                        <p:strVal val="visible"/>
+                                      </p:to>
+                                    </p:set>
+                                  </p:childTnLst>
+                                </p:cTn>
+                              </p:par>
+                            </p:childTnLst>
+                          </p:cTn>
+                        </p:par>
+                      </p:childTnLst>
+                    </p:cTn>
+                  </p:par>
+                  <p:par>
+                    <p:cTn id="9" fill="hold">
+                      <p:stCondLst>
+                        <p:cond delay="indefinite"/>
+                      </p:stCondLst>
+                      <p:childTnLst>
+                        <p:par>
+                          <p:cTn id="10" fill="hold">
+                            <p:stCondLst>
+                              <p:cond delay="0"/>
+                            </p:stCondLst>
+                            <p:childTnLst>
+                              <p:par>
+                                <p:cTn id="11" presetID="1" presetClass="entr" presetSubtype="0" fill="hold" grpId="0" nodeType="clickEffect">
+                                  <p:stCondLst>
+                                    <p:cond delay="0"/>
+                                  </p:stCondLst>
+                                  <p:childTnLst>
+                                    <p:set>
+                                      <p:cBhvr>
+                                        <p:cTn id="12" dur="1" fill="hold">
+                                          <p:stCondLst>
+                                            <p:cond delay="0"/>
+                                          </p:stCondLst>
+                                        </p:cTn>
+                                        <p:tgtEl>
+                                          <p:spTgt spid="3">
+                                            <p:txEl>
+                                              <p:pRg st="2" end="2"/>
+                                            </p:txEl>
+                                          </p:spTgt>
+                                        </p:tgtEl>
+                                        <p:attrNameLst>
+                                          <p:attrName>style.visibility</p:attrName>
+                                        </p:attrNameLst>
+                                      </p:cBhvr>
+                                      <p:to>
+                                        <p:strVal val="visible"/>
+                                      </p:to>
+                                    </p:set>
+                                  </p:childTnLst>
+                                </p:cTn>
+                              </p:par>
+                              <p:par>
+                                <p:cTn id="13" presetID="1" presetClass="entr" presetSubtype="0" fill="hold" grpId="0" nodeType="withEffect">
+                                  <p:stCondLst>
+                                    <p:cond delay="0"/>
+                                  </p:stCondLst>
+                                  <p:childTnLst>
+                                    <p:set>
+                                      <p:cBhvr>
+                                        <p:cTn id="14" dur="1" fill="hold">
+                                          <p:stCondLst>
+                                            <p:cond delay="0"/>
+                                          </p:stCondLst>
+                                        </p:cTn>
+                                        <p:tgtEl>
+                                          <p:spTgt spid="3">
+                                            <p:txEl>
+                                              <p:pRg st="3" end="3"/>
+                                            </p:txEl>
+                                          </p:spTgt>
+                                        </p:tgtEl>
+                                        <p:attrNameLst>
+                                          <p:attrName>style.visibility</p:attrName>
+                                        </p:attrNameLst>
+                                      </p:cBhvr>
+                                      <p:to>
+                                        <p:strVal val="visible"/>
+                                      </p:to>
+                                    </p:set>
+                                  </p:childTnLst>
+                                </p:cTn>
+                              </p:par>
+                              <p:par>
+                                <p:cTn id="15" presetID="1" presetClass="entr" presetSubtype="0" fill="hold" grpId="0" nodeType="withEffect">
+                                  <p:stCondLst>
+                                    <p:cond delay="0"/>
+                                  </p:stCondLst>
+                                  <p:childTnLst>
+                                    <p:set>
+                                      <p:cBhvr>
+                                        <p:cTn id="16" dur="1" fill="hold">
+                                          <p:stCondLst>
+                                            <p:cond delay="0"/>
+                                          </p:stCondLst>
+                                        </p:cTn>
+                                        <p:tgtEl>
+                                          <p:spTgt spid="4"/>
+                                        </p:tgtEl>
+                                        <p:attrNameLst>
+                                          <p:attrName>style.visibility</p:attrName>
+                                        </p:attrNameLst>
+                                      </p:cBhvr>
+                                      <p:to>
+                                        <p:strVal val="visible"/>
+                                      </p:to>
+                                    </p:set>
+                                  </p:childTnLst>
+                                </p:cTn>
+                              </p:par>
+                            </p:childTnLst>
+                          </p:cTn>
+                        </p:par>
+                      </p:childTnLst>
+                    </p:cTn>
+                  </p:par>
+                  <p:par>
+                    <p:cTn id="17" fill="hold">
+                      <p:stCondLst>
+                        <p:cond delay="indefinite"/>
+                      </p:stCondLst>
+                      <p:childTnLst>
+                        <p:par>
+                          <p:cTn id="18" fill="hold">
+                            <p:stCondLst>
+                              <p:cond delay="0"/>
+                            </p:stCondLst>
+                            <p:childTnLst>
+                              <p:par>
+                                <p:cTn id="19" presetID="1" presetClass="entr" presetSubtype="0" fill="hold" nodeType="clickEffect">
+                                  <p:stCondLst>
+                                    <p:cond delay="0"/>
+                                  </p:stCondLst>
+                                  <p:childTnLst>
+                                    <p:set>
+                                      <p:cBhvr>
+                                        <p:cTn id="20" dur="1" fill="hold">
+                                          <p:stCondLst>
+                                            <p:cond delay="0"/>
+                                          </p:stCondLst>
+                                        </p:cTn>
+                                        <p:tgtEl>
+                                          <p:spTgt spid="5"/>
+                                        </p:tgtEl>
+                                        <p:attrNameLst>
+                                          <p:attrName>style.visibility</p:attrName>
+                                        </p:attrNameLst>
+                                      </p:cBhvr>
+                                      <p:to>
+                                        <p:strVal val="visible"/>
+                                      </p:to>
+                                    </p:set>
+                                  </p:childTnLst>
+                                </p:cTn>
+                              </p:par>
+                            </p:childTnLst>
+                          </p:cTn>
+                        </p:par>
+                      </p:childTnLst>
+                    </p:cTn>
+                  </p:par>
+                  <p:par>
+                    <p:cTn id="21" fill="hold">
+                      <p:stCondLst>
+                        <p:cond delay="indefinite"/>
+                      </p:stCondLst>
+                      <p:childTnLst>
+                        <p:par>
+                          <p:cTn id="22" fill="hold">
+                            <p:stCondLst>
+                              <p:cond delay="0"/>
+                            </p:stCondLst>
+                            <p:childTnLst>
+                              <p:par>
+                                <p:cTn id="23" presetID="1" presetClass="entr" presetSubtype="0" fill="hold" nodeType="clickEffect">
+                                  <p:stCondLst>
+                                    <p:cond delay="0"/>
+                                  </p:stCondLst>
+                                  <p:childTnLst>
+                                    <p:set>
+                                      <p:cBhvr>
+                                        <p:cTn id="24" dur="1" fill="hold">
+                                          <p:stCondLst>
+                                            <p:cond delay="0"/>
+                                          </p:stCondLst>
+                                        </p:cTn>
+                                        <p:tgtEl>
+                                          <p:spTgt spid="11"/>
+                                        </p:tgtEl>
+                                        <p:attrNameLst>
+                                          <p:attrName>style.visibility</p:attrName>
+                                        </p:attrNameLst>
+                                      </p:cBhvr>
+                                      <p:to>
+                                        <p:strVal val="visible"/>
+                                      </p:to>
+                                    </p:set>
+                                  </p:childTnLst>
+                                </p:cTn>
+                              </p:par>
+                            </p:childTnLst>
+                          </p:cTn>
+                        </p:par>
+                      </p:childTnLst>
+                    </p:cTn>
+                  </p:par>
+                </p:childTnLst>
+              </p:cTn>
+              <p:prevCondLst>
+                <p:cond evt="onPrev" delay="0">
+                  <p:tgtEl>
+                    <p:sldTgt/>
+                  </p:tgtEl>
+                </p:cond>
+              </p:prevCondLst>
+              <p:nextCondLst>
+                <p:cond evt="onNext" delay="0">
+                  <p:tgtEl>
+                    <p:sldTgt/>
+                  </p:tgtEl>
+                </p:cond>
+              </p:nextCondLst>
+            </p:seq>
+          </p:childTnLst>
+        </p:cTn>
+      </p:par>
+    </p:tnLst>
+    <p:bldLst>
+      <p:bldP spid="3" grpId="0" uiExpand="1" build="p"/>
+      <p:bldP spid="4" grpId="0" animBg="1"/>
+    </p:bldLst>
+  </p:timing>
+</p:sld>
+</file>
+
+<file path=ppt/slides/slide13.xml><?xml version="1.0" encoding="utf-8"?>
+<p:sld xmlns:a="http://schemas.openxmlformats.org/drawingml/2006/main" xmlns:r="http://schemas.openxmlformats.org/officeDocument/2006/relationships" xmlns:p="http://schemas.openxmlformats.org/presentationml/2006/main">
+  <p:cSld>
+    <p:spTree>
+      <p:nvGrpSpPr>
+        <p:cNvPr id="1" name=""/>
+        <p:cNvGrpSpPr/>
+        <p:nvPr/>
+      </p:nvGrpSpPr>
+      <p:grpSpPr>
+        <a:xfrm>
+          <a:off x="0" y="0"/>
+          <a:ext cx="0" cy="0"/>
+          <a:chOff x="0" y="0"/>
+          <a:chExt cx="0" cy="0"/>
+        </a:xfrm>
+      </p:grpSpPr>
+      <p:sp>
+        <p:nvSpPr>
+          <p:cNvPr id="2" name="Title 1"/>
+          <p:cNvSpPr>
+            <a:spLocks noGrp="1"/>
+          </p:cNvSpPr>
+          <p:nvPr>
+            <p:ph type="title"/>
+          </p:nvPr>
+        </p:nvSpPr>
+        <p:spPr/>
+        <p:txBody>
+          <a:bodyPr/>
+          <a:lstStyle/>
+          <a:p>
+            <a:r>
+              <a:rPr lang="en-US" dirty="0" smtClean="0"/>
+              <a:t>Using class and objects</a:t>
+            </a:r>
+            <a:endParaRPr lang="en-US" dirty="0"/>
+          </a:p>
+        </p:txBody>
+      </p:sp>
+      <p:sp>
+        <p:nvSpPr>
+          <p:cNvPr id="3" name="Content Placeholder 2"/>
+          <p:cNvSpPr>
+            <a:spLocks noGrp="1"/>
+          </p:cNvSpPr>
+          <p:nvPr>
+            <p:ph idx="1"/>
+          </p:nvPr>
+        </p:nvSpPr>
+        <p:spPr/>
+        <p:txBody>
+          <a:bodyPr/>
+          <a:lstStyle/>
+          <a:p>
+            <a:r>
+              <a:rPr lang="en-US" dirty="0" smtClean="0"/>
+              <a:t>Constructing a new </a:t>
+            </a:r>
+            <a:r>
+              <a:rPr lang="en-US" dirty="0" smtClean="0">
+                <a:latin typeface="Courier New" panose="02070309020205020404" pitchFamily="49" charset="0"/>
+                <a:cs typeface="Courier New" panose="02070309020205020404" pitchFamily="49" charset="0"/>
+              </a:rPr>
+              <a:t>Particle</a:t>
+            </a:r>
+            <a:r>
+              <a:rPr lang="en-US" dirty="0" smtClean="0"/>
+              <a:t> object</a:t>
+            </a:r>
+          </a:p>
+          <a:p>
+            <a:endParaRPr lang="en-US" dirty="0"/>
+          </a:p>
+          <a:p>
+            <a:endParaRPr lang="en-US" dirty="0" smtClean="0"/>
+          </a:p>
+          <a:p>
+            <a:r>
+              <a:rPr lang="en-US" dirty="0" smtClean="0"/>
+              <a:t>Calling inspectors</a:t>
+            </a:r>
+          </a:p>
+          <a:p>
+            <a:endParaRPr lang="en-US" dirty="0"/>
+          </a:p>
+          <a:p>
+            <a:endParaRPr lang="en-US" dirty="0" smtClean="0"/>
+          </a:p>
+          <a:p>
+            <a:r>
+              <a:rPr lang="en-US" dirty="0" smtClean="0"/>
+              <a:t>Calling </a:t>
+            </a:r>
+            <a:r>
+              <a:rPr lang="en-US" dirty="0" err="1" smtClean="0"/>
+              <a:t>mutator</a:t>
+            </a:r>
+            <a:endParaRPr lang="en-US" dirty="0"/>
+          </a:p>
+        </p:txBody>
+      </p:sp>
+      <p:sp>
+        <p:nvSpPr>
+          <p:cNvPr id="4" name="TextBox 3"/>
+          <p:cNvSpPr txBox="1"/>
+          <p:nvPr/>
+        </p:nvSpPr>
+        <p:spPr>
+          <a:xfrm>
+            <a:off x="628650" y="2361206"/>
+            <a:ext cx="5673827" cy="830997"/>
+          </a:xfrm>
+          <a:prstGeom prst="rect">
+            <a:avLst/>
+          </a:prstGeom>
+          <a:solidFill>
+            <a:schemeClr val="bg1">
+              <a:lumMod val="75000"/>
+            </a:schemeClr>
+          </a:solidFill>
+        </p:spPr>
+        <p:txBody>
+          <a:bodyPr wrap="square" rtlCol="0">
+            <a:spAutoFit/>
+          </a:bodyPr>
+          <a:lstStyle/>
+          <a:p>
+            <a:r>
+              <a:rPr lang="fr-FR" sz="1600" dirty="0" smtClean="0">
+                <a:latin typeface="Courier New" pitchFamily="49" charset="0"/>
+                <a:cs typeface="Courier New" pitchFamily="49" charset="0"/>
+              </a:rPr>
+              <a:t>…</a:t>
+            </a:r>
+          </a:p>
+          <a:p>
+            <a:r>
+              <a:rPr lang="fr-FR" sz="1600" dirty="0" err="1" smtClean="0">
+                <a:latin typeface="Courier New" pitchFamily="49" charset="0"/>
+                <a:cs typeface="Courier New" pitchFamily="49" charset="0"/>
+              </a:rPr>
+              <a:t>Particle</a:t>
+            </a:r>
+            <a:r>
+              <a:rPr lang="fr-FR" sz="1600" dirty="0" smtClean="0">
+                <a:latin typeface="Courier New" pitchFamily="49" charset="0"/>
+                <a:cs typeface="Courier New" pitchFamily="49" charset="0"/>
+              </a:rPr>
+              <a:t> p(0.3, 0.5, 0.7, 1.0, -1);</a:t>
+            </a:r>
+          </a:p>
+          <a:p>
+            <a:r>
+              <a:rPr lang="fr-FR" sz="1600" dirty="0" smtClean="0">
+                <a:latin typeface="Courier New" pitchFamily="49" charset="0"/>
+                <a:cs typeface="Courier New" pitchFamily="49" charset="0"/>
+              </a:rPr>
+              <a:t>…</a:t>
+            </a:r>
+            <a:endParaRPr lang="fr-FR" sz="1600" dirty="0">
+              <a:latin typeface="Courier New" pitchFamily="49" charset="0"/>
+              <a:cs typeface="Courier New" pitchFamily="49" charset="0"/>
+            </a:endParaRPr>
+          </a:p>
+        </p:txBody>
+      </p:sp>
+      <p:sp>
+        <p:nvSpPr>
+          <p:cNvPr id="5" name="TextBox 4"/>
+          <p:cNvSpPr txBox="1"/>
+          <p:nvPr/>
+        </p:nvSpPr>
+        <p:spPr>
+          <a:xfrm>
+            <a:off x="628650" y="3832017"/>
+            <a:ext cx="5673827" cy="830997"/>
+          </a:xfrm>
+          <a:prstGeom prst="rect">
+            <a:avLst/>
+          </a:prstGeom>
+          <a:solidFill>
+            <a:schemeClr val="bg1">
+              <a:lumMod val="75000"/>
+            </a:schemeClr>
+          </a:solidFill>
+        </p:spPr>
+        <p:txBody>
+          <a:bodyPr wrap="square" rtlCol="0">
+            <a:spAutoFit/>
+          </a:bodyPr>
+          <a:lstStyle/>
+          <a:p>
+            <a:r>
+              <a:rPr lang="fr-FR" sz="1600" dirty="0" smtClean="0">
+                <a:latin typeface="Courier New" pitchFamily="49" charset="0"/>
+                <a:cs typeface="Courier New" pitchFamily="49" charset="0"/>
+              </a:rPr>
+              <a:t>…</a:t>
+            </a:r>
+          </a:p>
+          <a:p>
+            <a:r>
+              <a:rPr lang="fr-FR" sz="1600" dirty="0" smtClean="0">
+                <a:latin typeface="Courier New" pitchFamily="49" charset="0"/>
+                <a:cs typeface="Courier New" pitchFamily="49" charset="0"/>
+              </a:rPr>
+              <a:t>cout &lt;&lt; "(" &lt;&lt; </a:t>
+            </a:r>
+            <a:r>
+              <a:rPr lang="fr-FR" sz="1600" dirty="0" err="1" smtClean="0">
+                <a:latin typeface="Courier New" pitchFamily="49" charset="0"/>
+                <a:cs typeface="Courier New" pitchFamily="49" charset="0"/>
+              </a:rPr>
+              <a:t>p.x</a:t>
+            </a:r>
+            <a:r>
+              <a:rPr lang="fr-FR" sz="1600" dirty="0" smtClean="0">
+                <a:latin typeface="Courier New" pitchFamily="49" charset="0"/>
+                <a:cs typeface="Courier New" pitchFamily="49" charset="0"/>
+              </a:rPr>
+              <a:t>() &lt;&lt; ", " &lt;&lt; </a:t>
+            </a:r>
+            <a:r>
+              <a:rPr lang="fr-FR" sz="1600" dirty="0" err="1" smtClean="0">
+                <a:latin typeface="Courier New" pitchFamily="49" charset="0"/>
+                <a:cs typeface="Courier New" pitchFamily="49" charset="0"/>
+              </a:rPr>
+              <a:t>p.y</a:t>
+            </a:r>
+            <a:r>
+              <a:rPr lang="fr-FR" sz="1600" dirty="0" smtClean="0">
+                <a:latin typeface="Courier New" pitchFamily="49" charset="0"/>
+                <a:cs typeface="Courier New" pitchFamily="49" charset="0"/>
+              </a:rPr>
+              <a:t>() &lt;&lt; …;</a:t>
+            </a:r>
+          </a:p>
+          <a:p>
+            <a:r>
+              <a:rPr lang="fr-FR" sz="1600" dirty="0" smtClean="0">
+                <a:latin typeface="Courier New" pitchFamily="49" charset="0"/>
+                <a:cs typeface="Courier New" pitchFamily="49" charset="0"/>
+              </a:rPr>
+              <a:t>…</a:t>
+            </a:r>
+            <a:endParaRPr lang="fr-FR" sz="1600" dirty="0">
+              <a:latin typeface="Courier New" pitchFamily="49" charset="0"/>
+              <a:cs typeface="Courier New" pitchFamily="49" charset="0"/>
+            </a:endParaRPr>
+          </a:p>
+        </p:txBody>
+      </p:sp>
+      <p:sp>
+        <p:nvSpPr>
+          <p:cNvPr id="6" name="TextBox 5"/>
+          <p:cNvSpPr txBox="1"/>
+          <p:nvPr/>
+        </p:nvSpPr>
+        <p:spPr>
+          <a:xfrm>
+            <a:off x="628650" y="5441382"/>
+            <a:ext cx="5752485" cy="830997"/>
+          </a:xfrm>
+          <a:prstGeom prst="rect">
+            <a:avLst/>
+          </a:prstGeom>
+          <a:solidFill>
+            <a:schemeClr val="bg1">
+              <a:lumMod val="75000"/>
+            </a:schemeClr>
+          </a:solidFill>
+        </p:spPr>
+        <p:txBody>
+          <a:bodyPr wrap="square" rtlCol="0">
+            <a:spAutoFit/>
+          </a:bodyPr>
+          <a:lstStyle/>
+          <a:p>
+            <a:r>
+              <a:rPr lang="fr-FR" sz="1600" dirty="0" smtClean="0">
+                <a:latin typeface="Courier New" pitchFamily="49" charset="0"/>
+                <a:cs typeface="Courier New" pitchFamily="49" charset="0"/>
+              </a:rPr>
+              <a:t>…</a:t>
+            </a:r>
+          </a:p>
+          <a:p>
+            <a:r>
+              <a:rPr lang="fr-FR" sz="1600" dirty="0" err="1" smtClean="0">
+                <a:latin typeface="Courier New" pitchFamily="49" charset="0"/>
+                <a:cs typeface="Courier New" pitchFamily="49" charset="0"/>
+              </a:rPr>
+              <a:t>p.move</a:t>
+            </a:r>
+            <a:r>
+              <a:rPr lang="fr-FR" sz="1600" dirty="0" smtClean="0">
+                <a:latin typeface="Courier New" pitchFamily="49" charset="0"/>
+                <a:cs typeface="Courier New" pitchFamily="49" charset="0"/>
+              </a:rPr>
+              <a:t>(0.5, 0.5, 0.5);</a:t>
+            </a:r>
+          </a:p>
+          <a:p>
+            <a:r>
+              <a:rPr lang="fr-FR" sz="1600" dirty="0" smtClean="0">
+                <a:latin typeface="Courier New" pitchFamily="49" charset="0"/>
+                <a:cs typeface="Courier New" pitchFamily="49" charset="0"/>
+              </a:rPr>
+              <a:t>…</a:t>
+            </a:r>
+            <a:endParaRPr lang="fr-FR" sz="1600" dirty="0">
+              <a:latin typeface="Courier New" pitchFamily="49" charset="0"/>
+              <a:cs typeface="Courier New" pitchFamily="49" charset="0"/>
+            </a:endParaRPr>
+          </a:p>
+        </p:txBody>
+      </p:sp>
+      <p:sp>
+        <p:nvSpPr>
+          <p:cNvPr id="7" name="Slide Number Placeholder 6"/>
+          <p:cNvSpPr>
+            <a:spLocks noGrp="1"/>
+          </p:cNvSpPr>
+          <p:nvPr>
+            <p:ph type="sldNum" sz="quarter" idx="12"/>
+          </p:nvPr>
+        </p:nvSpPr>
+        <p:spPr/>
+        <p:txBody>
+          <a:bodyPr/>
+          <a:lstStyle/>
+          <a:p>
+            <a:fld id="{2F8BA72C-5DC7-4014-AC42-C5F5AAAF9B79}" type="slidenum">
+              <a:rPr lang="en-US" smtClean="0"/>
+              <a:t>13</a:t>
+            </a:fld>
+            <a:endParaRPr lang="en-US"/>
+          </a:p>
+        </p:txBody>
+      </p:sp>
+    </p:spTree>
+    <p:extLst>
+      <p:ext uri="{BB962C8B-B14F-4D97-AF65-F5344CB8AC3E}">
+        <p14:creationId xmlns:p14="http://schemas.microsoft.com/office/powerpoint/2010/main" val="3661714082"/>
+      </p:ext>
+    </p:extLst>
+  </p:cSld>
+  <p:clrMapOvr>
+    <a:masterClrMapping/>
+  </p:clrMapOvr>
+  <p:timing>
+    <p:tnLst>
+      <p:par>
+        <p:cTn id="1" dur="indefinite" restart="never" nodeType="tmRoot">
+          <p:childTnLst>
+            <p:seq concurrent="1" nextAc="seek">
+              <p:cTn id="2" dur="indefinite" nodeType="mainSeq">
+                <p:childTnLst>
+                  <p:par>
+                    <p:cTn id="3" fill="hold">
+                      <p:stCondLst>
+                        <p:cond delay="indefinite"/>
+                        <p:cond evt="onBegin" delay="0">
+                          <p:tn val="2"/>
+                        </p:cond>
+                      </p:stCondLst>
+                      <p:childTnLst>
+                        <p:par>
+                          <p:cTn id="4" fill="hold">
+                            <p:stCondLst>
+                              <p:cond delay="0"/>
+                            </p:stCondLst>
+                            <p:childTnLst>
+                              <p:par>
+                                <p:cTn id="5" presetID="1" presetClass="entr" presetSubtype="0" fill="hold" grpId="0" nodeType="withEffect">
+                                  <p:stCondLst>
+                                    <p:cond delay="0"/>
+                                  </p:stCondLst>
+                                  <p:childTnLst>
+                                    <p:set>
+                                      <p:cBhvr>
+                                        <p:cTn id="6" dur="1" fill="hold">
+                                          <p:stCondLst>
+                                            <p:cond delay="0"/>
+                                          </p:stCondLst>
+                                        </p:cTn>
+                                        <p:tgtEl>
+                                          <p:spTgt spid="3">
+                                            <p:txEl>
+                                              <p:pRg st="0" end="0"/>
+                                            </p:txEl>
+                                          </p:spTgt>
+                                        </p:tgtEl>
+                                        <p:attrNameLst>
+                                          <p:attrName>style.visibility</p:attrName>
+                                        </p:attrNameLst>
+                                      </p:cBhvr>
+                                      <p:to>
+                                        <p:strVal val="visible"/>
+                                      </p:to>
+                                    </p:set>
+                                  </p:childTnLst>
+                                </p:cTn>
+                              </p:par>
+                              <p:par>
+                                <p:cTn id="7" presetID="1" presetClass="entr" presetSubtype="0" fill="hold" grpId="0" nodeType="withEffect">
+                                  <p:stCondLst>
+                                    <p:cond delay="0"/>
+                                  </p:stCondLst>
+                                  <p:childTnLst>
+                                    <p:set>
+                                      <p:cBhvr>
+                                        <p:cTn id="8" dur="1" fill="hold">
+                                          <p:stCondLst>
+                                            <p:cond delay="0"/>
+                                          </p:stCondLst>
+                                        </p:cTn>
+                                        <p:tgtEl>
+                                          <p:spTgt spid="4"/>
+                                        </p:tgtEl>
+                                        <p:attrNameLst>
+                                          <p:attrName>style.visibility</p:attrName>
+                                        </p:attrNameLst>
+                                      </p:cBhvr>
+                                      <p:to>
+                                        <p:strVal val="visible"/>
+                                      </p:to>
+                                    </p:set>
+                                  </p:childTnLst>
+                                </p:cTn>
+                              </p:par>
+                            </p:childTnLst>
+                          </p:cTn>
+                        </p:par>
+                      </p:childTnLst>
+                    </p:cTn>
+                  </p:par>
+                  <p:par>
+                    <p:cTn id="9" fill="hold">
+                      <p:stCondLst>
+                        <p:cond delay="indefinite"/>
+                      </p:stCondLst>
+                      <p:childTnLst>
+                        <p:par>
+                          <p:cTn id="10" fill="hold">
+                            <p:stCondLst>
+                              <p:cond delay="0"/>
+                            </p:stCondLst>
+                            <p:childTnLst>
+                              <p:par>
+                                <p:cTn id="11" presetID="1" presetClass="entr" presetSubtype="0" fill="hold" grpId="0" nodeType="clickEffect">
+                                  <p:stCondLst>
+                                    <p:cond delay="0"/>
+                                  </p:stCondLst>
+                                  <p:childTnLst>
+                                    <p:set>
+                                      <p:cBhvr>
+                                        <p:cTn id="12" dur="1" fill="hold">
+                                          <p:stCondLst>
+                                            <p:cond delay="0"/>
+                                          </p:stCondLst>
+                                        </p:cTn>
+                                        <p:tgtEl>
+                                          <p:spTgt spid="3">
+                                            <p:txEl>
+                                              <p:pRg st="3" end="3"/>
+                                            </p:txEl>
+                                          </p:spTgt>
+                                        </p:tgtEl>
+                                        <p:attrNameLst>
+                                          <p:attrName>style.visibility</p:attrName>
+                                        </p:attrNameLst>
+                                      </p:cBhvr>
+                                      <p:to>
+                                        <p:strVal val="visible"/>
+                                      </p:to>
+                                    </p:set>
+                                  </p:childTnLst>
+                                </p:cTn>
+                              </p:par>
+                              <p:par>
+                                <p:cTn id="13" presetID="1" presetClass="entr" presetSubtype="0" fill="hold" grpId="0" nodeType="withEffect">
+                                  <p:stCondLst>
+                                    <p:cond delay="0"/>
+                                  </p:stCondLst>
+                                  <p:childTnLst>
+                                    <p:set>
+                                      <p:cBhvr>
+                                        <p:cTn id="14" dur="1" fill="hold">
+                                          <p:stCondLst>
+                                            <p:cond delay="0"/>
+                                          </p:stCondLst>
+                                        </p:cTn>
+                                        <p:tgtEl>
+                                          <p:spTgt spid="5"/>
+                                        </p:tgtEl>
+                                        <p:attrNameLst>
+                                          <p:attrName>style.visibility</p:attrName>
+                                        </p:attrNameLst>
+                                      </p:cBhvr>
+                                      <p:to>
+                                        <p:strVal val="visible"/>
+                                      </p:to>
+                                    </p:set>
+                                  </p:childTnLst>
+                                </p:cTn>
+                              </p:par>
+                            </p:childTnLst>
+                          </p:cTn>
+                        </p:par>
+                      </p:childTnLst>
+                    </p:cTn>
+                  </p:par>
+                  <p:par>
+                    <p:cTn id="15" fill="hold">
+                      <p:stCondLst>
+                        <p:cond delay="indefinite"/>
+                      </p:stCondLst>
+                      <p:childTnLst>
+                        <p:par>
+                          <p:cTn id="16" fill="hold">
+                            <p:stCondLst>
+                              <p:cond delay="0"/>
+                            </p:stCondLst>
+                            <p:childTnLst>
+                              <p:par>
+                                <p:cTn id="17" presetID="1" presetClass="entr" presetSubtype="0" fill="hold" grpId="0" nodeType="clickEffect">
+                                  <p:stCondLst>
+                                    <p:cond delay="0"/>
+                                  </p:stCondLst>
+                                  <p:childTnLst>
+                                    <p:set>
+                                      <p:cBhvr>
+                                        <p:cTn id="18" dur="1" fill="hold">
+                                          <p:stCondLst>
+                                            <p:cond delay="0"/>
+                                          </p:stCondLst>
+                                        </p:cTn>
+                                        <p:tgtEl>
+                                          <p:spTgt spid="3">
+                                            <p:txEl>
+                                              <p:pRg st="6" end="6"/>
+                                            </p:txEl>
+                                          </p:spTgt>
+                                        </p:tgtEl>
+                                        <p:attrNameLst>
+                                          <p:attrName>style.visibility</p:attrName>
+                                        </p:attrNameLst>
+                                      </p:cBhvr>
+                                      <p:to>
+                                        <p:strVal val="visible"/>
+                                      </p:to>
+                                    </p:set>
+                                  </p:childTnLst>
+                                </p:cTn>
+                              </p:par>
+                              <p:par>
+                                <p:cTn id="19" presetID="1" presetClass="entr" presetSubtype="0" fill="hold" grpId="0" nodeType="withEffect">
+                                  <p:stCondLst>
+                                    <p:cond delay="0"/>
+                                  </p:stCondLst>
+                                  <p:childTnLst>
+                                    <p:set>
+                                      <p:cBhvr>
+                                        <p:cTn id="20" dur="1" fill="hold">
+                                          <p:stCondLst>
+                                            <p:cond delay="0"/>
+                                          </p:stCondLst>
+                                        </p:cTn>
+                                        <p:tgtEl>
+                                          <p:spTgt spid="6"/>
+                                        </p:tgtEl>
+                                        <p:attrNameLst>
+                                          <p:attrName>style.visibility</p:attrName>
+                                        </p:attrNameLst>
+                                      </p:cBhvr>
+                                      <p:to>
+                                        <p:strVal val="visible"/>
+                                      </p:to>
+                                    </p:set>
+                                  </p:childTnLst>
+                                </p:cTn>
+                              </p:par>
+                            </p:childTnLst>
+                          </p:cTn>
+                        </p:par>
+                      </p:childTnLst>
+                    </p:cTn>
+                  </p:par>
+                </p:childTnLst>
+              </p:cTn>
+              <p:prevCondLst>
+                <p:cond evt="onPrev" delay="0">
+                  <p:tgtEl>
+                    <p:sldTgt/>
+                  </p:tgtEl>
+                </p:cond>
+              </p:prevCondLst>
+              <p:nextCondLst>
+                <p:cond evt="onNext" delay="0">
+                  <p:tgtEl>
+                    <p:sldTgt/>
+                  </p:tgtEl>
+                </p:cond>
+              </p:nextCondLst>
+            </p:seq>
+          </p:childTnLst>
+        </p:cTn>
+      </p:par>
+    </p:tnLst>
+    <p:bldLst>
+      <p:bldP spid="3" grpId="0" uiExpand="1" build="p"/>
+      <p:bldP spid="4" grpId="0" animBg="1"/>
+      <p:bldP spid="5" grpId="0" animBg="1"/>
+      <p:bldP spid="6" grpId="0" animBg="1"/>
+    </p:bldLst>
+  </p:timing>
+</p:sld>
+</file>
+
+<file path=ppt/slides/slide14.xml><?xml version="1.0" encoding="utf-8"?>
+<p:sld xmlns:a="http://schemas.openxmlformats.org/drawingml/2006/main" xmlns:r="http://schemas.openxmlformats.org/officeDocument/2006/relationships" xmlns:p="http://schemas.openxmlformats.org/presentationml/2006/main">
+  <p:cSld>
+    <p:spTree>
+      <p:nvGrpSpPr>
+        <p:cNvPr id="1" name=""/>
+        <p:cNvGrpSpPr/>
+        <p:nvPr/>
+      </p:nvGrpSpPr>
+      <p:grpSpPr>
+        <a:xfrm>
+          <a:off x="0" y="0"/>
+          <a:ext cx="0" cy="0"/>
+          <a:chOff x="0" y="0"/>
+          <a:chExt cx="0" cy="0"/>
+        </a:xfrm>
+      </p:grpSpPr>
+      <p:sp>
+        <p:nvSpPr>
+          <p:cNvPr id="2" name="Title 1"/>
+          <p:cNvSpPr>
+            <a:spLocks noGrp="1"/>
+          </p:cNvSpPr>
+          <p:nvPr>
+            <p:ph type="title"/>
+          </p:nvPr>
+        </p:nvSpPr>
+        <p:spPr/>
+        <p:txBody>
+          <a:bodyPr/>
+          <a:lstStyle/>
+          <a:p>
+            <a:r>
+              <a:rPr lang="en-US" dirty="0" smtClean="0"/>
+              <a:t>Another method</a:t>
+            </a:r>
+            <a:endParaRPr lang="en-US" dirty="0"/>
+          </a:p>
+        </p:txBody>
+      </p:sp>
+      <p:sp>
+        <p:nvSpPr>
+          <p:cNvPr id="3" name="Content Placeholder 2"/>
+          <p:cNvSpPr>
+            <a:spLocks noGrp="1"/>
+          </p:cNvSpPr>
+          <p:nvPr>
+            <p:ph idx="1"/>
+          </p:nvPr>
+        </p:nvSpPr>
+        <p:spPr>
+          <a:xfrm>
+            <a:off x="628650" y="1825624"/>
+            <a:ext cx="7886700" cy="4811149"/>
+          </a:xfrm>
+        </p:spPr>
+        <p:txBody>
+          <a:bodyPr>
+            <a:normAutofit/>
+          </a:bodyPr>
+          <a:lstStyle/>
+          <a:p>
+            <a:r>
+              <a:rPr lang="en-US" dirty="0" smtClean="0"/>
+              <a:t>Declaration</a:t>
+            </a:r>
+          </a:p>
+          <a:p>
+            <a:endParaRPr lang="en-US" dirty="0"/>
+          </a:p>
+          <a:p>
+            <a:endParaRPr lang="en-US" dirty="0" smtClean="0"/>
+          </a:p>
+          <a:p>
+            <a:endParaRPr lang="en-US" dirty="0"/>
+          </a:p>
+          <a:p>
+            <a:r>
+              <a:rPr lang="en-US" dirty="0" smtClean="0"/>
+              <a:t>Implementation</a:t>
+            </a:r>
+          </a:p>
+          <a:p>
+            <a:endParaRPr lang="en-US" dirty="0"/>
+          </a:p>
+          <a:p>
+            <a:endParaRPr lang="en-US" dirty="0" smtClean="0"/>
+          </a:p>
+          <a:p>
+            <a:endParaRPr lang="en-US" dirty="0"/>
+          </a:p>
+          <a:p>
+            <a:r>
+              <a:rPr lang="en-US" dirty="0" smtClean="0"/>
+              <a:t>Use</a:t>
+            </a:r>
+            <a:endParaRPr lang="en-US" dirty="0"/>
+          </a:p>
+        </p:txBody>
+      </p:sp>
+      <p:sp>
+        <p:nvSpPr>
+          <p:cNvPr id="5" name="TextBox 4"/>
+          <p:cNvSpPr txBox="1"/>
+          <p:nvPr/>
+        </p:nvSpPr>
+        <p:spPr>
+          <a:xfrm>
+            <a:off x="628650" y="2292370"/>
+            <a:ext cx="6657053" cy="1569660"/>
+          </a:xfrm>
+          <a:prstGeom prst="rect">
+            <a:avLst/>
+          </a:prstGeom>
+          <a:solidFill>
+            <a:schemeClr val="bg1">
+              <a:lumMod val="75000"/>
+            </a:schemeClr>
+          </a:solidFill>
+        </p:spPr>
+        <p:txBody>
+          <a:bodyPr wrap="square" rtlCol="0">
+            <a:spAutoFit/>
+          </a:bodyPr>
+          <a:lstStyle/>
+          <a:p>
+            <a:r>
+              <a:rPr lang="en-US" sz="1600" dirty="0" smtClean="0">
+                <a:latin typeface="Courier New" pitchFamily="49" charset="0"/>
+                <a:cs typeface="Courier New" pitchFamily="49" charset="0"/>
+              </a:rPr>
+              <a:t>class Particle {</a:t>
+            </a:r>
+          </a:p>
+          <a:p>
+            <a:r>
+              <a:rPr lang="en-US" sz="1600" dirty="0">
+                <a:latin typeface="Courier New" pitchFamily="49" charset="0"/>
+                <a:cs typeface="Courier New" pitchFamily="49" charset="0"/>
+              </a:rPr>
+              <a:t> </a:t>
+            </a:r>
+            <a:r>
+              <a:rPr lang="en-US" sz="1600" dirty="0" smtClean="0">
+                <a:latin typeface="Courier New" pitchFamily="49" charset="0"/>
+                <a:cs typeface="Courier New" pitchFamily="49" charset="0"/>
+              </a:rPr>
+              <a:t>   …</a:t>
+            </a:r>
+          </a:p>
+          <a:p>
+            <a:r>
+              <a:rPr lang="en-US" sz="1600" dirty="0" smtClean="0">
+                <a:latin typeface="Courier New" pitchFamily="49" charset="0"/>
+                <a:cs typeface="Courier New" pitchFamily="49" charset="0"/>
+              </a:rPr>
+              <a:t>    </a:t>
+            </a:r>
+            <a:r>
+              <a:rPr lang="en-US" sz="1600" dirty="0">
+                <a:latin typeface="Courier New" pitchFamily="49" charset="0"/>
+                <a:cs typeface="Courier New" pitchFamily="49" charset="0"/>
+              </a:rPr>
+              <a:t>public</a:t>
+            </a:r>
+            <a:r>
+              <a:rPr lang="en-US" sz="1600" dirty="0" smtClean="0">
+                <a:latin typeface="Courier New" pitchFamily="49" charset="0"/>
+                <a:cs typeface="Courier New" pitchFamily="49" charset="0"/>
+              </a:rPr>
+              <a:t>:</a:t>
+            </a:r>
+          </a:p>
+          <a:p>
+            <a:r>
+              <a:rPr lang="en-US" sz="1600" dirty="0">
+                <a:latin typeface="Courier New" pitchFamily="49" charset="0"/>
+                <a:cs typeface="Courier New" pitchFamily="49" charset="0"/>
+              </a:rPr>
+              <a:t> </a:t>
+            </a:r>
+            <a:r>
+              <a:rPr lang="en-US" sz="1600" dirty="0" smtClean="0">
+                <a:latin typeface="Courier New" pitchFamily="49" charset="0"/>
+                <a:cs typeface="Courier New" pitchFamily="49" charset="0"/>
+              </a:rPr>
+              <a:t>       …</a:t>
+            </a:r>
+          </a:p>
+          <a:p>
+            <a:r>
+              <a:rPr lang="en-US" sz="1600" dirty="0">
+                <a:latin typeface="Courier New" pitchFamily="49" charset="0"/>
+                <a:cs typeface="Courier New" pitchFamily="49" charset="0"/>
+              </a:rPr>
+              <a:t> </a:t>
+            </a:r>
+            <a:r>
+              <a:rPr lang="en-US" sz="1600" dirty="0" smtClean="0">
+                <a:latin typeface="Courier New" pitchFamily="49" charset="0"/>
+                <a:cs typeface="Courier New" pitchFamily="49" charset="0"/>
+              </a:rPr>
+              <a:t>       double </a:t>
+            </a:r>
+            <a:r>
+              <a:rPr lang="en-US" sz="1600" dirty="0" err="1" smtClean="0">
+                <a:latin typeface="Courier New" pitchFamily="49" charset="0"/>
+                <a:cs typeface="Courier New" pitchFamily="49" charset="0"/>
+              </a:rPr>
+              <a:t>dist</a:t>
+            </a:r>
+            <a:r>
+              <a:rPr lang="en-US" sz="1600" dirty="0" smtClean="0">
+                <a:latin typeface="Courier New" pitchFamily="49" charset="0"/>
+                <a:cs typeface="Courier New" pitchFamily="49" charset="0"/>
+              </a:rPr>
+              <a:t>(</a:t>
+            </a:r>
+            <a:r>
+              <a:rPr lang="en-US" sz="1600" dirty="0" err="1" smtClean="0">
+                <a:latin typeface="Courier New" pitchFamily="49" charset="0"/>
+                <a:cs typeface="Courier New" pitchFamily="49" charset="0"/>
+              </a:rPr>
+              <a:t>const</a:t>
+            </a:r>
+            <a:r>
+              <a:rPr lang="en-US" sz="1600" dirty="0" smtClean="0">
+                <a:latin typeface="Courier New" pitchFamily="49" charset="0"/>
+                <a:cs typeface="Courier New" pitchFamily="49" charset="0"/>
+              </a:rPr>
+              <a:t> Particle&amp; other) </a:t>
+            </a:r>
+            <a:r>
+              <a:rPr lang="en-US" sz="1600" dirty="0" err="1" smtClean="0">
+                <a:latin typeface="Courier New" pitchFamily="49" charset="0"/>
+                <a:cs typeface="Courier New" pitchFamily="49" charset="0"/>
+              </a:rPr>
+              <a:t>const</a:t>
+            </a:r>
+            <a:r>
+              <a:rPr lang="en-US" sz="1600" dirty="0" smtClean="0">
+                <a:latin typeface="Courier New" pitchFamily="49" charset="0"/>
+                <a:cs typeface="Courier New" pitchFamily="49" charset="0"/>
+              </a:rPr>
+              <a:t>;</a:t>
+            </a:r>
+          </a:p>
+          <a:p>
+            <a:r>
+              <a:rPr lang="en-US" sz="1600" dirty="0" smtClean="0">
+                <a:latin typeface="Courier New" pitchFamily="49" charset="0"/>
+                <a:cs typeface="Courier New" pitchFamily="49" charset="0"/>
+              </a:rPr>
+              <a:t>};</a:t>
+            </a:r>
+            <a:endParaRPr lang="en-US" sz="1600" dirty="0">
+              <a:latin typeface="Courier New" pitchFamily="49" charset="0"/>
+              <a:cs typeface="Courier New" pitchFamily="49" charset="0"/>
+            </a:endParaRPr>
+          </a:p>
+        </p:txBody>
+      </p:sp>
+      <p:sp>
+        <p:nvSpPr>
+          <p:cNvPr id="6" name="TextBox 5"/>
+          <p:cNvSpPr txBox="1"/>
+          <p:nvPr/>
+        </p:nvSpPr>
+        <p:spPr>
+          <a:xfrm>
+            <a:off x="628650" y="4326385"/>
+            <a:ext cx="6657053" cy="1569660"/>
+          </a:xfrm>
+          <a:prstGeom prst="rect">
+            <a:avLst/>
+          </a:prstGeom>
+          <a:solidFill>
+            <a:schemeClr val="bg1">
+              <a:lumMod val="75000"/>
+            </a:schemeClr>
+          </a:solidFill>
+        </p:spPr>
+        <p:txBody>
+          <a:bodyPr wrap="square" rtlCol="0">
+            <a:spAutoFit/>
+          </a:bodyPr>
+          <a:lstStyle/>
+          <a:p>
+            <a:r>
+              <a:rPr lang="en-US" sz="1600" b="1" dirty="0" smtClean="0">
+                <a:solidFill>
+                  <a:srgbClr val="C00000"/>
+                </a:solidFill>
+                <a:latin typeface="Courier New" pitchFamily="49" charset="0"/>
+                <a:cs typeface="Courier New" pitchFamily="49" charset="0"/>
+              </a:rPr>
+              <a:t>inline</a:t>
+            </a:r>
+            <a:r>
+              <a:rPr lang="en-US" sz="1600" dirty="0" smtClean="0">
+                <a:latin typeface="Courier New" pitchFamily="49" charset="0"/>
+                <a:cs typeface="Courier New" pitchFamily="49" charset="0"/>
+              </a:rPr>
+              <a:t> double </a:t>
+            </a:r>
+            <a:r>
+              <a:rPr lang="en-US" sz="1600" dirty="0" err="1" smtClean="0">
+                <a:latin typeface="Courier New" pitchFamily="49" charset="0"/>
+                <a:cs typeface="Courier New" pitchFamily="49" charset="0"/>
+              </a:rPr>
+              <a:t>sqr</a:t>
+            </a:r>
+            <a:r>
+              <a:rPr lang="en-US" sz="1600" dirty="0" smtClean="0">
+                <a:latin typeface="Courier New" pitchFamily="49" charset="0"/>
+                <a:cs typeface="Courier New" pitchFamily="49" charset="0"/>
+              </a:rPr>
+              <a:t>(double x) { return x*x; }</a:t>
+            </a:r>
+          </a:p>
+          <a:p>
+            <a:r>
+              <a:rPr lang="en-US" sz="1600" dirty="0" smtClean="0">
+                <a:latin typeface="Courier New" pitchFamily="49" charset="0"/>
+                <a:cs typeface="Courier New" pitchFamily="49" charset="0"/>
+              </a:rPr>
+              <a:t>double </a:t>
+            </a:r>
+            <a:r>
+              <a:rPr lang="en-US" sz="1600" dirty="0">
+                <a:latin typeface="Courier New" pitchFamily="49" charset="0"/>
+                <a:cs typeface="Courier New" pitchFamily="49" charset="0"/>
+              </a:rPr>
+              <a:t>Particle::</a:t>
+            </a:r>
+            <a:r>
+              <a:rPr lang="en-US" sz="1600" dirty="0" err="1">
+                <a:latin typeface="Courier New" pitchFamily="49" charset="0"/>
+                <a:cs typeface="Courier New" pitchFamily="49" charset="0"/>
+              </a:rPr>
+              <a:t>dist</a:t>
+            </a:r>
+            <a:r>
+              <a:rPr lang="en-US" sz="1600" dirty="0">
+                <a:latin typeface="Courier New" pitchFamily="49" charset="0"/>
+                <a:cs typeface="Courier New" pitchFamily="49" charset="0"/>
+              </a:rPr>
+              <a:t>(</a:t>
+            </a:r>
+            <a:r>
+              <a:rPr lang="en-US" sz="1600" dirty="0" err="1">
+                <a:latin typeface="Courier New" pitchFamily="49" charset="0"/>
+                <a:cs typeface="Courier New" pitchFamily="49" charset="0"/>
+              </a:rPr>
+              <a:t>const</a:t>
+            </a:r>
+            <a:r>
+              <a:rPr lang="en-US" sz="1600" dirty="0">
+                <a:latin typeface="Courier New" pitchFamily="49" charset="0"/>
+                <a:cs typeface="Courier New" pitchFamily="49" charset="0"/>
+              </a:rPr>
+              <a:t> Particle&amp; other) </a:t>
+            </a:r>
+            <a:r>
+              <a:rPr lang="en-US" sz="1600" dirty="0" err="1">
+                <a:latin typeface="Courier New" pitchFamily="49" charset="0"/>
+                <a:cs typeface="Courier New" pitchFamily="49" charset="0"/>
+              </a:rPr>
+              <a:t>const</a:t>
+            </a:r>
+            <a:r>
+              <a:rPr lang="en-US" sz="1600" dirty="0">
+                <a:latin typeface="Courier New" pitchFamily="49" charset="0"/>
+                <a:cs typeface="Courier New" pitchFamily="49" charset="0"/>
+              </a:rPr>
+              <a:t> {</a:t>
+            </a:r>
+          </a:p>
+          <a:p>
+            <a:r>
+              <a:rPr lang="en-US" sz="1600" dirty="0">
+                <a:latin typeface="Courier New" pitchFamily="49" charset="0"/>
+                <a:cs typeface="Courier New" pitchFamily="49" charset="0"/>
+              </a:rPr>
+              <a:t>    return </a:t>
+            </a:r>
+            <a:r>
+              <a:rPr lang="en-US" sz="1600" dirty="0" err="1">
+                <a:latin typeface="Courier New" pitchFamily="49" charset="0"/>
+                <a:cs typeface="Courier New" pitchFamily="49" charset="0"/>
+              </a:rPr>
+              <a:t>sqrt</a:t>
+            </a:r>
+            <a:r>
+              <a:rPr lang="en-US" sz="1600" dirty="0">
+                <a:latin typeface="Courier New" pitchFamily="49" charset="0"/>
+                <a:cs typeface="Courier New" pitchFamily="49" charset="0"/>
+              </a:rPr>
+              <a:t>(</a:t>
+            </a:r>
+            <a:r>
+              <a:rPr lang="en-US" sz="1600" dirty="0" err="1">
+                <a:latin typeface="Courier New" pitchFamily="49" charset="0"/>
+                <a:cs typeface="Courier New" pitchFamily="49" charset="0"/>
+              </a:rPr>
+              <a:t>sqr</a:t>
+            </a:r>
+            <a:r>
+              <a:rPr lang="en-US" sz="1600" dirty="0">
+                <a:latin typeface="Courier New" pitchFamily="49" charset="0"/>
+                <a:cs typeface="Courier New" pitchFamily="49" charset="0"/>
+              </a:rPr>
+              <a:t>(_x - </a:t>
+            </a:r>
+            <a:r>
+              <a:rPr lang="en-US" sz="1600" dirty="0" err="1">
+                <a:latin typeface="Courier New" pitchFamily="49" charset="0"/>
+                <a:cs typeface="Courier New" pitchFamily="49" charset="0"/>
+              </a:rPr>
+              <a:t>other.x</a:t>
+            </a:r>
+            <a:r>
+              <a:rPr lang="en-US" sz="1600" dirty="0">
+                <a:latin typeface="Courier New" pitchFamily="49" charset="0"/>
+                <a:cs typeface="Courier New" pitchFamily="49" charset="0"/>
+              </a:rPr>
+              <a:t>()) + </a:t>
+            </a:r>
+          </a:p>
+          <a:p>
+            <a:r>
+              <a:rPr lang="en-US" sz="1600" dirty="0">
+                <a:latin typeface="Courier New" pitchFamily="49" charset="0"/>
+                <a:cs typeface="Courier New" pitchFamily="49" charset="0"/>
+              </a:rPr>
+              <a:t>                </a:t>
+            </a:r>
+            <a:r>
+              <a:rPr lang="en-US" sz="1600" dirty="0" err="1">
+                <a:latin typeface="Courier New" pitchFamily="49" charset="0"/>
+                <a:cs typeface="Courier New" pitchFamily="49" charset="0"/>
+              </a:rPr>
+              <a:t>sqr</a:t>
+            </a:r>
+            <a:r>
+              <a:rPr lang="en-US" sz="1600" dirty="0">
+                <a:latin typeface="Courier New" pitchFamily="49" charset="0"/>
+                <a:cs typeface="Courier New" pitchFamily="49" charset="0"/>
+              </a:rPr>
+              <a:t>(_y - </a:t>
+            </a:r>
+            <a:r>
+              <a:rPr lang="en-US" sz="1600" dirty="0" err="1">
+                <a:latin typeface="Courier New" pitchFamily="49" charset="0"/>
+                <a:cs typeface="Courier New" pitchFamily="49" charset="0"/>
+              </a:rPr>
+              <a:t>other.y</a:t>
+            </a:r>
+            <a:r>
+              <a:rPr lang="en-US" sz="1600" dirty="0">
+                <a:latin typeface="Courier New" pitchFamily="49" charset="0"/>
+                <a:cs typeface="Courier New" pitchFamily="49" charset="0"/>
+              </a:rPr>
+              <a:t>()) +</a:t>
+            </a:r>
+          </a:p>
+          <a:p>
+            <a:r>
+              <a:rPr lang="en-US" sz="1600" dirty="0">
+                <a:latin typeface="Courier New" pitchFamily="49" charset="0"/>
+                <a:cs typeface="Courier New" pitchFamily="49" charset="0"/>
+              </a:rPr>
+              <a:t>                </a:t>
+            </a:r>
+            <a:r>
+              <a:rPr lang="en-US" sz="1600" dirty="0" err="1">
+                <a:latin typeface="Courier New" pitchFamily="49" charset="0"/>
+                <a:cs typeface="Courier New" pitchFamily="49" charset="0"/>
+              </a:rPr>
+              <a:t>sqr</a:t>
+            </a:r>
+            <a:r>
+              <a:rPr lang="en-US" sz="1600" dirty="0">
+                <a:latin typeface="Courier New" pitchFamily="49" charset="0"/>
+                <a:cs typeface="Courier New" pitchFamily="49" charset="0"/>
+              </a:rPr>
+              <a:t>(_z - </a:t>
+            </a:r>
+            <a:r>
+              <a:rPr lang="en-US" sz="1600" dirty="0" err="1">
+                <a:latin typeface="Courier New" pitchFamily="49" charset="0"/>
+                <a:cs typeface="Courier New" pitchFamily="49" charset="0"/>
+              </a:rPr>
+              <a:t>other.z</a:t>
+            </a:r>
+            <a:r>
+              <a:rPr lang="en-US" sz="1600" dirty="0">
+                <a:latin typeface="Courier New" pitchFamily="49" charset="0"/>
+                <a:cs typeface="Courier New" pitchFamily="49" charset="0"/>
+              </a:rPr>
+              <a:t>()));</a:t>
+            </a:r>
+          </a:p>
+          <a:p>
+            <a:r>
+              <a:rPr lang="en-US" sz="1600" dirty="0">
+                <a:latin typeface="Courier New" pitchFamily="49" charset="0"/>
+                <a:cs typeface="Courier New" pitchFamily="49" charset="0"/>
+              </a:rPr>
+              <a:t>}</a:t>
+            </a:r>
+          </a:p>
+        </p:txBody>
+      </p:sp>
+      <p:sp>
+        <p:nvSpPr>
+          <p:cNvPr id="7" name="Slide Number Placeholder 6"/>
+          <p:cNvSpPr>
+            <a:spLocks noGrp="1"/>
+          </p:cNvSpPr>
+          <p:nvPr>
+            <p:ph type="sldNum" sz="quarter" idx="12"/>
+          </p:nvPr>
+        </p:nvSpPr>
+        <p:spPr/>
+        <p:txBody>
+          <a:bodyPr/>
+          <a:lstStyle/>
+          <a:p>
+            <a:fld id="{2F8BA72C-5DC7-4014-AC42-C5F5AAAF9B79}" type="slidenum">
+              <a:rPr lang="en-US" smtClean="0"/>
+              <a:t>14</a:t>
+            </a:fld>
+            <a:endParaRPr lang="en-US"/>
+          </a:p>
+        </p:txBody>
+      </p:sp>
+      <p:sp>
+        <p:nvSpPr>
+          <p:cNvPr id="8" name="TextBox 7"/>
+          <p:cNvSpPr txBox="1"/>
+          <p:nvPr/>
+        </p:nvSpPr>
+        <p:spPr>
+          <a:xfrm>
+            <a:off x="628650" y="6328317"/>
+            <a:ext cx="6657053" cy="338554"/>
+          </a:xfrm>
+          <a:prstGeom prst="rect">
+            <a:avLst/>
+          </a:prstGeom>
+          <a:solidFill>
+            <a:schemeClr val="bg1">
+              <a:lumMod val="75000"/>
+            </a:schemeClr>
+          </a:solidFill>
+        </p:spPr>
+        <p:txBody>
+          <a:bodyPr wrap="square" rtlCol="0">
+            <a:spAutoFit/>
+          </a:bodyPr>
+          <a:lstStyle/>
+          <a:p>
+            <a:r>
+              <a:rPr lang="en-US" sz="1600" dirty="0" smtClean="0">
+                <a:latin typeface="Courier New" pitchFamily="49" charset="0"/>
+                <a:cs typeface="Courier New" pitchFamily="49" charset="0"/>
+              </a:rPr>
+              <a:t>double r {p1.dist(p2)};</a:t>
+            </a:r>
+            <a:endParaRPr lang="en-US" sz="1600" dirty="0">
+              <a:latin typeface="Courier New" pitchFamily="49" charset="0"/>
+              <a:cs typeface="Courier New" pitchFamily="49" charset="0"/>
+            </a:endParaRPr>
+          </a:p>
+        </p:txBody>
+      </p:sp>
+      <p:sp>
+        <p:nvSpPr>
+          <p:cNvPr id="9" name="TextBox 8"/>
+          <p:cNvSpPr txBox="1"/>
+          <p:nvPr/>
+        </p:nvSpPr>
+        <p:spPr>
+          <a:xfrm>
+            <a:off x="6723421" y="4997441"/>
+            <a:ext cx="1718740" cy="1200329"/>
+          </a:xfrm>
+          <a:prstGeom prst="rect">
+            <a:avLst/>
+          </a:prstGeom>
+          <a:solidFill>
+            <a:schemeClr val="bg1"/>
+          </a:solidFill>
+          <a:ln>
+            <a:solidFill>
+              <a:schemeClr val="tx1"/>
+            </a:solidFill>
+          </a:ln>
+        </p:spPr>
+        <p:txBody>
+          <a:bodyPr wrap="none" rtlCol="0">
+            <a:spAutoFit/>
+          </a:bodyPr>
+          <a:lstStyle/>
+          <a:p>
+            <a:r>
+              <a:rPr lang="en-US" dirty="0" smtClean="0"/>
+              <a:t>Could use</a:t>
+            </a:r>
+            <a:br>
+              <a:rPr lang="en-US" dirty="0" smtClean="0"/>
+            </a:br>
+            <a:r>
+              <a:rPr lang="en-US" dirty="0" err="1" smtClean="0">
+                <a:latin typeface="Courier New" panose="02070309020205020404" pitchFamily="49" charset="0"/>
+                <a:cs typeface="Courier New" panose="02070309020205020404" pitchFamily="49" charset="0"/>
+              </a:rPr>
+              <a:t>other._x</a:t>
+            </a:r>
+            <a:r>
+              <a:rPr lang="en-US" dirty="0" smtClean="0"/>
+              <a:t>, but</a:t>
+            </a:r>
+            <a:br>
+              <a:rPr lang="en-US" dirty="0" smtClean="0"/>
+            </a:br>
+            <a:r>
+              <a:rPr lang="en-US" dirty="0" err="1" smtClean="0">
+                <a:latin typeface="Courier New" panose="02070309020205020404" pitchFamily="49" charset="0"/>
+                <a:cs typeface="Courier New" panose="02070309020205020404" pitchFamily="49" charset="0"/>
+              </a:rPr>
+              <a:t>other.x</a:t>
+            </a:r>
+            <a:r>
+              <a:rPr lang="en-US" dirty="0" smtClean="0">
+                <a:latin typeface="Courier New" panose="02070309020205020404" pitchFamily="49" charset="0"/>
+                <a:cs typeface="Courier New" panose="02070309020205020404" pitchFamily="49" charset="0"/>
+              </a:rPr>
+              <a:t>()</a:t>
+            </a:r>
+            <a:r>
+              <a:rPr lang="en-US" dirty="0" smtClean="0"/>
+              <a:t> is</a:t>
+            </a:r>
+            <a:br>
+              <a:rPr lang="en-US" dirty="0" smtClean="0"/>
+            </a:br>
+            <a:r>
+              <a:rPr lang="en-US" dirty="0" smtClean="0"/>
+              <a:t>better</a:t>
+            </a:r>
+            <a:endParaRPr lang="en-US" dirty="0"/>
+          </a:p>
+        </p:txBody>
+      </p:sp>
+    </p:spTree>
+    <p:extLst>
+      <p:ext uri="{BB962C8B-B14F-4D97-AF65-F5344CB8AC3E}">
+        <p14:creationId xmlns:p14="http://schemas.microsoft.com/office/powerpoint/2010/main" val="2393250269"/>
+      </p:ext>
+    </p:extLst>
+  </p:cSld>
+  <p:clrMapOvr>
+    <a:masterClrMapping/>
+  </p:clrMapOvr>
+  <p:timing>
+    <p:tnLst>
+      <p:par>
+        <p:cTn id="1" dur="indefinite" restart="never" nodeType="tmRoot">
+          <p:childTnLst>
+            <p:seq concurrent="1" nextAc="seek">
+              <p:cTn id="2" dur="indefinite" nodeType="mainSeq">
+                <p:childTnLst>
+                  <p:par>
+                    <p:cTn id="3" fill="hold">
+                      <p:stCondLst>
+                        <p:cond delay="indefinite"/>
+                        <p:cond evt="onBegin" delay="0">
+                          <p:tn val="2"/>
+                        </p:cond>
+                      </p:stCondLst>
+                      <p:childTnLst>
+                        <p:par>
+                          <p:cTn id="4" fill="hold">
+                            <p:stCondLst>
+                              <p:cond delay="0"/>
+                            </p:stCondLst>
+                            <p:childTnLst>
+                              <p:par>
+                                <p:cTn id="5" presetID="1" presetClass="entr" presetSubtype="0" fill="hold" grpId="0" nodeType="withEffect">
+                                  <p:stCondLst>
+                                    <p:cond delay="0"/>
+                                  </p:stCondLst>
+                                  <p:childTnLst>
+                                    <p:set>
+                                      <p:cBhvr>
+                                        <p:cTn id="6" dur="1" fill="hold">
+                                          <p:stCondLst>
+                                            <p:cond delay="0"/>
+                                          </p:stCondLst>
+                                        </p:cTn>
+                                        <p:tgtEl>
+                                          <p:spTgt spid="3">
+                                            <p:txEl>
+                                              <p:pRg st="0" end="0"/>
+                                            </p:txEl>
+                                          </p:spTgt>
+                                        </p:tgtEl>
+                                        <p:attrNameLst>
+                                          <p:attrName>style.visibility</p:attrName>
+                                        </p:attrNameLst>
+                                      </p:cBhvr>
+                                      <p:to>
+                                        <p:strVal val="visible"/>
+                                      </p:to>
+                                    </p:set>
+                                  </p:childTnLst>
+                                </p:cTn>
+                              </p:par>
+                              <p:par>
+                                <p:cTn id="7" presetID="1" presetClass="entr" presetSubtype="0" fill="hold" grpId="0" nodeType="withEffect">
+                                  <p:stCondLst>
+                                    <p:cond delay="0"/>
+                                  </p:stCondLst>
+                                  <p:childTnLst>
+                                    <p:set>
+                                      <p:cBhvr>
+                                        <p:cTn id="8" dur="1" fill="hold">
+                                          <p:stCondLst>
+                                            <p:cond delay="0"/>
+                                          </p:stCondLst>
+                                        </p:cTn>
+                                        <p:tgtEl>
+                                          <p:spTgt spid="5"/>
+                                        </p:tgtEl>
+                                        <p:attrNameLst>
+                                          <p:attrName>style.visibility</p:attrName>
+                                        </p:attrNameLst>
+                                      </p:cBhvr>
+                                      <p:to>
+                                        <p:strVal val="visible"/>
+                                      </p:to>
+                                    </p:set>
+                                  </p:childTnLst>
+                                </p:cTn>
+                              </p:par>
+                            </p:childTnLst>
+                          </p:cTn>
+                        </p:par>
+                      </p:childTnLst>
+                    </p:cTn>
+                  </p:par>
+                  <p:par>
+                    <p:cTn id="9" fill="hold">
+                      <p:stCondLst>
+                        <p:cond delay="indefinite"/>
+                      </p:stCondLst>
+                      <p:childTnLst>
+                        <p:par>
+                          <p:cTn id="10" fill="hold">
+                            <p:stCondLst>
+                              <p:cond delay="0"/>
+                            </p:stCondLst>
+                            <p:childTnLst>
+                              <p:par>
+                                <p:cTn id="11" presetID="1" presetClass="entr" presetSubtype="0" fill="hold" grpId="0" nodeType="clickEffect">
+                                  <p:stCondLst>
+                                    <p:cond delay="0"/>
+                                  </p:stCondLst>
+                                  <p:childTnLst>
+                                    <p:set>
+                                      <p:cBhvr>
+                                        <p:cTn id="12" dur="1" fill="hold">
+                                          <p:stCondLst>
+                                            <p:cond delay="0"/>
+                                          </p:stCondLst>
+                                        </p:cTn>
+                                        <p:tgtEl>
+                                          <p:spTgt spid="3">
+                                            <p:txEl>
+                                              <p:pRg st="4" end="4"/>
+                                            </p:txEl>
+                                          </p:spTgt>
+                                        </p:tgtEl>
+                                        <p:attrNameLst>
+                                          <p:attrName>style.visibility</p:attrName>
+                                        </p:attrNameLst>
+                                      </p:cBhvr>
+                                      <p:to>
+                                        <p:strVal val="visible"/>
+                                      </p:to>
+                                    </p:set>
+                                  </p:childTnLst>
+                                </p:cTn>
+                              </p:par>
+                              <p:par>
+                                <p:cTn id="13" presetID="1" presetClass="entr" presetSubtype="0" fill="hold" grpId="0" nodeType="withEffect">
+                                  <p:stCondLst>
+                                    <p:cond delay="0"/>
+                                  </p:stCondLst>
+                                  <p:childTnLst>
+                                    <p:set>
+                                      <p:cBhvr>
+                                        <p:cTn id="14" dur="1" fill="hold">
+                                          <p:stCondLst>
+                                            <p:cond delay="0"/>
+                                          </p:stCondLst>
+                                        </p:cTn>
+                                        <p:tgtEl>
+                                          <p:spTgt spid="6"/>
+                                        </p:tgtEl>
+                                        <p:attrNameLst>
+                                          <p:attrName>style.visibility</p:attrName>
+                                        </p:attrNameLst>
+                                      </p:cBhvr>
+                                      <p:to>
+                                        <p:strVal val="visible"/>
+                                      </p:to>
+                                    </p:set>
+                                  </p:childTnLst>
+                                </p:cTn>
+                              </p:par>
+                            </p:childTnLst>
+                          </p:cTn>
+                        </p:par>
+                      </p:childTnLst>
+                    </p:cTn>
+                  </p:par>
+                  <p:par>
+                    <p:cTn id="15" fill="hold">
+                      <p:stCondLst>
+                        <p:cond delay="indefinite"/>
+                      </p:stCondLst>
+                      <p:childTnLst>
+                        <p:par>
+                          <p:cTn id="16" fill="hold">
+                            <p:stCondLst>
+                              <p:cond delay="0"/>
+                            </p:stCondLst>
+                            <p:childTnLst>
+                              <p:par>
+                                <p:cTn id="17" presetID="1" presetClass="entr" presetSubtype="0" fill="hold" grpId="0" nodeType="clickEffect">
+                                  <p:stCondLst>
+                                    <p:cond delay="0"/>
+                                  </p:stCondLst>
+                                  <p:childTnLst>
+                                    <p:set>
+                                      <p:cBhvr>
+                                        <p:cTn id="18" dur="1" fill="hold">
+                                          <p:stCondLst>
+                                            <p:cond delay="0"/>
+                                          </p:stCondLst>
+                                        </p:cTn>
+                                        <p:tgtEl>
+                                          <p:spTgt spid="9"/>
+                                        </p:tgtEl>
+                                        <p:attrNameLst>
+                                          <p:attrName>style.visibility</p:attrName>
+                                        </p:attrNameLst>
+                                      </p:cBhvr>
+                                      <p:to>
+                                        <p:strVal val="visible"/>
+                                      </p:to>
+                                    </p:set>
+                                  </p:childTnLst>
+                                </p:cTn>
+                              </p:par>
+                            </p:childTnLst>
+                          </p:cTn>
+                        </p:par>
+                      </p:childTnLst>
+                    </p:cTn>
+                  </p:par>
+                  <p:par>
+                    <p:cTn id="19" fill="hold">
+                      <p:stCondLst>
+                        <p:cond delay="indefinite"/>
+                      </p:stCondLst>
+                      <p:childTnLst>
+                        <p:par>
+                          <p:cTn id="20" fill="hold">
+                            <p:stCondLst>
+                              <p:cond delay="0"/>
+                            </p:stCondLst>
+                            <p:childTnLst>
+                              <p:par>
+                                <p:cTn id="21" presetID="1" presetClass="entr" presetSubtype="0" fill="hold" grpId="0" nodeType="clickEffect">
+                                  <p:stCondLst>
+                                    <p:cond delay="0"/>
+                                  </p:stCondLst>
+                                  <p:childTnLst>
+                                    <p:set>
+                                      <p:cBhvr>
+                                        <p:cTn id="22" dur="1" fill="hold">
+                                          <p:stCondLst>
+                                            <p:cond delay="0"/>
+                                          </p:stCondLst>
+                                        </p:cTn>
+                                        <p:tgtEl>
+                                          <p:spTgt spid="3">
+                                            <p:txEl>
+                                              <p:pRg st="8" end="8"/>
+                                            </p:txEl>
+                                          </p:spTgt>
+                                        </p:tgtEl>
+                                        <p:attrNameLst>
+                                          <p:attrName>style.visibility</p:attrName>
+                                        </p:attrNameLst>
+                                      </p:cBhvr>
+                                      <p:to>
+                                        <p:strVal val="visible"/>
+                                      </p:to>
+                                    </p:set>
+                                  </p:childTnLst>
+                                </p:cTn>
+                              </p:par>
+                              <p:par>
+                                <p:cTn id="23" presetID="1" presetClass="entr" presetSubtype="0" fill="hold" grpId="0" nodeType="withEffect">
+                                  <p:stCondLst>
+                                    <p:cond delay="0"/>
+                                  </p:stCondLst>
+                                  <p:childTnLst>
+                                    <p:set>
+                                      <p:cBhvr>
+                                        <p:cTn id="24" dur="1" fill="hold">
+                                          <p:stCondLst>
+                                            <p:cond delay="0"/>
+                                          </p:stCondLst>
+                                        </p:cTn>
+                                        <p:tgtEl>
+                                          <p:spTgt spid="8"/>
+                                        </p:tgtEl>
+                                        <p:attrNameLst>
+                                          <p:attrName>style.visibility</p:attrName>
+                                        </p:attrNameLst>
+                                      </p:cBhvr>
+                                      <p:to>
+                                        <p:strVal val="visible"/>
+                                      </p:to>
+                                    </p:set>
+                                  </p:childTnLst>
+                                </p:cTn>
+                              </p:par>
+                            </p:childTnLst>
+                          </p:cTn>
+                        </p:par>
+                      </p:childTnLst>
+                    </p:cTn>
+                  </p:par>
+                </p:childTnLst>
+              </p:cTn>
+              <p:prevCondLst>
+                <p:cond evt="onPrev" delay="0">
+                  <p:tgtEl>
+                    <p:sldTgt/>
+                  </p:tgtEl>
+                </p:cond>
+              </p:prevCondLst>
+              <p:nextCondLst>
+                <p:cond evt="onNext" delay="0">
+                  <p:tgtEl>
+                    <p:sldTgt/>
+                  </p:tgtEl>
+                </p:cond>
+              </p:nextCondLst>
+            </p:seq>
+          </p:childTnLst>
+        </p:cTn>
+      </p:par>
+    </p:tnLst>
+    <p:bldLst>
+      <p:bldP spid="3" grpId="0" uiExpand="1" build="p"/>
+      <p:bldP spid="5" grpId="0" animBg="1"/>
+      <p:bldP spid="6" grpId="0" animBg="1"/>
+      <p:bldP spid="8" grpId="0" animBg="1"/>
+      <p:bldP spid="9" grpId="0" animBg="1"/>
+    </p:bldLst>
   </p:timing>
 </p:sld>
 </file>
@@ -4448,6 +7743,29 @@
               <a:t>Mathematical modelling</a:t>
             </a:r>
             <a:endParaRPr lang="en-US" sz="2400" dirty="0"/>
+          </a:p>
+        </p:txBody>
+      </p:sp>
+      <p:sp>
+        <p:nvSpPr>
+          <p:cNvPr id="4" name="Slide Number Placeholder 3"/>
+          <p:cNvSpPr>
+            <a:spLocks noGrp="1"/>
+          </p:cNvSpPr>
+          <p:nvPr>
+            <p:ph type="sldNum" sz="quarter" idx="12"/>
+          </p:nvPr>
+        </p:nvSpPr>
+        <p:spPr/>
+        <p:txBody>
+          <a:bodyPr/>
+          <a:lstStyle/>
+          <a:p>
+            <a:fld id="{2F8BA72C-5DC7-4014-AC42-C5F5AAAF9B79}" type="slidenum">
+              <a:rPr lang="en-US" smtClean="0"/>
+              <a:t>3</a:t>
+            </a:fld>
+            <a:endParaRPr lang="en-US"/>
           </a:p>
         </p:txBody>
       </p:sp>
@@ -4949,6 +8267,29 @@
           </p:style>
         </p:cxnSp>
       </p:grpSp>
+      <p:sp>
+        <p:nvSpPr>
+          <p:cNvPr id="9" name="Slide Number Placeholder 8"/>
+          <p:cNvSpPr>
+            <a:spLocks noGrp="1"/>
+          </p:cNvSpPr>
+          <p:nvPr>
+            <p:ph type="sldNum" sz="quarter" idx="12"/>
+          </p:nvPr>
+        </p:nvSpPr>
+        <p:spPr/>
+        <p:txBody>
+          <a:bodyPr/>
+          <a:lstStyle/>
+          <a:p>
+            <a:fld id="{2F8BA72C-5DC7-4014-AC42-C5F5AAAF9B79}" type="slidenum">
+              <a:rPr lang="en-US" smtClean="0"/>
+              <a:t>4</a:t>
+            </a:fld>
+            <a:endParaRPr lang="en-US"/>
+          </a:p>
+        </p:txBody>
+      </p:sp>
     </p:spTree>
     <p:extLst>
       <p:ext uri="{BB962C8B-B14F-4D97-AF65-F5344CB8AC3E}">
@@ -5781,6 +9122,29 @@
           </a:p>
         </p:txBody>
       </p:sp>
+      <p:sp>
+        <p:nvSpPr>
+          <p:cNvPr id="8" name="Slide Number Placeholder 7"/>
+          <p:cNvSpPr>
+            <a:spLocks noGrp="1"/>
+          </p:cNvSpPr>
+          <p:nvPr>
+            <p:ph type="sldNum" sz="quarter" idx="12"/>
+          </p:nvPr>
+        </p:nvSpPr>
+        <p:spPr/>
+        <p:txBody>
+          <a:bodyPr/>
+          <a:lstStyle/>
+          <a:p>
+            <a:fld id="{2F8BA72C-5DC7-4014-AC42-C5F5AAAF9B79}" type="slidenum">
+              <a:rPr lang="en-US" smtClean="0"/>
+              <a:t>5</a:t>
+            </a:fld>
+            <a:endParaRPr lang="en-US"/>
+          </a:p>
+        </p:txBody>
+      </p:sp>
     </p:spTree>
     <p:extLst>
       <p:ext uri="{BB962C8B-B14F-4D97-AF65-F5344CB8AC3E}">
@@ -6526,6 +9890,29 @@
           </p:style>
         </p:cxnSp>
       </p:grpSp>
+      <p:sp>
+        <p:nvSpPr>
+          <p:cNvPr id="9" name="Slide Number Placeholder 8"/>
+          <p:cNvSpPr>
+            <a:spLocks noGrp="1"/>
+          </p:cNvSpPr>
+          <p:nvPr>
+            <p:ph type="sldNum" sz="quarter" idx="12"/>
+          </p:nvPr>
+        </p:nvSpPr>
+        <p:spPr/>
+        <p:txBody>
+          <a:bodyPr/>
+          <a:lstStyle/>
+          <a:p>
+            <a:fld id="{2F8BA72C-5DC7-4014-AC42-C5F5AAAF9B79}" type="slidenum">
+              <a:rPr lang="en-US" smtClean="0"/>
+              <a:t>6</a:t>
+            </a:fld>
+            <a:endParaRPr lang="en-US"/>
+          </a:p>
+        </p:txBody>
+      </p:sp>
     </p:spTree>
     <p:extLst>
       <p:ext uri="{BB962C8B-B14F-4D97-AF65-F5344CB8AC3E}">
@@ -6774,6 +10161,29 @@
               <a:t>Alternative: classes</a:t>
             </a:r>
             <a:endParaRPr lang="en-US" dirty="0"/>
+          </a:p>
+        </p:txBody>
+      </p:sp>
+      <p:sp>
+        <p:nvSpPr>
+          <p:cNvPr id="4" name="Slide Number Placeholder 3"/>
+          <p:cNvSpPr>
+            <a:spLocks noGrp="1"/>
+          </p:cNvSpPr>
+          <p:nvPr>
+            <p:ph type="sldNum" sz="quarter" idx="12"/>
+          </p:nvPr>
+        </p:nvSpPr>
+        <p:spPr/>
+        <p:txBody>
+          <a:bodyPr/>
+          <a:lstStyle/>
+          <a:p>
+            <a:fld id="{2F8BA72C-5DC7-4014-AC42-C5F5AAAF9B79}" type="slidenum">
+              <a:rPr lang="en-US" smtClean="0"/>
+              <a:t>7</a:t>
+            </a:fld>
+            <a:endParaRPr lang="en-US"/>
           </a:p>
         </p:txBody>
       </p:sp>
@@ -7284,6 +10694,12 @@
               <a:t>Can also be public</a:t>
             </a:r>
           </a:p>
+          <a:p>
+            <a:r>
+              <a:rPr lang="en-US" dirty="0" smtClean="0"/>
+              <a:t>Determine state of object</a:t>
+            </a:r>
+          </a:p>
         </p:txBody>
       </p:sp>
       <p:sp>
@@ -7405,6 +10821,29 @@
               <a:latin typeface="Courier New" pitchFamily="49" charset="0"/>
               <a:cs typeface="Courier New" pitchFamily="49" charset="0"/>
             </a:endParaRPr>
+          </a:p>
+        </p:txBody>
+      </p:sp>
+      <p:sp>
+        <p:nvSpPr>
+          <p:cNvPr id="5" name="Slide Number Placeholder 4"/>
+          <p:cNvSpPr>
+            <a:spLocks noGrp="1"/>
+          </p:cNvSpPr>
+          <p:nvPr>
+            <p:ph type="sldNum" sz="quarter" idx="12"/>
+          </p:nvPr>
+        </p:nvSpPr>
+        <p:spPr/>
+        <p:txBody>
+          <a:bodyPr/>
+          <a:lstStyle/>
+          <a:p>
+            <a:fld id="{2F8BA72C-5DC7-4014-AC42-C5F5AAAF9B79}" type="slidenum">
+              <a:rPr lang="en-US" smtClean="0"/>
+              <a:t>8</a:t>
+            </a:fld>
+            <a:endParaRPr lang="en-US"/>
           </a:p>
         </p:txBody>
       </p:sp>
@@ -7603,6 +11042,55 @@
                       </p:childTnLst>
                     </p:cTn>
                   </p:par>
+                  <p:par>
+                    <p:cTn id="17" fill="hold">
+                      <p:stCondLst>
+                        <p:cond delay="indefinite"/>
+                      </p:stCondLst>
+                      <p:childTnLst>
+                        <p:par>
+                          <p:cTn id="18" fill="hold">
+                            <p:stCondLst>
+                              <p:cond delay="0"/>
+                            </p:stCondLst>
+                            <p:childTnLst>
+                              <p:par>
+                                <p:cTn id="19" presetID="1" presetClass="entr" presetSubtype="0" fill="hold" grpId="0" nodeType="clickEffect">
+                                  <p:stCondLst>
+                                    <p:cond delay="0"/>
+                                  </p:stCondLst>
+                                  <p:childTnLst>
+                                    <p:set>
+                                      <p:cBhvr>
+                                        <p:cTn id="20" dur="1" fill="hold">
+                                          <p:stCondLst>
+                                            <p:cond delay="0"/>
+                                          </p:stCondLst>
+                                        </p:cTn>
+                                        <p:tgtEl>
+                                          <p:spTgt spid="3">
+                                            <p:txEl>
+                                              <p:pRg st="7" end="7"/>
+                                            </p:txEl>
+                                          </p:spTgt>
+                                        </p:tgtEl>
+                                        <p:attrNameLst>
+                                          <p:attrName>style.visibility</p:attrName>
+                                        </p:attrNameLst>
+                                      </p:cBhvr>
+                                      <p:to>
+                                        <p:strVal val="visible"/>
+                                      </p:to>
+                                    </p:set>
+                                  </p:childTnLst>
+                                </p:cTn>
+                              </p:par>
+                            </p:childTnLst>
+                          </p:cTn>
+                        </p:par>
+                      </p:childTnLst>
+                    </p:cTn>
+                  </p:par>
                 </p:childTnLst>
               </p:cTn>
               <p:prevCondLst>
@@ -7684,7 +11172,9 @@
         </p:nvSpPr>
         <p:spPr/>
         <p:txBody>
-          <a:bodyPr/>
+          <a:bodyPr>
+            <a:normAutofit/>
+          </a:bodyPr>
           <a:lstStyle/>
           <a:p>
             <a:r>
@@ -7718,6 +11208,11 @@
               <a:rPr lang="en-US" dirty="0" smtClean="0"/>
               <a:t>Can also be private</a:t>
             </a:r>
+          </a:p>
+          <a:p>
+            <a:pPr marL="0" indent="0">
+              <a:buNone/>
+            </a:pPr>
             <a:endParaRPr lang="en-US" dirty="0"/>
           </a:p>
         </p:txBody>
@@ -8189,6 +11684,29 @@
           </p:style>
         </p:cxnSp>
       </p:grpSp>
+      <p:sp>
+        <p:nvSpPr>
+          <p:cNvPr id="17" name="Slide Number Placeholder 16"/>
+          <p:cNvSpPr>
+            <a:spLocks noGrp="1"/>
+          </p:cNvSpPr>
+          <p:nvPr>
+            <p:ph type="sldNum" sz="quarter" idx="12"/>
+          </p:nvPr>
+        </p:nvSpPr>
+        <p:spPr/>
+        <p:txBody>
+          <a:bodyPr/>
+          <a:lstStyle/>
+          <a:p>
+            <a:fld id="{2F8BA72C-5DC7-4014-AC42-C5F5AAAF9B79}" type="slidenum">
+              <a:rPr lang="en-US" smtClean="0"/>
+              <a:t>9</a:t>
+            </a:fld>
+            <a:endParaRPr lang="en-US"/>
+          </a:p>
+        </p:txBody>
+      </p:sp>
     </p:spTree>
     <p:extLst>
       <p:ext uri="{BB962C8B-B14F-4D97-AF65-F5344CB8AC3E}">
@@ -8762,4 +12280,265 @@
     </a:ext>
   </a:extLst>
 </a:theme>
+</file>
+
+<file path=ppt/theme/theme2.xml><?xml version="1.0" encoding="utf-8"?>
+<a:theme xmlns:a="http://schemas.openxmlformats.org/drawingml/2006/main" name="Office Theme">
+  <a:themeElements>
+    <a:clrScheme name="Office">
+      <a:dk1>
+        <a:sysClr val="windowText" lastClr="000000"/>
+      </a:dk1>
+      <a:lt1>
+        <a:sysClr val="window" lastClr="FFFFFF"/>
+      </a:lt1>
+      <a:dk2>
+        <a:srgbClr val="44546A"/>
+      </a:dk2>
+      <a:lt2>
+        <a:srgbClr val="E7E6E6"/>
+      </a:lt2>
+      <a:accent1>
+        <a:srgbClr val="5B9BD5"/>
+      </a:accent1>
+      <a:accent2>
+        <a:srgbClr val="ED7D31"/>
+      </a:accent2>
+      <a:accent3>
+        <a:srgbClr val="A5A5A5"/>
+      </a:accent3>
+      <a:accent4>
+        <a:srgbClr val="FFC000"/>
+      </a:accent4>
+      <a:accent5>
+        <a:srgbClr val="4472C4"/>
+      </a:accent5>
+      <a:accent6>
+        <a:srgbClr val="70AD47"/>
+      </a:accent6>
+      <a:hlink>
+        <a:srgbClr val="0563C1"/>
+      </a:hlink>
+      <a:folHlink>
+        <a:srgbClr val="954F72"/>
+      </a:folHlink>
+    </a:clrScheme>
+    <a:fontScheme name="Office">
+      <a:majorFont>
+        <a:latin typeface="Calibri Light" panose="020F0302020204030204"/>
+        <a:ea typeface=""/>
+        <a:cs typeface=""/>
+        <a:font script="Jpan" typeface="ＭＳ Ｐゴシック"/>
+        <a:font script="Hang" typeface="맑은 고딕"/>
+        <a:font script="Hans" typeface="宋体"/>
+        <a:font script="Hant" typeface="新細明體"/>
+        <a:font script="Arab" typeface="Times New Roman"/>
+        <a:font script="Hebr" typeface="Times New Roman"/>
+        <a:font script="Thai" typeface="Angsana New"/>
+        <a:font script="Ethi" typeface="Nyala"/>
+        <a:font script="Beng" typeface="Vrinda"/>
+        <a:font script="Gujr" typeface="Shruti"/>
+        <a:font script="Khmr" typeface="MoolBoran"/>
+        <a:font script="Knda" typeface="Tunga"/>
+        <a:font script="Guru" typeface="Raavi"/>
+        <a:font script="Cans" typeface="Euphemia"/>
+        <a:font script="Cher" typeface="Plantagenet Cherokee"/>
+        <a:font script="Yiii" typeface="Microsoft Yi Baiti"/>
+        <a:font script="Tibt" typeface="Microsoft Himalaya"/>
+        <a:font script="Thaa" typeface="MV Boli"/>
+        <a:font script="Deva" typeface="Mangal"/>
+        <a:font script="Telu" typeface="Gautami"/>
+        <a:font script="Taml" typeface="Latha"/>
+        <a:font script="Syrc" typeface="Estrangelo Edessa"/>
+        <a:font script="Orya" typeface="Kalinga"/>
+        <a:font script="Mlym" typeface="Kartika"/>
+        <a:font script="Laoo" typeface="DokChampa"/>
+        <a:font script="Sinh" typeface="Iskoola Pota"/>
+        <a:font script="Mong" typeface="Mongolian Baiti"/>
+        <a:font script="Viet" typeface="Times New Roman"/>
+        <a:font script="Uigh" typeface="Microsoft Uighur"/>
+        <a:font script="Geor" typeface="Sylfaen"/>
+      </a:majorFont>
+      <a:minorFont>
+        <a:latin typeface="Calibri" panose="020F0502020204030204"/>
+        <a:ea typeface=""/>
+        <a:cs typeface=""/>
+        <a:font script="Jpan" typeface="ＭＳ Ｐゴシック"/>
+        <a:font script="Hang" typeface="맑은 고딕"/>
+        <a:font script="Hans" typeface="宋体"/>
+        <a:font script="Hant" typeface="新細明體"/>
+        <a:font script="Arab" typeface="Arial"/>
+        <a:font script="Hebr" typeface="Arial"/>
+        <a:font script="Thai" typeface="Cordia New"/>
+        <a:font script="Ethi" typeface="Nyala"/>
+        <a:font script="Beng" typeface="Vrinda"/>
+        <a:font script="Gujr" typeface="Shruti"/>
+        <a:font script="Khmr" typeface="DaunPenh"/>
+        <a:font script="Knda" typeface="Tunga"/>
+        <a:font script="Guru" typeface="Raavi"/>
+        <a:font script="Cans" typeface="Euphemia"/>
+        <a:font script="Cher" typeface="Plantagenet Cherokee"/>
+        <a:font script="Yiii" typeface="Microsoft Yi Baiti"/>
+        <a:font script="Tibt" typeface="Microsoft Himalaya"/>
+        <a:font script="Thaa" typeface="MV Boli"/>
+        <a:font script="Deva" typeface="Mangal"/>
+        <a:font script="Telu" typeface="Gautami"/>
+        <a:font script="Taml" typeface="Latha"/>
+        <a:font script="Syrc" typeface="Estrangelo Edessa"/>
+        <a:font script="Orya" typeface="Kalinga"/>
+        <a:font script="Mlym" typeface="Kartika"/>
+        <a:font script="Laoo" typeface="DokChampa"/>
+        <a:font script="Sinh" typeface="Iskoola Pota"/>
+        <a:font script="Mong" typeface="Mongolian Baiti"/>
+        <a:font script="Viet" typeface="Arial"/>
+        <a:font script="Uigh" typeface="Microsoft Uighur"/>
+        <a:font script="Geor" typeface="Sylfaen"/>
+      </a:minorFont>
+    </a:fontScheme>
+    <a:fmtScheme name="Office">
+      <a:fillStyleLst>
+        <a:solidFill>
+          <a:schemeClr val="phClr"/>
+        </a:solidFill>
+        <a:gradFill rotWithShape="1">
+          <a:gsLst>
+            <a:gs pos="0">
+              <a:schemeClr val="phClr">
+                <a:lumMod val="110000"/>
+                <a:satMod val="105000"/>
+                <a:tint val="67000"/>
+              </a:schemeClr>
+            </a:gs>
+            <a:gs pos="50000">
+              <a:schemeClr val="phClr">
+                <a:lumMod val="105000"/>
+                <a:satMod val="103000"/>
+                <a:tint val="73000"/>
+              </a:schemeClr>
+            </a:gs>
+            <a:gs pos="100000">
+              <a:schemeClr val="phClr">
+                <a:lumMod val="105000"/>
+                <a:satMod val="109000"/>
+                <a:tint val="81000"/>
+              </a:schemeClr>
+            </a:gs>
+          </a:gsLst>
+          <a:lin ang="5400000" scaled="0"/>
+        </a:gradFill>
+        <a:gradFill rotWithShape="1">
+          <a:gsLst>
+            <a:gs pos="0">
+              <a:schemeClr val="phClr">
+                <a:satMod val="103000"/>
+                <a:lumMod val="102000"/>
+                <a:tint val="94000"/>
+              </a:schemeClr>
+            </a:gs>
+            <a:gs pos="50000">
+              <a:schemeClr val="phClr">
+                <a:satMod val="110000"/>
+                <a:lumMod val="100000"/>
+                <a:shade val="100000"/>
+              </a:schemeClr>
+            </a:gs>
+            <a:gs pos="100000">
+              <a:schemeClr val="phClr">
+                <a:lumMod val="99000"/>
+                <a:satMod val="120000"/>
+                <a:shade val="78000"/>
+              </a:schemeClr>
+            </a:gs>
+          </a:gsLst>
+          <a:lin ang="5400000" scaled="0"/>
+        </a:gradFill>
+      </a:fillStyleLst>
+      <a:lnStyleLst>
+        <a:ln w="6350" cap="flat" cmpd="sng" algn="ctr">
+          <a:solidFill>
+            <a:schemeClr val="phClr"/>
+          </a:solidFill>
+          <a:prstDash val="solid"/>
+          <a:miter lim="800000"/>
+        </a:ln>
+        <a:ln w="12700" cap="flat" cmpd="sng" algn="ctr">
+          <a:solidFill>
+            <a:schemeClr val="phClr"/>
+          </a:solidFill>
+          <a:prstDash val="solid"/>
+          <a:miter lim="800000"/>
+        </a:ln>
+        <a:ln w="19050" cap="flat" cmpd="sng" algn="ctr">
+          <a:solidFill>
+            <a:schemeClr val="phClr"/>
+          </a:solidFill>
+          <a:prstDash val="solid"/>
+          <a:miter lim="800000"/>
+        </a:ln>
+      </a:lnStyleLst>
+      <a:effectStyleLst>
+        <a:effectStyle>
+          <a:effectLst/>
+        </a:effectStyle>
+        <a:effectStyle>
+          <a:effectLst/>
+        </a:effectStyle>
+        <a:effectStyle>
+          <a:effectLst>
+            <a:outerShdw blurRad="57150" dist="19050" dir="5400000" algn="ctr" rotWithShape="0">
+              <a:srgbClr val="000000">
+                <a:alpha val="63000"/>
+              </a:srgbClr>
+            </a:outerShdw>
+          </a:effectLst>
+        </a:effectStyle>
+      </a:effectStyleLst>
+      <a:bgFillStyleLst>
+        <a:solidFill>
+          <a:schemeClr val="phClr"/>
+        </a:solidFill>
+        <a:solidFill>
+          <a:schemeClr val="phClr">
+            <a:tint val="95000"/>
+            <a:satMod val="170000"/>
+          </a:schemeClr>
+        </a:solidFill>
+        <a:gradFill rotWithShape="1">
+          <a:gsLst>
+            <a:gs pos="0">
+              <a:schemeClr val="phClr">
+                <a:tint val="93000"/>
+                <a:satMod val="150000"/>
+                <a:shade val="98000"/>
+                <a:lumMod val="102000"/>
+              </a:schemeClr>
+            </a:gs>
+            <a:gs pos="50000">
+              <a:schemeClr val="phClr">
+                <a:tint val="98000"/>
+                <a:satMod val="130000"/>
+                <a:shade val="90000"/>
+                <a:lumMod val="103000"/>
+              </a:schemeClr>
+            </a:gs>
+            <a:gs pos="100000">
+              <a:schemeClr val="phClr">
+                <a:shade val="63000"/>
+                <a:satMod val="120000"/>
+              </a:schemeClr>
+            </a:gs>
+          </a:gsLst>
+          <a:lin ang="5400000" scaled="0"/>
+        </a:gradFill>
+      </a:bgFillStyleLst>
+    </a:fmtScheme>
+  </a:themeElements>
+  <a:objectDefaults/>
+  <a:extraClrSchemeLst/>
+  <a:extLst>
+    <a:ext uri="{05A4C25C-085E-4340-85A3-A5531E510DB2}">
+      <thm15:themeFamily xmlns:thm15="http://schemas.microsoft.com/office/thememl/2012/main" name="Office Theme" id="{62F939B6-93AF-4DB8-9C6B-D6C7DFDC589F}" vid="{4A3C46E8-61CC-4603-A589-7422A47A8E4A}"/>
+    </a:ext>
+  </a:extLst>
+</a:theme>
 </file>
</xml_diff>

<commit_message>
Included slides on enum classes, switch statement
</commit_message>
<xml_diff>
--- a/CPlusPlus/02_essential_cpp_udt.pptx
+++ b/CPlusPlus/02_essential_cpp_udt.pptx
@@ -5,7 +5,7 @@
     <p:sldMasterId id="2147483660" r:id="rId1"/>
   </p:sldMasterIdLst>
   <p:notesMasterIdLst>
-    <p:notesMasterId r:id="rId16"/>
+    <p:notesMasterId r:id="rId19"/>
   </p:notesMasterIdLst>
   <p:sldIdLst>
     <p:sldId id="257" r:id="rId2"/>
@@ -22,6 +22,9 @@
     <p:sldId id="269" r:id="rId13"/>
     <p:sldId id="268" r:id="rId14"/>
     <p:sldId id="270" r:id="rId15"/>
+    <p:sldId id="271" r:id="rId16"/>
+    <p:sldId id="272" r:id="rId17"/>
+    <p:sldId id="273" r:id="rId18"/>
   </p:sldIdLst>
   <p:sldSz cx="9144000" cy="6858000" type="screen4x3"/>
   <p:notesSz cx="6858000" cy="9144000"/>
@@ -7377,6 +7380,2387 @@
       <p:bldP spid="6" grpId="0" animBg="1"/>
       <p:bldP spid="8" grpId="0" animBg="1"/>
       <p:bldP spid="9" grpId="0" animBg="1"/>
+    </p:bldLst>
+  </p:timing>
+</p:sld>
+</file>
+
+<file path=ppt/slides/slide15.xml><?xml version="1.0" encoding="utf-8"?>
+<p:sld xmlns:a="http://schemas.openxmlformats.org/drawingml/2006/main" xmlns:r="http://schemas.openxmlformats.org/officeDocument/2006/relationships" xmlns:p="http://schemas.openxmlformats.org/presentationml/2006/main">
+  <p:cSld>
+    <p:spTree>
+      <p:nvGrpSpPr>
+        <p:cNvPr id="1" name=""/>
+        <p:cNvGrpSpPr/>
+        <p:nvPr/>
+      </p:nvGrpSpPr>
+      <p:grpSpPr>
+        <a:xfrm>
+          <a:off x="0" y="0"/>
+          <a:ext cx="0" cy="0"/>
+          <a:chOff x="0" y="0"/>
+          <a:chExt cx="0" cy="0"/>
+        </a:xfrm>
+      </p:grpSpPr>
+      <p:sp>
+        <p:nvSpPr>
+          <p:cNvPr id="2" name="Title 1"/>
+          <p:cNvSpPr>
+            <a:spLocks noGrp="1"/>
+          </p:cNvSpPr>
+          <p:nvPr>
+            <p:ph type="title"/>
+          </p:nvPr>
+        </p:nvSpPr>
+        <p:spPr/>
+        <p:txBody>
+          <a:bodyPr/>
+          <a:lstStyle/>
+          <a:p>
+            <a:r>
+              <a:rPr lang="en-US" dirty="0" smtClean="0"/>
+              <a:t>Interlude: function </a:t>
+            </a:r>
+            <a:r>
+              <a:rPr lang="en-US" dirty="0" err="1" smtClean="0"/>
+              <a:t>inlining</a:t>
+            </a:r>
+            <a:endParaRPr lang="en-US" dirty="0"/>
+          </a:p>
+        </p:txBody>
+      </p:sp>
+      <p:sp>
+        <p:nvSpPr>
+          <p:cNvPr id="3" name="Content Placeholder 2"/>
+          <p:cNvSpPr>
+            <a:spLocks noGrp="1"/>
+          </p:cNvSpPr>
+          <p:nvPr>
+            <p:ph idx="1"/>
+          </p:nvPr>
+        </p:nvSpPr>
+        <p:spPr/>
+        <p:txBody>
+          <a:bodyPr/>
+          <a:lstStyle/>
+          <a:p>
+            <a:r>
+              <a:rPr lang="en-US" dirty="0" smtClean="0"/>
+              <a:t>Many functions</a:t>
+            </a:r>
+          </a:p>
+          <a:p>
+            <a:pPr lvl="1"/>
+            <a:r>
+              <a:rPr lang="en-US" dirty="0" smtClean="0"/>
+              <a:t>improve code quality, easier to understand</a:t>
+            </a:r>
+          </a:p>
+          <a:p>
+            <a:pPr lvl="1"/>
+            <a:r>
+              <a:rPr lang="en-US" dirty="0" smtClean="0"/>
+              <a:t>but calls may have performance impact</a:t>
+            </a:r>
+          </a:p>
+          <a:p>
+            <a:r>
+              <a:rPr lang="en-US" dirty="0" smtClean="0"/>
+              <a:t>Solution: inline</a:t>
+            </a:r>
+          </a:p>
+          <a:p>
+            <a:pPr lvl="1"/>
+            <a:r>
+              <a:rPr lang="en-US" dirty="0" smtClean="0"/>
+              <a:t>explicitly declared: inline keyword (advise to compiler)</a:t>
+            </a:r>
+          </a:p>
+          <a:p>
+            <a:pPr lvl="1"/>
+            <a:r>
+              <a:rPr lang="en-US" dirty="0" smtClean="0"/>
+              <a:t>automatically by compiler</a:t>
+            </a:r>
+            <a:endParaRPr lang="en-US" dirty="0"/>
+          </a:p>
+        </p:txBody>
+      </p:sp>
+      <p:sp>
+        <p:nvSpPr>
+          <p:cNvPr id="4" name="Slide Number Placeholder 3"/>
+          <p:cNvSpPr>
+            <a:spLocks noGrp="1"/>
+          </p:cNvSpPr>
+          <p:nvPr>
+            <p:ph type="sldNum" sz="quarter" idx="12"/>
+          </p:nvPr>
+        </p:nvSpPr>
+        <p:spPr/>
+        <p:txBody>
+          <a:bodyPr/>
+          <a:lstStyle/>
+          <a:p>
+            <a:fld id="{2F8BA72C-5DC7-4014-AC42-C5F5AAAF9B79}" type="slidenum">
+              <a:rPr lang="en-US" smtClean="0"/>
+              <a:t>15</a:t>
+            </a:fld>
+            <a:endParaRPr lang="en-US"/>
+          </a:p>
+        </p:txBody>
+      </p:sp>
+      <p:sp>
+        <p:nvSpPr>
+          <p:cNvPr id="5" name="TextBox 4"/>
+          <p:cNvSpPr txBox="1"/>
+          <p:nvPr/>
+        </p:nvSpPr>
+        <p:spPr>
+          <a:xfrm>
+            <a:off x="628650" y="4503365"/>
+            <a:ext cx="6657053" cy="1569660"/>
+          </a:xfrm>
+          <a:prstGeom prst="rect">
+            <a:avLst/>
+          </a:prstGeom>
+          <a:solidFill>
+            <a:schemeClr val="bg1">
+              <a:lumMod val="75000"/>
+            </a:schemeClr>
+          </a:solidFill>
+        </p:spPr>
+        <p:txBody>
+          <a:bodyPr wrap="square" rtlCol="0">
+            <a:spAutoFit/>
+          </a:bodyPr>
+          <a:lstStyle/>
+          <a:p>
+            <a:r>
+              <a:rPr lang="en-US" sz="1600" b="1" dirty="0" smtClean="0">
+                <a:solidFill>
+                  <a:srgbClr val="C00000"/>
+                </a:solidFill>
+                <a:latin typeface="Courier New" pitchFamily="49" charset="0"/>
+                <a:cs typeface="Courier New" pitchFamily="49" charset="0"/>
+              </a:rPr>
+              <a:t>inline</a:t>
+            </a:r>
+            <a:r>
+              <a:rPr lang="en-US" sz="1600" dirty="0" smtClean="0">
+                <a:latin typeface="Courier New" pitchFamily="49" charset="0"/>
+                <a:cs typeface="Courier New" pitchFamily="49" charset="0"/>
+              </a:rPr>
+              <a:t> double </a:t>
+            </a:r>
+            <a:r>
+              <a:rPr lang="en-US" sz="1600" dirty="0" err="1" smtClean="0">
+                <a:latin typeface="Courier New" pitchFamily="49" charset="0"/>
+                <a:cs typeface="Courier New" pitchFamily="49" charset="0"/>
+              </a:rPr>
+              <a:t>sqr</a:t>
+            </a:r>
+            <a:r>
+              <a:rPr lang="en-US" sz="1600" dirty="0" smtClean="0">
+                <a:latin typeface="Courier New" pitchFamily="49" charset="0"/>
+                <a:cs typeface="Courier New" pitchFamily="49" charset="0"/>
+              </a:rPr>
+              <a:t>(double x) { return x*x; }</a:t>
+            </a:r>
+          </a:p>
+          <a:p>
+            <a:r>
+              <a:rPr lang="en-US" sz="1600" dirty="0" smtClean="0">
+                <a:latin typeface="Courier New" pitchFamily="49" charset="0"/>
+                <a:cs typeface="Courier New" pitchFamily="49" charset="0"/>
+              </a:rPr>
+              <a:t>double </a:t>
+            </a:r>
+            <a:r>
+              <a:rPr lang="en-US" sz="1600" dirty="0">
+                <a:latin typeface="Courier New" pitchFamily="49" charset="0"/>
+                <a:cs typeface="Courier New" pitchFamily="49" charset="0"/>
+              </a:rPr>
+              <a:t>Particle::</a:t>
+            </a:r>
+            <a:r>
+              <a:rPr lang="en-US" sz="1600" dirty="0" err="1">
+                <a:latin typeface="Courier New" pitchFamily="49" charset="0"/>
+                <a:cs typeface="Courier New" pitchFamily="49" charset="0"/>
+              </a:rPr>
+              <a:t>dist</a:t>
+            </a:r>
+            <a:r>
+              <a:rPr lang="en-US" sz="1600" dirty="0">
+                <a:latin typeface="Courier New" pitchFamily="49" charset="0"/>
+                <a:cs typeface="Courier New" pitchFamily="49" charset="0"/>
+              </a:rPr>
+              <a:t>(</a:t>
+            </a:r>
+            <a:r>
+              <a:rPr lang="en-US" sz="1600" dirty="0" err="1">
+                <a:latin typeface="Courier New" pitchFamily="49" charset="0"/>
+                <a:cs typeface="Courier New" pitchFamily="49" charset="0"/>
+              </a:rPr>
+              <a:t>const</a:t>
+            </a:r>
+            <a:r>
+              <a:rPr lang="en-US" sz="1600" dirty="0">
+                <a:latin typeface="Courier New" pitchFamily="49" charset="0"/>
+                <a:cs typeface="Courier New" pitchFamily="49" charset="0"/>
+              </a:rPr>
+              <a:t> Particle&amp; other) </a:t>
+            </a:r>
+            <a:r>
+              <a:rPr lang="en-US" sz="1600" dirty="0" err="1">
+                <a:latin typeface="Courier New" pitchFamily="49" charset="0"/>
+                <a:cs typeface="Courier New" pitchFamily="49" charset="0"/>
+              </a:rPr>
+              <a:t>const</a:t>
+            </a:r>
+            <a:r>
+              <a:rPr lang="en-US" sz="1600" dirty="0">
+                <a:latin typeface="Courier New" pitchFamily="49" charset="0"/>
+                <a:cs typeface="Courier New" pitchFamily="49" charset="0"/>
+              </a:rPr>
+              <a:t> {</a:t>
+            </a:r>
+          </a:p>
+          <a:p>
+            <a:r>
+              <a:rPr lang="en-US" sz="1600" dirty="0">
+                <a:latin typeface="Courier New" pitchFamily="49" charset="0"/>
+                <a:cs typeface="Courier New" pitchFamily="49" charset="0"/>
+              </a:rPr>
+              <a:t>    return </a:t>
+            </a:r>
+            <a:r>
+              <a:rPr lang="en-US" sz="1600" dirty="0" err="1" smtClean="0">
+                <a:latin typeface="Courier New" pitchFamily="49" charset="0"/>
+                <a:cs typeface="Courier New" pitchFamily="49" charset="0"/>
+              </a:rPr>
+              <a:t>sqrt</a:t>
+            </a:r>
+            <a:r>
+              <a:rPr lang="en-US" sz="1600" dirty="0" smtClean="0">
+                <a:latin typeface="Courier New" pitchFamily="49" charset="0"/>
+                <a:cs typeface="Courier New" pitchFamily="49" charset="0"/>
+              </a:rPr>
+              <a:t>((_</a:t>
+            </a:r>
+            <a:r>
+              <a:rPr lang="en-US" sz="1600" dirty="0">
+                <a:latin typeface="Courier New" pitchFamily="49" charset="0"/>
+                <a:cs typeface="Courier New" pitchFamily="49" charset="0"/>
+              </a:rPr>
+              <a:t>x - </a:t>
+            </a:r>
+            <a:r>
+              <a:rPr lang="en-US" sz="1600" dirty="0" err="1">
+                <a:latin typeface="Courier New" pitchFamily="49" charset="0"/>
+                <a:cs typeface="Courier New" pitchFamily="49" charset="0"/>
+              </a:rPr>
+              <a:t>other.x</a:t>
+            </a:r>
+            <a:r>
+              <a:rPr lang="en-US" sz="1600" dirty="0">
+                <a:latin typeface="Courier New" pitchFamily="49" charset="0"/>
+                <a:cs typeface="Courier New" pitchFamily="49" charset="0"/>
+              </a:rPr>
+              <a:t>())*(_x - </a:t>
+            </a:r>
+            <a:r>
+              <a:rPr lang="en-US" sz="1600" dirty="0" err="1">
+                <a:latin typeface="Courier New" pitchFamily="49" charset="0"/>
+                <a:cs typeface="Courier New" pitchFamily="49" charset="0"/>
+              </a:rPr>
+              <a:t>other.x</a:t>
+            </a:r>
+            <a:r>
+              <a:rPr lang="en-US" sz="1600" dirty="0" smtClean="0">
+                <a:latin typeface="Courier New" pitchFamily="49" charset="0"/>
+                <a:cs typeface="Courier New" pitchFamily="49" charset="0"/>
+              </a:rPr>
+              <a:t>()) </a:t>
+            </a:r>
+            <a:r>
+              <a:rPr lang="en-US" sz="1600" dirty="0">
+                <a:latin typeface="Courier New" pitchFamily="49" charset="0"/>
+                <a:cs typeface="Courier New" pitchFamily="49" charset="0"/>
+              </a:rPr>
+              <a:t>+ </a:t>
+            </a:r>
+          </a:p>
+          <a:p>
+            <a:r>
+              <a:rPr lang="en-US" sz="1600" dirty="0">
+                <a:latin typeface="Courier New" pitchFamily="49" charset="0"/>
+                <a:cs typeface="Courier New" pitchFamily="49" charset="0"/>
+              </a:rPr>
+              <a:t>                </a:t>
+            </a:r>
+            <a:r>
+              <a:rPr lang="en-US" sz="1600" dirty="0" smtClean="0">
+                <a:latin typeface="Courier New" pitchFamily="49" charset="0"/>
+                <a:cs typeface="Courier New" pitchFamily="49" charset="0"/>
+              </a:rPr>
+              <a:t>(_</a:t>
+            </a:r>
+            <a:r>
+              <a:rPr lang="en-US" sz="1600" dirty="0">
+                <a:latin typeface="Courier New" pitchFamily="49" charset="0"/>
+                <a:cs typeface="Courier New" pitchFamily="49" charset="0"/>
+              </a:rPr>
+              <a:t>y - </a:t>
+            </a:r>
+            <a:r>
+              <a:rPr lang="en-US" sz="1600" dirty="0" err="1">
+                <a:latin typeface="Courier New" pitchFamily="49" charset="0"/>
+                <a:cs typeface="Courier New" pitchFamily="49" charset="0"/>
+              </a:rPr>
+              <a:t>other.y</a:t>
+            </a:r>
+            <a:r>
+              <a:rPr lang="en-US" sz="1600" dirty="0" smtClean="0">
+                <a:latin typeface="Courier New" pitchFamily="49" charset="0"/>
+                <a:cs typeface="Courier New" pitchFamily="49" charset="0"/>
+              </a:rPr>
+              <a:t>())*(_</a:t>
+            </a:r>
+            <a:r>
+              <a:rPr lang="en-US" sz="1600" dirty="0">
+                <a:latin typeface="Courier New" pitchFamily="49" charset="0"/>
+                <a:cs typeface="Courier New" pitchFamily="49" charset="0"/>
+              </a:rPr>
+              <a:t>y - </a:t>
+            </a:r>
+            <a:r>
+              <a:rPr lang="en-US" sz="1600" dirty="0" err="1">
+                <a:latin typeface="Courier New" pitchFamily="49" charset="0"/>
+                <a:cs typeface="Courier New" pitchFamily="49" charset="0"/>
+              </a:rPr>
+              <a:t>other.y</a:t>
+            </a:r>
+            <a:r>
+              <a:rPr lang="en-US" sz="1600" dirty="0">
+                <a:latin typeface="Courier New" pitchFamily="49" charset="0"/>
+                <a:cs typeface="Courier New" pitchFamily="49" charset="0"/>
+              </a:rPr>
+              <a:t>()) </a:t>
+            </a:r>
+            <a:r>
+              <a:rPr lang="en-US" sz="1600" dirty="0">
+                <a:latin typeface="Courier New" pitchFamily="49" charset="0"/>
+                <a:cs typeface="Courier New" pitchFamily="49" charset="0"/>
+              </a:rPr>
+              <a:t>+</a:t>
+            </a:r>
+          </a:p>
+          <a:p>
+            <a:r>
+              <a:rPr lang="en-US" sz="1600" dirty="0">
+                <a:latin typeface="Courier New" pitchFamily="49" charset="0"/>
+                <a:cs typeface="Courier New" pitchFamily="49" charset="0"/>
+              </a:rPr>
+              <a:t>                </a:t>
+            </a:r>
+            <a:r>
+              <a:rPr lang="en-US" sz="1600" dirty="0" smtClean="0">
+                <a:latin typeface="Courier New" pitchFamily="49" charset="0"/>
+                <a:cs typeface="Courier New" pitchFamily="49" charset="0"/>
+              </a:rPr>
+              <a:t>(_</a:t>
+            </a:r>
+            <a:r>
+              <a:rPr lang="en-US" sz="1600" dirty="0">
+                <a:latin typeface="Courier New" pitchFamily="49" charset="0"/>
+                <a:cs typeface="Courier New" pitchFamily="49" charset="0"/>
+              </a:rPr>
+              <a:t>z - </a:t>
+            </a:r>
+            <a:r>
+              <a:rPr lang="en-US" sz="1600" dirty="0" err="1">
+                <a:latin typeface="Courier New" pitchFamily="49" charset="0"/>
+                <a:cs typeface="Courier New" pitchFamily="49" charset="0"/>
+              </a:rPr>
+              <a:t>other.z</a:t>
+            </a:r>
+            <a:r>
+              <a:rPr lang="en-US" sz="1600" dirty="0">
+                <a:latin typeface="Courier New" pitchFamily="49" charset="0"/>
+                <a:cs typeface="Courier New" pitchFamily="49" charset="0"/>
+              </a:rPr>
+              <a:t>())*(_z - </a:t>
+            </a:r>
+            <a:r>
+              <a:rPr lang="en-US" sz="1600" dirty="0" err="1">
+                <a:latin typeface="Courier New" pitchFamily="49" charset="0"/>
+                <a:cs typeface="Courier New" pitchFamily="49" charset="0"/>
+              </a:rPr>
+              <a:t>other.z</a:t>
+            </a:r>
+            <a:r>
+              <a:rPr lang="en-US" sz="1600" dirty="0">
+                <a:latin typeface="Courier New" pitchFamily="49" charset="0"/>
+                <a:cs typeface="Courier New" pitchFamily="49" charset="0"/>
+              </a:rPr>
+              <a:t>()));</a:t>
+            </a:r>
+            <a:endParaRPr lang="en-US" sz="1600" dirty="0">
+              <a:latin typeface="Courier New" pitchFamily="49" charset="0"/>
+              <a:cs typeface="Courier New" pitchFamily="49" charset="0"/>
+            </a:endParaRPr>
+          </a:p>
+          <a:p>
+            <a:r>
+              <a:rPr lang="en-US" sz="1600" dirty="0">
+                <a:latin typeface="Courier New" pitchFamily="49" charset="0"/>
+                <a:cs typeface="Courier New" pitchFamily="49" charset="0"/>
+              </a:rPr>
+              <a:t>}</a:t>
+            </a:r>
+          </a:p>
+        </p:txBody>
+      </p:sp>
+      <p:grpSp>
+        <p:nvGrpSpPr>
+          <p:cNvPr id="6" name="Group 5"/>
+          <p:cNvGrpSpPr/>
+          <p:nvPr/>
+        </p:nvGrpSpPr>
+        <p:grpSpPr>
+          <a:xfrm>
+            <a:off x="1037907" y="5781369"/>
+            <a:ext cx="3602919" cy="907438"/>
+            <a:chOff x="91423" y="3368249"/>
+            <a:chExt cx="3534093" cy="841479"/>
+          </a:xfrm>
+        </p:grpSpPr>
+        <p:sp>
+          <p:nvSpPr>
+            <p:cNvPr id="7" name="TextBox 6"/>
+            <p:cNvSpPr txBox="1"/>
+            <p:nvPr/>
+          </p:nvSpPr>
+          <p:spPr>
+            <a:xfrm>
+              <a:off x="91423" y="3501842"/>
+              <a:ext cx="2019926" cy="707886"/>
+            </a:xfrm>
+            <a:prstGeom prst="rect">
+              <a:avLst/>
+            </a:prstGeom>
+            <a:solidFill>
+              <a:schemeClr val="bg1"/>
+            </a:solidFill>
+            <a:ln w="19050">
+              <a:solidFill>
+                <a:schemeClr val="tx1"/>
+              </a:solidFill>
+            </a:ln>
+          </p:spPr>
+          <p:txBody>
+            <a:bodyPr wrap="square" rtlCol="0">
+              <a:spAutoFit/>
+            </a:bodyPr>
+            <a:lstStyle/>
+            <a:p>
+              <a:r>
+                <a:rPr lang="en-US" sz="2000" dirty="0" smtClean="0"/>
+                <a:t>substitution at compile time</a:t>
+              </a:r>
+              <a:endParaRPr lang="en-US" sz="2000" dirty="0">
+                <a:latin typeface="Courier New" panose="02070309020205020404" pitchFamily="49" charset="0"/>
+                <a:cs typeface="Courier New" panose="02070309020205020404" pitchFamily="49" charset="0"/>
+              </a:endParaRPr>
+            </a:p>
+          </p:txBody>
+        </p:sp>
+        <p:cxnSp>
+          <p:nvCxnSpPr>
+            <p:cNvPr id="8" name="Straight Arrow Connector 7"/>
+            <p:cNvCxnSpPr>
+              <a:stCxn id="7" idx="3"/>
+            </p:cNvCxnSpPr>
+            <p:nvPr/>
+          </p:nvCxnSpPr>
+          <p:spPr>
+            <a:xfrm flipV="1">
+              <a:off x="2111349" y="3368249"/>
+              <a:ext cx="1514167" cy="487536"/>
+            </a:xfrm>
+            <a:prstGeom prst="straightConnector1">
+              <a:avLst/>
+            </a:prstGeom>
+            <a:ln w="19050">
+              <a:solidFill>
+                <a:schemeClr val="tx1"/>
+              </a:solidFill>
+              <a:tailEnd type="stealth" w="lg" len="lg"/>
+            </a:ln>
+          </p:spPr>
+          <p:style>
+            <a:lnRef idx="1">
+              <a:schemeClr val="accent1"/>
+            </a:lnRef>
+            <a:fillRef idx="0">
+              <a:schemeClr val="accent1"/>
+            </a:fillRef>
+            <a:effectRef idx="0">
+              <a:schemeClr val="accent1"/>
+            </a:effectRef>
+            <a:fontRef idx="minor">
+              <a:schemeClr val="tx1"/>
+            </a:fontRef>
+          </p:style>
+        </p:cxnSp>
+      </p:grpSp>
+    </p:spTree>
+    <p:extLst>
+      <p:ext uri="{BB962C8B-B14F-4D97-AF65-F5344CB8AC3E}">
+        <p14:creationId xmlns:p14="http://schemas.microsoft.com/office/powerpoint/2010/main" val="3114102048"/>
+      </p:ext>
+    </p:extLst>
+  </p:cSld>
+  <p:clrMapOvr>
+    <a:masterClrMapping/>
+  </p:clrMapOvr>
+  <p:timing>
+    <p:tnLst>
+      <p:par>
+        <p:cTn id="1" dur="indefinite" restart="never" nodeType="tmRoot">
+          <p:childTnLst>
+            <p:seq concurrent="1" nextAc="seek">
+              <p:cTn id="2" dur="indefinite" nodeType="mainSeq">
+                <p:childTnLst>
+                  <p:par>
+                    <p:cTn id="3" fill="hold">
+                      <p:stCondLst>
+                        <p:cond delay="indefinite"/>
+                        <p:cond evt="onBegin" delay="0">
+                          <p:tn val="2"/>
+                        </p:cond>
+                      </p:stCondLst>
+                      <p:childTnLst>
+                        <p:par>
+                          <p:cTn id="4" fill="hold">
+                            <p:stCondLst>
+                              <p:cond delay="0"/>
+                            </p:stCondLst>
+                            <p:childTnLst>
+                              <p:par>
+                                <p:cTn id="5" presetID="1" presetClass="entr" presetSubtype="0" fill="hold" grpId="0" nodeType="withEffect">
+                                  <p:stCondLst>
+                                    <p:cond delay="0"/>
+                                  </p:stCondLst>
+                                  <p:childTnLst>
+                                    <p:set>
+                                      <p:cBhvr>
+                                        <p:cTn id="6" dur="1" fill="hold">
+                                          <p:stCondLst>
+                                            <p:cond delay="0"/>
+                                          </p:stCondLst>
+                                        </p:cTn>
+                                        <p:tgtEl>
+                                          <p:spTgt spid="3">
+                                            <p:txEl>
+                                              <p:pRg st="0" end="0"/>
+                                            </p:txEl>
+                                          </p:spTgt>
+                                        </p:tgtEl>
+                                        <p:attrNameLst>
+                                          <p:attrName>style.visibility</p:attrName>
+                                        </p:attrNameLst>
+                                      </p:cBhvr>
+                                      <p:to>
+                                        <p:strVal val="visible"/>
+                                      </p:to>
+                                    </p:set>
+                                  </p:childTnLst>
+                                </p:cTn>
+                              </p:par>
+                              <p:par>
+                                <p:cTn id="7" presetID="1" presetClass="entr" presetSubtype="0" fill="hold" grpId="0" nodeType="withEffect">
+                                  <p:stCondLst>
+                                    <p:cond delay="0"/>
+                                  </p:stCondLst>
+                                  <p:childTnLst>
+                                    <p:set>
+                                      <p:cBhvr>
+                                        <p:cTn id="8" dur="1" fill="hold">
+                                          <p:stCondLst>
+                                            <p:cond delay="0"/>
+                                          </p:stCondLst>
+                                        </p:cTn>
+                                        <p:tgtEl>
+                                          <p:spTgt spid="3">
+                                            <p:txEl>
+                                              <p:pRg st="1" end="1"/>
+                                            </p:txEl>
+                                          </p:spTgt>
+                                        </p:tgtEl>
+                                        <p:attrNameLst>
+                                          <p:attrName>style.visibility</p:attrName>
+                                        </p:attrNameLst>
+                                      </p:cBhvr>
+                                      <p:to>
+                                        <p:strVal val="visible"/>
+                                      </p:to>
+                                    </p:set>
+                                  </p:childTnLst>
+                                </p:cTn>
+                              </p:par>
+                            </p:childTnLst>
+                          </p:cTn>
+                        </p:par>
+                      </p:childTnLst>
+                    </p:cTn>
+                  </p:par>
+                  <p:par>
+                    <p:cTn id="9" fill="hold">
+                      <p:stCondLst>
+                        <p:cond delay="indefinite"/>
+                      </p:stCondLst>
+                      <p:childTnLst>
+                        <p:par>
+                          <p:cTn id="10" fill="hold">
+                            <p:stCondLst>
+                              <p:cond delay="0"/>
+                            </p:stCondLst>
+                            <p:childTnLst>
+                              <p:par>
+                                <p:cTn id="11" presetID="1" presetClass="entr" presetSubtype="0" fill="hold" grpId="0" nodeType="clickEffect">
+                                  <p:stCondLst>
+                                    <p:cond delay="0"/>
+                                  </p:stCondLst>
+                                  <p:childTnLst>
+                                    <p:set>
+                                      <p:cBhvr>
+                                        <p:cTn id="12" dur="1" fill="hold">
+                                          <p:stCondLst>
+                                            <p:cond delay="0"/>
+                                          </p:stCondLst>
+                                        </p:cTn>
+                                        <p:tgtEl>
+                                          <p:spTgt spid="3">
+                                            <p:txEl>
+                                              <p:pRg st="2" end="2"/>
+                                            </p:txEl>
+                                          </p:spTgt>
+                                        </p:tgtEl>
+                                        <p:attrNameLst>
+                                          <p:attrName>style.visibility</p:attrName>
+                                        </p:attrNameLst>
+                                      </p:cBhvr>
+                                      <p:to>
+                                        <p:strVal val="visible"/>
+                                      </p:to>
+                                    </p:set>
+                                  </p:childTnLst>
+                                </p:cTn>
+                              </p:par>
+                            </p:childTnLst>
+                          </p:cTn>
+                        </p:par>
+                      </p:childTnLst>
+                    </p:cTn>
+                  </p:par>
+                  <p:par>
+                    <p:cTn id="13" fill="hold">
+                      <p:stCondLst>
+                        <p:cond delay="indefinite"/>
+                      </p:stCondLst>
+                      <p:childTnLst>
+                        <p:par>
+                          <p:cTn id="14" fill="hold">
+                            <p:stCondLst>
+                              <p:cond delay="0"/>
+                            </p:stCondLst>
+                            <p:childTnLst>
+                              <p:par>
+                                <p:cTn id="15" presetID="1" presetClass="entr" presetSubtype="0" fill="hold" grpId="0" nodeType="clickEffect">
+                                  <p:stCondLst>
+                                    <p:cond delay="0"/>
+                                  </p:stCondLst>
+                                  <p:childTnLst>
+                                    <p:set>
+                                      <p:cBhvr>
+                                        <p:cTn id="16" dur="1" fill="hold">
+                                          <p:stCondLst>
+                                            <p:cond delay="0"/>
+                                          </p:stCondLst>
+                                        </p:cTn>
+                                        <p:tgtEl>
+                                          <p:spTgt spid="3">
+                                            <p:txEl>
+                                              <p:pRg st="3" end="3"/>
+                                            </p:txEl>
+                                          </p:spTgt>
+                                        </p:tgtEl>
+                                        <p:attrNameLst>
+                                          <p:attrName>style.visibility</p:attrName>
+                                        </p:attrNameLst>
+                                      </p:cBhvr>
+                                      <p:to>
+                                        <p:strVal val="visible"/>
+                                      </p:to>
+                                    </p:set>
+                                  </p:childTnLst>
+                                </p:cTn>
+                              </p:par>
+                            </p:childTnLst>
+                          </p:cTn>
+                        </p:par>
+                      </p:childTnLst>
+                    </p:cTn>
+                  </p:par>
+                  <p:par>
+                    <p:cTn id="17" fill="hold">
+                      <p:stCondLst>
+                        <p:cond delay="indefinite"/>
+                      </p:stCondLst>
+                      <p:childTnLst>
+                        <p:par>
+                          <p:cTn id="18" fill="hold">
+                            <p:stCondLst>
+                              <p:cond delay="0"/>
+                            </p:stCondLst>
+                            <p:childTnLst>
+                              <p:par>
+                                <p:cTn id="19" presetID="1" presetClass="entr" presetSubtype="0" fill="hold" grpId="0" nodeType="clickEffect">
+                                  <p:stCondLst>
+                                    <p:cond delay="0"/>
+                                  </p:stCondLst>
+                                  <p:childTnLst>
+                                    <p:set>
+                                      <p:cBhvr>
+                                        <p:cTn id="20" dur="1" fill="hold">
+                                          <p:stCondLst>
+                                            <p:cond delay="0"/>
+                                          </p:stCondLst>
+                                        </p:cTn>
+                                        <p:tgtEl>
+                                          <p:spTgt spid="3">
+                                            <p:txEl>
+                                              <p:pRg st="4" end="4"/>
+                                            </p:txEl>
+                                          </p:spTgt>
+                                        </p:tgtEl>
+                                        <p:attrNameLst>
+                                          <p:attrName>style.visibility</p:attrName>
+                                        </p:attrNameLst>
+                                      </p:cBhvr>
+                                      <p:to>
+                                        <p:strVal val="visible"/>
+                                      </p:to>
+                                    </p:set>
+                                  </p:childTnLst>
+                                </p:cTn>
+                              </p:par>
+                            </p:childTnLst>
+                          </p:cTn>
+                        </p:par>
+                      </p:childTnLst>
+                    </p:cTn>
+                  </p:par>
+                  <p:par>
+                    <p:cTn id="21" fill="hold">
+                      <p:stCondLst>
+                        <p:cond delay="indefinite"/>
+                      </p:stCondLst>
+                      <p:childTnLst>
+                        <p:par>
+                          <p:cTn id="22" fill="hold">
+                            <p:stCondLst>
+                              <p:cond delay="0"/>
+                            </p:stCondLst>
+                            <p:childTnLst>
+                              <p:par>
+                                <p:cTn id="23" presetID="1" presetClass="entr" presetSubtype="0" fill="hold" grpId="0" nodeType="clickEffect">
+                                  <p:stCondLst>
+                                    <p:cond delay="0"/>
+                                  </p:stCondLst>
+                                  <p:childTnLst>
+                                    <p:set>
+                                      <p:cBhvr>
+                                        <p:cTn id="24" dur="1" fill="hold">
+                                          <p:stCondLst>
+                                            <p:cond delay="0"/>
+                                          </p:stCondLst>
+                                        </p:cTn>
+                                        <p:tgtEl>
+                                          <p:spTgt spid="3">
+                                            <p:txEl>
+                                              <p:pRg st="5" end="5"/>
+                                            </p:txEl>
+                                          </p:spTgt>
+                                        </p:tgtEl>
+                                        <p:attrNameLst>
+                                          <p:attrName>style.visibility</p:attrName>
+                                        </p:attrNameLst>
+                                      </p:cBhvr>
+                                      <p:to>
+                                        <p:strVal val="visible"/>
+                                      </p:to>
+                                    </p:set>
+                                  </p:childTnLst>
+                                </p:cTn>
+                              </p:par>
+                              <p:par>
+                                <p:cTn id="25" presetID="1" presetClass="entr" presetSubtype="0" fill="hold" grpId="0" nodeType="withEffect">
+                                  <p:stCondLst>
+                                    <p:cond delay="0"/>
+                                  </p:stCondLst>
+                                  <p:childTnLst>
+                                    <p:set>
+                                      <p:cBhvr>
+                                        <p:cTn id="26" dur="1" fill="hold">
+                                          <p:stCondLst>
+                                            <p:cond delay="0"/>
+                                          </p:stCondLst>
+                                        </p:cTn>
+                                        <p:tgtEl>
+                                          <p:spTgt spid="5"/>
+                                        </p:tgtEl>
+                                        <p:attrNameLst>
+                                          <p:attrName>style.visibility</p:attrName>
+                                        </p:attrNameLst>
+                                      </p:cBhvr>
+                                      <p:to>
+                                        <p:strVal val="visible"/>
+                                      </p:to>
+                                    </p:set>
+                                  </p:childTnLst>
+                                </p:cTn>
+                              </p:par>
+                            </p:childTnLst>
+                          </p:cTn>
+                        </p:par>
+                      </p:childTnLst>
+                    </p:cTn>
+                  </p:par>
+                  <p:par>
+                    <p:cTn id="27" fill="hold">
+                      <p:stCondLst>
+                        <p:cond delay="indefinite"/>
+                      </p:stCondLst>
+                      <p:childTnLst>
+                        <p:par>
+                          <p:cTn id="28" fill="hold">
+                            <p:stCondLst>
+                              <p:cond delay="0"/>
+                            </p:stCondLst>
+                            <p:childTnLst>
+                              <p:par>
+                                <p:cTn id="29" presetID="1" presetClass="entr" presetSubtype="0" fill="hold" nodeType="clickEffect">
+                                  <p:stCondLst>
+                                    <p:cond delay="0"/>
+                                  </p:stCondLst>
+                                  <p:childTnLst>
+                                    <p:set>
+                                      <p:cBhvr>
+                                        <p:cTn id="30" dur="1" fill="hold">
+                                          <p:stCondLst>
+                                            <p:cond delay="0"/>
+                                          </p:stCondLst>
+                                        </p:cTn>
+                                        <p:tgtEl>
+                                          <p:spTgt spid="6"/>
+                                        </p:tgtEl>
+                                        <p:attrNameLst>
+                                          <p:attrName>style.visibility</p:attrName>
+                                        </p:attrNameLst>
+                                      </p:cBhvr>
+                                      <p:to>
+                                        <p:strVal val="visible"/>
+                                      </p:to>
+                                    </p:set>
+                                  </p:childTnLst>
+                                </p:cTn>
+                              </p:par>
+                            </p:childTnLst>
+                          </p:cTn>
+                        </p:par>
+                      </p:childTnLst>
+                    </p:cTn>
+                  </p:par>
+                </p:childTnLst>
+              </p:cTn>
+              <p:prevCondLst>
+                <p:cond evt="onPrev" delay="0">
+                  <p:tgtEl>
+                    <p:sldTgt/>
+                  </p:tgtEl>
+                </p:cond>
+              </p:prevCondLst>
+              <p:nextCondLst>
+                <p:cond evt="onNext" delay="0">
+                  <p:tgtEl>
+                    <p:sldTgt/>
+                  </p:tgtEl>
+                </p:cond>
+              </p:nextCondLst>
+            </p:seq>
+          </p:childTnLst>
+        </p:cTn>
+      </p:par>
+    </p:tnLst>
+    <p:bldLst>
+      <p:bldP spid="3" grpId="0" uiExpand="1" build="p" bldLvl="2"/>
+      <p:bldP spid="5" grpId="0" animBg="1"/>
+    </p:bldLst>
+  </p:timing>
+</p:sld>
+</file>
+
+<file path=ppt/slides/slide16.xml><?xml version="1.0" encoding="utf-8"?>
+<p:sld xmlns:a="http://schemas.openxmlformats.org/drawingml/2006/main" xmlns:r="http://schemas.openxmlformats.org/officeDocument/2006/relationships" xmlns:p="http://schemas.openxmlformats.org/presentationml/2006/main">
+  <p:cSld>
+    <p:spTree>
+      <p:nvGrpSpPr>
+        <p:cNvPr id="1" name=""/>
+        <p:cNvGrpSpPr/>
+        <p:nvPr/>
+      </p:nvGrpSpPr>
+      <p:grpSpPr>
+        <a:xfrm>
+          <a:off x="0" y="0"/>
+          <a:ext cx="0" cy="0"/>
+          <a:chOff x="0" y="0"/>
+          <a:chExt cx="0" cy="0"/>
+        </a:xfrm>
+      </p:grpSpPr>
+      <p:sp>
+        <p:nvSpPr>
+          <p:cNvPr id="2" name="Title 1"/>
+          <p:cNvSpPr>
+            <a:spLocks noGrp="1"/>
+          </p:cNvSpPr>
+          <p:nvPr>
+            <p:ph type="title"/>
+          </p:nvPr>
+        </p:nvSpPr>
+        <p:spPr/>
+        <p:txBody>
+          <a:bodyPr/>
+          <a:lstStyle/>
+          <a:p>
+            <a:r>
+              <a:rPr lang="en-US" dirty="0" err="1" smtClean="0"/>
+              <a:t>Enum</a:t>
+            </a:r>
+            <a:r>
+              <a:rPr lang="en-US" dirty="0" smtClean="0"/>
+              <a:t> class</a:t>
+            </a:r>
+            <a:endParaRPr lang="en-US" dirty="0"/>
+          </a:p>
+        </p:txBody>
+      </p:sp>
+      <p:sp>
+        <p:nvSpPr>
+          <p:cNvPr id="3" name="Content Placeholder 2"/>
+          <p:cNvSpPr>
+            <a:spLocks noGrp="1"/>
+          </p:cNvSpPr>
+          <p:nvPr>
+            <p:ph idx="1"/>
+          </p:nvPr>
+        </p:nvSpPr>
+        <p:spPr/>
+        <p:txBody>
+          <a:bodyPr/>
+          <a:lstStyle/>
+          <a:p>
+            <a:r>
+              <a:rPr lang="en-US" dirty="0" smtClean="0"/>
+              <a:t>Examples</a:t>
+            </a:r>
+          </a:p>
+          <a:p>
+            <a:pPr lvl="1"/>
+            <a:r>
+              <a:rPr lang="en-US" dirty="0" smtClean="0"/>
+              <a:t>charge: positive, neutral, negative</a:t>
+            </a:r>
+          </a:p>
+          <a:p>
+            <a:pPr lvl="1"/>
+            <a:r>
+              <a:rPr lang="en-US" dirty="0" smtClean="0"/>
+              <a:t>color: magenta, cyan, yellow, black</a:t>
+            </a:r>
+            <a:endParaRPr lang="en-US" dirty="0"/>
+          </a:p>
+        </p:txBody>
+      </p:sp>
+      <p:sp>
+        <p:nvSpPr>
+          <p:cNvPr id="4" name="Slide Number Placeholder 3"/>
+          <p:cNvSpPr>
+            <a:spLocks noGrp="1"/>
+          </p:cNvSpPr>
+          <p:nvPr>
+            <p:ph type="sldNum" sz="quarter" idx="12"/>
+          </p:nvPr>
+        </p:nvSpPr>
+        <p:spPr/>
+        <p:txBody>
+          <a:bodyPr/>
+          <a:lstStyle/>
+          <a:p>
+            <a:fld id="{2F8BA72C-5DC7-4014-AC42-C5F5AAAF9B79}" type="slidenum">
+              <a:rPr lang="en-US" smtClean="0"/>
+              <a:t>16</a:t>
+            </a:fld>
+            <a:endParaRPr lang="en-US"/>
+          </a:p>
+        </p:txBody>
+      </p:sp>
+      <p:sp>
+        <p:nvSpPr>
+          <p:cNvPr id="5" name="TextBox 4"/>
+          <p:cNvSpPr txBox="1"/>
+          <p:nvPr/>
+        </p:nvSpPr>
+        <p:spPr>
+          <a:xfrm>
+            <a:off x="628650" y="3372657"/>
+            <a:ext cx="6657053" cy="3046988"/>
+          </a:xfrm>
+          <a:prstGeom prst="rect">
+            <a:avLst/>
+          </a:prstGeom>
+          <a:solidFill>
+            <a:schemeClr val="bg1">
+              <a:lumMod val="75000"/>
+            </a:schemeClr>
+          </a:solidFill>
+        </p:spPr>
+        <p:txBody>
+          <a:bodyPr wrap="square" rtlCol="0">
+            <a:spAutoFit/>
+          </a:bodyPr>
+          <a:lstStyle/>
+          <a:p>
+            <a:r>
+              <a:rPr lang="en-US" sz="1600" b="1" dirty="0" err="1" smtClean="0">
+                <a:latin typeface="Courier New" pitchFamily="49" charset="0"/>
+                <a:cs typeface="Courier New" pitchFamily="49" charset="0"/>
+              </a:rPr>
+              <a:t>enum</a:t>
+            </a:r>
+            <a:r>
+              <a:rPr lang="en-US" sz="1600" b="1" dirty="0" smtClean="0">
+                <a:latin typeface="Courier New" pitchFamily="49" charset="0"/>
+                <a:cs typeface="Courier New" pitchFamily="49" charset="0"/>
+              </a:rPr>
+              <a:t> class</a:t>
+            </a:r>
+            <a:r>
+              <a:rPr lang="en-US" sz="1600" dirty="0" smtClean="0">
+                <a:latin typeface="Courier New" pitchFamily="49" charset="0"/>
+                <a:cs typeface="Courier New" pitchFamily="49" charset="0"/>
+              </a:rPr>
+              <a:t> Charge {</a:t>
+            </a:r>
+            <a:r>
+              <a:rPr lang="en-US" sz="1600" b="1" dirty="0" smtClean="0">
+                <a:solidFill>
+                  <a:srgbClr val="0070C0"/>
+                </a:solidFill>
+                <a:latin typeface="Courier New" pitchFamily="49" charset="0"/>
+                <a:cs typeface="Courier New" pitchFamily="49" charset="0"/>
+              </a:rPr>
+              <a:t>negative</a:t>
+            </a:r>
+            <a:r>
+              <a:rPr lang="en-US" sz="1600" dirty="0" smtClean="0">
+                <a:latin typeface="Courier New" pitchFamily="49" charset="0"/>
+                <a:cs typeface="Courier New" pitchFamily="49" charset="0"/>
+              </a:rPr>
+              <a:t>, </a:t>
+            </a:r>
+            <a:r>
+              <a:rPr lang="en-US" sz="1600" b="1" dirty="0" smtClean="0">
+                <a:solidFill>
+                  <a:srgbClr val="00B050"/>
+                </a:solidFill>
+                <a:latin typeface="Courier New" pitchFamily="49" charset="0"/>
+                <a:cs typeface="Courier New" pitchFamily="49" charset="0"/>
+              </a:rPr>
+              <a:t>neutral</a:t>
+            </a:r>
+            <a:r>
+              <a:rPr lang="en-US" sz="1600" dirty="0" smtClean="0">
+                <a:latin typeface="Courier New" pitchFamily="49" charset="0"/>
+                <a:cs typeface="Courier New" pitchFamily="49" charset="0"/>
+              </a:rPr>
+              <a:t>, </a:t>
+            </a:r>
+            <a:r>
+              <a:rPr lang="en-US" sz="1600" b="1" dirty="0" smtClean="0">
+                <a:solidFill>
+                  <a:srgbClr val="C00000"/>
+                </a:solidFill>
+                <a:latin typeface="Courier New" pitchFamily="49" charset="0"/>
+                <a:cs typeface="Courier New" pitchFamily="49" charset="0"/>
+              </a:rPr>
+              <a:t>positive</a:t>
+            </a:r>
+            <a:r>
+              <a:rPr lang="en-US" sz="1600" dirty="0" smtClean="0">
+                <a:latin typeface="Courier New" pitchFamily="49" charset="0"/>
+                <a:cs typeface="Courier New" pitchFamily="49" charset="0"/>
+              </a:rPr>
+              <a:t>};</a:t>
+            </a:r>
+          </a:p>
+          <a:p>
+            <a:endParaRPr lang="en-US" sz="1600" dirty="0" smtClean="0">
+              <a:latin typeface="Courier New" pitchFamily="49" charset="0"/>
+              <a:cs typeface="Courier New" pitchFamily="49" charset="0"/>
+            </a:endParaRPr>
+          </a:p>
+          <a:p>
+            <a:r>
+              <a:rPr lang="en-US" sz="1600" dirty="0" err="1">
+                <a:latin typeface="Courier New" pitchFamily="49" charset="0"/>
+                <a:cs typeface="Courier New" pitchFamily="49" charset="0"/>
+              </a:rPr>
+              <a:t>int</a:t>
+            </a:r>
+            <a:r>
+              <a:rPr lang="en-US" sz="1600" dirty="0">
+                <a:latin typeface="Courier New" pitchFamily="49" charset="0"/>
+                <a:cs typeface="Courier New" pitchFamily="49" charset="0"/>
+              </a:rPr>
+              <a:t> </a:t>
+            </a:r>
+            <a:r>
+              <a:rPr lang="en-US" sz="1600" dirty="0" err="1">
+                <a:latin typeface="Courier New" pitchFamily="49" charset="0"/>
+                <a:cs typeface="Courier New" pitchFamily="49" charset="0"/>
+              </a:rPr>
+              <a:t>charge_value</a:t>
+            </a:r>
+            <a:r>
+              <a:rPr lang="en-US" sz="1600" dirty="0">
+                <a:latin typeface="Courier New" pitchFamily="49" charset="0"/>
+                <a:cs typeface="Courier New" pitchFamily="49" charset="0"/>
+              </a:rPr>
+              <a:t>(</a:t>
+            </a:r>
+            <a:r>
+              <a:rPr lang="en-US" sz="1600" b="1" dirty="0">
+                <a:latin typeface="Courier New" pitchFamily="49" charset="0"/>
+                <a:cs typeface="Courier New" pitchFamily="49" charset="0"/>
+              </a:rPr>
+              <a:t>Charge</a:t>
+            </a:r>
+            <a:r>
+              <a:rPr lang="en-US" sz="1600" dirty="0">
+                <a:latin typeface="Courier New" pitchFamily="49" charset="0"/>
+                <a:cs typeface="Courier New" pitchFamily="49" charset="0"/>
+              </a:rPr>
+              <a:t> charge) {</a:t>
+            </a:r>
+          </a:p>
+          <a:p>
+            <a:r>
+              <a:rPr lang="en-US" sz="1600" dirty="0" smtClean="0">
+                <a:latin typeface="Courier New" pitchFamily="49" charset="0"/>
+                <a:cs typeface="Courier New" pitchFamily="49" charset="0"/>
+              </a:rPr>
+              <a:t>    switch </a:t>
+            </a:r>
+            <a:r>
+              <a:rPr lang="en-US" sz="1600" dirty="0">
+                <a:latin typeface="Courier New" pitchFamily="49" charset="0"/>
+                <a:cs typeface="Courier New" pitchFamily="49" charset="0"/>
+              </a:rPr>
+              <a:t>(charge)</a:t>
+            </a:r>
+          </a:p>
+          <a:p>
+            <a:r>
+              <a:rPr lang="en-US" sz="1600" dirty="0">
+                <a:latin typeface="Courier New" pitchFamily="49" charset="0"/>
+                <a:cs typeface="Courier New" pitchFamily="49" charset="0"/>
+              </a:rPr>
+              <a:t>        case </a:t>
+            </a:r>
+            <a:r>
+              <a:rPr lang="en-US" sz="1600" b="1" dirty="0">
+                <a:solidFill>
+                  <a:srgbClr val="0070C0"/>
+                </a:solidFill>
+                <a:latin typeface="Courier New" pitchFamily="49" charset="0"/>
+                <a:cs typeface="Courier New" pitchFamily="49" charset="0"/>
+              </a:rPr>
+              <a:t>Charge::negative</a:t>
+            </a:r>
+            <a:r>
+              <a:rPr lang="en-US" sz="1600" dirty="0">
+                <a:latin typeface="Courier New" pitchFamily="49" charset="0"/>
+                <a:cs typeface="Courier New" pitchFamily="49" charset="0"/>
+              </a:rPr>
+              <a:t>:</a:t>
+            </a:r>
+          </a:p>
+          <a:p>
+            <a:r>
+              <a:rPr lang="en-US" sz="1600" dirty="0">
+                <a:latin typeface="Courier New" pitchFamily="49" charset="0"/>
+                <a:cs typeface="Courier New" pitchFamily="49" charset="0"/>
+              </a:rPr>
+              <a:t>            </a:t>
+            </a:r>
+            <a:r>
+              <a:rPr lang="en-US" sz="1600" dirty="0" smtClean="0">
+                <a:latin typeface="Courier New" pitchFamily="49" charset="0"/>
+                <a:cs typeface="Courier New" pitchFamily="49" charset="0"/>
+              </a:rPr>
+              <a:t>return </a:t>
+            </a:r>
+            <a:r>
+              <a:rPr lang="en-US" sz="1600" dirty="0">
+                <a:latin typeface="Courier New" pitchFamily="49" charset="0"/>
+                <a:cs typeface="Courier New" pitchFamily="49" charset="0"/>
+              </a:rPr>
+              <a:t>-1;</a:t>
+            </a:r>
+          </a:p>
+          <a:p>
+            <a:r>
+              <a:rPr lang="en-US" sz="1600" dirty="0" smtClean="0">
+                <a:latin typeface="Courier New" pitchFamily="49" charset="0"/>
+                <a:cs typeface="Courier New" pitchFamily="49" charset="0"/>
+              </a:rPr>
+              <a:t>        case </a:t>
+            </a:r>
+            <a:r>
+              <a:rPr lang="en-US" sz="1600" b="1" dirty="0">
+                <a:solidFill>
+                  <a:srgbClr val="00B050"/>
+                </a:solidFill>
+                <a:latin typeface="Courier New" pitchFamily="49" charset="0"/>
+                <a:cs typeface="Courier New" pitchFamily="49" charset="0"/>
+              </a:rPr>
+              <a:t>Charge::neutral</a:t>
+            </a:r>
+            <a:r>
+              <a:rPr lang="en-US" sz="1600" dirty="0">
+                <a:latin typeface="Courier New" pitchFamily="49" charset="0"/>
+                <a:cs typeface="Courier New" pitchFamily="49" charset="0"/>
+              </a:rPr>
+              <a:t>:</a:t>
+            </a:r>
+          </a:p>
+          <a:p>
+            <a:r>
+              <a:rPr lang="en-US" sz="1600" dirty="0">
+                <a:latin typeface="Courier New" pitchFamily="49" charset="0"/>
+                <a:cs typeface="Courier New" pitchFamily="49" charset="0"/>
+              </a:rPr>
+              <a:t>            </a:t>
+            </a:r>
+            <a:r>
+              <a:rPr lang="en-US" sz="1600" dirty="0" smtClean="0">
+                <a:latin typeface="Courier New" pitchFamily="49" charset="0"/>
+                <a:cs typeface="Courier New" pitchFamily="49" charset="0"/>
+              </a:rPr>
+              <a:t>return </a:t>
+            </a:r>
+            <a:r>
+              <a:rPr lang="en-US" sz="1600" dirty="0">
+                <a:latin typeface="Courier New" pitchFamily="49" charset="0"/>
+                <a:cs typeface="Courier New" pitchFamily="49" charset="0"/>
+              </a:rPr>
+              <a:t>0;</a:t>
+            </a:r>
+          </a:p>
+          <a:p>
+            <a:r>
+              <a:rPr lang="en-US" sz="1600" dirty="0" smtClean="0">
+                <a:latin typeface="Courier New" pitchFamily="49" charset="0"/>
+                <a:cs typeface="Courier New" pitchFamily="49" charset="0"/>
+              </a:rPr>
+              <a:t>        case </a:t>
+            </a:r>
+            <a:r>
+              <a:rPr lang="en-US" sz="1600" b="1" dirty="0">
+                <a:solidFill>
+                  <a:srgbClr val="C00000"/>
+                </a:solidFill>
+                <a:latin typeface="Courier New" pitchFamily="49" charset="0"/>
+                <a:cs typeface="Courier New" pitchFamily="49" charset="0"/>
+              </a:rPr>
+              <a:t>Charge::positive</a:t>
+            </a:r>
+            <a:r>
+              <a:rPr lang="en-US" sz="1600" dirty="0">
+                <a:latin typeface="Courier New" pitchFamily="49" charset="0"/>
+                <a:cs typeface="Courier New" pitchFamily="49" charset="0"/>
+              </a:rPr>
+              <a:t>:</a:t>
+            </a:r>
+          </a:p>
+          <a:p>
+            <a:r>
+              <a:rPr lang="en-US" sz="1600" dirty="0">
+                <a:latin typeface="Courier New" pitchFamily="49" charset="0"/>
+                <a:cs typeface="Courier New" pitchFamily="49" charset="0"/>
+              </a:rPr>
+              <a:t>        </a:t>
+            </a:r>
+            <a:r>
+              <a:rPr lang="en-US" sz="1600" dirty="0" smtClean="0">
+                <a:latin typeface="Courier New" pitchFamily="49" charset="0"/>
+                <a:cs typeface="Courier New" pitchFamily="49" charset="0"/>
+              </a:rPr>
+              <a:t>    return 1;</a:t>
+            </a:r>
+          </a:p>
+          <a:p>
+            <a:r>
+              <a:rPr lang="en-US" sz="1600" dirty="0">
+                <a:latin typeface="Courier New" pitchFamily="49" charset="0"/>
+                <a:cs typeface="Courier New" pitchFamily="49" charset="0"/>
+              </a:rPr>
+              <a:t> </a:t>
+            </a:r>
+            <a:r>
+              <a:rPr lang="en-US" sz="1600" dirty="0" smtClean="0">
+                <a:latin typeface="Courier New" pitchFamily="49" charset="0"/>
+                <a:cs typeface="Courier New" pitchFamily="49" charset="0"/>
+              </a:rPr>
+              <a:t>   }</a:t>
+            </a:r>
+          </a:p>
+          <a:p>
+            <a:r>
+              <a:rPr lang="en-US" sz="1600" dirty="0" smtClean="0">
+                <a:latin typeface="Courier New" pitchFamily="49" charset="0"/>
+                <a:cs typeface="Courier New" pitchFamily="49" charset="0"/>
+              </a:rPr>
+              <a:t>}    </a:t>
+            </a:r>
+            <a:endParaRPr lang="en-US" sz="1600" dirty="0">
+              <a:latin typeface="Courier New" pitchFamily="49" charset="0"/>
+              <a:cs typeface="Courier New" pitchFamily="49" charset="0"/>
+            </a:endParaRPr>
+          </a:p>
+        </p:txBody>
+      </p:sp>
+      <p:grpSp>
+        <p:nvGrpSpPr>
+          <p:cNvPr id="7" name="Group 6"/>
+          <p:cNvGrpSpPr/>
+          <p:nvPr/>
+        </p:nvGrpSpPr>
+        <p:grpSpPr>
+          <a:xfrm>
+            <a:off x="5289755" y="3736259"/>
+            <a:ext cx="3569110" cy="665145"/>
+            <a:chOff x="-1020223" y="3236807"/>
+            <a:chExt cx="3569110" cy="665145"/>
+          </a:xfrm>
+        </p:grpSpPr>
+        <p:sp>
+          <p:nvSpPr>
+            <p:cNvPr id="8" name="TextBox 7"/>
+            <p:cNvSpPr txBox="1"/>
+            <p:nvPr/>
+          </p:nvSpPr>
+          <p:spPr>
+            <a:xfrm>
+              <a:off x="91423" y="3501842"/>
+              <a:ext cx="2457464" cy="400110"/>
+            </a:xfrm>
+            <a:prstGeom prst="rect">
+              <a:avLst/>
+            </a:prstGeom>
+            <a:solidFill>
+              <a:schemeClr val="bg1"/>
+            </a:solidFill>
+            <a:ln w="19050">
+              <a:solidFill>
+                <a:schemeClr val="tx1"/>
+              </a:solidFill>
+            </a:ln>
+          </p:spPr>
+          <p:txBody>
+            <a:bodyPr wrap="square" rtlCol="0">
+              <a:spAutoFit/>
+            </a:bodyPr>
+            <a:lstStyle/>
+            <a:p>
+              <a:r>
+                <a:rPr lang="en-US" sz="2000" dirty="0" err="1" smtClean="0"/>
+                <a:t>enum</a:t>
+              </a:r>
+              <a:r>
+                <a:rPr lang="en-US" sz="2000" dirty="0" smtClean="0"/>
+                <a:t> class definition</a:t>
+              </a:r>
+              <a:endParaRPr lang="en-US" sz="2000" dirty="0">
+                <a:latin typeface="Courier New" panose="02070309020205020404" pitchFamily="49" charset="0"/>
+                <a:cs typeface="Courier New" panose="02070309020205020404" pitchFamily="49" charset="0"/>
+              </a:endParaRPr>
+            </a:p>
+          </p:txBody>
+        </p:sp>
+        <p:cxnSp>
+          <p:nvCxnSpPr>
+            <p:cNvPr id="9" name="Straight Arrow Connector 8"/>
+            <p:cNvCxnSpPr>
+              <a:stCxn id="8" idx="1"/>
+            </p:cNvCxnSpPr>
+            <p:nvPr/>
+          </p:nvCxnSpPr>
+          <p:spPr>
+            <a:xfrm flipH="1" flipV="1">
+              <a:off x="-1020223" y="3236807"/>
+              <a:ext cx="1111646" cy="465090"/>
+            </a:xfrm>
+            <a:prstGeom prst="straightConnector1">
+              <a:avLst/>
+            </a:prstGeom>
+            <a:ln w="19050">
+              <a:solidFill>
+                <a:schemeClr val="tx1"/>
+              </a:solidFill>
+              <a:tailEnd type="stealth" w="lg" len="lg"/>
+            </a:ln>
+          </p:spPr>
+          <p:style>
+            <a:lnRef idx="1">
+              <a:schemeClr val="accent1"/>
+            </a:lnRef>
+            <a:fillRef idx="0">
+              <a:schemeClr val="accent1"/>
+            </a:fillRef>
+            <a:effectRef idx="0">
+              <a:schemeClr val="accent1"/>
+            </a:effectRef>
+            <a:fontRef idx="minor">
+              <a:schemeClr val="tx1"/>
+            </a:fontRef>
+          </p:style>
+        </p:cxnSp>
+      </p:grpSp>
+    </p:spTree>
+    <p:extLst>
+      <p:ext uri="{BB962C8B-B14F-4D97-AF65-F5344CB8AC3E}">
+        <p14:creationId xmlns:p14="http://schemas.microsoft.com/office/powerpoint/2010/main" val="1417550885"/>
+      </p:ext>
+    </p:extLst>
+  </p:cSld>
+  <p:clrMapOvr>
+    <a:masterClrMapping/>
+  </p:clrMapOvr>
+  <p:timing>
+    <p:tnLst>
+      <p:par>
+        <p:cTn id="1" dur="indefinite" restart="never" nodeType="tmRoot">
+          <p:childTnLst>
+            <p:seq concurrent="1" nextAc="seek">
+              <p:cTn id="2" dur="indefinite" nodeType="mainSeq">
+                <p:childTnLst>
+                  <p:par>
+                    <p:cTn id="3" fill="hold">
+                      <p:stCondLst>
+                        <p:cond delay="indefinite"/>
+                        <p:cond evt="onBegin" delay="0">
+                          <p:tn val="2"/>
+                        </p:cond>
+                      </p:stCondLst>
+                      <p:childTnLst>
+                        <p:par>
+                          <p:cTn id="4" fill="hold">
+                            <p:stCondLst>
+                              <p:cond delay="0"/>
+                            </p:stCondLst>
+                            <p:childTnLst>
+                              <p:par>
+                                <p:cTn id="5" presetID="1" presetClass="entr" presetSubtype="0" fill="hold" grpId="0" nodeType="withEffect">
+                                  <p:stCondLst>
+                                    <p:cond delay="0"/>
+                                  </p:stCondLst>
+                                  <p:childTnLst>
+                                    <p:set>
+                                      <p:cBhvr>
+                                        <p:cTn id="6" dur="1" fill="hold">
+                                          <p:stCondLst>
+                                            <p:cond delay="0"/>
+                                          </p:stCondLst>
+                                        </p:cTn>
+                                        <p:tgtEl>
+                                          <p:spTgt spid="5"/>
+                                        </p:tgtEl>
+                                        <p:attrNameLst>
+                                          <p:attrName>style.visibility</p:attrName>
+                                        </p:attrNameLst>
+                                      </p:cBhvr>
+                                      <p:to>
+                                        <p:strVal val="visible"/>
+                                      </p:to>
+                                    </p:set>
+                                  </p:childTnLst>
+                                </p:cTn>
+                              </p:par>
+                            </p:childTnLst>
+                          </p:cTn>
+                        </p:par>
+                      </p:childTnLst>
+                    </p:cTn>
+                  </p:par>
+                  <p:par>
+                    <p:cTn id="7" fill="hold">
+                      <p:stCondLst>
+                        <p:cond delay="indefinite"/>
+                      </p:stCondLst>
+                      <p:childTnLst>
+                        <p:par>
+                          <p:cTn id="8" fill="hold">
+                            <p:stCondLst>
+                              <p:cond delay="0"/>
+                            </p:stCondLst>
+                            <p:childTnLst>
+                              <p:par>
+                                <p:cTn id="9" presetID="1" presetClass="entr" presetSubtype="0" fill="hold" nodeType="clickEffect">
+                                  <p:stCondLst>
+                                    <p:cond delay="0"/>
+                                  </p:stCondLst>
+                                  <p:childTnLst>
+                                    <p:set>
+                                      <p:cBhvr>
+                                        <p:cTn id="10" dur="1" fill="hold">
+                                          <p:stCondLst>
+                                            <p:cond delay="0"/>
+                                          </p:stCondLst>
+                                        </p:cTn>
+                                        <p:tgtEl>
+                                          <p:spTgt spid="7"/>
+                                        </p:tgtEl>
+                                        <p:attrNameLst>
+                                          <p:attrName>style.visibility</p:attrName>
+                                        </p:attrNameLst>
+                                      </p:cBhvr>
+                                      <p:to>
+                                        <p:strVal val="visible"/>
+                                      </p:to>
+                                    </p:set>
+                                  </p:childTnLst>
+                                </p:cTn>
+                              </p:par>
+                            </p:childTnLst>
+                          </p:cTn>
+                        </p:par>
+                      </p:childTnLst>
+                    </p:cTn>
+                  </p:par>
+                </p:childTnLst>
+              </p:cTn>
+              <p:prevCondLst>
+                <p:cond evt="onPrev" delay="0">
+                  <p:tgtEl>
+                    <p:sldTgt/>
+                  </p:tgtEl>
+                </p:cond>
+              </p:prevCondLst>
+              <p:nextCondLst>
+                <p:cond evt="onNext" delay="0">
+                  <p:tgtEl>
+                    <p:sldTgt/>
+                  </p:tgtEl>
+                </p:cond>
+              </p:nextCondLst>
+            </p:seq>
+          </p:childTnLst>
+        </p:cTn>
+      </p:par>
+    </p:tnLst>
+    <p:bldLst>
+      <p:bldP spid="5" grpId="0" animBg="1"/>
+    </p:bldLst>
+  </p:timing>
+</p:sld>
+</file>
+
+<file path=ppt/slides/slide17.xml><?xml version="1.0" encoding="utf-8"?>
+<p:sld xmlns:a="http://schemas.openxmlformats.org/drawingml/2006/main" xmlns:r="http://schemas.openxmlformats.org/officeDocument/2006/relationships" xmlns:p="http://schemas.openxmlformats.org/presentationml/2006/main">
+  <p:cSld>
+    <p:spTree>
+      <p:nvGrpSpPr>
+        <p:cNvPr id="1" name=""/>
+        <p:cNvGrpSpPr/>
+        <p:nvPr/>
+      </p:nvGrpSpPr>
+      <p:grpSpPr>
+        <a:xfrm>
+          <a:off x="0" y="0"/>
+          <a:ext cx="0" cy="0"/>
+          <a:chOff x="0" y="0"/>
+          <a:chExt cx="0" cy="0"/>
+        </a:xfrm>
+      </p:grpSpPr>
+      <p:sp>
+        <p:nvSpPr>
+          <p:cNvPr id="2" name="Title 1"/>
+          <p:cNvSpPr>
+            <a:spLocks noGrp="1"/>
+          </p:cNvSpPr>
+          <p:nvPr>
+            <p:ph type="title"/>
+          </p:nvPr>
+        </p:nvSpPr>
+        <p:spPr/>
+        <p:txBody>
+          <a:bodyPr/>
+          <a:lstStyle/>
+          <a:p>
+            <a:r>
+              <a:rPr lang="en-US" dirty="0" smtClean="0"/>
+              <a:t>Interlude: switch</a:t>
+            </a:r>
+            <a:endParaRPr lang="en-US" dirty="0"/>
+          </a:p>
+        </p:txBody>
+      </p:sp>
+      <p:sp>
+        <p:nvSpPr>
+          <p:cNvPr id="3" name="Content Placeholder 2"/>
+          <p:cNvSpPr>
+            <a:spLocks noGrp="1"/>
+          </p:cNvSpPr>
+          <p:nvPr>
+            <p:ph idx="1"/>
+          </p:nvPr>
+        </p:nvSpPr>
+        <p:spPr/>
+        <p:txBody>
+          <a:bodyPr/>
+          <a:lstStyle/>
+          <a:p>
+            <a:r>
+              <a:rPr lang="en-US" dirty="0" smtClean="0"/>
+              <a:t>Conditional statement</a:t>
+            </a:r>
+          </a:p>
+          <a:p>
+            <a:pPr lvl="1"/>
+            <a:r>
+              <a:rPr lang="en-US" dirty="0" smtClean="0"/>
+              <a:t>only for scalar types (</a:t>
+            </a:r>
+            <a:r>
+              <a:rPr lang="en-US" dirty="0" err="1" smtClean="0">
+                <a:latin typeface="Courier New" panose="02070309020205020404" pitchFamily="49" charset="0"/>
+                <a:cs typeface="Courier New" panose="02070309020205020404" pitchFamily="49" charset="0"/>
+              </a:rPr>
+              <a:t>int</a:t>
+            </a:r>
+            <a:r>
+              <a:rPr lang="en-US" dirty="0" smtClean="0"/>
+              <a:t>, </a:t>
+            </a:r>
+            <a:r>
+              <a:rPr lang="en-US" dirty="0" smtClean="0">
+                <a:latin typeface="Courier New" panose="02070309020205020404" pitchFamily="49" charset="0"/>
+                <a:cs typeface="Courier New" panose="02070309020205020404" pitchFamily="49" charset="0"/>
+              </a:rPr>
+              <a:t>char</a:t>
+            </a:r>
+            <a:r>
+              <a:rPr lang="en-US" dirty="0" smtClean="0"/>
+              <a:t>, </a:t>
+            </a:r>
+            <a:r>
+              <a:rPr lang="en-US" dirty="0" err="1" smtClean="0">
+                <a:latin typeface="Courier New" panose="02070309020205020404" pitchFamily="49" charset="0"/>
+                <a:cs typeface="Courier New" panose="02070309020205020404" pitchFamily="49" charset="0"/>
+              </a:rPr>
+              <a:t>enum</a:t>
+            </a:r>
+            <a:r>
+              <a:rPr lang="en-US" dirty="0" smtClean="0">
+                <a:latin typeface="Courier New" panose="02070309020205020404" pitchFamily="49" charset="0"/>
+                <a:cs typeface="Courier New" panose="02070309020205020404" pitchFamily="49" charset="0"/>
+              </a:rPr>
+              <a:t> class</a:t>
+            </a:r>
+            <a:r>
+              <a:rPr lang="en-US" dirty="0" smtClean="0"/>
+              <a:t>es)</a:t>
+            </a:r>
+            <a:endParaRPr lang="en-US" dirty="0"/>
+          </a:p>
+        </p:txBody>
+      </p:sp>
+      <p:sp>
+        <p:nvSpPr>
+          <p:cNvPr id="4" name="Slide Number Placeholder 3"/>
+          <p:cNvSpPr>
+            <a:spLocks noGrp="1"/>
+          </p:cNvSpPr>
+          <p:nvPr>
+            <p:ph type="sldNum" sz="quarter" idx="12"/>
+          </p:nvPr>
+        </p:nvSpPr>
+        <p:spPr/>
+        <p:txBody>
+          <a:bodyPr/>
+          <a:lstStyle/>
+          <a:p>
+            <a:fld id="{2F8BA72C-5DC7-4014-AC42-C5F5AAAF9B79}" type="slidenum">
+              <a:rPr lang="en-US" smtClean="0"/>
+              <a:t>17</a:t>
+            </a:fld>
+            <a:endParaRPr lang="en-US"/>
+          </a:p>
+        </p:txBody>
+      </p:sp>
+      <p:sp>
+        <p:nvSpPr>
+          <p:cNvPr id="5" name="TextBox 4"/>
+          <p:cNvSpPr txBox="1"/>
+          <p:nvPr/>
+        </p:nvSpPr>
+        <p:spPr>
+          <a:xfrm>
+            <a:off x="628650" y="2753231"/>
+            <a:ext cx="3176434" cy="3539430"/>
+          </a:xfrm>
+          <a:prstGeom prst="rect">
+            <a:avLst/>
+          </a:prstGeom>
+          <a:solidFill>
+            <a:schemeClr val="bg1">
+              <a:lumMod val="75000"/>
+            </a:schemeClr>
+          </a:solidFill>
+        </p:spPr>
+        <p:txBody>
+          <a:bodyPr wrap="square" rtlCol="0">
+            <a:spAutoFit/>
+          </a:bodyPr>
+          <a:lstStyle/>
+          <a:p>
+            <a:r>
+              <a:rPr lang="en-US" sz="1600" dirty="0" smtClean="0">
+                <a:latin typeface="Courier New" pitchFamily="49" charset="0"/>
+                <a:cs typeface="Courier New" pitchFamily="49" charset="0"/>
+              </a:rPr>
+              <a:t>char op;</a:t>
+            </a:r>
+          </a:p>
+          <a:p>
+            <a:r>
+              <a:rPr lang="en-US" sz="1600" dirty="0" smtClean="0">
+                <a:latin typeface="Courier New" pitchFamily="49" charset="0"/>
+                <a:cs typeface="Courier New" pitchFamily="49" charset="0"/>
+              </a:rPr>
+              <a:t>double result, a, b;</a:t>
+            </a:r>
+            <a:endParaRPr lang="en-US" sz="1600" dirty="0" smtClean="0">
+              <a:latin typeface="Courier New" pitchFamily="49" charset="0"/>
+              <a:cs typeface="Courier New" pitchFamily="49" charset="0"/>
+            </a:endParaRPr>
+          </a:p>
+          <a:p>
+            <a:r>
+              <a:rPr lang="en-US" sz="1600" dirty="0" smtClean="0">
+                <a:latin typeface="Courier New" pitchFamily="49" charset="0"/>
+                <a:cs typeface="Courier New" pitchFamily="49" charset="0"/>
+              </a:rPr>
+              <a:t>…</a:t>
+            </a:r>
+            <a:endParaRPr lang="en-US" sz="1600" dirty="0" smtClean="0">
+              <a:latin typeface="Courier New" pitchFamily="49" charset="0"/>
+              <a:cs typeface="Courier New" pitchFamily="49" charset="0"/>
+            </a:endParaRPr>
+          </a:p>
+          <a:p>
+            <a:r>
+              <a:rPr lang="en-US" sz="1600" dirty="0" smtClean="0">
+                <a:latin typeface="Courier New" pitchFamily="49" charset="0"/>
+                <a:cs typeface="Courier New" pitchFamily="49" charset="0"/>
+              </a:rPr>
+              <a:t>switch (op) {</a:t>
+            </a:r>
+          </a:p>
+          <a:p>
+            <a:r>
+              <a:rPr lang="en-US" sz="1600" dirty="0">
+                <a:latin typeface="Courier New" pitchFamily="49" charset="0"/>
+                <a:cs typeface="Courier New" pitchFamily="49" charset="0"/>
+              </a:rPr>
+              <a:t> </a:t>
+            </a:r>
+            <a:r>
+              <a:rPr lang="en-US" sz="1600" dirty="0" smtClean="0">
+                <a:latin typeface="Courier New" pitchFamily="49" charset="0"/>
+                <a:cs typeface="Courier New" pitchFamily="49" charset="0"/>
+              </a:rPr>
+              <a:t>   case '+':</a:t>
+            </a:r>
+          </a:p>
+          <a:p>
+            <a:r>
+              <a:rPr lang="en-US" sz="1600" dirty="0" smtClean="0">
+                <a:latin typeface="Courier New" pitchFamily="49" charset="0"/>
+                <a:cs typeface="Courier New" pitchFamily="49" charset="0"/>
+              </a:rPr>
+              <a:t>        result = a + b;</a:t>
+            </a:r>
+          </a:p>
+          <a:p>
+            <a:r>
+              <a:rPr lang="en-US" sz="1600" dirty="0">
+                <a:latin typeface="Courier New" pitchFamily="49" charset="0"/>
+                <a:cs typeface="Courier New" pitchFamily="49" charset="0"/>
+              </a:rPr>
+              <a:t> </a:t>
+            </a:r>
+            <a:r>
+              <a:rPr lang="en-US" sz="1600" dirty="0" smtClean="0">
+                <a:latin typeface="Courier New" pitchFamily="49" charset="0"/>
+                <a:cs typeface="Courier New" pitchFamily="49" charset="0"/>
+              </a:rPr>
+              <a:t>       break;</a:t>
+            </a:r>
+          </a:p>
+          <a:p>
+            <a:r>
+              <a:rPr lang="en-US" sz="1600" dirty="0">
+                <a:latin typeface="Courier New" pitchFamily="49" charset="0"/>
+                <a:cs typeface="Courier New" pitchFamily="49" charset="0"/>
+              </a:rPr>
+              <a:t> </a:t>
+            </a:r>
+            <a:r>
+              <a:rPr lang="en-US" sz="1600" dirty="0" smtClean="0">
+                <a:latin typeface="Courier New" pitchFamily="49" charset="0"/>
+                <a:cs typeface="Courier New" pitchFamily="49" charset="0"/>
+              </a:rPr>
+              <a:t>   case '-':</a:t>
+            </a:r>
+          </a:p>
+          <a:p>
+            <a:r>
+              <a:rPr lang="en-US" sz="1600" dirty="0">
+                <a:latin typeface="Courier New" pitchFamily="49" charset="0"/>
+                <a:cs typeface="Courier New" pitchFamily="49" charset="0"/>
+              </a:rPr>
+              <a:t> </a:t>
+            </a:r>
+            <a:r>
+              <a:rPr lang="en-US" sz="1600" dirty="0" smtClean="0">
+                <a:latin typeface="Courier New" pitchFamily="49" charset="0"/>
+                <a:cs typeface="Courier New" pitchFamily="49" charset="0"/>
+              </a:rPr>
+              <a:t>       result = a - b;</a:t>
+            </a:r>
+          </a:p>
+          <a:p>
+            <a:r>
+              <a:rPr lang="en-US" sz="1600" dirty="0">
+                <a:latin typeface="Courier New" pitchFamily="49" charset="0"/>
+                <a:cs typeface="Courier New" pitchFamily="49" charset="0"/>
+              </a:rPr>
+              <a:t> </a:t>
+            </a:r>
+            <a:r>
+              <a:rPr lang="en-US" sz="1600" dirty="0" smtClean="0">
+                <a:latin typeface="Courier New" pitchFamily="49" charset="0"/>
+                <a:cs typeface="Courier New" pitchFamily="49" charset="0"/>
+              </a:rPr>
+              <a:t>       break;</a:t>
+            </a:r>
+          </a:p>
+          <a:p>
+            <a:r>
+              <a:rPr lang="en-US" sz="1600" dirty="0">
+                <a:latin typeface="Courier New" pitchFamily="49" charset="0"/>
+                <a:cs typeface="Courier New" pitchFamily="49" charset="0"/>
+              </a:rPr>
+              <a:t> </a:t>
+            </a:r>
+            <a:r>
+              <a:rPr lang="en-US" sz="1600" dirty="0" smtClean="0">
+                <a:latin typeface="Courier New" pitchFamily="49" charset="0"/>
+                <a:cs typeface="Courier New" pitchFamily="49" charset="0"/>
+              </a:rPr>
+              <a:t>   …</a:t>
+            </a:r>
+          </a:p>
+          <a:p>
+            <a:r>
+              <a:rPr lang="en-US" sz="1600" dirty="0">
+                <a:latin typeface="Courier New" pitchFamily="49" charset="0"/>
+                <a:cs typeface="Courier New" pitchFamily="49" charset="0"/>
+              </a:rPr>
+              <a:t> </a:t>
+            </a:r>
+            <a:r>
+              <a:rPr lang="en-US" sz="1600" dirty="0" smtClean="0">
+                <a:latin typeface="Courier New" pitchFamily="49" charset="0"/>
+                <a:cs typeface="Courier New" pitchFamily="49" charset="0"/>
+              </a:rPr>
+              <a:t>   default:</a:t>
+            </a:r>
+          </a:p>
+          <a:p>
+            <a:r>
+              <a:rPr lang="en-US" sz="1600" dirty="0">
+                <a:latin typeface="Courier New" pitchFamily="49" charset="0"/>
+                <a:cs typeface="Courier New" pitchFamily="49" charset="0"/>
+              </a:rPr>
+              <a:t> </a:t>
+            </a:r>
+            <a:r>
+              <a:rPr lang="en-US" sz="1600" dirty="0" smtClean="0">
+                <a:latin typeface="Courier New" pitchFamily="49" charset="0"/>
+                <a:cs typeface="Courier New" pitchFamily="49" charset="0"/>
+              </a:rPr>
+              <a:t>       // error</a:t>
+            </a:r>
+          </a:p>
+          <a:p>
+            <a:r>
+              <a:rPr lang="en-US" sz="1600" dirty="0">
+                <a:latin typeface="Courier New" pitchFamily="49" charset="0"/>
+                <a:cs typeface="Courier New" pitchFamily="49" charset="0"/>
+              </a:rPr>
+              <a:t>}</a:t>
+            </a:r>
+            <a:endParaRPr lang="en-US" sz="1600" dirty="0">
+              <a:latin typeface="Courier New" pitchFamily="49" charset="0"/>
+              <a:cs typeface="Courier New" pitchFamily="49" charset="0"/>
+            </a:endParaRPr>
+          </a:p>
+        </p:txBody>
+      </p:sp>
+      <p:sp>
+        <p:nvSpPr>
+          <p:cNvPr id="6" name="TextBox 5"/>
+          <p:cNvSpPr txBox="1"/>
+          <p:nvPr/>
+        </p:nvSpPr>
+        <p:spPr>
+          <a:xfrm>
+            <a:off x="4832554" y="2753231"/>
+            <a:ext cx="2974873" cy="3046988"/>
+          </a:xfrm>
+          <a:prstGeom prst="rect">
+            <a:avLst/>
+          </a:prstGeom>
+          <a:solidFill>
+            <a:schemeClr val="bg1">
+              <a:lumMod val="75000"/>
+            </a:schemeClr>
+          </a:solidFill>
+        </p:spPr>
+        <p:txBody>
+          <a:bodyPr wrap="square" rtlCol="0">
+            <a:spAutoFit/>
+          </a:bodyPr>
+          <a:lstStyle/>
+          <a:p>
+            <a:r>
+              <a:rPr lang="en-US" sz="1600" dirty="0" smtClean="0">
+                <a:latin typeface="Courier New" pitchFamily="49" charset="0"/>
+                <a:cs typeface="Courier New" pitchFamily="49" charset="0"/>
+              </a:rPr>
+              <a:t>char op;</a:t>
+            </a:r>
+          </a:p>
+          <a:p>
+            <a:r>
+              <a:rPr lang="en-US" sz="1600" dirty="0" smtClean="0">
+                <a:latin typeface="Courier New" pitchFamily="49" charset="0"/>
+                <a:cs typeface="Courier New" pitchFamily="49" charset="0"/>
+              </a:rPr>
+              <a:t>double result, a, b;</a:t>
+            </a:r>
+            <a:endParaRPr lang="en-US" sz="1600" dirty="0" smtClean="0">
+              <a:latin typeface="Courier New" pitchFamily="49" charset="0"/>
+              <a:cs typeface="Courier New" pitchFamily="49" charset="0"/>
+            </a:endParaRPr>
+          </a:p>
+          <a:p>
+            <a:r>
+              <a:rPr lang="en-US" sz="1600" dirty="0" smtClean="0">
+                <a:latin typeface="Courier New" pitchFamily="49" charset="0"/>
+                <a:cs typeface="Courier New" pitchFamily="49" charset="0"/>
+              </a:rPr>
+              <a:t>…</a:t>
+            </a:r>
+            <a:endParaRPr lang="en-US" sz="1600" dirty="0" smtClean="0">
+              <a:latin typeface="Courier New" pitchFamily="49" charset="0"/>
+              <a:cs typeface="Courier New" pitchFamily="49" charset="0"/>
+            </a:endParaRPr>
+          </a:p>
+          <a:p>
+            <a:r>
+              <a:rPr lang="en-US" sz="1600" dirty="0" smtClean="0">
+                <a:latin typeface="Courier New" pitchFamily="49" charset="0"/>
+                <a:cs typeface="Courier New" pitchFamily="49" charset="0"/>
+              </a:rPr>
+              <a:t>if (op ==</a:t>
+            </a:r>
+            <a:r>
+              <a:rPr lang="en-US" sz="1600" dirty="0" smtClean="0">
+                <a:latin typeface="Courier New" pitchFamily="49" charset="0"/>
+                <a:cs typeface="Courier New" pitchFamily="49" charset="0"/>
+              </a:rPr>
+              <a:t> '+') {</a:t>
+            </a:r>
+          </a:p>
+          <a:p>
+            <a:r>
+              <a:rPr lang="en-US" sz="1600" dirty="0" smtClean="0">
+                <a:latin typeface="Courier New" pitchFamily="49" charset="0"/>
+                <a:cs typeface="Courier New" pitchFamily="49" charset="0"/>
+              </a:rPr>
+              <a:t>    result = a + b;</a:t>
+            </a:r>
+          </a:p>
+          <a:p>
+            <a:r>
+              <a:rPr lang="en-US" sz="1600" dirty="0" smtClean="0">
+                <a:latin typeface="Courier New" pitchFamily="49" charset="0"/>
+                <a:cs typeface="Courier New" pitchFamily="49" charset="0"/>
+              </a:rPr>
+              <a:t>else if (op == '-') {</a:t>
+            </a:r>
+          </a:p>
+          <a:p>
+            <a:r>
+              <a:rPr lang="en-US" sz="1600" dirty="0" smtClean="0">
+                <a:latin typeface="Courier New" pitchFamily="49" charset="0"/>
+                <a:cs typeface="Courier New" pitchFamily="49" charset="0"/>
+              </a:rPr>
+              <a:t>    result = a - b;</a:t>
+            </a:r>
+          </a:p>
+          <a:p>
+            <a:r>
+              <a:rPr lang="en-US" sz="1600" dirty="0" smtClean="0">
+                <a:latin typeface="Courier New" pitchFamily="49" charset="0"/>
+                <a:cs typeface="Courier New" pitchFamily="49" charset="0"/>
+              </a:rPr>
+              <a:t>} … {</a:t>
+            </a:r>
+          </a:p>
+          <a:p>
+            <a:r>
+              <a:rPr lang="en-US" sz="1600" dirty="0">
+                <a:latin typeface="Courier New" pitchFamily="49" charset="0"/>
+                <a:cs typeface="Courier New" pitchFamily="49" charset="0"/>
+              </a:rPr>
+              <a:t> </a:t>
+            </a:r>
+            <a:r>
+              <a:rPr lang="en-US" sz="1600" dirty="0" smtClean="0">
+                <a:latin typeface="Courier New" pitchFamily="49" charset="0"/>
+                <a:cs typeface="Courier New" pitchFamily="49" charset="0"/>
+              </a:rPr>
+              <a:t>   …</a:t>
+            </a:r>
+          </a:p>
+          <a:p>
+            <a:r>
+              <a:rPr lang="en-US" sz="1600" dirty="0" smtClean="0">
+                <a:latin typeface="Courier New" pitchFamily="49" charset="0"/>
+                <a:cs typeface="Courier New" pitchFamily="49" charset="0"/>
+              </a:rPr>
+              <a:t>} else {</a:t>
+            </a:r>
+          </a:p>
+          <a:p>
+            <a:r>
+              <a:rPr lang="en-US" sz="1600" dirty="0" smtClean="0">
+                <a:latin typeface="Courier New" pitchFamily="49" charset="0"/>
+                <a:cs typeface="Courier New" pitchFamily="49" charset="0"/>
+              </a:rPr>
+              <a:t>     // error</a:t>
+            </a:r>
+          </a:p>
+          <a:p>
+            <a:r>
+              <a:rPr lang="en-US" sz="1600" dirty="0">
+                <a:latin typeface="Courier New" pitchFamily="49" charset="0"/>
+                <a:cs typeface="Courier New" pitchFamily="49" charset="0"/>
+              </a:rPr>
+              <a:t>}</a:t>
+            </a:r>
+            <a:endParaRPr lang="en-US" sz="1600" dirty="0">
+              <a:latin typeface="Courier New" pitchFamily="49" charset="0"/>
+              <a:cs typeface="Courier New" pitchFamily="49" charset="0"/>
+            </a:endParaRPr>
+          </a:p>
+        </p:txBody>
+      </p:sp>
+      <p:sp>
+        <p:nvSpPr>
+          <p:cNvPr id="8" name="TextBox 7"/>
+          <p:cNvSpPr txBox="1"/>
+          <p:nvPr/>
+        </p:nvSpPr>
+        <p:spPr>
+          <a:xfrm>
+            <a:off x="2694339" y="6037062"/>
+            <a:ext cx="2221489" cy="400110"/>
+          </a:xfrm>
+          <a:prstGeom prst="rect">
+            <a:avLst/>
+          </a:prstGeom>
+          <a:solidFill>
+            <a:schemeClr val="bg1"/>
+          </a:solidFill>
+          <a:ln w="19050">
+            <a:solidFill>
+              <a:schemeClr val="tx1"/>
+            </a:solidFill>
+          </a:ln>
+        </p:spPr>
+        <p:txBody>
+          <a:bodyPr wrap="square" rtlCol="0">
+            <a:spAutoFit/>
+          </a:bodyPr>
+          <a:lstStyle/>
+          <a:p>
+            <a:r>
+              <a:rPr lang="en-US" sz="2000" dirty="0" smtClean="0"/>
+              <a:t>better performance</a:t>
+            </a:r>
+            <a:endParaRPr lang="en-US" sz="2000" dirty="0">
+              <a:latin typeface="Courier New" panose="02070309020205020404" pitchFamily="49" charset="0"/>
+              <a:cs typeface="Courier New" panose="02070309020205020404" pitchFamily="49" charset="0"/>
+            </a:endParaRPr>
+          </a:p>
+        </p:txBody>
+      </p:sp>
+      <p:sp>
+        <p:nvSpPr>
+          <p:cNvPr id="11" name="TextBox 10"/>
+          <p:cNvSpPr txBox="1"/>
+          <p:nvPr/>
+        </p:nvSpPr>
+        <p:spPr>
+          <a:xfrm>
+            <a:off x="6815283" y="4889234"/>
+            <a:ext cx="1700067" cy="400110"/>
+          </a:xfrm>
+          <a:prstGeom prst="rect">
+            <a:avLst/>
+          </a:prstGeom>
+          <a:solidFill>
+            <a:schemeClr val="bg1"/>
+          </a:solidFill>
+          <a:ln w="19050">
+            <a:solidFill>
+              <a:schemeClr val="tx1"/>
+            </a:solidFill>
+          </a:ln>
+        </p:spPr>
+        <p:txBody>
+          <a:bodyPr wrap="square" rtlCol="0">
+            <a:spAutoFit/>
+          </a:bodyPr>
+          <a:lstStyle/>
+          <a:p>
+            <a:r>
+              <a:rPr lang="en-US" sz="2000" dirty="0" smtClean="0"/>
+              <a:t>more versatile</a:t>
+            </a:r>
+            <a:endParaRPr lang="en-US" sz="2000" dirty="0">
+              <a:latin typeface="Courier New" panose="02070309020205020404" pitchFamily="49" charset="0"/>
+              <a:cs typeface="Courier New" panose="02070309020205020404" pitchFamily="49" charset="0"/>
+            </a:endParaRPr>
+          </a:p>
+        </p:txBody>
+      </p:sp>
+    </p:spTree>
+    <p:extLst>
+      <p:ext uri="{BB962C8B-B14F-4D97-AF65-F5344CB8AC3E}">
+        <p14:creationId xmlns:p14="http://schemas.microsoft.com/office/powerpoint/2010/main" val="826121658"/>
+      </p:ext>
+    </p:extLst>
+  </p:cSld>
+  <p:clrMapOvr>
+    <a:masterClrMapping/>
+  </p:clrMapOvr>
+  <p:timing>
+    <p:tnLst>
+      <p:par>
+        <p:cTn id="1" dur="indefinite" restart="never" nodeType="tmRoot">
+          <p:childTnLst>
+            <p:seq concurrent="1" nextAc="seek">
+              <p:cTn id="2" dur="indefinite" nodeType="mainSeq">
+                <p:childTnLst>
+                  <p:par>
+                    <p:cTn id="3" fill="hold">
+                      <p:stCondLst>
+                        <p:cond delay="indefinite"/>
+                      </p:stCondLst>
+                      <p:childTnLst>
+                        <p:par>
+                          <p:cTn id="4" fill="hold">
+                            <p:stCondLst>
+                              <p:cond delay="0"/>
+                            </p:stCondLst>
+                            <p:childTnLst>
+                              <p:par>
+                                <p:cTn id="5" presetID="1" presetClass="entr" presetSubtype="0" fill="hold" grpId="0" nodeType="clickEffect">
+                                  <p:stCondLst>
+                                    <p:cond delay="0"/>
+                                  </p:stCondLst>
+                                  <p:childTnLst>
+                                    <p:set>
+                                      <p:cBhvr>
+                                        <p:cTn id="6" dur="1" fill="hold">
+                                          <p:stCondLst>
+                                            <p:cond delay="0"/>
+                                          </p:stCondLst>
+                                        </p:cTn>
+                                        <p:tgtEl>
+                                          <p:spTgt spid="6"/>
+                                        </p:tgtEl>
+                                        <p:attrNameLst>
+                                          <p:attrName>style.visibility</p:attrName>
+                                        </p:attrNameLst>
+                                      </p:cBhvr>
+                                      <p:to>
+                                        <p:strVal val="visible"/>
+                                      </p:to>
+                                    </p:set>
+                                  </p:childTnLst>
+                                </p:cTn>
+                              </p:par>
+                            </p:childTnLst>
+                          </p:cTn>
+                        </p:par>
+                      </p:childTnLst>
+                    </p:cTn>
+                  </p:par>
+                  <p:par>
+                    <p:cTn id="7" fill="hold">
+                      <p:stCondLst>
+                        <p:cond delay="indefinite"/>
+                      </p:stCondLst>
+                      <p:childTnLst>
+                        <p:par>
+                          <p:cTn id="8" fill="hold">
+                            <p:stCondLst>
+                              <p:cond delay="0"/>
+                            </p:stCondLst>
+                            <p:childTnLst>
+                              <p:par>
+                                <p:cTn id="9" presetID="1" presetClass="entr" presetSubtype="0" fill="hold" grpId="0" nodeType="clickEffect">
+                                  <p:stCondLst>
+                                    <p:cond delay="0"/>
+                                  </p:stCondLst>
+                                  <p:childTnLst>
+                                    <p:set>
+                                      <p:cBhvr>
+                                        <p:cTn id="10" dur="1" fill="hold">
+                                          <p:stCondLst>
+                                            <p:cond delay="0"/>
+                                          </p:stCondLst>
+                                        </p:cTn>
+                                        <p:tgtEl>
+                                          <p:spTgt spid="8"/>
+                                        </p:tgtEl>
+                                        <p:attrNameLst>
+                                          <p:attrName>style.visibility</p:attrName>
+                                        </p:attrNameLst>
+                                      </p:cBhvr>
+                                      <p:to>
+                                        <p:strVal val="visible"/>
+                                      </p:to>
+                                    </p:set>
+                                  </p:childTnLst>
+                                </p:cTn>
+                              </p:par>
+                            </p:childTnLst>
+                          </p:cTn>
+                        </p:par>
+                      </p:childTnLst>
+                    </p:cTn>
+                  </p:par>
+                  <p:par>
+                    <p:cTn id="11" fill="hold">
+                      <p:stCondLst>
+                        <p:cond delay="indefinite"/>
+                      </p:stCondLst>
+                      <p:childTnLst>
+                        <p:par>
+                          <p:cTn id="12" fill="hold">
+                            <p:stCondLst>
+                              <p:cond delay="0"/>
+                            </p:stCondLst>
+                            <p:childTnLst>
+                              <p:par>
+                                <p:cTn id="13" presetID="1" presetClass="entr" presetSubtype="0" fill="hold" grpId="0" nodeType="clickEffect">
+                                  <p:stCondLst>
+                                    <p:cond delay="0"/>
+                                  </p:stCondLst>
+                                  <p:childTnLst>
+                                    <p:set>
+                                      <p:cBhvr>
+                                        <p:cTn id="14" dur="1" fill="hold">
+                                          <p:stCondLst>
+                                            <p:cond delay="0"/>
+                                          </p:stCondLst>
+                                        </p:cTn>
+                                        <p:tgtEl>
+                                          <p:spTgt spid="11"/>
+                                        </p:tgtEl>
+                                        <p:attrNameLst>
+                                          <p:attrName>style.visibility</p:attrName>
+                                        </p:attrNameLst>
+                                      </p:cBhvr>
+                                      <p:to>
+                                        <p:strVal val="visible"/>
+                                      </p:to>
+                                    </p:set>
+                                  </p:childTnLst>
+                                </p:cTn>
+                              </p:par>
+                            </p:childTnLst>
+                          </p:cTn>
+                        </p:par>
+                      </p:childTnLst>
+                    </p:cTn>
+                  </p:par>
+                </p:childTnLst>
+              </p:cTn>
+              <p:prevCondLst>
+                <p:cond evt="onPrev" delay="0">
+                  <p:tgtEl>
+                    <p:sldTgt/>
+                  </p:tgtEl>
+                </p:cond>
+              </p:prevCondLst>
+              <p:nextCondLst>
+                <p:cond evt="onNext" delay="0">
+                  <p:tgtEl>
+                    <p:sldTgt/>
+                  </p:tgtEl>
+                </p:cond>
+              </p:nextCondLst>
+            </p:seq>
+          </p:childTnLst>
+        </p:cTn>
+      </p:par>
+    </p:tnLst>
+    <p:bldLst>
+      <p:bldP spid="6" grpId="0" animBg="1"/>
+      <p:bldP spid="8" grpId="0" animBg="1"/>
+      <p:bldP spid="11" grpId="0" animBg="1"/>
     </p:bldLst>
   </p:timing>
 </p:sld>

</xml_diff>

<commit_message>
Added amphsis for switch types
</commit_message>
<xml_diff>
--- a/CPlusPlus/02_essential_cpp_udt.pptx
+++ b/CPlusPlus/02_essential_cpp_udt.pptx
@@ -213,7 +213,7 @@
           <a:p>
             <a:fld id="{65F1378B-C2AB-4698-A639-9C0E3F833333}" type="datetimeFigureOut">
               <a:rPr lang="en-US" smtClean="0"/>
-              <a:t>2017-02-19</a:t>
+              <a:t>2017-03-01</a:t>
             </a:fld>
             <a:endParaRPr lang="en-US"/>
           </a:p>
@@ -696,7 +696,7 @@
           <a:p>
             <a:fld id="{5786021F-A61E-4517-8760-BC87D1A92FA2}" type="datetime1">
               <a:rPr lang="en-US" smtClean="0"/>
-              <a:t>2017-02-19</a:t>
+              <a:t>2017-03-01</a:t>
             </a:fld>
             <a:endParaRPr lang="en-US"/>
           </a:p>
@@ -866,7 +866,7 @@
           <a:p>
             <a:fld id="{1319E2CA-33D9-482F-BBF4-3C2EF9A11FD9}" type="datetime1">
               <a:rPr lang="en-US" smtClean="0"/>
-              <a:t>2017-02-19</a:t>
+              <a:t>2017-03-01</a:t>
             </a:fld>
             <a:endParaRPr lang="en-US"/>
           </a:p>
@@ -1046,7 +1046,7 @@
           <a:p>
             <a:fld id="{E0855842-D24D-4D96-893F-FC8253D498B3}" type="datetime1">
               <a:rPr lang="en-US" smtClean="0"/>
-              <a:t>2017-02-19</a:t>
+              <a:t>2017-03-01</a:t>
             </a:fld>
             <a:endParaRPr lang="en-US"/>
           </a:p>
@@ -1216,7 +1216,7 @@
           <a:p>
             <a:fld id="{4F17A02C-CCD5-4EAA-AD62-6AF1BBBA5098}" type="datetime1">
               <a:rPr lang="en-US" smtClean="0"/>
-              <a:t>2017-02-19</a:t>
+              <a:t>2017-03-01</a:t>
             </a:fld>
             <a:endParaRPr lang="en-US"/>
           </a:p>
@@ -1460,7 +1460,7 @@
           <a:p>
             <a:fld id="{3C16106F-9685-4E44-9262-E438E92F03CD}" type="datetime1">
               <a:rPr lang="en-US" smtClean="0"/>
-              <a:t>2017-02-19</a:t>
+              <a:t>2017-03-01</a:t>
             </a:fld>
             <a:endParaRPr lang="en-US"/>
           </a:p>
@@ -1692,7 +1692,7 @@
           <a:p>
             <a:fld id="{BA74F6A0-DDD4-49C4-A22A-B3084067F398}" type="datetime1">
               <a:rPr lang="en-US" smtClean="0"/>
-              <a:t>2017-02-19</a:t>
+              <a:t>2017-03-01</a:t>
             </a:fld>
             <a:endParaRPr lang="en-US"/>
           </a:p>
@@ -2059,7 +2059,7 @@
           <a:p>
             <a:fld id="{EFA42ADE-A4E3-4963-8866-B76841D074B7}" type="datetime1">
               <a:rPr lang="en-US" smtClean="0"/>
-              <a:t>2017-02-19</a:t>
+              <a:t>2017-03-01</a:t>
             </a:fld>
             <a:endParaRPr lang="en-US"/>
           </a:p>
@@ -2177,7 +2177,7 @@
           <a:p>
             <a:fld id="{9BF63FB9-06BC-40F3-9571-396BEEB1EB3D}" type="datetime1">
               <a:rPr lang="en-US" smtClean="0"/>
-              <a:t>2017-02-19</a:t>
+              <a:t>2017-03-01</a:t>
             </a:fld>
             <a:endParaRPr lang="en-US"/>
           </a:p>
@@ -2272,7 +2272,7 @@
           <a:p>
             <a:fld id="{A2766F7D-06DD-44B0-8ACC-315F25A1E086}" type="datetime1">
               <a:rPr lang="en-US" smtClean="0"/>
-              <a:t>2017-02-19</a:t>
+              <a:t>2017-03-01</a:t>
             </a:fld>
             <a:endParaRPr lang="en-US"/>
           </a:p>
@@ -2549,7 +2549,7 @@
           <a:p>
             <a:fld id="{19AB181A-4E09-4B9D-B55E-138F3038D59A}" type="datetime1">
               <a:rPr lang="en-US" smtClean="0"/>
-              <a:t>2017-02-19</a:t>
+              <a:t>2017-03-01</a:t>
             </a:fld>
             <a:endParaRPr lang="en-US"/>
           </a:p>
@@ -2806,7 +2806,7 @@
           <a:p>
             <a:fld id="{DABD2A41-686D-44E1-829D-0CDE584BAA73}" type="datetime1">
               <a:rPr lang="en-US" smtClean="0"/>
-              <a:t>2017-02-19</a:t>
+              <a:t>2017-03-01</a:t>
             </a:fld>
             <a:endParaRPr lang="en-US"/>
           </a:p>
@@ -3019,7 +3019,7 @@
           <a:p>
             <a:fld id="{6FCAA38F-FF33-40B5-8182-D4E420F5D6EB}" type="datetime1">
               <a:rPr lang="en-US" smtClean="0"/>
-              <a:t>2017-02-19</a:t>
+              <a:t>2017-03-01</a:t>
             </a:fld>
             <a:endParaRPr lang="en-US"/>
           </a:p>
@@ -3877,21 +3877,7 @@
                 <a:latin typeface="Courier New" pitchFamily="49" charset="0"/>
                 <a:cs typeface="Courier New" pitchFamily="49" charset="0"/>
               </a:rPr>
-              <a:t>mass</a:t>
-            </a:r>
-            <a:r>
-              <a:rPr lang="en-US" sz="1600" dirty="0" smtClean="0">
-                <a:latin typeface="Courier New" pitchFamily="49" charset="0"/>
-                <a:cs typeface="Courier New" pitchFamily="49" charset="0"/>
-              </a:rPr>
-              <a:t>} </a:t>
-            </a:r>
-            <a:r>
-              <a:rPr lang="en-US" sz="1600" dirty="0" smtClean="0">
-                <a:latin typeface="Courier New" pitchFamily="49" charset="0"/>
-                <a:cs typeface="Courier New" pitchFamily="49" charset="0"/>
-              </a:rPr>
-              <a:t>{};</a:t>
+              <a:t>mass} {};</a:t>
             </a:r>
           </a:p>
           <a:p>
@@ -5920,19 +5906,8 @@
                 <a:latin typeface="Courier New" pitchFamily="49" charset="0"/>
                 <a:cs typeface="Courier New" pitchFamily="49" charset="0"/>
               </a:rPr>
-              <a:t> p(0.3, 0.5, 0.7, </a:t>
-            </a:r>
-            <a:r>
-              <a:rPr lang="fr-FR" sz="1600" dirty="0" smtClean="0">
-                <a:latin typeface="Courier New" pitchFamily="49" charset="0"/>
-                <a:cs typeface="Courier New" pitchFamily="49" charset="0"/>
-              </a:rPr>
-              <a:t>1.0);</a:t>
-            </a:r>
-            <a:endParaRPr lang="fr-FR" sz="1600" dirty="0" smtClean="0">
-              <a:latin typeface="Courier New" pitchFamily="49" charset="0"/>
-              <a:cs typeface="Courier New" pitchFamily="49" charset="0"/>
-            </a:endParaRPr>
+              <a:t> p(0.3, 0.5, 0.7, 1.0);</a:t>
+            </a:r>
           </a:p>
           <a:p>
             <a:r>
@@ -7745,37 +7720,44 @@
                 <a:latin typeface="Courier New" pitchFamily="49" charset="0"/>
                 <a:cs typeface="Courier New" pitchFamily="49" charset="0"/>
               </a:rPr>
-              <a:t>()) </a:t>
-            </a:r>
+              <a:t>()) +</a:t>
+            </a:r>
+          </a:p>
+          <a:p>
             <a:r>
               <a:rPr lang="en-US" sz="1600" dirty="0">
                 <a:latin typeface="Courier New" pitchFamily="49" charset="0"/>
                 <a:cs typeface="Courier New" pitchFamily="49" charset="0"/>
               </a:rPr>
-              <a:t>+</a:t>
-            </a:r>
-          </a:p>
-          <a:p>
+              <a:t>                </a:t>
+            </a:r>
+            <a:r>
+              <a:rPr lang="en-US" sz="1600" dirty="0" smtClean="0">
+                <a:latin typeface="Courier New" pitchFamily="49" charset="0"/>
+                <a:cs typeface="Courier New" pitchFamily="49" charset="0"/>
+              </a:rPr>
+              <a:t>(_</a:t>
+            </a:r>
             <a:r>
               <a:rPr lang="en-US" sz="1600" dirty="0">
                 <a:latin typeface="Courier New" pitchFamily="49" charset="0"/>
                 <a:cs typeface="Courier New" pitchFamily="49" charset="0"/>
               </a:rPr>
-              <a:t>                </a:t>
-            </a:r>
-            <a:r>
-              <a:rPr lang="en-US" sz="1600" dirty="0" smtClean="0">
-                <a:latin typeface="Courier New" pitchFamily="49" charset="0"/>
-                <a:cs typeface="Courier New" pitchFamily="49" charset="0"/>
-              </a:rPr>
-              <a:t>(_</a:t>
+              <a:t>z - </a:t>
+            </a:r>
+            <a:r>
+              <a:rPr lang="en-US" sz="1600" dirty="0" err="1">
+                <a:latin typeface="Courier New" pitchFamily="49" charset="0"/>
+                <a:cs typeface="Courier New" pitchFamily="49" charset="0"/>
+              </a:rPr>
+              <a:t>other.z</a:t>
             </a:r>
             <a:r>
               <a:rPr lang="en-US" sz="1600" dirty="0">
                 <a:latin typeface="Courier New" pitchFamily="49" charset="0"/>
                 <a:cs typeface="Courier New" pitchFamily="49" charset="0"/>
               </a:rPr>
-              <a:t>z - </a:t>
+              <a:t>())*(_z - </a:t>
             </a:r>
             <a:r>
               <a:rPr lang="en-US" sz="1600" dirty="0" err="1">
@@ -7789,26 +7771,8 @@
                 <a:latin typeface="Courier New" pitchFamily="49" charset="0"/>
                 <a:cs typeface="Courier New" pitchFamily="49" charset="0"/>
               </a:rPr>
-              <a:t>())*(_z - </a:t>
-            </a:r>
-            <a:r>
-              <a:rPr lang="en-US" sz="1600" dirty="0" err="1">
-                <a:latin typeface="Courier New" pitchFamily="49" charset="0"/>
-                <a:cs typeface="Courier New" pitchFamily="49" charset="0"/>
-              </a:rPr>
-              <a:t>other.z</a:t>
-            </a:r>
-            <a:r>
-              <a:rPr lang="en-US" sz="1600" dirty="0">
-                <a:latin typeface="Courier New" pitchFamily="49" charset="0"/>
-                <a:cs typeface="Courier New" pitchFamily="49" charset="0"/>
-              </a:rPr>
               <a:t>()));</a:t>
             </a:r>
-            <a:endParaRPr lang="en-US" sz="1600" dirty="0">
-              <a:latin typeface="Courier New" pitchFamily="49" charset="0"/>
-              <a:cs typeface="Courier New" pitchFamily="49" charset="0"/>
-            </a:endParaRPr>
           </a:p>
           <a:p>
             <a:r>
@@ -9051,8 +9015,24 @@
           <a:p>
             <a:pPr lvl="1"/>
             <a:r>
+              <a:rPr lang="en-US" i="1" dirty="0" smtClean="0">
+                <a:solidFill>
+                  <a:srgbClr val="C00000"/>
+                </a:solidFill>
+              </a:rPr>
+              <a:t>only</a:t>
+            </a:r>
+            <a:r>
+              <a:rPr lang="en-US" dirty="0" smtClean="0">
+                <a:solidFill>
+                  <a:srgbClr val="C00000"/>
+                </a:solidFill>
+              </a:rPr>
+              <a:t> </a:t>
+            </a:r>
+            <a:r>
               <a:rPr lang="en-US" dirty="0" smtClean="0"/>
-              <a:t>only for scalar types (</a:t>
+              <a:t>for scalar types (</a:t>
             </a:r>
             <a:r>
               <a:rPr lang="en-US" dirty="0" err="1" smtClean="0">
@@ -9163,10 +9143,6 @@
               </a:rPr>
               <a:t>double result, a, b;</a:t>
             </a:r>
-            <a:endParaRPr lang="en-US" sz="1600" dirty="0" smtClean="0">
-              <a:latin typeface="Courier New" pitchFamily="49" charset="0"/>
-              <a:cs typeface="Courier New" pitchFamily="49" charset="0"/>
-            </a:endParaRPr>
           </a:p>
           <a:p>
             <a:r>
@@ -9176,10 +9152,6 @@
               </a:rPr>
               <a:t>…</a:t>
             </a:r>
-            <a:endParaRPr lang="en-US" sz="1600" dirty="0" smtClean="0">
-              <a:latin typeface="Courier New" pitchFamily="49" charset="0"/>
-              <a:cs typeface="Courier New" pitchFamily="49" charset="0"/>
-            </a:endParaRPr>
           </a:p>
           <a:p>
             <a:r>
@@ -9335,10 +9307,6 @@
               </a:rPr>
               <a:t>}</a:t>
             </a:r>
-            <a:endParaRPr lang="en-US" sz="1600" dirty="0">
-              <a:latin typeface="Courier New" pitchFamily="49" charset="0"/>
-              <a:cs typeface="Courier New" pitchFamily="49" charset="0"/>
-            </a:endParaRPr>
           </a:p>
         </p:txBody>
       </p:sp>
@@ -9384,10 +9352,6 @@
               </a:rPr>
               <a:t>double result, a, b;</a:t>
             </a:r>
-            <a:endParaRPr lang="en-US" sz="1600" dirty="0" smtClean="0">
-              <a:latin typeface="Courier New" pitchFamily="49" charset="0"/>
-              <a:cs typeface="Courier New" pitchFamily="49" charset="0"/>
-            </a:endParaRPr>
           </a:p>
           <a:p>
             <a:r>
@@ -9397,10 +9361,6 @@
               </a:rPr>
               <a:t>…</a:t>
             </a:r>
-            <a:endParaRPr lang="en-US" sz="1600" dirty="0" smtClean="0">
-              <a:latin typeface="Courier New" pitchFamily="49" charset="0"/>
-              <a:cs typeface="Courier New" pitchFamily="49" charset="0"/>
-            </a:endParaRPr>
           </a:p>
           <a:p>
             <a:r>
@@ -9408,14 +9368,16 @@
                 <a:latin typeface="Courier New" pitchFamily="49" charset="0"/>
                 <a:cs typeface="Courier New" pitchFamily="49" charset="0"/>
               </a:rPr>
-              <a:t>if (op ==</a:t>
-            </a:r>
+              <a:t>if (op == '+') {</a:t>
+            </a:r>
+          </a:p>
+          <a:p>
             <a:r>
               <a:rPr lang="en-US" sz="1600" dirty="0" smtClean="0">
                 <a:latin typeface="Courier New" pitchFamily="49" charset="0"/>
                 <a:cs typeface="Courier New" pitchFamily="49" charset="0"/>
               </a:rPr>
-              <a:t> '+') {</a:t>
+              <a:t>    result = a + b;</a:t>
             </a:r>
           </a:p>
           <a:p>
@@ -9424,7 +9386,7 @@
                 <a:latin typeface="Courier New" pitchFamily="49" charset="0"/>
                 <a:cs typeface="Courier New" pitchFamily="49" charset="0"/>
               </a:rPr>
-              <a:t>    result = a + b;</a:t>
+              <a:t>else if (op == '-') {</a:t>
             </a:r>
           </a:p>
           <a:p>
@@ -9433,7 +9395,7 @@
                 <a:latin typeface="Courier New" pitchFamily="49" charset="0"/>
                 <a:cs typeface="Courier New" pitchFamily="49" charset="0"/>
               </a:rPr>
-              <a:t>else if (op == '-') {</a:t>
+              <a:t>    result = a - b;</a:t>
             </a:r>
           </a:p>
           <a:p>
@@ -9442,16 +9404,41 @@
                 <a:latin typeface="Courier New" pitchFamily="49" charset="0"/>
                 <a:cs typeface="Courier New" pitchFamily="49" charset="0"/>
               </a:rPr>
-              <a:t>    result = a - b;</a:t>
-            </a:r>
-          </a:p>
-          <a:p>
+              <a:t>} … {</a:t>
+            </a:r>
+          </a:p>
+          <a:p>
+            <a:r>
+              <a:rPr lang="en-US" sz="1600" dirty="0">
+                <a:latin typeface="Courier New" pitchFamily="49" charset="0"/>
+                <a:cs typeface="Courier New" pitchFamily="49" charset="0"/>
+              </a:rPr>
+              <a:t> </a:t>
+            </a:r>
             <a:r>
               <a:rPr lang="en-US" sz="1600" dirty="0" smtClean="0">
                 <a:latin typeface="Courier New" pitchFamily="49" charset="0"/>
                 <a:cs typeface="Courier New" pitchFamily="49" charset="0"/>
               </a:rPr>
-              <a:t>} … {</a:t>
+              <a:t>   …</a:t>
+            </a:r>
+          </a:p>
+          <a:p>
+            <a:r>
+              <a:rPr lang="en-US" sz="1600" dirty="0" smtClean="0">
+                <a:latin typeface="Courier New" pitchFamily="49" charset="0"/>
+                <a:cs typeface="Courier New" pitchFamily="49" charset="0"/>
+              </a:rPr>
+              <a:t>} else {</a:t>
+            </a:r>
+          </a:p>
+          <a:p>
+            <a:r>
+              <a:rPr lang="en-US" sz="1600" dirty="0" smtClean="0">
+                <a:latin typeface="Courier New" pitchFamily="49" charset="0"/>
+                <a:cs typeface="Courier New" pitchFamily="49" charset="0"/>
+              </a:rPr>
+              <a:t>     // error</a:t>
             </a:r>
           </a:p>
           <a:p>
@@ -9460,46 +9447,8 @@
                 <a:latin typeface="Courier New" pitchFamily="49" charset="0"/>
                 <a:cs typeface="Courier New" pitchFamily="49" charset="0"/>
               </a:rPr>
-              <a:t> </a:t>
-            </a:r>
-            <a:r>
-              <a:rPr lang="en-US" sz="1600" dirty="0" smtClean="0">
-                <a:latin typeface="Courier New" pitchFamily="49" charset="0"/>
-                <a:cs typeface="Courier New" pitchFamily="49" charset="0"/>
-              </a:rPr>
-              <a:t>   …</a:t>
-            </a:r>
-          </a:p>
-          <a:p>
-            <a:r>
-              <a:rPr lang="en-US" sz="1600" dirty="0" smtClean="0">
-                <a:latin typeface="Courier New" pitchFamily="49" charset="0"/>
-                <a:cs typeface="Courier New" pitchFamily="49" charset="0"/>
-              </a:rPr>
-              <a:t>} else {</a:t>
-            </a:r>
-          </a:p>
-          <a:p>
-            <a:r>
-              <a:rPr lang="en-US" sz="1600" dirty="0" smtClean="0">
-                <a:latin typeface="Courier New" pitchFamily="49" charset="0"/>
-                <a:cs typeface="Courier New" pitchFamily="49" charset="0"/>
-              </a:rPr>
-              <a:t>     // error</a:t>
-            </a:r>
-          </a:p>
-          <a:p>
-            <a:r>
-              <a:rPr lang="en-US" sz="1600" dirty="0">
-                <a:latin typeface="Courier New" pitchFamily="49" charset="0"/>
-                <a:cs typeface="Courier New" pitchFamily="49" charset="0"/>
-              </a:rPr>
               <a:t>}</a:t>
             </a:r>
-            <a:endParaRPr lang="en-US" sz="1600" dirty="0">
-              <a:latin typeface="Courier New" pitchFamily="49" charset="0"/>
-              <a:cs typeface="Courier New" pitchFamily="49" charset="0"/>
-            </a:endParaRPr>
           </a:p>
         </p:txBody>
       </p:sp>
@@ -11183,10 +11132,6 @@
               </a:rPr>
               <a:t>};</a:t>
             </a:r>
-            <a:endParaRPr lang="nn-NO" sz="1600" dirty="0" smtClean="0">
-              <a:latin typeface="Courier New" pitchFamily="49" charset="0"/>
-              <a:cs typeface="Courier New" pitchFamily="49" charset="0"/>
-            </a:endParaRPr>
           </a:p>
         </p:txBody>
       </p:sp>
@@ -13154,10 +13099,6 @@
               </a:rPr>
               <a:t>…</a:t>
             </a:r>
-            <a:endParaRPr lang="en-US" sz="1600" dirty="0" smtClean="0">
-              <a:latin typeface="Courier New" pitchFamily="49" charset="0"/>
-              <a:cs typeface="Courier New" pitchFamily="49" charset="0"/>
-            </a:endParaRPr>
           </a:p>
           <a:p>
             <a:r>

</xml_diff>

<commit_message>
Added slides listing what was was left out from slides as well as extras
</commit_message>
<xml_diff>
--- a/CPlusPlus/02_essential_cpp_udt.pptx
+++ b/CPlusPlus/02_essential_cpp_udt.pptx
@@ -5,7 +5,7 @@
     <p:sldMasterId id="2147483660" r:id="rId1"/>
   </p:sldMasterIdLst>
   <p:notesMasterIdLst>
-    <p:notesMasterId r:id="rId19"/>
+    <p:notesMasterId r:id="rId20"/>
   </p:notesMasterIdLst>
   <p:sldIdLst>
     <p:sldId id="257" r:id="rId2"/>
@@ -25,6 +25,7 @@
     <p:sldId id="271" r:id="rId16"/>
     <p:sldId id="272" r:id="rId17"/>
     <p:sldId id="273" r:id="rId18"/>
+    <p:sldId id="274" r:id="rId19"/>
   </p:sldIdLst>
   <p:sldSz cx="9144000" cy="6858000" type="screen4x3"/>
   <p:notesSz cx="6858000" cy="9144000"/>
@@ -9712,6 +9713,112 @@
       <p:bldP spid="11" grpId="0" animBg="1"/>
     </p:bldLst>
   </p:timing>
+</p:sld>
+</file>
+
+<file path=ppt/slides/slide18.xml><?xml version="1.0" encoding="utf-8"?>
+<p:sld xmlns:a="http://schemas.openxmlformats.org/drawingml/2006/main" xmlns:r="http://schemas.openxmlformats.org/officeDocument/2006/relationships" xmlns:p="http://schemas.openxmlformats.org/presentationml/2006/main">
+  <p:cSld>
+    <p:spTree>
+      <p:nvGrpSpPr>
+        <p:cNvPr id="1" name=""/>
+        <p:cNvGrpSpPr/>
+        <p:nvPr/>
+      </p:nvGrpSpPr>
+      <p:grpSpPr>
+        <a:xfrm>
+          <a:off x="0" y="0"/>
+          <a:ext cx="0" cy="0"/>
+          <a:chOff x="0" y="0"/>
+          <a:chExt cx="0" cy="0"/>
+        </a:xfrm>
+      </p:grpSpPr>
+      <p:sp>
+        <p:nvSpPr>
+          <p:cNvPr id="2" name="Title 1"/>
+          <p:cNvSpPr>
+            <a:spLocks noGrp="1"/>
+          </p:cNvSpPr>
+          <p:nvPr>
+            <p:ph type="title"/>
+          </p:nvPr>
+        </p:nvSpPr>
+        <p:spPr/>
+        <p:txBody>
+          <a:bodyPr/>
+          <a:lstStyle/>
+          <a:p>
+            <a:r>
+              <a:rPr lang="en-US" dirty="0" smtClean="0"/>
+              <a:t>What was left out?</a:t>
+            </a:r>
+            <a:endParaRPr lang="en-US" dirty="0"/>
+          </a:p>
+        </p:txBody>
+      </p:sp>
+      <p:sp>
+        <p:nvSpPr>
+          <p:cNvPr id="3" name="Content Placeholder 2"/>
+          <p:cNvSpPr>
+            <a:spLocks noGrp="1"/>
+          </p:cNvSpPr>
+          <p:nvPr>
+            <p:ph idx="1"/>
+          </p:nvPr>
+        </p:nvSpPr>
+        <p:spPr/>
+        <p:txBody>
+          <a:bodyPr/>
+          <a:lstStyle/>
+          <a:p>
+            <a:r>
+              <a:rPr lang="en-US" dirty="0" smtClean="0">
+                <a:latin typeface="Courier New" panose="02070309020205020404" pitchFamily="49" charset="0"/>
+                <a:cs typeface="Courier New" panose="02070309020205020404" pitchFamily="49" charset="0"/>
+              </a:rPr>
+              <a:t>union</a:t>
+            </a:r>
+            <a:r>
+              <a:rPr lang="en-US" dirty="0" smtClean="0"/>
+              <a:t> data type</a:t>
+            </a:r>
+            <a:endParaRPr lang="en-US" dirty="0"/>
+          </a:p>
+        </p:txBody>
+      </p:sp>
+      <p:sp>
+        <p:nvSpPr>
+          <p:cNvPr id="4" name="Slide Number Placeholder 3"/>
+          <p:cNvSpPr>
+            <a:spLocks noGrp="1"/>
+          </p:cNvSpPr>
+          <p:nvPr>
+            <p:ph type="sldNum" sz="quarter" idx="12"/>
+          </p:nvPr>
+        </p:nvSpPr>
+        <p:spPr/>
+        <p:txBody>
+          <a:bodyPr/>
+          <a:lstStyle/>
+          <a:p>
+            <a:fld id="{2F8BA72C-5DC7-4014-AC42-C5F5AAAF9B79}" type="slidenum">
+              <a:rPr lang="en-US" smtClean="0"/>
+              <a:t>18</a:t>
+            </a:fld>
+            <a:endParaRPr lang="en-US"/>
+          </a:p>
+        </p:txBody>
+      </p:sp>
+    </p:spTree>
+    <p:extLst>
+      <p:ext uri="{BB962C8B-B14F-4D97-AF65-F5344CB8AC3E}">
+        <p14:creationId xmlns:p14="http://schemas.microsoft.com/office/powerpoint/2010/main" val="2844357252"/>
+      </p:ext>
+    </p:extLst>
+  </p:cSld>
+  <p:clrMapOvr>
+    <a:masterClrMapping/>
+  </p:clrMapOvr>
 </p:sld>
 </file>
 

</xml_diff>